<commit_message>
Update high level sequence diagrams
</commit_message>
<xml_diff>
--- a/docs/diagrams/HighLevelSequenceDiagrams.pptx
+++ b/docs/diagrams/HighLevelSequenceDiagrams.pptx
@@ -107,6 +107,22 @@
       </a:defRPr>
     </a:lvl9pPr>
   </p:defaultTextStyle>
+  <p:extLst>
+    <p:ext uri="{EFAFB233-063F-42B5-8137-9DF3F51BA10A}">
+      <p15:sldGuideLst xmlns:p15="http://schemas.microsoft.com/office/powerpoint/2012/main">
+        <p15:guide id="1" orient="horz" pos="1488">
+          <p15:clr>
+            <a:srgbClr val="A4A3A4"/>
+          </p15:clr>
+        </p15:guide>
+        <p15:guide id="2" pos="2880">
+          <p15:clr>
+            <a:srgbClr val="A4A3A4"/>
+          </p15:clr>
+        </p15:guide>
+      </p15:sldGuideLst>
+    </p:ext>
+  </p:extLst>
 </p:presentation>
 </file>
 
@@ -159,7 +175,7 @@
             </a:lvl1pPr>
           </a:lstStyle>
           <a:p>
-            <a:endParaRPr lang="en-US"/>
+            <a:endParaRPr lang="en-US" dirty="0"/>
           </a:p>
         </p:txBody>
       </p:sp>
@@ -192,9 +208,9 @@
           <a:p>
             <a:fld id="{F5CC4B3F-88C1-4FFA-B1B6-F41C21DC6924}" type="datetimeFigureOut">
               <a:rPr lang="en-US" smtClean="0"/>
-              <a:t>10/16/2016</a:t>
+              <a:t>3/13/17</a:t>
             </a:fld>
-            <a:endParaRPr lang="en-US"/>
+            <a:endParaRPr lang="en-US" dirty="0"/>
           </a:p>
         </p:txBody>
       </p:sp>
@@ -227,7 +243,7 @@
           <a:bodyPr vert="horz" lIns="91440" tIns="45720" rIns="91440" bIns="45720" rtlCol="0" anchor="ctr"/>
           <a:lstStyle/>
           <a:p>
-            <a:endParaRPr lang="en-US"/>
+            <a:endParaRPr lang="en-US" dirty="0"/>
           </a:p>
         </p:txBody>
       </p:sp>
@@ -318,7 +334,7 @@
             </a:lvl1pPr>
           </a:lstStyle>
           <a:p>
-            <a:endParaRPr lang="en-US"/>
+            <a:endParaRPr lang="en-US" dirty="0"/>
           </a:p>
         </p:txBody>
       </p:sp>
@@ -353,7 +369,7 @@
               <a:rPr lang="en-US" smtClean="0"/>
               <a:t>‹#›</a:t>
             </a:fld>
-            <a:endParaRPr lang="en-US"/>
+            <a:endParaRPr lang="en-US" dirty="0"/>
           </a:p>
         </p:txBody>
       </p:sp>
@@ -641,9 +657,9 @@
           <a:p>
             <a:fld id="{78C97017-6FC3-485B-9764-EAC9E56C1D49}" type="datetimeFigureOut">
               <a:rPr lang="en-US" smtClean="0"/>
-              <a:t>10/16/2016</a:t>
+              <a:t>3/13/17</a:t>
             </a:fld>
-            <a:endParaRPr lang="en-US"/>
+            <a:endParaRPr lang="en-US" dirty="0"/>
           </a:p>
         </p:txBody>
       </p:sp>
@@ -662,7 +678,7 @@
           <a:bodyPr/>
           <a:lstStyle/>
           <a:p>
-            <a:endParaRPr lang="en-US"/>
+            <a:endParaRPr lang="en-US" dirty="0"/>
           </a:p>
         </p:txBody>
       </p:sp>
@@ -685,7 +701,7 @@
               <a:rPr lang="en-US" smtClean="0"/>
               <a:t>‹#›</a:t>
             </a:fld>
-            <a:endParaRPr lang="en-US"/>
+            <a:endParaRPr lang="en-US" dirty="0"/>
           </a:p>
         </p:txBody>
       </p:sp>
@@ -811,9 +827,9 @@
           <a:p>
             <a:fld id="{78C97017-6FC3-485B-9764-EAC9E56C1D49}" type="datetimeFigureOut">
               <a:rPr lang="en-US" smtClean="0"/>
-              <a:t>10/16/2016</a:t>
+              <a:t>3/13/17</a:t>
             </a:fld>
-            <a:endParaRPr lang="en-US"/>
+            <a:endParaRPr lang="en-US" dirty="0"/>
           </a:p>
         </p:txBody>
       </p:sp>
@@ -832,7 +848,7 @@
           <a:bodyPr/>
           <a:lstStyle/>
           <a:p>
-            <a:endParaRPr lang="en-US"/>
+            <a:endParaRPr lang="en-US" dirty="0"/>
           </a:p>
         </p:txBody>
       </p:sp>
@@ -855,7 +871,7 @@
               <a:rPr lang="en-US" smtClean="0"/>
               <a:t>‹#›</a:t>
             </a:fld>
-            <a:endParaRPr lang="en-US"/>
+            <a:endParaRPr lang="en-US" dirty="0"/>
           </a:p>
         </p:txBody>
       </p:sp>
@@ -991,9 +1007,9 @@
           <a:p>
             <a:fld id="{78C97017-6FC3-485B-9764-EAC9E56C1D49}" type="datetimeFigureOut">
               <a:rPr lang="en-US" smtClean="0"/>
-              <a:t>10/16/2016</a:t>
+              <a:t>3/13/17</a:t>
             </a:fld>
-            <a:endParaRPr lang="en-US"/>
+            <a:endParaRPr lang="en-US" dirty="0"/>
           </a:p>
         </p:txBody>
       </p:sp>
@@ -1012,7 +1028,7 @@
           <a:bodyPr/>
           <a:lstStyle/>
           <a:p>
-            <a:endParaRPr lang="en-US"/>
+            <a:endParaRPr lang="en-US" dirty="0"/>
           </a:p>
         </p:txBody>
       </p:sp>
@@ -1035,7 +1051,7 @@
               <a:rPr lang="en-US" smtClean="0"/>
               <a:t>‹#›</a:t>
             </a:fld>
-            <a:endParaRPr lang="en-US"/>
+            <a:endParaRPr lang="en-US" dirty="0"/>
           </a:p>
         </p:txBody>
       </p:sp>
@@ -1161,9 +1177,9 @@
           <a:p>
             <a:fld id="{78C97017-6FC3-485B-9764-EAC9E56C1D49}" type="datetimeFigureOut">
               <a:rPr lang="en-US" smtClean="0"/>
-              <a:t>10/16/2016</a:t>
+              <a:t>3/13/17</a:t>
             </a:fld>
-            <a:endParaRPr lang="en-US"/>
+            <a:endParaRPr lang="en-US" dirty="0"/>
           </a:p>
         </p:txBody>
       </p:sp>
@@ -1182,7 +1198,7 @@
           <a:bodyPr/>
           <a:lstStyle/>
           <a:p>
-            <a:endParaRPr lang="en-US"/>
+            <a:endParaRPr lang="en-US" dirty="0"/>
           </a:p>
         </p:txBody>
       </p:sp>
@@ -1205,7 +1221,7 @@
               <a:rPr lang="en-US" smtClean="0"/>
               <a:t>‹#›</a:t>
             </a:fld>
-            <a:endParaRPr lang="en-US"/>
+            <a:endParaRPr lang="en-US" dirty="0"/>
           </a:p>
         </p:txBody>
       </p:sp>
@@ -1407,9 +1423,9 @@
           <a:p>
             <a:fld id="{78C97017-6FC3-485B-9764-EAC9E56C1D49}" type="datetimeFigureOut">
               <a:rPr lang="en-US" smtClean="0"/>
-              <a:t>10/16/2016</a:t>
+              <a:t>3/13/17</a:t>
             </a:fld>
-            <a:endParaRPr lang="en-US"/>
+            <a:endParaRPr lang="en-US" dirty="0"/>
           </a:p>
         </p:txBody>
       </p:sp>
@@ -1428,7 +1444,7 @@
           <a:bodyPr/>
           <a:lstStyle/>
           <a:p>
-            <a:endParaRPr lang="en-US"/>
+            <a:endParaRPr lang="en-US" dirty="0"/>
           </a:p>
         </p:txBody>
       </p:sp>
@@ -1451,7 +1467,7 @@
               <a:rPr lang="en-US" smtClean="0"/>
               <a:t>‹#›</a:t>
             </a:fld>
-            <a:endParaRPr lang="en-US"/>
+            <a:endParaRPr lang="en-US" dirty="0"/>
           </a:p>
         </p:txBody>
       </p:sp>
@@ -1695,9 +1711,9 @@
           <a:p>
             <a:fld id="{78C97017-6FC3-485B-9764-EAC9E56C1D49}" type="datetimeFigureOut">
               <a:rPr lang="en-US" smtClean="0"/>
-              <a:t>10/16/2016</a:t>
+              <a:t>3/13/17</a:t>
             </a:fld>
-            <a:endParaRPr lang="en-US"/>
+            <a:endParaRPr lang="en-US" dirty="0"/>
           </a:p>
         </p:txBody>
       </p:sp>
@@ -1716,7 +1732,7 @@
           <a:bodyPr/>
           <a:lstStyle/>
           <a:p>
-            <a:endParaRPr lang="en-US"/>
+            <a:endParaRPr lang="en-US" dirty="0"/>
           </a:p>
         </p:txBody>
       </p:sp>
@@ -1739,7 +1755,7 @@
               <a:rPr lang="en-US" smtClean="0"/>
               <a:t>‹#›</a:t>
             </a:fld>
-            <a:endParaRPr lang="en-US"/>
+            <a:endParaRPr lang="en-US" dirty="0"/>
           </a:p>
         </p:txBody>
       </p:sp>
@@ -2117,9 +2133,9 @@
           <a:p>
             <a:fld id="{78C97017-6FC3-485B-9764-EAC9E56C1D49}" type="datetimeFigureOut">
               <a:rPr lang="en-US" smtClean="0"/>
-              <a:t>10/16/2016</a:t>
+              <a:t>3/13/17</a:t>
             </a:fld>
-            <a:endParaRPr lang="en-US"/>
+            <a:endParaRPr lang="en-US" dirty="0"/>
           </a:p>
         </p:txBody>
       </p:sp>
@@ -2138,7 +2154,7 @@
           <a:bodyPr/>
           <a:lstStyle/>
           <a:p>
-            <a:endParaRPr lang="en-US"/>
+            <a:endParaRPr lang="en-US" dirty="0"/>
           </a:p>
         </p:txBody>
       </p:sp>
@@ -2161,7 +2177,7 @@
               <a:rPr lang="en-US" smtClean="0"/>
               <a:t>‹#›</a:t>
             </a:fld>
-            <a:endParaRPr lang="en-US"/>
+            <a:endParaRPr lang="en-US" dirty="0"/>
           </a:p>
         </p:txBody>
       </p:sp>
@@ -2235,9 +2251,9 @@
           <a:p>
             <a:fld id="{78C97017-6FC3-485B-9764-EAC9E56C1D49}" type="datetimeFigureOut">
               <a:rPr lang="en-US" smtClean="0"/>
-              <a:t>10/16/2016</a:t>
+              <a:t>3/13/17</a:t>
             </a:fld>
-            <a:endParaRPr lang="en-US"/>
+            <a:endParaRPr lang="en-US" dirty="0"/>
           </a:p>
         </p:txBody>
       </p:sp>
@@ -2256,7 +2272,7 @@
           <a:bodyPr/>
           <a:lstStyle/>
           <a:p>
-            <a:endParaRPr lang="en-US"/>
+            <a:endParaRPr lang="en-US" dirty="0"/>
           </a:p>
         </p:txBody>
       </p:sp>
@@ -2279,7 +2295,7 @@
               <a:rPr lang="en-US" smtClean="0"/>
               <a:t>‹#›</a:t>
             </a:fld>
-            <a:endParaRPr lang="en-US"/>
+            <a:endParaRPr lang="en-US" dirty="0"/>
           </a:p>
         </p:txBody>
       </p:sp>
@@ -2330,9 +2346,9 @@
           <a:p>
             <a:fld id="{78C97017-6FC3-485B-9764-EAC9E56C1D49}" type="datetimeFigureOut">
               <a:rPr lang="en-US" smtClean="0"/>
-              <a:t>10/16/2016</a:t>
+              <a:t>3/13/17</a:t>
             </a:fld>
-            <a:endParaRPr lang="en-US"/>
+            <a:endParaRPr lang="en-US" dirty="0"/>
           </a:p>
         </p:txBody>
       </p:sp>
@@ -2351,7 +2367,7 @@
           <a:bodyPr/>
           <a:lstStyle/>
           <a:p>
-            <a:endParaRPr lang="en-US"/>
+            <a:endParaRPr lang="en-US" dirty="0"/>
           </a:p>
         </p:txBody>
       </p:sp>
@@ -2374,7 +2390,7 @@
               <a:rPr lang="en-US" smtClean="0"/>
               <a:t>‹#›</a:t>
             </a:fld>
-            <a:endParaRPr lang="en-US"/>
+            <a:endParaRPr lang="en-US" dirty="0"/>
           </a:p>
         </p:txBody>
       </p:sp>
@@ -2607,9 +2623,9 @@
           <a:p>
             <a:fld id="{78C97017-6FC3-485B-9764-EAC9E56C1D49}" type="datetimeFigureOut">
               <a:rPr lang="en-US" smtClean="0"/>
-              <a:t>10/16/2016</a:t>
+              <a:t>3/13/17</a:t>
             </a:fld>
-            <a:endParaRPr lang="en-US"/>
+            <a:endParaRPr lang="en-US" dirty="0"/>
           </a:p>
         </p:txBody>
       </p:sp>
@@ -2628,7 +2644,7 @@
           <a:bodyPr/>
           <a:lstStyle/>
           <a:p>
-            <a:endParaRPr lang="en-US"/>
+            <a:endParaRPr lang="en-US" dirty="0"/>
           </a:p>
         </p:txBody>
       </p:sp>
@@ -2651,7 +2667,7 @@
               <a:rPr lang="en-US" smtClean="0"/>
               <a:t>‹#›</a:t>
             </a:fld>
-            <a:endParaRPr lang="en-US"/>
+            <a:endParaRPr lang="en-US" dirty="0"/>
           </a:p>
         </p:txBody>
       </p:sp>
@@ -2774,7 +2790,7 @@
             </a:lvl9pPr>
           </a:lstStyle>
           <a:p>
-            <a:endParaRPr lang="en-US"/>
+            <a:endParaRPr lang="en-US" dirty="0"/>
           </a:p>
         </p:txBody>
       </p:sp>
@@ -2860,9 +2876,9 @@
           <a:p>
             <a:fld id="{78C97017-6FC3-485B-9764-EAC9E56C1D49}" type="datetimeFigureOut">
               <a:rPr lang="en-US" smtClean="0"/>
-              <a:t>10/16/2016</a:t>
+              <a:t>3/13/17</a:t>
             </a:fld>
-            <a:endParaRPr lang="en-US"/>
+            <a:endParaRPr lang="en-US" dirty="0"/>
           </a:p>
         </p:txBody>
       </p:sp>
@@ -2881,7 +2897,7 @@
           <a:bodyPr/>
           <a:lstStyle/>
           <a:p>
-            <a:endParaRPr lang="en-US"/>
+            <a:endParaRPr lang="en-US" dirty="0"/>
           </a:p>
         </p:txBody>
       </p:sp>
@@ -2904,7 +2920,7 @@
               <a:rPr lang="en-US" smtClean="0"/>
               <a:t>‹#›</a:t>
             </a:fld>
-            <a:endParaRPr lang="en-US"/>
+            <a:endParaRPr lang="en-US" dirty="0"/>
           </a:p>
         </p:txBody>
       </p:sp>
@@ -3073,9 +3089,9 @@
           <a:p>
             <a:fld id="{78C97017-6FC3-485B-9764-EAC9E56C1D49}" type="datetimeFigureOut">
               <a:rPr lang="en-US" smtClean="0"/>
-              <a:t>10/16/2016</a:t>
+              <a:t>3/13/17</a:t>
             </a:fld>
-            <a:endParaRPr lang="en-US"/>
+            <a:endParaRPr lang="en-US" dirty="0"/>
           </a:p>
         </p:txBody>
       </p:sp>
@@ -3112,7 +3128,7 @@
             </a:lvl1pPr>
           </a:lstStyle>
           <a:p>
-            <a:endParaRPr lang="en-US"/>
+            <a:endParaRPr lang="en-US" dirty="0"/>
           </a:p>
         </p:txBody>
       </p:sp>
@@ -3153,7 +3169,7 @@
               <a:rPr lang="en-US" smtClean="0"/>
               <a:t>‹#›</a:t>
             </a:fld>
-            <a:endParaRPr lang="en-US"/>
+            <a:endParaRPr lang="en-US" dirty="0"/>
           </a:p>
         </p:txBody>
       </p:sp>
@@ -3587,7 +3603,7 @@
           <a:lstStyle/>
           <a:p>
             <a:pPr algn="ctr"/>
-            <a:endParaRPr lang="en-SG" sz="1400">
+            <a:endParaRPr lang="en-SG" sz="1400" dirty="0">
               <a:solidFill>
                 <a:schemeClr val="dk1"/>
               </a:solidFill>
@@ -3595,223 +3611,6 @@
           </a:p>
         </p:txBody>
       </p:sp>
-      <p:grpSp>
-        <p:nvGrpSpPr>
-          <p:cNvPr id="7" name="Actor"/>
-          <p:cNvGrpSpPr/>
-          <p:nvPr/>
-        </p:nvGrpSpPr>
-        <p:grpSpPr>
-          <a:xfrm>
-            <a:off x="152400" y="533400"/>
-            <a:ext cx="324036" cy="573410"/>
-            <a:chOff x="3239901" y="4149080"/>
-            <a:chExt cx="648072" cy="1146820"/>
-          </a:xfrm>
-        </p:grpSpPr>
-        <p:sp>
-          <p:nvSpPr>
-            <p:cNvPr id="8" name="Flowchart: Connector 7"/>
-            <p:cNvSpPr/>
-            <p:nvPr/>
-          </p:nvSpPr>
-          <p:spPr>
-            <a:xfrm>
-              <a:off x="3419872" y="4149080"/>
-              <a:ext cx="288032" cy="288032"/>
-            </a:xfrm>
-            <a:prstGeom prst="flowChartConnector">
-              <a:avLst/>
-            </a:prstGeom>
-            <a:solidFill>
-              <a:schemeClr val="bg1">
-                <a:lumMod val="85000"/>
-              </a:schemeClr>
-            </a:solidFill>
-            <a:ln w="28575">
-              <a:solidFill>
-                <a:schemeClr val="tx1"/>
-              </a:solidFill>
-            </a:ln>
-            <a:effectLst/>
-          </p:spPr>
-          <p:style>
-            <a:lnRef idx="1">
-              <a:schemeClr val="accent4"/>
-            </a:lnRef>
-            <a:fillRef idx="2">
-              <a:schemeClr val="accent4"/>
-            </a:fillRef>
-            <a:effectRef idx="1">
-              <a:schemeClr val="accent4"/>
-            </a:effectRef>
-            <a:fontRef idx="minor">
-              <a:schemeClr val="dk1"/>
-            </a:fontRef>
-          </p:style>
-          <p:txBody>
-            <a:bodyPr rtlCol="0" anchor="ctr"/>
-            <a:lstStyle/>
-            <a:p>
-              <a:pPr algn="ctr"/>
-              <a:endParaRPr lang="en-SG"/>
-            </a:p>
-          </p:txBody>
-        </p:sp>
-        <p:cxnSp>
-          <p:nvCxnSpPr>
-            <p:cNvPr id="9" name="Straight Connector 8"/>
-            <p:cNvCxnSpPr>
-              <a:stCxn id="8" idx="4"/>
-            </p:cNvCxnSpPr>
-            <p:nvPr/>
-          </p:nvCxnSpPr>
-          <p:spPr>
-            <a:xfrm>
-              <a:off x="3563888" y="4437112"/>
-              <a:ext cx="0" cy="504056"/>
-            </a:xfrm>
-            <a:prstGeom prst="line">
-              <a:avLst/>
-            </a:prstGeom>
-            <a:ln w="28575">
-              <a:solidFill>
-                <a:schemeClr val="tx1"/>
-              </a:solidFill>
-            </a:ln>
-            <a:effectLst/>
-          </p:spPr>
-          <p:style>
-            <a:lnRef idx="1">
-              <a:schemeClr val="accent4"/>
-            </a:lnRef>
-            <a:fillRef idx="2">
-              <a:schemeClr val="accent4"/>
-            </a:fillRef>
-            <a:effectRef idx="1">
-              <a:schemeClr val="accent4"/>
-            </a:effectRef>
-            <a:fontRef idx="minor">
-              <a:schemeClr val="dk1"/>
-            </a:fontRef>
-          </p:style>
-        </p:cxnSp>
-        <p:sp>
-          <p:nvSpPr>
-            <p:cNvPr id="10" name="Freeform 9"/>
-            <p:cNvSpPr/>
-            <p:nvPr/>
-          </p:nvSpPr>
-          <p:spPr>
-            <a:xfrm>
-              <a:off x="3324225" y="4933950"/>
-              <a:ext cx="479425" cy="361950"/>
-            </a:xfrm>
-            <a:custGeom>
-              <a:avLst/>
-              <a:gdLst>
-                <a:gd name="connsiteX0" fmla="*/ 0 w 479425"/>
-                <a:gd name="connsiteY0" fmla="*/ 355600 h 361950"/>
-                <a:gd name="connsiteX1" fmla="*/ 241300 w 479425"/>
-                <a:gd name="connsiteY1" fmla="*/ 0 h 361950"/>
-                <a:gd name="connsiteX2" fmla="*/ 479425 w 479425"/>
-                <a:gd name="connsiteY2" fmla="*/ 361950 h 361950"/>
-              </a:gdLst>
-              <a:ahLst/>
-              <a:cxnLst>
-                <a:cxn ang="0">
-                  <a:pos x="connsiteX0" y="connsiteY0"/>
-                </a:cxn>
-                <a:cxn ang="0">
-                  <a:pos x="connsiteX1" y="connsiteY1"/>
-                </a:cxn>
-                <a:cxn ang="0">
-                  <a:pos x="connsiteX2" y="connsiteY2"/>
-                </a:cxn>
-              </a:cxnLst>
-              <a:rect l="l" t="t" r="r" b="b"/>
-              <a:pathLst>
-                <a:path w="479425" h="361950">
-                  <a:moveTo>
-                    <a:pt x="0" y="355600"/>
-                  </a:moveTo>
-                  <a:lnTo>
-                    <a:pt x="241300" y="0"/>
-                  </a:lnTo>
-                  <a:lnTo>
-                    <a:pt x="479425" y="361950"/>
-                  </a:lnTo>
-                </a:path>
-              </a:pathLst>
-            </a:custGeom>
-            <a:noFill/>
-            <a:ln w="28575">
-              <a:solidFill>
-                <a:schemeClr val="tx1"/>
-              </a:solidFill>
-            </a:ln>
-            <a:effectLst/>
-          </p:spPr>
-          <p:style>
-            <a:lnRef idx="1">
-              <a:schemeClr val="accent4"/>
-            </a:lnRef>
-            <a:fillRef idx="2">
-              <a:schemeClr val="accent4"/>
-            </a:fillRef>
-            <a:effectRef idx="1">
-              <a:schemeClr val="accent4"/>
-            </a:effectRef>
-            <a:fontRef idx="minor">
-              <a:schemeClr val="dk1"/>
-            </a:fontRef>
-          </p:style>
-          <p:txBody>
-            <a:bodyPr rtlCol="0" anchor="ctr"/>
-            <a:lstStyle/>
-            <a:p>
-              <a:pPr algn="ctr"/>
-              <a:endParaRPr lang="en-SG"/>
-            </a:p>
-          </p:txBody>
-        </p:sp>
-        <p:cxnSp>
-          <p:nvCxnSpPr>
-            <p:cNvPr id="11" name="Straight Connector 10"/>
-            <p:cNvCxnSpPr/>
-            <p:nvPr/>
-          </p:nvCxnSpPr>
-          <p:spPr>
-            <a:xfrm>
-              <a:off x="3239901" y="4509120"/>
-              <a:ext cx="648072" cy="0"/>
-            </a:xfrm>
-            <a:prstGeom prst="line">
-              <a:avLst/>
-            </a:prstGeom>
-            <a:ln w="28575">
-              <a:solidFill>
-                <a:schemeClr val="tx1"/>
-              </a:solidFill>
-            </a:ln>
-            <a:effectLst/>
-          </p:spPr>
-          <p:style>
-            <a:lnRef idx="1">
-              <a:schemeClr val="accent4"/>
-            </a:lnRef>
-            <a:fillRef idx="2">
-              <a:schemeClr val="accent4"/>
-            </a:fillRef>
-            <a:effectRef idx="1">
-              <a:schemeClr val="accent4"/>
-            </a:effectRef>
-            <a:fontRef idx="minor">
-              <a:schemeClr val="dk1"/>
-            </a:fontRef>
-          </p:style>
-        </p:cxnSp>
-      </p:grpSp>
       <p:sp>
         <p:nvSpPr>
           <p:cNvPr id="16" name="Rectangle 62"/>
@@ -3951,7 +3750,7 @@
           <a:lstStyle/>
           <a:p>
             <a:pPr algn="ctr"/>
-            <a:endParaRPr lang="en-SG" sz="1400">
+            <a:endParaRPr lang="en-SG" sz="1400" dirty="0">
               <a:solidFill>
                 <a:schemeClr val="dk1"/>
               </a:solidFill>
@@ -4098,7 +3897,7 @@
           <a:lstStyle/>
           <a:p>
             <a:pPr algn="ctr"/>
-            <a:endParaRPr lang="en-SG" sz="1400">
+            <a:endParaRPr lang="en-SG" sz="1400" dirty="0">
               <a:solidFill>
                 <a:schemeClr val="dk1"/>
               </a:solidFill>
@@ -4305,20 +4104,28 @@
           <a:lstStyle/>
           <a:p>
             <a:r>
-              <a:rPr lang="en-US" sz="1400" dirty="0" err="1" smtClean="0">
-                <a:solidFill>
-                  <a:srgbClr val="7030A0"/>
-                </a:solidFill>
-              </a:rPr>
-              <a:t>deletePerson</a:t>
-            </a:r>
-            <a:r>
               <a:rPr lang="en-US" sz="1400" dirty="0" smtClean="0">
                 <a:solidFill>
                   <a:srgbClr val="7030A0"/>
                 </a:solidFill>
               </a:rPr>
-              <a:t>(p)</a:t>
+              <a:t>deleteTask</a:t>
+            </a:r>
+            <a:r>
+              <a:rPr lang="en-US" sz="1400" dirty="0" smtClean="0">
+                <a:solidFill>
+                  <a:srgbClr val="7030A0"/>
+                </a:solidFill>
+              </a:rPr>
+              <a:t>(p</a:t>
+            </a:r>
+            <a:r>
+              <a:rPr lang="en-US" sz="1400" dirty="0" smtClean="0">
+                <a:solidFill>
+                  <a:srgbClr val="7030A0"/>
+                </a:solidFill>
+              </a:rPr>
+              <a:t>)</a:t>
             </a:r>
             <a:endParaRPr lang="en-US" sz="1400" dirty="0">
               <a:solidFill>
@@ -4361,14 +4168,14 @@
               <a:t>post(</a:t>
             </a:r>
             <a:r>
-              <a:rPr lang="en-US" sz="1400" dirty="0" err="1" smtClean="0">
+              <a:rPr lang="en-US" sz="1400" dirty="0" smtClean="0">
                 <a:solidFill>
                   <a:schemeClr val="accent5">
                     <a:lumMod val="75000"/>
                   </a:schemeClr>
                 </a:solidFill>
               </a:rPr>
-              <a:t>AddressBookChangedEvent</a:t>
+              <a:t>TaskBossChangedEvent</a:t>
             </a:r>
             <a:r>
               <a:rPr lang="en-US" sz="1400" dirty="0" smtClean="0">
@@ -4560,7 +4367,7 @@
               <a:t>:</a:t>
             </a:r>
             <a:r>
-              <a:rPr lang="en-US" sz="1600" dirty="0" err="1" smtClean="0">
+              <a:rPr lang="en-US" sz="1600" dirty="0" smtClean="0">
                 <a:solidFill>
                   <a:schemeClr val="bg1"/>
                 </a:solidFill>
@@ -4661,7 +4468,7 @@
           <a:lstStyle/>
           <a:p>
             <a:pPr algn="ctr"/>
-            <a:endParaRPr lang="en-SG" sz="1400">
+            <a:endParaRPr lang="en-SG" sz="1400" dirty="0">
               <a:solidFill>
                 <a:schemeClr val="dk1"/>
               </a:solidFill>
@@ -4894,7 +4701,7 @@
           <a:lstStyle/>
           <a:p>
             <a:pPr algn="ctr"/>
-            <a:endParaRPr lang="en-SG" sz="1400">
+            <a:endParaRPr lang="en-SG" sz="1400" dirty="0">
               <a:solidFill>
                 <a:schemeClr val="dk1"/>
               </a:solidFill>
@@ -4935,14 +4742,14 @@
               <a:t>post(</a:t>
             </a:r>
             <a:r>
-              <a:rPr lang="en-US" sz="1400" dirty="0" err="1" smtClean="0">
+              <a:rPr lang="en-US" sz="1400" dirty="0" smtClean="0">
                 <a:solidFill>
                   <a:schemeClr val="accent5">
                     <a:lumMod val="75000"/>
                   </a:schemeClr>
                 </a:solidFill>
               </a:rPr>
-              <a:t>AddressBookChangedEvent</a:t>
+              <a:t>TaskBossChangedEvent</a:t>
             </a:r>
             <a:r>
               <a:rPr lang="en-US" sz="1400" dirty="0" smtClean="0">
@@ -5060,7 +4867,7 @@
               <a:t>:</a:t>
             </a:r>
             <a:r>
-              <a:rPr lang="en-US" sz="1600" dirty="0" err="1" smtClean="0">
+              <a:rPr lang="en-US" sz="1600" dirty="0" smtClean="0">
                 <a:solidFill>
                   <a:schemeClr val="bg1"/>
                 </a:solidFill>
@@ -5161,7 +4968,7 @@
           <a:lstStyle/>
           <a:p>
             <a:pPr algn="ctr"/>
-            <a:endParaRPr lang="en-SG" sz="1400">
+            <a:endParaRPr lang="en-SG" sz="1400" dirty="0">
               <a:solidFill>
                 <a:schemeClr val="dk1"/>
               </a:solidFill>
@@ -5307,14 +5114,14 @@
           <a:lstStyle/>
           <a:p>
             <a:r>
-              <a:rPr lang="en-US" sz="1400" dirty="0" err="1" smtClean="0">
+              <a:rPr lang="en-US" sz="1400" dirty="0" smtClean="0">
                 <a:solidFill>
                   <a:schemeClr val="accent6">
                     <a:lumMod val="75000"/>
                   </a:schemeClr>
                 </a:solidFill>
               </a:rPr>
-              <a:t>handleAddresssBookChangedEvent</a:t>
+              <a:t>handleTaskBossChangedEvent</a:t>
             </a:r>
             <a:r>
               <a:rPr lang="en-US" sz="1400" dirty="0" smtClean="0">
@@ -5512,7 +5319,7 @@
           <a:lstStyle/>
           <a:p>
             <a:pPr algn="ctr"/>
-            <a:endParaRPr lang="en-SG" sz="1400">
+            <a:endParaRPr lang="en-SG" sz="1400" dirty="0">
               <a:solidFill>
                 <a:schemeClr val="dk1"/>
               </a:solidFill>
@@ -5620,12 +5427,12 @@
           <a:lstStyle/>
           <a:p>
             <a:r>
-              <a:rPr lang="en-US" sz="1400" dirty="0" err="1" smtClean="0">
+              <a:rPr lang="en-US" sz="1400" dirty="0" smtClean="0">
                 <a:solidFill>
                   <a:srgbClr val="00B050"/>
                 </a:solidFill>
               </a:rPr>
-              <a:t>handleAddresssBookChangedEvent</a:t>
+              <a:t>handleTaskBossChangedEvent</a:t>
             </a:r>
             <a:r>
               <a:rPr lang="en-US" sz="1400" dirty="0" smtClean="0">
@@ -5746,7 +5553,7 @@
             <a:lstStyle/>
             <a:p>
               <a:pPr algn="ctr"/>
-              <a:endParaRPr lang="en-SG"/>
+              <a:endParaRPr lang="en-SG" dirty="0"/>
             </a:p>
           </p:txBody>
         </p:sp>
@@ -5793,7 +5600,7 @@
             <a:lstStyle/>
             <a:p>
               <a:pPr algn="ctr"/>
-              <a:endParaRPr lang="en-SG" sz="1400">
+              <a:endParaRPr lang="en-SG" sz="1400" dirty="0">
                 <a:solidFill>
                   <a:schemeClr val="dk1"/>
                 </a:solidFill>
@@ -5946,7 +5753,7 @@
             <a:lstStyle/>
             <a:p>
               <a:pPr algn="ctr"/>
-              <a:endParaRPr lang="en-SG"/>
+              <a:endParaRPr lang="en-SG" dirty="0"/>
             </a:p>
           </p:txBody>
         </p:sp>
@@ -5995,7 +5802,7 @@
             <a:lstStyle/>
             <a:p>
               <a:pPr algn="ctr"/>
-              <a:endParaRPr lang="en-SG" sz="1400">
+              <a:endParaRPr lang="en-SG" sz="1400" dirty="0">
                 <a:solidFill>
                   <a:schemeClr val="dk1"/>
                 </a:solidFill>
@@ -6065,6 +5872,30 @@
           </a:p>
         </p:txBody>
       </p:sp>
+      <p:pic>
+        <p:nvPicPr>
+          <p:cNvPr id="14" name="Picture 13"/>
+          <p:cNvPicPr>
+            <a:picLocks noChangeAspect="1"/>
+          </p:cNvPicPr>
+          <p:nvPr/>
+        </p:nvPicPr>
+        <p:blipFill>
+          <a:blip r:embed="rId2"/>
+          <a:stretch>
+            <a:fillRect/>
+          </a:stretch>
+        </p:blipFill>
+        <p:spPr>
+          <a:xfrm>
+            <a:off x="102609" y="494345"/>
+            <a:ext cx="540572" cy="540572"/>
+          </a:xfrm>
+          <a:prstGeom prst="rect">
+            <a:avLst/>
+          </a:prstGeom>
+        </p:spPr>
+      </p:pic>
     </p:spTree>
     <p:extLst>
       <p:ext uri="{BB962C8B-B14F-4D97-AF65-F5344CB8AC3E}">

</xml_diff>

<commit_message>
Update Design for Task Manager
</commit_message>
<xml_diff>
--- a/docs/diagrams/HighLevelSequenceDiagrams.pptx
+++ b/docs/diagrams/HighLevelSequenceDiagrams.pptx
@@ -107,6 +107,22 @@
       </a:defRPr>
     </a:lvl9pPr>
   </p:defaultTextStyle>
+  <p:extLst>
+    <p:ext uri="{EFAFB233-063F-42B5-8137-9DF3F51BA10A}">
+      <p15:sldGuideLst xmlns:p15="http://schemas.microsoft.com/office/powerpoint/2012/main">
+        <p15:guide id="1" orient="horz" pos="1488">
+          <p15:clr>
+            <a:srgbClr val="A4A3A4"/>
+          </p15:clr>
+        </p15:guide>
+        <p15:guide id="2" pos="2880">
+          <p15:clr>
+            <a:srgbClr val="A4A3A4"/>
+          </p15:clr>
+        </p15:guide>
+      </p15:sldGuideLst>
+    </p:ext>
+  </p:extLst>
 </p:presentation>
 </file>
 
@@ -192,7 +208,7 @@
           <a:p>
             <a:fld id="{F5CC4B3F-88C1-4FFA-B1B6-F41C21DC6924}" type="datetimeFigureOut">
               <a:rPr lang="en-US" smtClean="0"/>
-              <a:t>10/16/2016</a:t>
+              <a:t>3/14/2017</a:t>
             </a:fld>
             <a:endParaRPr lang="en-US"/>
           </a:p>
@@ -641,7 +657,7 @@
           <a:p>
             <a:fld id="{78C97017-6FC3-485B-9764-EAC9E56C1D49}" type="datetimeFigureOut">
               <a:rPr lang="en-US" smtClean="0"/>
-              <a:t>10/16/2016</a:t>
+              <a:t>3/14/2017</a:t>
             </a:fld>
             <a:endParaRPr lang="en-US"/>
           </a:p>
@@ -811,7 +827,7 @@
           <a:p>
             <a:fld id="{78C97017-6FC3-485B-9764-EAC9E56C1D49}" type="datetimeFigureOut">
               <a:rPr lang="en-US" smtClean="0"/>
-              <a:t>10/16/2016</a:t>
+              <a:t>3/14/2017</a:t>
             </a:fld>
             <a:endParaRPr lang="en-US"/>
           </a:p>
@@ -991,7 +1007,7 @@
           <a:p>
             <a:fld id="{78C97017-6FC3-485B-9764-EAC9E56C1D49}" type="datetimeFigureOut">
               <a:rPr lang="en-US" smtClean="0"/>
-              <a:t>10/16/2016</a:t>
+              <a:t>3/14/2017</a:t>
             </a:fld>
             <a:endParaRPr lang="en-US"/>
           </a:p>
@@ -1161,7 +1177,7 @@
           <a:p>
             <a:fld id="{78C97017-6FC3-485B-9764-EAC9E56C1D49}" type="datetimeFigureOut">
               <a:rPr lang="en-US" smtClean="0"/>
-              <a:t>10/16/2016</a:t>
+              <a:t>3/14/2017</a:t>
             </a:fld>
             <a:endParaRPr lang="en-US"/>
           </a:p>
@@ -1407,7 +1423,7 @@
           <a:p>
             <a:fld id="{78C97017-6FC3-485B-9764-EAC9E56C1D49}" type="datetimeFigureOut">
               <a:rPr lang="en-US" smtClean="0"/>
-              <a:t>10/16/2016</a:t>
+              <a:t>3/14/2017</a:t>
             </a:fld>
             <a:endParaRPr lang="en-US"/>
           </a:p>
@@ -1695,7 +1711,7 @@
           <a:p>
             <a:fld id="{78C97017-6FC3-485B-9764-EAC9E56C1D49}" type="datetimeFigureOut">
               <a:rPr lang="en-US" smtClean="0"/>
-              <a:t>10/16/2016</a:t>
+              <a:t>3/14/2017</a:t>
             </a:fld>
             <a:endParaRPr lang="en-US"/>
           </a:p>
@@ -2117,7 +2133,7 @@
           <a:p>
             <a:fld id="{78C97017-6FC3-485B-9764-EAC9E56C1D49}" type="datetimeFigureOut">
               <a:rPr lang="en-US" smtClean="0"/>
-              <a:t>10/16/2016</a:t>
+              <a:t>3/14/2017</a:t>
             </a:fld>
             <a:endParaRPr lang="en-US"/>
           </a:p>
@@ -2235,7 +2251,7 @@
           <a:p>
             <a:fld id="{78C97017-6FC3-485B-9764-EAC9E56C1D49}" type="datetimeFigureOut">
               <a:rPr lang="en-US" smtClean="0"/>
-              <a:t>10/16/2016</a:t>
+              <a:t>3/14/2017</a:t>
             </a:fld>
             <a:endParaRPr lang="en-US"/>
           </a:p>
@@ -2330,7 +2346,7 @@
           <a:p>
             <a:fld id="{78C97017-6FC3-485B-9764-EAC9E56C1D49}" type="datetimeFigureOut">
               <a:rPr lang="en-US" smtClean="0"/>
-              <a:t>10/16/2016</a:t>
+              <a:t>3/14/2017</a:t>
             </a:fld>
             <a:endParaRPr lang="en-US"/>
           </a:p>
@@ -2607,7 +2623,7 @@
           <a:p>
             <a:fld id="{78C97017-6FC3-485B-9764-EAC9E56C1D49}" type="datetimeFigureOut">
               <a:rPr lang="en-US" smtClean="0"/>
-              <a:t>10/16/2016</a:t>
+              <a:t>3/14/2017</a:t>
             </a:fld>
             <a:endParaRPr lang="en-US"/>
           </a:p>
@@ -2860,7 +2876,7 @@
           <a:p>
             <a:fld id="{78C97017-6FC3-485B-9764-EAC9E56C1D49}" type="datetimeFigureOut">
               <a:rPr lang="en-US" smtClean="0"/>
-              <a:t>10/16/2016</a:t>
+              <a:t>3/14/2017</a:t>
             </a:fld>
             <a:endParaRPr lang="en-US"/>
           </a:p>
@@ -3073,7 +3089,7 @@
           <a:p>
             <a:fld id="{78C97017-6FC3-485B-9764-EAC9E56C1D49}" type="datetimeFigureOut">
               <a:rPr lang="en-US" smtClean="0"/>
-              <a:t>10/16/2016</a:t>
+              <a:t>3/14/2017</a:t>
             </a:fld>
             <a:endParaRPr lang="en-US"/>
           </a:p>
@@ -4114,7 +4130,7 @@
         </p:nvCxnSpPr>
         <p:spPr>
           <a:xfrm>
-            <a:off x="466818" y="1325979"/>
+            <a:off x="466818" y="1322292"/>
             <a:ext cx="1119851" cy="0"/>
           </a:xfrm>
           <a:prstGeom prst="straightConnector1">
@@ -4150,7 +4166,7 @@
         </p:nvSpPr>
         <p:spPr>
           <a:xfrm>
-            <a:off x="466818" y="1345880"/>
+            <a:off x="466818" y="1345657"/>
             <a:ext cx="860170" cy="215444"/>
           </a:xfrm>
           <a:prstGeom prst="rect">
@@ -4290,8 +4306,8 @@
         </p:nvSpPr>
         <p:spPr>
           <a:xfrm>
-            <a:off x="4299772" y="1542583"/>
-            <a:ext cx="1424846" cy="215444"/>
+            <a:off x="4419600" y="1542582"/>
+            <a:ext cx="1040823" cy="218871"/>
           </a:xfrm>
           <a:prstGeom prst="rect">
             <a:avLst/>
@@ -4304,21 +4320,21 @@
           </a:bodyPr>
           <a:lstStyle/>
           <a:p>
-            <a:r>
-              <a:rPr lang="en-US" sz="1400" dirty="0" err="1" smtClean="0">
-                <a:solidFill>
-                  <a:srgbClr val="7030A0"/>
-                </a:solidFill>
-              </a:rPr>
-              <a:t>deletePerson</a:t>
-            </a:r>
             <a:r>
               <a:rPr lang="en-US" sz="1400" dirty="0" smtClean="0">
                 <a:solidFill>
                   <a:srgbClr val="7030A0"/>
                 </a:solidFill>
               </a:rPr>
-              <a:t>(p)</a:t>
+              <a:t>deleteTask(p</a:t>
+            </a:r>
+            <a:r>
+              <a:rPr lang="en-US" sz="1400" dirty="0" smtClean="0">
+                <a:solidFill>
+                  <a:srgbClr val="7030A0"/>
+                </a:solidFill>
+              </a:rPr>
+              <a:t>)</a:t>
             </a:r>
             <a:endParaRPr lang="en-US" sz="1400" dirty="0">
               <a:solidFill>
@@ -4336,7 +4352,7 @@
         </p:nvSpPr>
         <p:spPr>
           <a:xfrm>
-            <a:off x="6074030" y="1687656"/>
+            <a:off x="6019800" y="1689532"/>
             <a:ext cx="2438400" cy="215444"/>
           </a:xfrm>
           <a:prstGeom prst="rect">
@@ -4361,14 +4377,24 @@
               <a:t>post(</a:t>
             </a:r>
             <a:r>
-              <a:rPr lang="en-US" sz="1400" dirty="0" err="1" smtClean="0">
+              <a:rPr lang="en-US" sz="1400" dirty="0" smtClean="0">
                 <a:solidFill>
                   <a:schemeClr val="accent5">
                     <a:lumMod val="75000"/>
                   </a:schemeClr>
                 </a:solidFill>
               </a:rPr>
-              <a:t>AddressBookChangedEvent</a:t>
+              <a:t>TaskManager</a:t>
+            </a:r>
+            <a:r>
+              <a:rPr lang="en-US" sz="1400" dirty="0" smtClean="0">
+                <a:solidFill>
+                  <a:schemeClr val="accent5">
+                    <a:lumMod val="75000"/>
+                  </a:schemeClr>
+                </a:solidFill>
+              </a:rPr>
+              <a:t>ChangedEvent</a:t>
             </a:r>
             <a:r>
               <a:rPr lang="en-US" sz="1400" dirty="0" smtClean="0">
@@ -4557,15 +4583,7 @@
                   <a:schemeClr val="bg1"/>
                 </a:solidFill>
               </a:rPr>
-              <a:t>:</a:t>
-            </a:r>
-            <a:r>
-              <a:rPr lang="en-US" sz="1600" dirty="0" err="1" smtClean="0">
-                <a:solidFill>
-                  <a:schemeClr val="bg1"/>
-                </a:solidFill>
-              </a:rPr>
-              <a:t>EventsCenter</a:t>
+              <a:t>:EventsCenter</a:t>
             </a:r>
             <a:endParaRPr lang="en-SG" sz="1600" dirty="0">
               <a:solidFill>
@@ -4935,14 +4953,24 @@
               <a:t>post(</a:t>
             </a:r>
             <a:r>
-              <a:rPr lang="en-US" sz="1400" dirty="0" err="1" smtClean="0">
+              <a:rPr lang="en-US" sz="1400" dirty="0" smtClean="0">
                 <a:solidFill>
                   <a:schemeClr val="accent5">
                     <a:lumMod val="75000"/>
                   </a:schemeClr>
                 </a:solidFill>
               </a:rPr>
-              <a:t>AddressBookChangedEvent</a:t>
+              <a:t>TaskManager</a:t>
+            </a:r>
+            <a:r>
+              <a:rPr lang="en-US" sz="1400" dirty="0" smtClean="0">
+                <a:solidFill>
+                  <a:schemeClr val="accent5">
+                    <a:lumMod val="75000"/>
+                  </a:schemeClr>
+                </a:solidFill>
+              </a:rPr>
+              <a:t>ChangedEvent</a:t>
             </a:r>
             <a:r>
               <a:rPr lang="en-US" sz="1400" dirty="0" smtClean="0">
@@ -5057,15 +5085,7 @@
                   <a:schemeClr val="bg1"/>
                 </a:solidFill>
               </a:rPr>
-              <a:t>:</a:t>
-            </a:r>
-            <a:r>
-              <a:rPr lang="en-US" sz="1600" dirty="0" err="1" smtClean="0">
-                <a:solidFill>
-                  <a:schemeClr val="bg1"/>
-                </a:solidFill>
-              </a:rPr>
-              <a:t>EventsCenter</a:t>
+              <a:t>:EventsCenter</a:t>
             </a:r>
             <a:endParaRPr lang="en-SG" sz="1600" dirty="0">
               <a:solidFill>
@@ -5307,14 +5327,14 @@
           <a:lstStyle/>
           <a:p>
             <a:r>
-              <a:rPr lang="en-US" sz="1400" dirty="0" err="1" smtClean="0">
+              <a:rPr lang="en-US" sz="1400" dirty="0" smtClean="0">
                 <a:solidFill>
                   <a:schemeClr val="accent6">
                     <a:lumMod val="75000"/>
                   </a:schemeClr>
                 </a:solidFill>
               </a:rPr>
-              <a:t>handleAddresssBookChangedEvent</a:t>
+              <a:t>handleTaskManagerChangedEvent</a:t>
             </a:r>
             <a:r>
               <a:rPr lang="en-US" sz="1400" dirty="0" smtClean="0">
@@ -5620,12 +5640,12 @@
           <a:lstStyle/>
           <a:p>
             <a:r>
-              <a:rPr lang="en-US" sz="1400" dirty="0" err="1" smtClean="0">
+              <a:rPr lang="en-US" sz="1400" dirty="0" smtClean="0">
                 <a:solidFill>
                   <a:srgbClr val="00B050"/>
                 </a:solidFill>
               </a:rPr>
-              <a:t>handleAddresssBookChangedEvent</a:t>
+              <a:t>handleTaskManagerChangedEvent</a:t>
             </a:r>
             <a:r>
               <a:rPr lang="en-US" sz="1400" dirty="0" smtClean="0">
@@ -6062,6 +6082,41 @@
                 </a:schemeClr>
               </a:solidFill>
             </a:endParaRPr>
+          </a:p>
+        </p:txBody>
+      </p:sp>
+      <p:sp>
+        <p:nvSpPr>
+          <p:cNvPr id="64" name="TextBox 63"/>
+          <p:cNvSpPr txBox="1"/>
+          <p:nvPr/>
+        </p:nvSpPr>
+        <p:spPr>
+          <a:xfrm>
+            <a:off x="92908" y="506094"/>
+            <a:ext cx="575170" cy="615553"/>
+          </a:xfrm>
+          <a:prstGeom prst="rect">
+            <a:avLst/>
+          </a:prstGeom>
+          <a:solidFill>
+            <a:schemeClr val="bg1"/>
+          </a:solidFill>
+        </p:spPr>
+        <p:txBody>
+          <a:bodyPr wrap="square" lIns="0" tIns="0" rIns="0" bIns="0" rtlCol="0">
+            <a:spAutoFit/>
+          </a:bodyPr>
+          <a:lstStyle/>
+          <a:p>
+            <a:endParaRPr lang="en-US" sz="2000" dirty="0" smtClean="0"/>
+          </a:p>
+          <a:p>
+            <a:r>
+              <a:rPr lang="en-US" sz="2000" dirty="0" smtClean="0"/>
+              <a:t>Task</a:t>
+            </a:r>
+            <a:endParaRPr lang="en-US" sz="2000" dirty="0"/>
           </a:p>
         </p:txBody>
       </p:sp>

</xml_diff>

<commit_message>
Removed all references of AddressBook in dev guide
</commit_message>
<xml_diff>
--- a/docs/diagrams/HighLevelSequenceDiagrams.pptx
+++ b/docs/diagrams/HighLevelSequenceDiagrams.pptx
@@ -107,6 +107,22 @@
       </a:defRPr>
     </a:lvl9pPr>
   </p:defaultTextStyle>
+  <p:extLst>
+    <p:ext uri="{EFAFB233-063F-42B5-8137-9DF3F51BA10A}">
+      <p15:sldGuideLst xmlns:p15="http://schemas.microsoft.com/office/powerpoint/2012/main">
+        <p15:guide id="1" orient="horz" pos="1488">
+          <p15:clr>
+            <a:srgbClr val="A4A3A4"/>
+          </p15:clr>
+        </p15:guide>
+        <p15:guide id="2" pos="2880">
+          <p15:clr>
+            <a:srgbClr val="A4A3A4"/>
+          </p15:clr>
+        </p15:guide>
+      </p15:sldGuideLst>
+    </p:ext>
+  </p:extLst>
 </p:presentation>
 </file>
 
@@ -192,7 +208,7 @@
           <a:p>
             <a:fld id="{F5CC4B3F-88C1-4FFA-B1B6-F41C21DC6924}" type="datetimeFigureOut">
               <a:rPr lang="en-US" smtClean="0"/>
-              <a:t>10/16/2016</a:t>
+              <a:t>3/15/2017</a:t>
             </a:fld>
             <a:endParaRPr lang="en-US"/>
           </a:p>
@@ -256,38 +272,37 @@
           <a:p>
             <a:pPr lvl="0"/>
             <a:r>
-              <a:rPr lang="en-US" smtClean="0"/>
+              <a:rPr lang="en-US"/>
               <a:t>Click to edit Master text styles</a:t>
             </a:r>
           </a:p>
           <a:p>
             <a:pPr lvl="1"/>
             <a:r>
-              <a:rPr lang="en-US" smtClean="0"/>
+              <a:rPr lang="en-US"/>
               <a:t>Second level</a:t>
             </a:r>
           </a:p>
           <a:p>
             <a:pPr lvl="2"/>
             <a:r>
-              <a:rPr lang="en-US" smtClean="0"/>
+              <a:rPr lang="en-US"/>
               <a:t>Third level</a:t>
             </a:r>
           </a:p>
           <a:p>
             <a:pPr lvl="3"/>
             <a:r>
-              <a:rPr lang="en-US" smtClean="0"/>
+              <a:rPr lang="en-US"/>
               <a:t>Fourth level</a:t>
             </a:r>
           </a:p>
           <a:p>
             <a:pPr lvl="4"/>
             <a:r>
-              <a:rPr lang="en-US" smtClean="0"/>
+              <a:rPr lang="en-US"/>
               <a:t>Fifth level</a:t>
             </a:r>
-            <a:endParaRPr lang="en-US"/>
           </a:p>
         </p:txBody>
       </p:sp>
@@ -498,10 +513,9 @@
           <a:lstStyle/>
           <a:p>
             <a:r>
-              <a:rPr lang="en-US" smtClean="0"/>
+              <a:rPr lang="en-US"/>
               <a:t>Click to edit Master title style</a:t>
             </a:r>
-            <a:endParaRPr lang="en-US"/>
           </a:p>
         </p:txBody>
       </p:sp>
@@ -617,10 +631,9 @@
           </a:lstStyle>
           <a:p>
             <a:r>
-              <a:rPr lang="en-US" smtClean="0"/>
+              <a:rPr lang="en-US"/>
               <a:t>Click to edit Master subtitle style</a:t>
             </a:r>
-            <a:endParaRPr lang="en-US"/>
           </a:p>
         </p:txBody>
       </p:sp>
@@ -641,7 +654,7 @@
           <a:p>
             <a:fld id="{78C97017-6FC3-485B-9764-EAC9E56C1D49}" type="datetimeFigureOut">
               <a:rPr lang="en-US" smtClean="0"/>
-              <a:t>10/16/2016</a:t>
+              <a:t>3/15/2017</a:t>
             </a:fld>
             <a:endParaRPr lang="en-US"/>
           </a:p>
@@ -735,10 +748,9 @@
           <a:lstStyle/>
           <a:p>
             <a:r>
-              <a:rPr lang="en-US" smtClean="0"/>
+              <a:rPr lang="en-US"/>
               <a:t>Click to edit Master title style</a:t>
             </a:r>
-            <a:endParaRPr lang="en-US"/>
           </a:p>
         </p:txBody>
       </p:sp>
@@ -759,38 +771,37 @@
           <a:p>
             <a:pPr lvl="0"/>
             <a:r>
-              <a:rPr lang="en-US" smtClean="0"/>
+              <a:rPr lang="en-US"/>
               <a:t>Click to edit Master text styles</a:t>
             </a:r>
           </a:p>
           <a:p>
             <a:pPr lvl="1"/>
             <a:r>
-              <a:rPr lang="en-US" smtClean="0"/>
+              <a:rPr lang="en-US"/>
               <a:t>Second level</a:t>
             </a:r>
           </a:p>
           <a:p>
             <a:pPr lvl="2"/>
             <a:r>
-              <a:rPr lang="en-US" smtClean="0"/>
+              <a:rPr lang="en-US"/>
               <a:t>Third level</a:t>
             </a:r>
           </a:p>
           <a:p>
             <a:pPr lvl="3"/>
             <a:r>
-              <a:rPr lang="en-US" smtClean="0"/>
+              <a:rPr lang="en-US"/>
               <a:t>Fourth level</a:t>
             </a:r>
           </a:p>
           <a:p>
             <a:pPr lvl="4"/>
             <a:r>
-              <a:rPr lang="en-US" smtClean="0"/>
+              <a:rPr lang="en-US"/>
               <a:t>Fifth level</a:t>
             </a:r>
-            <a:endParaRPr lang="en-US"/>
           </a:p>
         </p:txBody>
       </p:sp>
@@ -811,7 +822,7 @@
           <a:p>
             <a:fld id="{78C97017-6FC3-485B-9764-EAC9E56C1D49}" type="datetimeFigureOut">
               <a:rPr lang="en-US" smtClean="0"/>
-              <a:t>10/16/2016</a:t>
+              <a:t>3/15/2017</a:t>
             </a:fld>
             <a:endParaRPr lang="en-US"/>
           </a:p>
@@ -910,10 +921,9 @@
           <a:lstStyle/>
           <a:p>
             <a:r>
-              <a:rPr lang="en-US" smtClean="0"/>
+              <a:rPr lang="en-US"/>
               <a:t>Click to edit Master title style</a:t>
             </a:r>
-            <a:endParaRPr lang="en-US"/>
           </a:p>
         </p:txBody>
       </p:sp>
@@ -939,38 +949,37 @@
           <a:p>
             <a:pPr lvl="0"/>
             <a:r>
-              <a:rPr lang="en-US" smtClean="0"/>
+              <a:rPr lang="en-US"/>
               <a:t>Click to edit Master text styles</a:t>
             </a:r>
           </a:p>
           <a:p>
             <a:pPr lvl="1"/>
             <a:r>
-              <a:rPr lang="en-US" smtClean="0"/>
+              <a:rPr lang="en-US"/>
               <a:t>Second level</a:t>
             </a:r>
           </a:p>
           <a:p>
             <a:pPr lvl="2"/>
             <a:r>
-              <a:rPr lang="en-US" smtClean="0"/>
+              <a:rPr lang="en-US"/>
               <a:t>Third level</a:t>
             </a:r>
           </a:p>
           <a:p>
             <a:pPr lvl="3"/>
             <a:r>
-              <a:rPr lang="en-US" smtClean="0"/>
+              <a:rPr lang="en-US"/>
               <a:t>Fourth level</a:t>
             </a:r>
           </a:p>
           <a:p>
             <a:pPr lvl="4"/>
             <a:r>
-              <a:rPr lang="en-US" smtClean="0"/>
+              <a:rPr lang="en-US"/>
               <a:t>Fifth level</a:t>
             </a:r>
-            <a:endParaRPr lang="en-US"/>
           </a:p>
         </p:txBody>
       </p:sp>
@@ -991,7 +1000,7 @@
           <a:p>
             <a:fld id="{78C97017-6FC3-485B-9764-EAC9E56C1D49}" type="datetimeFigureOut">
               <a:rPr lang="en-US" smtClean="0"/>
-              <a:t>10/16/2016</a:t>
+              <a:t>3/15/2017</a:t>
             </a:fld>
             <a:endParaRPr lang="en-US"/>
           </a:p>
@@ -1085,10 +1094,9 @@
           <a:lstStyle/>
           <a:p>
             <a:r>
-              <a:rPr lang="en-US" smtClean="0"/>
+              <a:rPr lang="en-US"/>
               <a:t>Click to edit Master title style</a:t>
             </a:r>
-            <a:endParaRPr lang="en-US"/>
           </a:p>
         </p:txBody>
       </p:sp>
@@ -1109,38 +1117,37 @@
           <a:p>
             <a:pPr lvl="0"/>
             <a:r>
-              <a:rPr lang="en-US" smtClean="0"/>
+              <a:rPr lang="en-US"/>
               <a:t>Click to edit Master text styles</a:t>
             </a:r>
           </a:p>
           <a:p>
             <a:pPr lvl="1"/>
             <a:r>
-              <a:rPr lang="en-US" smtClean="0"/>
+              <a:rPr lang="en-US"/>
               <a:t>Second level</a:t>
             </a:r>
           </a:p>
           <a:p>
             <a:pPr lvl="2"/>
             <a:r>
-              <a:rPr lang="en-US" smtClean="0"/>
+              <a:rPr lang="en-US"/>
               <a:t>Third level</a:t>
             </a:r>
           </a:p>
           <a:p>
             <a:pPr lvl="3"/>
             <a:r>
-              <a:rPr lang="en-US" smtClean="0"/>
+              <a:rPr lang="en-US"/>
               <a:t>Fourth level</a:t>
             </a:r>
           </a:p>
           <a:p>
             <a:pPr lvl="4"/>
             <a:r>
-              <a:rPr lang="en-US" smtClean="0"/>
+              <a:rPr lang="en-US"/>
               <a:t>Fifth level</a:t>
             </a:r>
-            <a:endParaRPr lang="en-US"/>
           </a:p>
         </p:txBody>
       </p:sp>
@@ -1161,7 +1168,7 @@
           <a:p>
             <a:fld id="{78C97017-6FC3-485B-9764-EAC9E56C1D49}" type="datetimeFigureOut">
               <a:rPr lang="en-US" smtClean="0"/>
-              <a:t>10/16/2016</a:t>
+              <a:t>3/15/2017</a:t>
             </a:fld>
             <a:endParaRPr lang="en-US"/>
           </a:p>
@@ -1264,10 +1271,9 @@
           </a:lstStyle>
           <a:p>
             <a:r>
-              <a:rPr lang="en-US" smtClean="0"/>
+              <a:rPr lang="en-US"/>
               <a:t>Click to edit Master title style</a:t>
             </a:r>
-            <a:endParaRPr lang="en-US"/>
           </a:p>
         </p:txBody>
       </p:sp>
@@ -1384,7 +1390,7 @@
           <a:p>
             <a:pPr lvl="0"/>
             <a:r>
-              <a:rPr lang="en-US" smtClean="0"/>
+              <a:rPr lang="en-US"/>
               <a:t>Click to edit Master text styles</a:t>
             </a:r>
           </a:p>
@@ -1407,7 +1413,7 @@
           <a:p>
             <a:fld id="{78C97017-6FC3-485B-9764-EAC9E56C1D49}" type="datetimeFigureOut">
               <a:rPr lang="en-US" smtClean="0"/>
-              <a:t>10/16/2016</a:t>
+              <a:t>3/15/2017</a:t>
             </a:fld>
             <a:endParaRPr lang="en-US"/>
           </a:p>
@@ -1501,10 +1507,9 @@
           <a:lstStyle/>
           <a:p>
             <a:r>
-              <a:rPr lang="en-US" smtClean="0"/>
+              <a:rPr lang="en-US"/>
               <a:t>Click to edit Master title style</a:t>
             </a:r>
-            <a:endParaRPr lang="en-US"/>
           </a:p>
         </p:txBody>
       </p:sp>
@@ -1558,38 +1563,37 @@
           <a:p>
             <a:pPr lvl="0"/>
             <a:r>
-              <a:rPr lang="en-US" smtClean="0"/>
+              <a:rPr lang="en-US"/>
               <a:t>Click to edit Master text styles</a:t>
             </a:r>
           </a:p>
           <a:p>
             <a:pPr lvl="1"/>
             <a:r>
-              <a:rPr lang="en-US" smtClean="0"/>
+              <a:rPr lang="en-US"/>
               <a:t>Second level</a:t>
             </a:r>
           </a:p>
           <a:p>
             <a:pPr lvl="2"/>
             <a:r>
-              <a:rPr lang="en-US" smtClean="0"/>
+              <a:rPr lang="en-US"/>
               <a:t>Third level</a:t>
             </a:r>
           </a:p>
           <a:p>
             <a:pPr lvl="3"/>
             <a:r>
-              <a:rPr lang="en-US" smtClean="0"/>
+              <a:rPr lang="en-US"/>
               <a:t>Fourth level</a:t>
             </a:r>
           </a:p>
           <a:p>
             <a:pPr lvl="4"/>
             <a:r>
-              <a:rPr lang="en-US" smtClean="0"/>
+              <a:rPr lang="en-US"/>
               <a:t>Fifth level</a:t>
             </a:r>
-            <a:endParaRPr lang="en-US"/>
           </a:p>
         </p:txBody>
       </p:sp>
@@ -1643,38 +1647,37 @@
           <a:p>
             <a:pPr lvl="0"/>
             <a:r>
-              <a:rPr lang="en-US" smtClean="0"/>
+              <a:rPr lang="en-US"/>
               <a:t>Click to edit Master text styles</a:t>
             </a:r>
           </a:p>
           <a:p>
             <a:pPr lvl="1"/>
             <a:r>
-              <a:rPr lang="en-US" smtClean="0"/>
+              <a:rPr lang="en-US"/>
               <a:t>Second level</a:t>
             </a:r>
           </a:p>
           <a:p>
             <a:pPr lvl="2"/>
             <a:r>
-              <a:rPr lang="en-US" smtClean="0"/>
+              <a:rPr lang="en-US"/>
               <a:t>Third level</a:t>
             </a:r>
           </a:p>
           <a:p>
             <a:pPr lvl="3"/>
             <a:r>
-              <a:rPr lang="en-US" smtClean="0"/>
+              <a:rPr lang="en-US"/>
               <a:t>Fourth level</a:t>
             </a:r>
           </a:p>
           <a:p>
             <a:pPr lvl="4"/>
             <a:r>
-              <a:rPr lang="en-US" smtClean="0"/>
+              <a:rPr lang="en-US"/>
               <a:t>Fifth level</a:t>
             </a:r>
-            <a:endParaRPr lang="en-US"/>
           </a:p>
         </p:txBody>
       </p:sp>
@@ -1695,7 +1698,7 @@
           <a:p>
             <a:fld id="{78C97017-6FC3-485B-9764-EAC9E56C1D49}" type="datetimeFigureOut">
               <a:rPr lang="en-US" smtClean="0"/>
-              <a:t>10/16/2016</a:t>
+              <a:t>3/15/2017</a:t>
             </a:fld>
             <a:endParaRPr lang="en-US"/>
           </a:p>
@@ -1793,10 +1796,9 @@
           </a:lstStyle>
           <a:p>
             <a:r>
-              <a:rPr lang="en-US" smtClean="0"/>
+              <a:rPr lang="en-US"/>
               <a:t>Click to edit Master title style</a:t>
             </a:r>
-            <a:endParaRPr lang="en-US"/>
           </a:p>
         </p:txBody>
       </p:sp>
@@ -1859,7 +1861,7 @@
           <a:p>
             <a:pPr lvl="0"/>
             <a:r>
-              <a:rPr lang="en-US" smtClean="0"/>
+              <a:rPr lang="en-US"/>
               <a:t>Click to edit Master text styles</a:t>
             </a:r>
           </a:p>
@@ -1915,38 +1917,37 @@
           <a:p>
             <a:pPr lvl="0"/>
             <a:r>
-              <a:rPr lang="en-US" smtClean="0"/>
+              <a:rPr lang="en-US"/>
               <a:t>Click to edit Master text styles</a:t>
             </a:r>
           </a:p>
           <a:p>
             <a:pPr lvl="1"/>
             <a:r>
-              <a:rPr lang="en-US" smtClean="0"/>
+              <a:rPr lang="en-US"/>
               <a:t>Second level</a:t>
             </a:r>
           </a:p>
           <a:p>
             <a:pPr lvl="2"/>
             <a:r>
-              <a:rPr lang="en-US" smtClean="0"/>
+              <a:rPr lang="en-US"/>
               <a:t>Third level</a:t>
             </a:r>
           </a:p>
           <a:p>
             <a:pPr lvl="3"/>
             <a:r>
-              <a:rPr lang="en-US" smtClean="0"/>
+              <a:rPr lang="en-US"/>
               <a:t>Fourth level</a:t>
             </a:r>
           </a:p>
           <a:p>
             <a:pPr lvl="4"/>
             <a:r>
-              <a:rPr lang="en-US" smtClean="0"/>
+              <a:rPr lang="en-US"/>
               <a:t>Fifth level</a:t>
             </a:r>
-            <a:endParaRPr lang="en-US"/>
           </a:p>
         </p:txBody>
       </p:sp>
@@ -2009,7 +2010,7 @@
           <a:p>
             <a:pPr lvl="0"/>
             <a:r>
-              <a:rPr lang="en-US" smtClean="0"/>
+              <a:rPr lang="en-US"/>
               <a:t>Click to edit Master text styles</a:t>
             </a:r>
           </a:p>
@@ -2065,38 +2066,37 @@
           <a:p>
             <a:pPr lvl="0"/>
             <a:r>
-              <a:rPr lang="en-US" smtClean="0"/>
+              <a:rPr lang="en-US"/>
               <a:t>Click to edit Master text styles</a:t>
             </a:r>
           </a:p>
           <a:p>
             <a:pPr lvl="1"/>
             <a:r>
-              <a:rPr lang="en-US" smtClean="0"/>
+              <a:rPr lang="en-US"/>
               <a:t>Second level</a:t>
             </a:r>
           </a:p>
           <a:p>
             <a:pPr lvl="2"/>
             <a:r>
-              <a:rPr lang="en-US" smtClean="0"/>
+              <a:rPr lang="en-US"/>
               <a:t>Third level</a:t>
             </a:r>
           </a:p>
           <a:p>
             <a:pPr lvl="3"/>
             <a:r>
-              <a:rPr lang="en-US" smtClean="0"/>
+              <a:rPr lang="en-US"/>
               <a:t>Fourth level</a:t>
             </a:r>
           </a:p>
           <a:p>
             <a:pPr lvl="4"/>
             <a:r>
-              <a:rPr lang="en-US" smtClean="0"/>
+              <a:rPr lang="en-US"/>
               <a:t>Fifth level</a:t>
             </a:r>
-            <a:endParaRPr lang="en-US"/>
           </a:p>
         </p:txBody>
       </p:sp>
@@ -2117,7 +2117,7 @@
           <a:p>
             <a:fld id="{78C97017-6FC3-485B-9764-EAC9E56C1D49}" type="datetimeFigureOut">
               <a:rPr lang="en-US" smtClean="0"/>
-              <a:t>10/16/2016</a:t>
+              <a:t>3/15/2017</a:t>
             </a:fld>
             <a:endParaRPr lang="en-US"/>
           </a:p>
@@ -2211,10 +2211,9 @@
           <a:lstStyle/>
           <a:p>
             <a:r>
-              <a:rPr lang="en-US" smtClean="0"/>
+              <a:rPr lang="en-US"/>
               <a:t>Click to edit Master title style</a:t>
             </a:r>
-            <a:endParaRPr lang="en-US"/>
           </a:p>
         </p:txBody>
       </p:sp>
@@ -2235,7 +2234,7 @@
           <a:p>
             <a:fld id="{78C97017-6FC3-485B-9764-EAC9E56C1D49}" type="datetimeFigureOut">
               <a:rPr lang="en-US" smtClean="0"/>
-              <a:t>10/16/2016</a:t>
+              <a:t>3/15/2017</a:t>
             </a:fld>
             <a:endParaRPr lang="en-US"/>
           </a:p>
@@ -2330,7 +2329,7 @@
           <a:p>
             <a:fld id="{78C97017-6FC3-485B-9764-EAC9E56C1D49}" type="datetimeFigureOut">
               <a:rPr lang="en-US" smtClean="0"/>
-              <a:t>10/16/2016</a:t>
+              <a:t>3/15/2017</a:t>
             </a:fld>
             <a:endParaRPr lang="en-US"/>
           </a:p>
@@ -2433,10 +2432,9 @@
           </a:lstStyle>
           <a:p>
             <a:r>
-              <a:rPr lang="en-US" smtClean="0"/>
+              <a:rPr lang="en-US"/>
               <a:t>Click to edit Master title style</a:t>
             </a:r>
-            <a:endParaRPr lang="en-US"/>
           </a:p>
         </p:txBody>
       </p:sp>
@@ -2490,38 +2488,37 @@
           <a:p>
             <a:pPr lvl="0"/>
             <a:r>
-              <a:rPr lang="en-US" smtClean="0"/>
+              <a:rPr lang="en-US"/>
               <a:t>Click to edit Master text styles</a:t>
             </a:r>
           </a:p>
           <a:p>
             <a:pPr lvl="1"/>
             <a:r>
-              <a:rPr lang="en-US" smtClean="0"/>
+              <a:rPr lang="en-US"/>
               <a:t>Second level</a:t>
             </a:r>
           </a:p>
           <a:p>
             <a:pPr lvl="2"/>
             <a:r>
-              <a:rPr lang="en-US" smtClean="0"/>
+              <a:rPr lang="en-US"/>
               <a:t>Third level</a:t>
             </a:r>
           </a:p>
           <a:p>
             <a:pPr lvl="3"/>
             <a:r>
-              <a:rPr lang="en-US" smtClean="0"/>
+              <a:rPr lang="en-US"/>
               <a:t>Fourth level</a:t>
             </a:r>
           </a:p>
           <a:p>
             <a:pPr lvl="4"/>
             <a:r>
-              <a:rPr lang="en-US" smtClean="0"/>
+              <a:rPr lang="en-US"/>
               <a:t>Fifth level</a:t>
             </a:r>
-            <a:endParaRPr lang="en-US"/>
           </a:p>
         </p:txBody>
       </p:sp>
@@ -2584,7 +2581,7 @@
           <a:p>
             <a:pPr lvl="0"/>
             <a:r>
-              <a:rPr lang="en-US" smtClean="0"/>
+              <a:rPr lang="en-US"/>
               <a:t>Click to edit Master text styles</a:t>
             </a:r>
           </a:p>
@@ -2607,7 +2604,7 @@
           <a:p>
             <a:fld id="{78C97017-6FC3-485B-9764-EAC9E56C1D49}" type="datetimeFigureOut">
               <a:rPr lang="en-US" smtClean="0"/>
-              <a:t>10/16/2016</a:t>
+              <a:t>3/15/2017</a:t>
             </a:fld>
             <a:endParaRPr lang="en-US"/>
           </a:p>
@@ -2710,10 +2707,9 @@
           </a:lstStyle>
           <a:p>
             <a:r>
-              <a:rPr lang="en-US" smtClean="0"/>
+              <a:rPr lang="en-US"/>
               <a:t>Click to edit Master title style</a:t>
             </a:r>
-            <a:endParaRPr lang="en-US"/>
           </a:p>
         </p:txBody>
       </p:sp>
@@ -2837,7 +2833,7 @@
           <a:p>
             <a:pPr lvl="0"/>
             <a:r>
-              <a:rPr lang="en-US" smtClean="0"/>
+              <a:rPr lang="en-US"/>
               <a:t>Click to edit Master text styles</a:t>
             </a:r>
           </a:p>
@@ -2860,7 +2856,7 @@
           <a:p>
             <a:fld id="{78C97017-6FC3-485B-9764-EAC9E56C1D49}" type="datetimeFigureOut">
               <a:rPr lang="en-US" smtClean="0"/>
-              <a:t>10/16/2016</a:t>
+              <a:t>3/15/2017</a:t>
             </a:fld>
             <a:endParaRPr lang="en-US"/>
           </a:p>
@@ -2969,10 +2965,9 @@
           <a:lstStyle/>
           <a:p>
             <a:r>
-              <a:rPr lang="en-US" smtClean="0"/>
+              <a:rPr lang="en-US"/>
               <a:t>Click to edit Master title style</a:t>
             </a:r>
-            <a:endParaRPr lang="en-US"/>
           </a:p>
         </p:txBody>
       </p:sp>
@@ -3003,38 +2998,37 @@
           <a:p>
             <a:pPr lvl="0"/>
             <a:r>
-              <a:rPr lang="en-US" smtClean="0"/>
+              <a:rPr lang="en-US"/>
               <a:t>Click to edit Master text styles</a:t>
             </a:r>
           </a:p>
           <a:p>
             <a:pPr lvl="1"/>
             <a:r>
-              <a:rPr lang="en-US" smtClean="0"/>
+              <a:rPr lang="en-US"/>
               <a:t>Second level</a:t>
             </a:r>
           </a:p>
           <a:p>
             <a:pPr lvl="2"/>
             <a:r>
-              <a:rPr lang="en-US" smtClean="0"/>
+              <a:rPr lang="en-US"/>
               <a:t>Third level</a:t>
             </a:r>
           </a:p>
           <a:p>
             <a:pPr lvl="3"/>
             <a:r>
-              <a:rPr lang="en-US" smtClean="0"/>
+              <a:rPr lang="en-US"/>
               <a:t>Fourth level</a:t>
             </a:r>
           </a:p>
           <a:p>
             <a:pPr lvl="4"/>
             <a:r>
-              <a:rPr lang="en-US" smtClean="0"/>
+              <a:rPr lang="en-US"/>
               <a:t>Fifth level</a:t>
             </a:r>
-            <a:endParaRPr lang="en-US"/>
           </a:p>
         </p:txBody>
       </p:sp>
@@ -3073,7 +3067,7 @@
           <a:p>
             <a:fld id="{78C97017-6FC3-485B-9764-EAC9E56C1D49}" type="datetimeFigureOut">
               <a:rPr lang="en-US" smtClean="0"/>
-              <a:t>10/16/2016</a:t>
+              <a:t>3/15/2017</a:t>
             </a:fld>
             <a:endParaRPr lang="en-US"/>
           </a:p>
@@ -3492,7 +3486,7 @@
           <a:p>
             <a:pPr algn="ctr"/>
             <a:r>
-              <a:rPr lang="en-US" sz="1600" dirty="0" smtClean="0">
+              <a:rPr lang="en-US" sz="1600" dirty="0">
                 <a:solidFill>
                   <a:schemeClr val="bg1"/>
                 </a:solidFill>
@@ -3856,7 +3850,7 @@
           <a:p>
             <a:pPr algn="ctr"/>
             <a:r>
-              <a:rPr lang="en-US" sz="1600" dirty="0" smtClean="0">
+              <a:rPr lang="en-US" sz="1600" dirty="0">
                 <a:solidFill>
                   <a:schemeClr val="bg1"/>
                 </a:solidFill>
@@ -4003,7 +3997,7 @@
           <a:p>
             <a:pPr algn="ctr"/>
             <a:r>
-              <a:rPr lang="en-US" sz="1600" dirty="0" smtClean="0">
+              <a:rPr lang="en-US" sz="1600" dirty="0">
                 <a:solidFill>
                   <a:schemeClr val="bg1"/>
                 </a:solidFill>
@@ -4165,10 +4159,9 @@
           <a:lstStyle/>
           <a:p>
             <a:r>
-              <a:rPr lang="en-US" sz="1400" dirty="0" smtClean="0"/>
+              <a:rPr lang="en-US" sz="1400" dirty="0"/>
               <a:t>delete 1</a:t>
             </a:r>
-            <a:endParaRPr lang="en-US" sz="1400" dirty="0"/>
           </a:p>
         </p:txBody>
       </p:sp>
@@ -4231,18 +4224,13 @@
           <a:lstStyle/>
           <a:p>
             <a:r>
-              <a:rPr lang="en-US" sz="1400" dirty="0" smtClean="0">
+              <a:rPr lang="en-US" sz="1400" dirty="0">
                 <a:solidFill>
                   <a:srgbClr val="0070C0"/>
                 </a:solidFill>
               </a:rPr>
               <a:t>execute(“delete 1”)</a:t>
             </a:r>
-            <a:endParaRPr lang="en-US" sz="1400" dirty="0">
-              <a:solidFill>
-                <a:srgbClr val="0070C0"/>
-              </a:solidFill>
-            </a:endParaRPr>
           </a:p>
         </p:txBody>
       </p:sp>
@@ -4305,26 +4293,21 @@
           <a:lstStyle/>
           <a:p>
             <a:r>
-              <a:rPr lang="en-US" sz="1400" dirty="0" err="1" smtClean="0">
+              <a:rPr lang="en-US" sz="1400" dirty="0" err="1">
                 <a:solidFill>
                   <a:srgbClr val="7030A0"/>
                 </a:solidFill>
               </a:rPr>
-              <a:t>deletePerson</a:t>
-            </a:r>
-            <a:r>
-              <a:rPr lang="en-US" sz="1400" dirty="0" smtClean="0">
+              <a:t>deleteTask</a:t>
+            </a:r>
+            <a:r>
+              <a:rPr lang="en-US" sz="1400" dirty="0">
                 <a:solidFill>
                   <a:srgbClr val="7030A0"/>
                 </a:solidFill>
               </a:rPr>
-              <a:t>(p)</a:t>
-            </a:r>
-            <a:endParaRPr lang="en-US" sz="1400" dirty="0">
-              <a:solidFill>
-                <a:srgbClr val="7030A0"/>
-              </a:solidFill>
-            </a:endParaRPr>
+              <a:t>(t)</a:t>
+            </a:r>
           </a:p>
         </p:txBody>
       </p:sp>
@@ -4351,7 +4334,7 @@
           <a:lstStyle/>
           <a:p>
             <a:r>
-              <a:rPr lang="en-US" sz="1400" dirty="0" smtClean="0">
+              <a:rPr lang="en-US" sz="1400" dirty="0">
                 <a:solidFill>
                   <a:schemeClr val="accent5">
                     <a:lumMod val="75000"/>
@@ -4361,17 +4344,17 @@
               <a:t>post(</a:t>
             </a:r>
             <a:r>
-              <a:rPr lang="en-US" sz="1400" dirty="0" err="1" smtClean="0">
+              <a:rPr lang="en-US" sz="1400" dirty="0" err="1">
                 <a:solidFill>
                   <a:schemeClr val="accent5">
                     <a:lumMod val="75000"/>
                   </a:schemeClr>
                 </a:solidFill>
               </a:rPr>
-              <a:t>AddressBookChangedEvent</a:t>
-            </a:r>
-            <a:r>
-              <a:rPr lang="en-US" sz="1400" dirty="0" smtClean="0">
+              <a:t>TaskBookChangedEvent</a:t>
+            </a:r>
+            <a:r>
+              <a:rPr lang="en-US" sz="1400" dirty="0">
                 <a:solidFill>
                   <a:schemeClr val="accent5">
                     <a:lumMod val="75000"/>
@@ -4380,13 +4363,6 @@
               </a:rPr>
               <a:t>)</a:t>
             </a:r>
-            <a:endParaRPr lang="en-US" sz="1400" dirty="0">
-              <a:solidFill>
-                <a:schemeClr val="accent5">
-                  <a:lumMod val="75000"/>
-                </a:schemeClr>
-              </a:solidFill>
-            </a:endParaRPr>
           </a:p>
         </p:txBody>
       </p:sp>
@@ -4552,7 +4528,7 @@
           <a:p>
             <a:pPr algn="ctr"/>
             <a:r>
-              <a:rPr lang="en-US" sz="1600" dirty="0" smtClean="0">
+              <a:rPr lang="en-US" sz="1600" dirty="0">
                 <a:solidFill>
                   <a:schemeClr val="bg1"/>
                 </a:solidFill>
@@ -4560,7 +4536,7 @@
               <a:t>:</a:t>
             </a:r>
             <a:r>
-              <a:rPr lang="en-US" sz="1600" dirty="0" err="1" smtClean="0">
+              <a:rPr lang="en-US" sz="1600" dirty="0" err="1">
                 <a:solidFill>
                   <a:schemeClr val="bg1"/>
                 </a:solidFill>
@@ -4793,7 +4769,7 @@
           <a:p>
             <a:pPr algn="ctr"/>
             <a:r>
-              <a:rPr lang="en-US" sz="1600" dirty="0" smtClean="0">
+              <a:rPr lang="en-US" sz="1600" dirty="0">
                 <a:solidFill>
                   <a:schemeClr val="bg1"/>
                 </a:solidFill>
@@ -4925,7 +4901,7 @@
           <a:lstStyle/>
           <a:p>
             <a:r>
-              <a:rPr lang="en-US" sz="1400" dirty="0" smtClean="0">
+              <a:rPr lang="en-US" sz="1400" dirty="0">
                 <a:solidFill>
                   <a:schemeClr val="accent5">
                     <a:lumMod val="75000"/>
@@ -4935,17 +4911,17 @@
               <a:t>post(</a:t>
             </a:r>
             <a:r>
-              <a:rPr lang="en-US" sz="1400" dirty="0" err="1" smtClean="0">
+              <a:rPr lang="en-US" sz="1400" dirty="0" err="1">
                 <a:solidFill>
                   <a:schemeClr val="accent5">
                     <a:lumMod val="75000"/>
                   </a:schemeClr>
                 </a:solidFill>
               </a:rPr>
-              <a:t>AddressBookChangedEvent</a:t>
-            </a:r>
-            <a:r>
-              <a:rPr lang="en-US" sz="1400" dirty="0" smtClean="0">
+              <a:t>TaskBookChangedEvent</a:t>
+            </a:r>
+            <a:r>
+              <a:rPr lang="en-US" sz="1400" dirty="0">
                 <a:solidFill>
                   <a:schemeClr val="accent5">
                     <a:lumMod val="75000"/>
@@ -4954,13 +4930,6 @@
               </a:rPr>
               <a:t>)</a:t>
             </a:r>
-            <a:endParaRPr lang="en-US" sz="1400" dirty="0">
-              <a:solidFill>
-                <a:schemeClr val="accent5">
-                  <a:lumMod val="75000"/>
-                </a:schemeClr>
-              </a:solidFill>
-            </a:endParaRPr>
           </a:p>
         </p:txBody>
       </p:sp>
@@ -5052,7 +5021,7 @@
           <a:p>
             <a:pPr algn="ctr"/>
             <a:r>
-              <a:rPr lang="en-US" sz="1600" dirty="0" smtClean="0">
+              <a:rPr lang="en-US" sz="1600" dirty="0">
                 <a:solidFill>
                   <a:schemeClr val="bg1"/>
                 </a:solidFill>
@@ -5060,7 +5029,7 @@
               <a:t>:</a:t>
             </a:r>
             <a:r>
-              <a:rPr lang="en-US" sz="1600" dirty="0" err="1" smtClean="0">
+              <a:rPr lang="en-US" sz="1600" dirty="0" err="1">
                 <a:solidFill>
                   <a:schemeClr val="bg1"/>
                 </a:solidFill>
@@ -5307,17 +5276,17 @@
           <a:lstStyle/>
           <a:p>
             <a:r>
-              <a:rPr lang="en-US" sz="1400" dirty="0" err="1" smtClean="0">
+              <a:rPr lang="en-US" sz="1400" dirty="0" err="1">
                 <a:solidFill>
                   <a:schemeClr val="accent6">
                     <a:lumMod val="75000"/>
                   </a:schemeClr>
                 </a:solidFill>
               </a:rPr>
-              <a:t>handleAddresssBookChangedEvent</a:t>
-            </a:r>
-            <a:r>
-              <a:rPr lang="en-US" sz="1400" dirty="0" smtClean="0">
+              <a:t>handleTaskBookChangedEvent</a:t>
+            </a:r>
+            <a:r>
+              <a:rPr lang="en-US" sz="1400" dirty="0">
                 <a:solidFill>
                   <a:schemeClr val="accent6">
                     <a:lumMod val="75000"/>
@@ -5326,13 +5295,6 @@
               </a:rPr>
               <a:t>()</a:t>
             </a:r>
-            <a:endParaRPr lang="en-US" sz="1400" dirty="0">
-              <a:solidFill>
-                <a:schemeClr val="accent6">
-                  <a:lumMod val="75000"/>
-                </a:schemeClr>
-              </a:solidFill>
-            </a:endParaRPr>
           </a:p>
         </p:txBody>
       </p:sp>
@@ -5417,7 +5379,7 @@
           <a:p>
             <a:pPr algn="ctr"/>
             <a:r>
-              <a:rPr lang="en-US" sz="1600" dirty="0" smtClean="0">
+              <a:rPr lang="en-US" sz="1600" dirty="0">
                 <a:solidFill>
                   <a:schemeClr val="bg1"/>
                 </a:solidFill>
@@ -5620,26 +5582,21 @@
           <a:lstStyle/>
           <a:p>
             <a:r>
-              <a:rPr lang="en-US" sz="1400" dirty="0" err="1" smtClean="0">
+              <a:rPr lang="en-US" sz="1400" dirty="0" err="1">
                 <a:solidFill>
                   <a:srgbClr val="00B050"/>
                 </a:solidFill>
               </a:rPr>
-              <a:t>handleAddresssBookChangedEvent</a:t>
-            </a:r>
-            <a:r>
-              <a:rPr lang="en-US" sz="1400" dirty="0" smtClean="0">
+              <a:t>handleTaskBookChangedEvent</a:t>
+            </a:r>
+            <a:r>
+              <a:rPr lang="en-US" sz="1400" dirty="0">
                 <a:solidFill>
                   <a:srgbClr val="00B050"/>
                 </a:solidFill>
               </a:rPr>
               <a:t>()</a:t>
             </a:r>
-            <a:endParaRPr lang="en-US" sz="1400" dirty="0">
-              <a:solidFill>
-                <a:srgbClr val="00B050"/>
-              </a:solidFill>
-            </a:endParaRPr>
           </a:p>
         </p:txBody>
       </p:sp>
@@ -5826,18 +5783,13 @@
           <a:p>
             <a:pPr algn="r"/>
             <a:r>
-              <a:rPr lang="en-US" sz="1400" dirty="0" smtClean="0">
+              <a:rPr lang="en-US" sz="1400" dirty="0">
                 <a:solidFill>
                   <a:srgbClr val="00B050"/>
                 </a:solidFill>
               </a:rPr>
               <a:t>Update status bar</a:t>
             </a:r>
-            <a:endParaRPr lang="en-US" sz="1400" dirty="0">
-              <a:solidFill>
-                <a:srgbClr val="00B050"/>
-              </a:solidFill>
-            </a:endParaRPr>
           </a:p>
         </p:txBody>
       </p:sp>
@@ -6027,7 +5979,7 @@
           <a:lstStyle/>
           <a:p>
             <a:r>
-              <a:rPr lang="en-US" sz="1400" dirty="0" smtClean="0">
+              <a:rPr lang="en-US" sz="1400" dirty="0">
                 <a:solidFill>
                   <a:schemeClr val="accent6">
                     <a:lumMod val="75000"/>
@@ -6037,7 +5989,7 @@
               <a:t>Save </a:t>
             </a:r>
             <a:br>
-              <a:rPr lang="en-US" sz="1400" dirty="0" smtClean="0">
+              <a:rPr lang="en-US" sz="1400" dirty="0">
                 <a:solidFill>
                   <a:schemeClr val="accent6">
                     <a:lumMod val="75000"/>
@@ -6046,7 +5998,7 @@
               </a:rPr>
             </a:br>
             <a:r>
-              <a:rPr lang="en-US" sz="1400" dirty="0" smtClean="0">
+              <a:rPr lang="en-US" sz="1400" dirty="0">
                 <a:solidFill>
                   <a:schemeClr val="accent6">
                     <a:lumMod val="75000"/>
@@ -6055,13 +6007,6 @@
               </a:rPr>
               <a:t>to file</a:t>
             </a:r>
-            <a:endParaRPr lang="en-US" sz="1400" dirty="0">
-              <a:solidFill>
-                <a:schemeClr val="accent6">
-                  <a:lumMod val="75000"/>
-                </a:schemeClr>
-              </a:solidFill>
-            </a:endParaRPr>
           </a:p>
         </p:txBody>
       </p:sp>

</xml_diff>

<commit_message>
Update DeveloperGuide and diagram pptx files
</commit_message>
<xml_diff>
--- a/docs/diagrams/HighLevelSequenceDiagrams.pptx
+++ b/docs/diagrams/HighLevelSequenceDiagrams.pptx
@@ -107,6 +107,22 @@
       </a:defRPr>
     </a:lvl9pPr>
   </p:defaultTextStyle>
+  <p:extLst>
+    <p:ext uri="{EFAFB233-063F-42B5-8137-9DF3F51BA10A}">
+      <p15:sldGuideLst xmlns:p15="http://schemas.microsoft.com/office/powerpoint/2012/main">
+        <p15:guide id="1" orient="horz" pos="1488">
+          <p15:clr>
+            <a:srgbClr val="A4A3A4"/>
+          </p15:clr>
+        </p15:guide>
+        <p15:guide id="2" pos="2880">
+          <p15:clr>
+            <a:srgbClr val="A4A3A4"/>
+          </p15:clr>
+        </p15:guide>
+      </p15:sldGuideLst>
+    </p:ext>
+  </p:extLst>
 </p:presentation>
 </file>
 
@@ -192,7 +208,7 @@
           <a:p>
             <a:fld id="{F5CC4B3F-88C1-4FFA-B1B6-F41C21DC6924}" type="datetimeFigureOut">
               <a:rPr lang="en-US" smtClean="0"/>
-              <a:t>10/16/2016</a:t>
+              <a:t>3/16/17</a:t>
             </a:fld>
             <a:endParaRPr lang="en-US"/>
           </a:p>
@@ -641,7 +657,7 @@
           <a:p>
             <a:fld id="{78C97017-6FC3-485B-9764-EAC9E56C1D49}" type="datetimeFigureOut">
               <a:rPr lang="en-US" smtClean="0"/>
-              <a:t>10/16/2016</a:t>
+              <a:t>3/16/17</a:t>
             </a:fld>
             <a:endParaRPr lang="en-US"/>
           </a:p>
@@ -811,7 +827,7 @@
           <a:p>
             <a:fld id="{78C97017-6FC3-485B-9764-EAC9E56C1D49}" type="datetimeFigureOut">
               <a:rPr lang="en-US" smtClean="0"/>
-              <a:t>10/16/2016</a:t>
+              <a:t>3/16/17</a:t>
             </a:fld>
             <a:endParaRPr lang="en-US"/>
           </a:p>
@@ -991,7 +1007,7 @@
           <a:p>
             <a:fld id="{78C97017-6FC3-485B-9764-EAC9E56C1D49}" type="datetimeFigureOut">
               <a:rPr lang="en-US" smtClean="0"/>
-              <a:t>10/16/2016</a:t>
+              <a:t>3/16/17</a:t>
             </a:fld>
             <a:endParaRPr lang="en-US"/>
           </a:p>
@@ -1161,7 +1177,7 @@
           <a:p>
             <a:fld id="{78C97017-6FC3-485B-9764-EAC9E56C1D49}" type="datetimeFigureOut">
               <a:rPr lang="en-US" smtClean="0"/>
-              <a:t>10/16/2016</a:t>
+              <a:t>3/16/17</a:t>
             </a:fld>
             <a:endParaRPr lang="en-US"/>
           </a:p>
@@ -1407,7 +1423,7 @@
           <a:p>
             <a:fld id="{78C97017-6FC3-485B-9764-EAC9E56C1D49}" type="datetimeFigureOut">
               <a:rPr lang="en-US" smtClean="0"/>
-              <a:t>10/16/2016</a:t>
+              <a:t>3/16/17</a:t>
             </a:fld>
             <a:endParaRPr lang="en-US"/>
           </a:p>
@@ -1695,7 +1711,7 @@
           <a:p>
             <a:fld id="{78C97017-6FC3-485B-9764-EAC9E56C1D49}" type="datetimeFigureOut">
               <a:rPr lang="en-US" smtClean="0"/>
-              <a:t>10/16/2016</a:t>
+              <a:t>3/16/17</a:t>
             </a:fld>
             <a:endParaRPr lang="en-US"/>
           </a:p>
@@ -2117,7 +2133,7 @@
           <a:p>
             <a:fld id="{78C97017-6FC3-485B-9764-EAC9E56C1D49}" type="datetimeFigureOut">
               <a:rPr lang="en-US" smtClean="0"/>
-              <a:t>10/16/2016</a:t>
+              <a:t>3/16/17</a:t>
             </a:fld>
             <a:endParaRPr lang="en-US"/>
           </a:p>
@@ -2235,7 +2251,7 @@
           <a:p>
             <a:fld id="{78C97017-6FC3-485B-9764-EAC9E56C1D49}" type="datetimeFigureOut">
               <a:rPr lang="en-US" smtClean="0"/>
-              <a:t>10/16/2016</a:t>
+              <a:t>3/16/17</a:t>
             </a:fld>
             <a:endParaRPr lang="en-US"/>
           </a:p>
@@ -2330,7 +2346,7 @@
           <a:p>
             <a:fld id="{78C97017-6FC3-485B-9764-EAC9E56C1D49}" type="datetimeFigureOut">
               <a:rPr lang="en-US" smtClean="0"/>
-              <a:t>10/16/2016</a:t>
+              <a:t>3/16/17</a:t>
             </a:fld>
             <a:endParaRPr lang="en-US"/>
           </a:p>
@@ -2607,7 +2623,7 @@
           <a:p>
             <a:fld id="{78C97017-6FC3-485B-9764-EAC9E56C1D49}" type="datetimeFigureOut">
               <a:rPr lang="en-US" smtClean="0"/>
-              <a:t>10/16/2016</a:t>
+              <a:t>3/16/17</a:t>
             </a:fld>
             <a:endParaRPr lang="en-US"/>
           </a:p>
@@ -2860,7 +2876,7 @@
           <a:p>
             <a:fld id="{78C97017-6FC3-485B-9764-EAC9E56C1D49}" type="datetimeFigureOut">
               <a:rPr lang="en-US" smtClean="0"/>
-              <a:t>10/16/2016</a:t>
+              <a:t>3/16/17</a:t>
             </a:fld>
             <a:endParaRPr lang="en-US"/>
           </a:p>
@@ -3073,7 +3089,7 @@
           <a:p>
             <a:fld id="{78C97017-6FC3-485B-9764-EAC9E56C1D49}" type="datetimeFigureOut">
               <a:rPr lang="en-US" smtClean="0"/>
-              <a:t>10/16/2016</a:t>
+              <a:t>3/16/17</a:t>
             </a:fld>
             <a:endParaRPr lang="en-US"/>
           </a:p>
@@ -4310,7 +4326,7 @@
                   <a:srgbClr val="7030A0"/>
                 </a:solidFill>
               </a:rPr>
-              <a:t>deletePerson</a:t>
+              <a:t>deleteTask</a:t>
             </a:r>
             <a:r>
               <a:rPr lang="en-US" sz="1400" dirty="0" smtClean="0">
@@ -4318,7 +4334,7 @@
                   <a:srgbClr val="7030A0"/>
                 </a:solidFill>
               </a:rPr>
-              <a:t>(p)</a:t>
+              <a:t>(t)</a:t>
             </a:r>
             <a:endParaRPr lang="en-US" sz="1400" dirty="0">
               <a:solidFill>
@@ -4368,7 +4384,7 @@
                   </a:schemeClr>
                 </a:solidFill>
               </a:rPr>
-              <a:t>AddressBookChangedEvent</a:t>
+              <a:t>TaskManagerChangedEvent</a:t>
             </a:r>
             <a:r>
               <a:rPr lang="en-US" sz="1400" dirty="0" smtClean="0">
@@ -4942,7 +4958,7 @@
                   </a:schemeClr>
                 </a:solidFill>
               </a:rPr>
-              <a:t>AddressBookChangedEvent</a:t>
+              <a:t>TaskManagerChangedEvent</a:t>
             </a:r>
             <a:r>
               <a:rPr lang="en-US" sz="1400" dirty="0" smtClean="0">
@@ -5314,7 +5330,7 @@
                   </a:schemeClr>
                 </a:solidFill>
               </a:rPr>
-              <a:t>handleAddresssBookChangedEvent</a:t>
+              <a:t>handleTaskManagerChangedEvent</a:t>
             </a:r>
             <a:r>
               <a:rPr lang="en-US" sz="1400" dirty="0" smtClean="0">
@@ -5625,7 +5641,7 @@
                   <a:srgbClr val="00B050"/>
                 </a:solidFill>
               </a:rPr>
-              <a:t>handleAddresssBookChangedEvent</a:t>
+              <a:t>handleTaskManagerChangedEvent</a:t>
             </a:r>
             <a:r>
               <a:rPr lang="en-US" sz="1400" dirty="0" smtClean="0">

</xml_diff>

<commit_message>
Updated Diagrams for dev Guide
</commit_message>
<xml_diff>
--- a/docs/diagrams/HighLevelSequenceDiagrams.pptx
+++ b/docs/diagrams/HighLevelSequenceDiagrams.pptx
@@ -107,6 +107,22 @@
       </a:defRPr>
     </a:lvl9pPr>
   </p:defaultTextStyle>
+  <p:extLst>
+    <p:ext uri="{EFAFB233-063F-42B5-8137-9DF3F51BA10A}">
+      <p15:sldGuideLst xmlns:p15="http://schemas.microsoft.com/office/powerpoint/2012/main">
+        <p15:guide id="1" orient="horz" pos="1488">
+          <p15:clr>
+            <a:srgbClr val="A4A3A4"/>
+          </p15:clr>
+        </p15:guide>
+        <p15:guide id="2" pos="2880">
+          <p15:clr>
+            <a:srgbClr val="A4A3A4"/>
+          </p15:clr>
+        </p15:guide>
+      </p15:sldGuideLst>
+    </p:ext>
+  </p:extLst>
 </p:presentation>
 </file>
 
@@ -192,7 +208,7 @@
           <a:p>
             <a:fld id="{F5CC4B3F-88C1-4FFA-B1B6-F41C21DC6924}" type="datetimeFigureOut">
               <a:rPr lang="en-US" smtClean="0"/>
-              <a:t>10/16/2016</a:t>
+              <a:t>17-Mar-17</a:t>
             </a:fld>
             <a:endParaRPr lang="en-US"/>
           </a:p>
@@ -641,7 +657,7 @@
           <a:p>
             <a:fld id="{78C97017-6FC3-485B-9764-EAC9E56C1D49}" type="datetimeFigureOut">
               <a:rPr lang="en-US" smtClean="0"/>
-              <a:t>10/16/2016</a:t>
+              <a:t>17-Mar-17</a:t>
             </a:fld>
             <a:endParaRPr lang="en-US"/>
           </a:p>
@@ -811,7 +827,7 @@
           <a:p>
             <a:fld id="{78C97017-6FC3-485B-9764-EAC9E56C1D49}" type="datetimeFigureOut">
               <a:rPr lang="en-US" smtClean="0"/>
-              <a:t>10/16/2016</a:t>
+              <a:t>17-Mar-17</a:t>
             </a:fld>
             <a:endParaRPr lang="en-US"/>
           </a:p>
@@ -991,7 +1007,7 @@
           <a:p>
             <a:fld id="{78C97017-6FC3-485B-9764-EAC9E56C1D49}" type="datetimeFigureOut">
               <a:rPr lang="en-US" smtClean="0"/>
-              <a:t>10/16/2016</a:t>
+              <a:t>17-Mar-17</a:t>
             </a:fld>
             <a:endParaRPr lang="en-US"/>
           </a:p>
@@ -1161,7 +1177,7 @@
           <a:p>
             <a:fld id="{78C97017-6FC3-485B-9764-EAC9E56C1D49}" type="datetimeFigureOut">
               <a:rPr lang="en-US" smtClean="0"/>
-              <a:t>10/16/2016</a:t>
+              <a:t>17-Mar-17</a:t>
             </a:fld>
             <a:endParaRPr lang="en-US"/>
           </a:p>
@@ -1407,7 +1423,7 @@
           <a:p>
             <a:fld id="{78C97017-6FC3-485B-9764-EAC9E56C1D49}" type="datetimeFigureOut">
               <a:rPr lang="en-US" smtClean="0"/>
-              <a:t>10/16/2016</a:t>
+              <a:t>17-Mar-17</a:t>
             </a:fld>
             <a:endParaRPr lang="en-US"/>
           </a:p>
@@ -1695,7 +1711,7 @@
           <a:p>
             <a:fld id="{78C97017-6FC3-485B-9764-EAC9E56C1D49}" type="datetimeFigureOut">
               <a:rPr lang="en-US" smtClean="0"/>
-              <a:t>10/16/2016</a:t>
+              <a:t>17-Mar-17</a:t>
             </a:fld>
             <a:endParaRPr lang="en-US"/>
           </a:p>
@@ -2117,7 +2133,7 @@
           <a:p>
             <a:fld id="{78C97017-6FC3-485B-9764-EAC9E56C1D49}" type="datetimeFigureOut">
               <a:rPr lang="en-US" smtClean="0"/>
-              <a:t>10/16/2016</a:t>
+              <a:t>17-Mar-17</a:t>
             </a:fld>
             <a:endParaRPr lang="en-US"/>
           </a:p>
@@ -2235,7 +2251,7 @@
           <a:p>
             <a:fld id="{78C97017-6FC3-485B-9764-EAC9E56C1D49}" type="datetimeFigureOut">
               <a:rPr lang="en-US" smtClean="0"/>
-              <a:t>10/16/2016</a:t>
+              <a:t>17-Mar-17</a:t>
             </a:fld>
             <a:endParaRPr lang="en-US"/>
           </a:p>
@@ -2330,7 +2346,7 @@
           <a:p>
             <a:fld id="{78C97017-6FC3-485B-9764-EAC9E56C1D49}" type="datetimeFigureOut">
               <a:rPr lang="en-US" smtClean="0"/>
-              <a:t>10/16/2016</a:t>
+              <a:t>17-Mar-17</a:t>
             </a:fld>
             <a:endParaRPr lang="en-US"/>
           </a:p>
@@ -2607,7 +2623,7 @@
           <a:p>
             <a:fld id="{78C97017-6FC3-485B-9764-EAC9E56C1D49}" type="datetimeFigureOut">
               <a:rPr lang="en-US" smtClean="0"/>
-              <a:t>10/16/2016</a:t>
+              <a:t>17-Mar-17</a:t>
             </a:fld>
             <a:endParaRPr lang="en-US"/>
           </a:p>
@@ -2860,7 +2876,7 @@
           <a:p>
             <a:fld id="{78C97017-6FC3-485B-9764-EAC9E56C1D49}" type="datetimeFigureOut">
               <a:rPr lang="en-US" smtClean="0"/>
-              <a:t>10/16/2016</a:t>
+              <a:t>17-Mar-17</a:t>
             </a:fld>
             <a:endParaRPr lang="en-US"/>
           </a:p>
@@ -3073,7 +3089,7 @@
           <a:p>
             <a:fld id="{78C97017-6FC3-485B-9764-EAC9E56C1D49}" type="datetimeFigureOut">
               <a:rPr lang="en-US" smtClean="0"/>
-              <a:t>10/16/2016</a:t>
+              <a:t>17-Mar-17</a:t>
             </a:fld>
             <a:endParaRPr lang="en-US"/>
           </a:p>
@@ -4310,7 +4326,7 @@
                   <a:srgbClr val="7030A0"/>
                 </a:solidFill>
               </a:rPr>
-              <a:t>deletePerson</a:t>
+              <a:t>deleteTask</a:t>
             </a:r>
             <a:r>
               <a:rPr lang="en-US" sz="1400" dirty="0" smtClean="0">
@@ -4318,7 +4334,15 @@
                   <a:srgbClr val="7030A0"/>
                 </a:solidFill>
               </a:rPr>
-              <a:t>(p)</a:t>
+              <a:t>(p</a:t>
+            </a:r>
+            <a:r>
+              <a:rPr lang="en-US" sz="1400" dirty="0" smtClean="0">
+                <a:solidFill>
+                  <a:srgbClr val="7030A0"/>
+                </a:solidFill>
+              </a:rPr>
+              <a:t>)</a:t>
             </a:r>
             <a:endParaRPr lang="en-US" sz="1400" dirty="0">
               <a:solidFill>
@@ -4368,7 +4392,17 @@
                   </a:schemeClr>
                 </a:solidFill>
               </a:rPr>
-              <a:t>AddressBookChangedEvent</a:t>
+              <a:t>TaskManager</a:t>
+            </a:r>
+            <a:r>
+              <a:rPr lang="en-US" sz="1400" dirty="0" err="1" smtClean="0">
+                <a:solidFill>
+                  <a:schemeClr val="accent5">
+                    <a:lumMod val="75000"/>
+                  </a:schemeClr>
+                </a:solidFill>
+              </a:rPr>
+              <a:t>Event</a:t>
             </a:r>
             <a:r>
               <a:rPr lang="en-US" sz="1400" dirty="0" smtClean="0">
@@ -4925,7 +4959,7 @@
           <a:lstStyle/>
           <a:p>
             <a:r>
-              <a:rPr lang="en-US" sz="1400" dirty="0" smtClean="0">
+              <a:rPr lang="en-US" sz="1400" dirty="0">
                 <a:solidFill>
                   <a:schemeClr val="accent5">
                     <a:lumMod val="75000"/>
@@ -4935,14 +4969,14 @@
               <a:t>post(</a:t>
             </a:r>
             <a:r>
-              <a:rPr lang="en-US" sz="1400" dirty="0" err="1" smtClean="0">
+              <a:rPr lang="en-US" sz="1400" dirty="0" err="1">
                 <a:solidFill>
                   <a:schemeClr val="accent5">
                     <a:lumMod val="75000"/>
                   </a:schemeClr>
                 </a:solidFill>
               </a:rPr>
-              <a:t>AddressBookChangedEvent</a:t>
+              <a:t>TaskManagerChangedEvent</a:t>
             </a:r>
             <a:r>
               <a:rPr lang="en-US" sz="1400" dirty="0" smtClean="0">
@@ -5307,14 +5341,14 @@
           <a:lstStyle/>
           <a:p>
             <a:r>
-              <a:rPr lang="en-US" sz="1400" dirty="0" err="1" smtClean="0">
+              <a:rPr lang="en-US" sz="1400" smtClean="0">
                 <a:solidFill>
                   <a:schemeClr val="accent6">
                     <a:lumMod val="75000"/>
                   </a:schemeClr>
                 </a:solidFill>
               </a:rPr>
-              <a:t>handleAddresssBookChangedEvent</a:t>
+              <a:t>handleTaskManagerChangedEvent</a:t>
             </a:r>
             <a:r>
               <a:rPr lang="en-US" sz="1400" dirty="0" smtClean="0">
@@ -5625,7 +5659,7 @@
                   <a:srgbClr val="00B050"/>
                 </a:solidFill>
               </a:rPr>
-              <a:t>handleAddresssBookChangedEvent</a:t>
+              <a:t>handleTaskManagerChangedEvent</a:t>
             </a:r>
             <a:r>
               <a:rPr lang="en-US" sz="1400" dirty="0" smtClean="0">

</xml_diff>

<commit_message>
Add sequence diagram for deletelabel and editlabel
</commit_message>
<xml_diff>
--- a/docs/diagrams/HighLevelSequenceDiagrams.pptx
+++ b/docs/diagrams/HighLevelSequenceDiagrams.pptx
@@ -5,10 +5,11 @@
     <p:sldMasterId id="2147483648" r:id="rId1"/>
   </p:sldMasterIdLst>
   <p:notesMasterIdLst>
-    <p:notesMasterId r:id="rId3"/>
+    <p:notesMasterId r:id="rId4"/>
   </p:notesMasterIdLst>
   <p:sldIdLst>
     <p:sldId id="266" r:id="rId2"/>
+    <p:sldId id="267" r:id="rId3"/>
   </p:sldIdLst>
   <p:sldSz cx="9144000" cy="6858000" type="screen4x3"/>
   <p:notesSz cx="6858000" cy="9144000"/>
@@ -107,6 +108,22 @@
       </a:defRPr>
     </a:lvl9pPr>
   </p:defaultTextStyle>
+  <p:extLst>
+    <p:ext uri="{EFAFB233-063F-42B5-8137-9DF3F51BA10A}">
+      <p15:sldGuideLst xmlns:p15="http://schemas.microsoft.com/office/powerpoint/2012/main">
+        <p15:guide id="1" orient="horz" pos="1488">
+          <p15:clr>
+            <a:srgbClr val="A4A3A4"/>
+          </p15:clr>
+        </p15:guide>
+        <p15:guide id="2" pos="2880">
+          <p15:clr>
+            <a:srgbClr val="A4A3A4"/>
+          </p15:clr>
+        </p15:guide>
+      </p15:sldGuideLst>
+    </p:ext>
+  </p:extLst>
 </p:presentation>
 </file>
 
@@ -192,7 +209,7 @@
           <a:p>
             <a:fld id="{F5CC4B3F-88C1-4FFA-B1B6-F41C21DC6924}" type="datetimeFigureOut">
               <a:rPr lang="en-US" smtClean="0"/>
-              <a:t>10/16/2016</a:t>
+              <a:t>3/18/2017</a:t>
             </a:fld>
             <a:endParaRPr lang="en-US"/>
           </a:p>
@@ -641,7 +658,7 @@
           <a:p>
             <a:fld id="{78C97017-6FC3-485B-9764-EAC9E56C1D49}" type="datetimeFigureOut">
               <a:rPr lang="en-US" smtClean="0"/>
-              <a:t>10/16/2016</a:t>
+              <a:t>3/18/2017</a:t>
             </a:fld>
             <a:endParaRPr lang="en-US"/>
           </a:p>
@@ -811,7 +828,7 @@
           <a:p>
             <a:fld id="{78C97017-6FC3-485B-9764-EAC9E56C1D49}" type="datetimeFigureOut">
               <a:rPr lang="en-US" smtClean="0"/>
-              <a:t>10/16/2016</a:t>
+              <a:t>3/18/2017</a:t>
             </a:fld>
             <a:endParaRPr lang="en-US"/>
           </a:p>
@@ -991,7 +1008,7 @@
           <a:p>
             <a:fld id="{78C97017-6FC3-485B-9764-EAC9E56C1D49}" type="datetimeFigureOut">
               <a:rPr lang="en-US" smtClean="0"/>
-              <a:t>10/16/2016</a:t>
+              <a:t>3/18/2017</a:t>
             </a:fld>
             <a:endParaRPr lang="en-US"/>
           </a:p>
@@ -1161,7 +1178,7 @@
           <a:p>
             <a:fld id="{78C97017-6FC3-485B-9764-EAC9E56C1D49}" type="datetimeFigureOut">
               <a:rPr lang="en-US" smtClean="0"/>
-              <a:t>10/16/2016</a:t>
+              <a:t>3/18/2017</a:t>
             </a:fld>
             <a:endParaRPr lang="en-US"/>
           </a:p>
@@ -1407,7 +1424,7 @@
           <a:p>
             <a:fld id="{78C97017-6FC3-485B-9764-EAC9E56C1D49}" type="datetimeFigureOut">
               <a:rPr lang="en-US" smtClean="0"/>
-              <a:t>10/16/2016</a:t>
+              <a:t>3/18/2017</a:t>
             </a:fld>
             <a:endParaRPr lang="en-US"/>
           </a:p>
@@ -1695,7 +1712,7 @@
           <a:p>
             <a:fld id="{78C97017-6FC3-485B-9764-EAC9E56C1D49}" type="datetimeFigureOut">
               <a:rPr lang="en-US" smtClean="0"/>
-              <a:t>10/16/2016</a:t>
+              <a:t>3/18/2017</a:t>
             </a:fld>
             <a:endParaRPr lang="en-US"/>
           </a:p>
@@ -2117,7 +2134,7 @@
           <a:p>
             <a:fld id="{78C97017-6FC3-485B-9764-EAC9E56C1D49}" type="datetimeFigureOut">
               <a:rPr lang="en-US" smtClean="0"/>
-              <a:t>10/16/2016</a:t>
+              <a:t>3/18/2017</a:t>
             </a:fld>
             <a:endParaRPr lang="en-US"/>
           </a:p>
@@ -2235,7 +2252,7 @@
           <a:p>
             <a:fld id="{78C97017-6FC3-485B-9764-EAC9E56C1D49}" type="datetimeFigureOut">
               <a:rPr lang="en-US" smtClean="0"/>
-              <a:t>10/16/2016</a:t>
+              <a:t>3/18/2017</a:t>
             </a:fld>
             <a:endParaRPr lang="en-US"/>
           </a:p>
@@ -2330,7 +2347,7 @@
           <a:p>
             <a:fld id="{78C97017-6FC3-485B-9764-EAC9E56C1D49}" type="datetimeFigureOut">
               <a:rPr lang="en-US" smtClean="0"/>
-              <a:t>10/16/2016</a:t>
+              <a:t>3/18/2017</a:t>
             </a:fld>
             <a:endParaRPr lang="en-US"/>
           </a:p>
@@ -2607,7 +2624,7 @@
           <a:p>
             <a:fld id="{78C97017-6FC3-485B-9764-EAC9E56C1D49}" type="datetimeFigureOut">
               <a:rPr lang="en-US" smtClean="0"/>
-              <a:t>10/16/2016</a:t>
+              <a:t>3/18/2017</a:t>
             </a:fld>
             <a:endParaRPr lang="en-US"/>
           </a:p>
@@ -2860,7 +2877,7 @@
           <a:p>
             <a:fld id="{78C97017-6FC3-485B-9764-EAC9E56C1D49}" type="datetimeFigureOut">
               <a:rPr lang="en-US" smtClean="0"/>
-              <a:t>10/16/2016</a:t>
+              <a:t>3/18/2017</a:t>
             </a:fld>
             <a:endParaRPr lang="en-US"/>
           </a:p>
@@ -3073,7 +3090,7 @@
           <a:p>
             <a:fld id="{78C97017-6FC3-485B-9764-EAC9E56C1D49}" type="datetimeFigureOut">
               <a:rPr lang="en-US" smtClean="0"/>
-              <a:t>10/16/2016</a:t>
+              <a:t>3/18/2017</a:t>
             </a:fld>
             <a:endParaRPr lang="en-US"/>
           </a:p>
@@ -6069,6 +6086,2754 @@
     <p:extLst>
       <p:ext uri="{BB962C8B-B14F-4D97-AF65-F5344CB8AC3E}">
         <p14:creationId xmlns:p14="http://schemas.microsoft.com/office/powerpoint/2010/main" val="4023378879"/>
+      </p:ext>
+    </p:extLst>
+  </p:cSld>
+  <p:clrMapOvr>
+    <a:masterClrMapping/>
+  </p:clrMapOvr>
+</p:sld>
+</file>
+
+<file path=ppt/slides/slide2.xml><?xml version="1.0" encoding="utf-8"?>
+<p:sld xmlns:a="http://schemas.openxmlformats.org/drawingml/2006/main" xmlns:r="http://schemas.openxmlformats.org/officeDocument/2006/relationships" xmlns:p="http://schemas.openxmlformats.org/presentationml/2006/main">
+  <p:cSld>
+    <p:spTree>
+      <p:nvGrpSpPr>
+        <p:cNvPr id="1" name=""/>
+        <p:cNvGrpSpPr/>
+        <p:nvPr/>
+      </p:nvGrpSpPr>
+      <p:grpSpPr>
+        <a:xfrm>
+          <a:off x="0" y="0"/>
+          <a:ext cx="0" cy="0"/>
+          <a:chOff x="0" y="0"/>
+          <a:chExt cx="0" cy="0"/>
+        </a:xfrm>
+      </p:grpSpPr>
+      <p:sp>
+        <p:nvSpPr>
+          <p:cNvPr id="2" name="Rectangle 62"/>
+          <p:cNvSpPr/>
+          <p:nvPr/>
+        </p:nvSpPr>
+        <p:spPr>
+          <a:xfrm>
+            <a:off x="1111860" y="607926"/>
+            <a:ext cx="1093635" cy="346760"/>
+          </a:xfrm>
+          <a:prstGeom prst="rect">
+            <a:avLst/>
+          </a:prstGeom>
+          <a:solidFill>
+            <a:srgbClr val="00B050"/>
+          </a:solidFill>
+          <a:ln w="19050">
+            <a:solidFill>
+              <a:srgbClr val="00B050"/>
+            </a:solidFill>
+          </a:ln>
+          <a:effectLst/>
+        </p:spPr>
+        <p:style>
+          <a:lnRef idx="1">
+            <a:schemeClr val="accent2"/>
+          </a:lnRef>
+          <a:fillRef idx="2">
+            <a:schemeClr val="accent2"/>
+          </a:fillRef>
+          <a:effectRef idx="1">
+            <a:schemeClr val="accent2"/>
+          </a:effectRef>
+          <a:fontRef idx="minor">
+            <a:schemeClr val="dk1"/>
+          </a:fontRef>
+        </p:style>
+        <p:txBody>
+          <a:bodyPr rtlCol="0" anchor="ctr"/>
+          <a:lstStyle/>
+          <a:p>
+            <a:pPr algn="ctr"/>
+            <a:r>
+              <a:rPr lang="en-US" sz="1600" dirty="0" smtClean="0">
+                <a:solidFill>
+                  <a:schemeClr val="bg1"/>
+                </a:solidFill>
+              </a:rPr>
+              <a:t>:UI</a:t>
+            </a:r>
+            <a:endParaRPr lang="en-SG" sz="1600" dirty="0">
+              <a:solidFill>
+                <a:schemeClr val="bg1"/>
+              </a:solidFill>
+            </a:endParaRPr>
+          </a:p>
+        </p:txBody>
+      </p:sp>
+      <p:cxnSp>
+        <p:nvCxnSpPr>
+          <p:cNvPr id="5" name="Straight Connector 4"/>
+          <p:cNvCxnSpPr/>
+          <p:nvPr/>
+        </p:nvCxnSpPr>
+        <p:spPr>
+          <a:xfrm>
+            <a:off x="1658677" y="971597"/>
+            <a:ext cx="0" cy="1723059"/>
+          </a:xfrm>
+          <a:prstGeom prst="line">
+            <a:avLst/>
+          </a:prstGeom>
+          <a:ln w="19050">
+            <a:solidFill>
+              <a:srgbClr val="00B050"/>
+            </a:solidFill>
+            <a:prstDash val="sysDash"/>
+          </a:ln>
+          <a:effectLst/>
+        </p:spPr>
+        <p:style>
+          <a:lnRef idx="1">
+            <a:schemeClr val="accent1"/>
+          </a:lnRef>
+          <a:fillRef idx="2">
+            <a:schemeClr val="accent1"/>
+          </a:fillRef>
+          <a:effectRef idx="1">
+            <a:schemeClr val="accent1"/>
+          </a:effectRef>
+          <a:fontRef idx="minor">
+            <a:schemeClr val="dk1"/>
+          </a:fontRef>
+        </p:style>
+      </p:cxnSp>
+      <p:sp>
+        <p:nvSpPr>
+          <p:cNvPr id="6" name="Rectangle 5"/>
+          <p:cNvSpPr/>
+          <p:nvPr/>
+        </p:nvSpPr>
+        <p:spPr>
+          <a:xfrm>
+            <a:off x="1586669" y="1322292"/>
+            <a:ext cx="152400" cy="1019910"/>
+          </a:xfrm>
+          <a:prstGeom prst="rect">
+            <a:avLst/>
+          </a:prstGeom>
+          <a:solidFill>
+            <a:srgbClr val="00B050"/>
+          </a:solidFill>
+          <a:ln>
+            <a:solidFill>
+              <a:srgbClr val="00B050"/>
+            </a:solidFill>
+          </a:ln>
+          <a:effectLst/>
+        </p:spPr>
+        <p:style>
+          <a:lnRef idx="1">
+            <a:schemeClr val="accent3"/>
+          </a:lnRef>
+          <a:fillRef idx="2">
+            <a:schemeClr val="accent3"/>
+          </a:fillRef>
+          <a:effectRef idx="1">
+            <a:schemeClr val="accent3"/>
+          </a:effectRef>
+          <a:fontRef idx="minor">
+            <a:schemeClr val="dk1"/>
+          </a:fontRef>
+        </p:style>
+        <p:txBody>
+          <a:bodyPr rtlCol="0" anchor="ctr"/>
+          <a:lstStyle/>
+          <a:p>
+            <a:pPr algn="ctr"/>
+            <a:endParaRPr lang="en-SG" sz="1400">
+              <a:solidFill>
+                <a:schemeClr val="dk1"/>
+              </a:solidFill>
+            </a:endParaRPr>
+          </a:p>
+        </p:txBody>
+      </p:sp>
+      <p:grpSp>
+        <p:nvGrpSpPr>
+          <p:cNvPr id="7" name="Actor"/>
+          <p:cNvGrpSpPr/>
+          <p:nvPr/>
+        </p:nvGrpSpPr>
+        <p:grpSpPr>
+          <a:xfrm>
+            <a:off x="152400" y="533400"/>
+            <a:ext cx="324036" cy="573410"/>
+            <a:chOff x="3239901" y="4149080"/>
+            <a:chExt cx="648072" cy="1146820"/>
+          </a:xfrm>
+        </p:grpSpPr>
+        <p:sp>
+          <p:nvSpPr>
+            <p:cNvPr id="8" name="Flowchart: Connector 7"/>
+            <p:cNvSpPr/>
+            <p:nvPr/>
+          </p:nvSpPr>
+          <p:spPr>
+            <a:xfrm>
+              <a:off x="3419872" y="4149080"/>
+              <a:ext cx="288032" cy="288032"/>
+            </a:xfrm>
+            <a:prstGeom prst="flowChartConnector">
+              <a:avLst/>
+            </a:prstGeom>
+            <a:solidFill>
+              <a:schemeClr val="bg1">
+                <a:lumMod val="85000"/>
+              </a:schemeClr>
+            </a:solidFill>
+            <a:ln w="28575">
+              <a:solidFill>
+                <a:schemeClr val="tx1"/>
+              </a:solidFill>
+            </a:ln>
+            <a:effectLst/>
+          </p:spPr>
+          <p:style>
+            <a:lnRef idx="1">
+              <a:schemeClr val="accent4"/>
+            </a:lnRef>
+            <a:fillRef idx="2">
+              <a:schemeClr val="accent4"/>
+            </a:fillRef>
+            <a:effectRef idx="1">
+              <a:schemeClr val="accent4"/>
+            </a:effectRef>
+            <a:fontRef idx="minor">
+              <a:schemeClr val="dk1"/>
+            </a:fontRef>
+          </p:style>
+          <p:txBody>
+            <a:bodyPr rtlCol="0" anchor="ctr"/>
+            <a:lstStyle/>
+            <a:p>
+              <a:pPr algn="ctr"/>
+              <a:endParaRPr lang="en-SG"/>
+            </a:p>
+          </p:txBody>
+        </p:sp>
+        <p:cxnSp>
+          <p:nvCxnSpPr>
+            <p:cNvPr id="9" name="Straight Connector 8"/>
+            <p:cNvCxnSpPr>
+              <a:stCxn id="8" idx="4"/>
+            </p:cNvCxnSpPr>
+            <p:nvPr/>
+          </p:nvCxnSpPr>
+          <p:spPr>
+            <a:xfrm>
+              <a:off x="3563888" y="4437112"/>
+              <a:ext cx="0" cy="504056"/>
+            </a:xfrm>
+            <a:prstGeom prst="line">
+              <a:avLst/>
+            </a:prstGeom>
+            <a:ln w="28575">
+              <a:solidFill>
+                <a:schemeClr val="tx1"/>
+              </a:solidFill>
+            </a:ln>
+            <a:effectLst/>
+          </p:spPr>
+          <p:style>
+            <a:lnRef idx="1">
+              <a:schemeClr val="accent4"/>
+            </a:lnRef>
+            <a:fillRef idx="2">
+              <a:schemeClr val="accent4"/>
+            </a:fillRef>
+            <a:effectRef idx="1">
+              <a:schemeClr val="accent4"/>
+            </a:effectRef>
+            <a:fontRef idx="minor">
+              <a:schemeClr val="dk1"/>
+            </a:fontRef>
+          </p:style>
+        </p:cxnSp>
+        <p:sp>
+          <p:nvSpPr>
+            <p:cNvPr id="10" name="Freeform 9"/>
+            <p:cNvSpPr/>
+            <p:nvPr/>
+          </p:nvSpPr>
+          <p:spPr>
+            <a:xfrm>
+              <a:off x="3324225" y="4933950"/>
+              <a:ext cx="479425" cy="361950"/>
+            </a:xfrm>
+            <a:custGeom>
+              <a:avLst/>
+              <a:gdLst>
+                <a:gd name="connsiteX0" fmla="*/ 0 w 479425"/>
+                <a:gd name="connsiteY0" fmla="*/ 355600 h 361950"/>
+                <a:gd name="connsiteX1" fmla="*/ 241300 w 479425"/>
+                <a:gd name="connsiteY1" fmla="*/ 0 h 361950"/>
+                <a:gd name="connsiteX2" fmla="*/ 479425 w 479425"/>
+                <a:gd name="connsiteY2" fmla="*/ 361950 h 361950"/>
+              </a:gdLst>
+              <a:ahLst/>
+              <a:cxnLst>
+                <a:cxn ang="0">
+                  <a:pos x="connsiteX0" y="connsiteY0"/>
+                </a:cxn>
+                <a:cxn ang="0">
+                  <a:pos x="connsiteX1" y="connsiteY1"/>
+                </a:cxn>
+                <a:cxn ang="0">
+                  <a:pos x="connsiteX2" y="connsiteY2"/>
+                </a:cxn>
+              </a:cxnLst>
+              <a:rect l="l" t="t" r="r" b="b"/>
+              <a:pathLst>
+                <a:path w="479425" h="361950">
+                  <a:moveTo>
+                    <a:pt x="0" y="355600"/>
+                  </a:moveTo>
+                  <a:lnTo>
+                    <a:pt x="241300" y="0"/>
+                  </a:lnTo>
+                  <a:lnTo>
+                    <a:pt x="479425" y="361950"/>
+                  </a:lnTo>
+                </a:path>
+              </a:pathLst>
+            </a:custGeom>
+            <a:noFill/>
+            <a:ln w="28575">
+              <a:solidFill>
+                <a:schemeClr val="tx1"/>
+              </a:solidFill>
+            </a:ln>
+            <a:effectLst/>
+          </p:spPr>
+          <p:style>
+            <a:lnRef idx="1">
+              <a:schemeClr val="accent4"/>
+            </a:lnRef>
+            <a:fillRef idx="2">
+              <a:schemeClr val="accent4"/>
+            </a:fillRef>
+            <a:effectRef idx="1">
+              <a:schemeClr val="accent4"/>
+            </a:effectRef>
+            <a:fontRef idx="minor">
+              <a:schemeClr val="dk1"/>
+            </a:fontRef>
+          </p:style>
+          <p:txBody>
+            <a:bodyPr rtlCol="0" anchor="ctr"/>
+            <a:lstStyle/>
+            <a:p>
+              <a:pPr algn="ctr"/>
+              <a:endParaRPr lang="en-SG"/>
+            </a:p>
+          </p:txBody>
+        </p:sp>
+        <p:cxnSp>
+          <p:nvCxnSpPr>
+            <p:cNvPr id="11" name="Straight Connector 10"/>
+            <p:cNvCxnSpPr/>
+            <p:nvPr/>
+          </p:nvCxnSpPr>
+          <p:spPr>
+            <a:xfrm>
+              <a:off x="3239901" y="4509120"/>
+              <a:ext cx="648072" cy="0"/>
+            </a:xfrm>
+            <a:prstGeom prst="line">
+              <a:avLst/>
+            </a:prstGeom>
+            <a:ln w="28575">
+              <a:solidFill>
+                <a:schemeClr val="tx1"/>
+              </a:solidFill>
+            </a:ln>
+            <a:effectLst/>
+          </p:spPr>
+          <p:style>
+            <a:lnRef idx="1">
+              <a:schemeClr val="accent4"/>
+            </a:lnRef>
+            <a:fillRef idx="2">
+              <a:schemeClr val="accent4"/>
+            </a:fillRef>
+            <a:effectRef idx="1">
+              <a:schemeClr val="accent4"/>
+            </a:effectRef>
+            <a:fontRef idx="minor">
+              <a:schemeClr val="dk1"/>
+            </a:fontRef>
+          </p:style>
+        </p:cxnSp>
+      </p:grpSp>
+      <p:sp>
+        <p:nvSpPr>
+          <p:cNvPr id="16" name="Rectangle 62"/>
+          <p:cNvSpPr/>
+          <p:nvPr/>
+        </p:nvSpPr>
+        <p:spPr>
+          <a:xfrm>
+            <a:off x="3335583" y="611613"/>
+            <a:ext cx="1093635" cy="346760"/>
+          </a:xfrm>
+          <a:prstGeom prst="rect">
+            <a:avLst/>
+          </a:prstGeom>
+          <a:solidFill>
+            <a:srgbClr val="0070C0"/>
+          </a:solidFill>
+          <a:ln w="19050">
+            <a:solidFill>
+              <a:srgbClr val="0070C0"/>
+            </a:solidFill>
+          </a:ln>
+          <a:effectLst/>
+        </p:spPr>
+        <p:style>
+          <a:lnRef idx="1">
+            <a:schemeClr val="accent2"/>
+          </a:lnRef>
+          <a:fillRef idx="2">
+            <a:schemeClr val="accent2"/>
+          </a:fillRef>
+          <a:effectRef idx="1">
+            <a:schemeClr val="accent2"/>
+          </a:effectRef>
+          <a:fontRef idx="minor">
+            <a:schemeClr val="dk1"/>
+          </a:fontRef>
+        </p:style>
+        <p:txBody>
+          <a:bodyPr rtlCol="0" anchor="ctr"/>
+          <a:lstStyle/>
+          <a:p>
+            <a:pPr algn="ctr"/>
+            <a:r>
+              <a:rPr lang="en-US" sz="1600" dirty="0" smtClean="0">
+                <a:solidFill>
+                  <a:schemeClr val="bg1"/>
+                </a:solidFill>
+              </a:rPr>
+              <a:t>:Logic</a:t>
+            </a:r>
+            <a:endParaRPr lang="en-SG" sz="1600" dirty="0">
+              <a:solidFill>
+                <a:schemeClr val="bg1"/>
+              </a:solidFill>
+            </a:endParaRPr>
+          </a:p>
+        </p:txBody>
+      </p:sp>
+      <p:cxnSp>
+        <p:nvCxnSpPr>
+          <p:cNvPr id="17" name="Straight Connector 16"/>
+          <p:cNvCxnSpPr/>
+          <p:nvPr/>
+        </p:nvCxnSpPr>
+        <p:spPr>
+          <a:xfrm>
+            <a:off x="3882400" y="975284"/>
+            <a:ext cx="0" cy="1723059"/>
+          </a:xfrm>
+          <a:prstGeom prst="line">
+            <a:avLst/>
+          </a:prstGeom>
+          <a:ln w="19050">
+            <a:solidFill>
+              <a:srgbClr val="0070C0"/>
+            </a:solidFill>
+            <a:prstDash val="sysDash"/>
+          </a:ln>
+          <a:effectLst/>
+        </p:spPr>
+        <p:style>
+          <a:lnRef idx="1">
+            <a:schemeClr val="accent1"/>
+          </a:lnRef>
+          <a:fillRef idx="2">
+            <a:schemeClr val="accent1"/>
+          </a:fillRef>
+          <a:effectRef idx="1">
+            <a:schemeClr val="accent1"/>
+          </a:effectRef>
+          <a:fontRef idx="minor">
+            <a:schemeClr val="dk1"/>
+          </a:fontRef>
+        </p:style>
+      </p:cxnSp>
+      <p:sp>
+        <p:nvSpPr>
+          <p:cNvPr id="18" name="Rectangle 17"/>
+          <p:cNvSpPr/>
+          <p:nvPr/>
+        </p:nvSpPr>
+        <p:spPr>
+          <a:xfrm>
+            <a:off x="3810392" y="1433477"/>
+            <a:ext cx="144016" cy="832525"/>
+          </a:xfrm>
+          <a:prstGeom prst="rect">
+            <a:avLst/>
+          </a:prstGeom>
+          <a:solidFill>
+            <a:srgbClr val="0070C0"/>
+          </a:solidFill>
+          <a:ln>
+            <a:solidFill>
+              <a:srgbClr val="0070C0"/>
+            </a:solidFill>
+          </a:ln>
+          <a:effectLst/>
+        </p:spPr>
+        <p:style>
+          <a:lnRef idx="1">
+            <a:schemeClr val="accent3"/>
+          </a:lnRef>
+          <a:fillRef idx="2">
+            <a:schemeClr val="accent3"/>
+          </a:fillRef>
+          <a:effectRef idx="1">
+            <a:schemeClr val="accent3"/>
+          </a:effectRef>
+          <a:fontRef idx="minor">
+            <a:schemeClr val="dk1"/>
+          </a:fontRef>
+        </p:style>
+        <p:txBody>
+          <a:bodyPr rtlCol="0" anchor="ctr"/>
+          <a:lstStyle/>
+          <a:p>
+            <a:pPr algn="ctr"/>
+            <a:endParaRPr lang="en-SG" sz="1400">
+              <a:solidFill>
+                <a:schemeClr val="dk1"/>
+              </a:solidFill>
+            </a:endParaRPr>
+          </a:p>
+        </p:txBody>
+      </p:sp>
+      <p:sp>
+        <p:nvSpPr>
+          <p:cNvPr id="19" name="Rectangle 62"/>
+          <p:cNvSpPr/>
+          <p:nvPr/>
+        </p:nvSpPr>
+        <p:spPr>
+          <a:xfrm>
+            <a:off x="5316783" y="607926"/>
+            <a:ext cx="1093635" cy="346760"/>
+          </a:xfrm>
+          <a:prstGeom prst="rect">
+            <a:avLst/>
+          </a:prstGeom>
+          <a:solidFill>
+            <a:srgbClr val="7030A0"/>
+          </a:solidFill>
+          <a:ln w="19050">
+            <a:solidFill>
+              <a:srgbClr val="7030A0"/>
+            </a:solidFill>
+          </a:ln>
+          <a:effectLst/>
+        </p:spPr>
+        <p:style>
+          <a:lnRef idx="1">
+            <a:schemeClr val="accent2"/>
+          </a:lnRef>
+          <a:fillRef idx="2">
+            <a:schemeClr val="accent2"/>
+          </a:fillRef>
+          <a:effectRef idx="1">
+            <a:schemeClr val="accent2"/>
+          </a:effectRef>
+          <a:fontRef idx="minor">
+            <a:schemeClr val="dk1"/>
+          </a:fontRef>
+        </p:style>
+        <p:txBody>
+          <a:bodyPr rtlCol="0" anchor="ctr"/>
+          <a:lstStyle/>
+          <a:p>
+            <a:pPr algn="ctr"/>
+            <a:r>
+              <a:rPr lang="en-US" sz="1600" dirty="0" smtClean="0">
+                <a:solidFill>
+                  <a:schemeClr val="bg1"/>
+                </a:solidFill>
+              </a:rPr>
+              <a:t>:Model</a:t>
+            </a:r>
+            <a:endParaRPr lang="en-SG" sz="1600" dirty="0">
+              <a:solidFill>
+                <a:schemeClr val="bg1"/>
+              </a:solidFill>
+            </a:endParaRPr>
+          </a:p>
+        </p:txBody>
+      </p:sp>
+      <p:cxnSp>
+        <p:nvCxnSpPr>
+          <p:cNvPr id="20" name="Straight Connector 19"/>
+          <p:cNvCxnSpPr/>
+          <p:nvPr/>
+        </p:nvCxnSpPr>
+        <p:spPr>
+          <a:xfrm>
+            <a:off x="5863600" y="971597"/>
+            <a:ext cx="0" cy="1723059"/>
+          </a:xfrm>
+          <a:prstGeom prst="line">
+            <a:avLst/>
+          </a:prstGeom>
+          <a:ln w="19050">
+            <a:solidFill>
+              <a:srgbClr val="7030A0"/>
+            </a:solidFill>
+            <a:prstDash val="sysDash"/>
+          </a:ln>
+          <a:effectLst/>
+        </p:spPr>
+        <p:style>
+          <a:lnRef idx="1">
+            <a:schemeClr val="accent1"/>
+          </a:lnRef>
+          <a:fillRef idx="2">
+            <a:schemeClr val="accent1"/>
+          </a:fillRef>
+          <a:effectRef idx="1">
+            <a:schemeClr val="accent1"/>
+          </a:effectRef>
+          <a:fontRef idx="minor">
+            <a:schemeClr val="dk1"/>
+          </a:fontRef>
+        </p:style>
+      </p:cxnSp>
+      <p:sp>
+        <p:nvSpPr>
+          <p:cNvPr id="21" name="Rectangle 20"/>
+          <p:cNvSpPr/>
+          <p:nvPr/>
+        </p:nvSpPr>
+        <p:spPr>
+          <a:xfrm>
+            <a:off x="5791592" y="1538408"/>
+            <a:ext cx="142006" cy="651394"/>
+          </a:xfrm>
+          <a:prstGeom prst="rect">
+            <a:avLst/>
+          </a:prstGeom>
+          <a:solidFill>
+            <a:srgbClr val="7030A0"/>
+          </a:solidFill>
+          <a:ln>
+            <a:solidFill>
+              <a:srgbClr val="7030A0"/>
+            </a:solidFill>
+          </a:ln>
+          <a:effectLst/>
+        </p:spPr>
+        <p:style>
+          <a:lnRef idx="1">
+            <a:schemeClr val="accent3"/>
+          </a:lnRef>
+          <a:fillRef idx="2">
+            <a:schemeClr val="accent3"/>
+          </a:fillRef>
+          <a:effectRef idx="1">
+            <a:schemeClr val="accent3"/>
+          </a:effectRef>
+          <a:fontRef idx="minor">
+            <a:schemeClr val="dk1"/>
+          </a:fontRef>
+        </p:style>
+        <p:txBody>
+          <a:bodyPr rtlCol="0" anchor="ctr"/>
+          <a:lstStyle/>
+          <a:p>
+            <a:pPr algn="ctr"/>
+            <a:endParaRPr lang="en-SG" sz="1400">
+              <a:solidFill>
+                <a:schemeClr val="dk1"/>
+              </a:solidFill>
+            </a:endParaRPr>
+          </a:p>
+        </p:txBody>
+      </p:sp>
+      <p:cxnSp>
+        <p:nvCxnSpPr>
+          <p:cNvPr id="23" name="Straight Arrow Connector 22"/>
+          <p:cNvCxnSpPr/>
+          <p:nvPr/>
+        </p:nvCxnSpPr>
+        <p:spPr>
+          <a:xfrm>
+            <a:off x="466818" y="1325979"/>
+            <a:ext cx="1119851" cy="0"/>
+          </a:xfrm>
+          <a:prstGeom prst="straightConnector1">
+            <a:avLst/>
+          </a:prstGeom>
+          <a:ln w="19050">
+            <a:solidFill>
+              <a:schemeClr val="tx1"/>
+            </a:solidFill>
+            <a:tailEnd type="arrow"/>
+          </a:ln>
+        </p:spPr>
+        <p:style>
+          <a:lnRef idx="1">
+            <a:schemeClr val="accent1"/>
+          </a:lnRef>
+          <a:fillRef idx="0">
+            <a:schemeClr val="accent1"/>
+          </a:fillRef>
+          <a:effectRef idx="0">
+            <a:schemeClr val="accent1"/>
+          </a:effectRef>
+          <a:fontRef idx="minor">
+            <a:schemeClr val="tx1"/>
+          </a:fontRef>
+        </p:style>
+      </p:cxnSp>
+      <p:sp>
+        <p:nvSpPr>
+          <p:cNvPr id="24" name="TextBox 23"/>
+          <p:cNvSpPr txBox="1"/>
+          <p:nvPr/>
+        </p:nvSpPr>
+        <p:spPr>
+          <a:xfrm>
+            <a:off x="466817" y="1345880"/>
+            <a:ext cx="1015480" cy="215444"/>
+          </a:xfrm>
+          <a:prstGeom prst="rect">
+            <a:avLst/>
+          </a:prstGeom>
+          <a:noFill/>
+        </p:spPr>
+        <p:txBody>
+          <a:bodyPr wrap="square" lIns="0" tIns="0" rIns="0" bIns="0" rtlCol="0">
+            <a:spAutoFit/>
+          </a:bodyPr>
+          <a:lstStyle/>
+          <a:p>
+            <a:r>
+              <a:rPr lang="en-US" sz="1400" dirty="0" smtClean="0"/>
+              <a:t>delete </a:t>
+            </a:r>
+            <a:r>
+              <a:rPr lang="en-US" sz="1400" dirty="0" smtClean="0"/>
+              <a:t>friends</a:t>
+            </a:r>
+            <a:endParaRPr lang="en-US" sz="1400" dirty="0"/>
+          </a:p>
+        </p:txBody>
+      </p:sp>
+      <p:cxnSp>
+        <p:nvCxnSpPr>
+          <p:cNvPr id="25" name="Straight Arrow Connector 24"/>
+          <p:cNvCxnSpPr/>
+          <p:nvPr/>
+        </p:nvCxnSpPr>
+        <p:spPr>
+          <a:xfrm>
+            <a:off x="1739069" y="1433478"/>
+            <a:ext cx="2071323" cy="0"/>
+          </a:xfrm>
+          <a:prstGeom prst="straightConnector1">
+            <a:avLst/>
+          </a:prstGeom>
+          <a:ln w="19050">
+            <a:solidFill>
+              <a:srgbClr val="00B050"/>
+            </a:solidFill>
+            <a:tailEnd type="arrow"/>
+          </a:ln>
+        </p:spPr>
+        <p:style>
+          <a:lnRef idx="1">
+            <a:schemeClr val="accent1"/>
+          </a:lnRef>
+          <a:fillRef idx="0">
+            <a:schemeClr val="accent1"/>
+          </a:fillRef>
+          <a:effectRef idx="0">
+            <a:schemeClr val="accent1"/>
+          </a:effectRef>
+          <a:fontRef idx="minor">
+            <a:schemeClr val="tx1"/>
+          </a:fontRef>
+        </p:style>
+      </p:cxnSp>
+      <p:sp>
+        <p:nvSpPr>
+          <p:cNvPr id="26" name="TextBox 25"/>
+          <p:cNvSpPr txBox="1"/>
+          <p:nvPr/>
+        </p:nvSpPr>
+        <p:spPr>
+          <a:xfrm>
+            <a:off x="1837124" y="1453602"/>
+            <a:ext cx="1908358" cy="215444"/>
+          </a:xfrm>
+          <a:prstGeom prst="rect">
+            <a:avLst/>
+          </a:prstGeom>
+          <a:noFill/>
+        </p:spPr>
+        <p:txBody>
+          <a:bodyPr wrap="square" lIns="0" tIns="0" rIns="0" bIns="0" rtlCol="0">
+            <a:spAutoFit/>
+          </a:bodyPr>
+          <a:lstStyle/>
+          <a:p>
+            <a:r>
+              <a:rPr lang="en-US" sz="1400" dirty="0" smtClean="0">
+                <a:solidFill>
+                  <a:srgbClr val="0070C0"/>
+                </a:solidFill>
+              </a:rPr>
+              <a:t>execute(“delete </a:t>
+            </a:r>
+            <a:r>
+              <a:rPr lang="en-US" sz="1400" dirty="0" smtClean="0">
+                <a:solidFill>
+                  <a:srgbClr val="0070C0"/>
+                </a:solidFill>
+              </a:rPr>
+              <a:t>friends”)</a:t>
+            </a:r>
+            <a:endParaRPr lang="en-US" sz="1400" dirty="0">
+              <a:solidFill>
+                <a:srgbClr val="0070C0"/>
+              </a:solidFill>
+            </a:endParaRPr>
+          </a:p>
+        </p:txBody>
+      </p:sp>
+      <p:cxnSp>
+        <p:nvCxnSpPr>
+          <p:cNvPr id="28" name="Straight Arrow Connector 27"/>
+          <p:cNvCxnSpPr/>
+          <p:nvPr/>
+        </p:nvCxnSpPr>
+        <p:spPr>
+          <a:xfrm>
+            <a:off x="3954408" y="1538409"/>
+            <a:ext cx="1837184" cy="0"/>
+          </a:xfrm>
+          <a:prstGeom prst="straightConnector1">
+            <a:avLst/>
+          </a:prstGeom>
+          <a:ln w="19050">
+            <a:solidFill>
+              <a:srgbClr val="0070C0"/>
+            </a:solidFill>
+            <a:tailEnd type="arrow"/>
+          </a:ln>
+        </p:spPr>
+        <p:style>
+          <a:lnRef idx="1">
+            <a:schemeClr val="accent1"/>
+          </a:lnRef>
+          <a:fillRef idx="0">
+            <a:schemeClr val="accent1"/>
+          </a:fillRef>
+          <a:effectRef idx="0">
+            <a:schemeClr val="accent1"/>
+          </a:effectRef>
+          <a:fontRef idx="minor">
+            <a:schemeClr val="tx1"/>
+          </a:fontRef>
+        </p:style>
+      </p:cxnSp>
+      <p:sp>
+        <p:nvSpPr>
+          <p:cNvPr id="29" name="TextBox 28"/>
+          <p:cNvSpPr txBox="1"/>
+          <p:nvPr/>
+        </p:nvSpPr>
+        <p:spPr>
+          <a:xfrm>
+            <a:off x="4022833" y="1534924"/>
+            <a:ext cx="1736395" cy="215444"/>
+          </a:xfrm>
+          <a:prstGeom prst="rect">
+            <a:avLst/>
+          </a:prstGeom>
+          <a:noFill/>
+        </p:spPr>
+        <p:txBody>
+          <a:bodyPr wrap="square" lIns="0" tIns="0" rIns="0" bIns="0" rtlCol="0">
+            <a:spAutoFit/>
+          </a:bodyPr>
+          <a:lstStyle/>
+          <a:p>
+            <a:r>
+              <a:rPr lang="en-US" sz="1400" dirty="0" err="1" smtClean="0">
+                <a:solidFill>
+                  <a:srgbClr val="7030A0"/>
+                </a:solidFill>
+              </a:rPr>
+              <a:t>deleteLabelFromTask</a:t>
+            </a:r>
+            <a:r>
+              <a:rPr lang="en-US" sz="1400" dirty="0" smtClean="0">
+                <a:solidFill>
+                  <a:srgbClr val="7030A0"/>
+                </a:solidFill>
+              </a:rPr>
+              <a:t>(t)</a:t>
+            </a:r>
+            <a:endParaRPr lang="en-US" sz="1400" dirty="0">
+              <a:solidFill>
+                <a:srgbClr val="7030A0"/>
+              </a:solidFill>
+            </a:endParaRPr>
+          </a:p>
+        </p:txBody>
+      </p:sp>
+      <p:sp>
+        <p:nvSpPr>
+          <p:cNvPr id="33" name="TextBox 32"/>
+          <p:cNvSpPr txBox="1"/>
+          <p:nvPr/>
+        </p:nvSpPr>
+        <p:spPr>
+          <a:xfrm>
+            <a:off x="6074030" y="1687656"/>
+            <a:ext cx="2438400" cy="215444"/>
+          </a:xfrm>
+          <a:prstGeom prst="rect">
+            <a:avLst/>
+          </a:prstGeom>
+          <a:noFill/>
+        </p:spPr>
+        <p:txBody>
+          <a:bodyPr wrap="square" lIns="0" tIns="0" rIns="0" bIns="0" rtlCol="0">
+            <a:spAutoFit/>
+          </a:bodyPr>
+          <a:lstStyle/>
+          <a:p>
+            <a:r>
+              <a:rPr lang="en-US" sz="1400" dirty="0" smtClean="0">
+                <a:solidFill>
+                  <a:schemeClr val="accent5">
+                    <a:lumMod val="75000"/>
+                  </a:schemeClr>
+                </a:solidFill>
+              </a:rPr>
+              <a:t>post(</a:t>
+            </a:r>
+            <a:r>
+              <a:rPr lang="en-US" sz="1400" dirty="0" err="1" smtClean="0">
+                <a:solidFill>
+                  <a:schemeClr val="accent5">
+                    <a:lumMod val="75000"/>
+                  </a:schemeClr>
+                </a:solidFill>
+              </a:rPr>
+              <a:t>AddressBookChangedEvent</a:t>
+            </a:r>
+            <a:r>
+              <a:rPr lang="en-US" sz="1400" dirty="0" smtClean="0">
+                <a:solidFill>
+                  <a:schemeClr val="accent5">
+                    <a:lumMod val="75000"/>
+                  </a:schemeClr>
+                </a:solidFill>
+              </a:rPr>
+              <a:t>)</a:t>
+            </a:r>
+            <a:endParaRPr lang="en-US" sz="1400" dirty="0">
+              <a:solidFill>
+                <a:schemeClr val="accent5">
+                  <a:lumMod val="75000"/>
+                </a:schemeClr>
+              </a:solidFill>
+            </a:endParaRPr>
+          </a:p>
+        </p:txBody>
+      </p:sp>
+      <p:cxnSp>
+        <p:nvCxnSpPr>
+          <p:cNvPr id="34" name="Straight Arrow Connector 33"/>
+          <p:cNvCxnSpPr/>
+          <p:nvPr/>
+        </p:nvCxnSpPr>
+        <p:spPr>
+          <a:xfrm>
+            <a:off x="3954408" y="2190681"/>
+            <a:ext cx="1837184" cy="0"/>
+          </a:xfrm>
+          <a:prstGeom prst="straightConnector1">
+            <a:avLst/>
+          </a:prstGeom>
+          <a:ln w="19050">
+            <a:solidFill>
+              <a:srgbClr val="7030A0"/>
+            </a:solidFill>
+            <a:prstDash val="sysDash"/>
+            <a:headEnd type="arrow" w="med" len="med"/>
+            <a:tailEnd type="none" w="med" len="med"/>
+          </a:ln>
+        </p:spPr>
+        <p:style>
+          <a:lnRef idx="1">
+            <a:schemeClr val="accent1"/>
+          </a:lnRef>
+          <a:fillRef idx="0">
+            <a:schemeClr val="accent1"/>
+          </a:fillRef>
+          <a:effectRef idx="0">
+            <a:schemeClr val="accent1"/>
+          </a:effectRef>
+          <a:fontRef idx="minor">
+            <a:schemeClr val="tx1"/>
+          </a:fontRef>
+        </p:style>
+      </p:cxnSp>
+      <p:cxnSp>
+        <p:nvCxnSpPr>
+          <p:cNvPr id="35" name="Straight Arrow Connector 34"/>
+          <p:cNvCxnSpPr/>
+          <p:nvPr/>
+        </p:nvCxnSpPr>
+        <p:spPr>
+          <a:xfrm>
+            <a:off x="1739069" y="2266002"/>
+            <a:ext cx="2058118" cy="0"/>
+          </a:xfrm>
+          <a:prstGeom prst="straightConnector1">
+            <a:avLst/>
+          </a:prstGeom>
+          <a:ln w="19050">
+            <a:solidFill>
+              <a:srgbClr val="0070C0"/>
+            </a:solidFill>
+            <a:prstDash val="sysDash"/>
+            <a:headEnd type="arrow" w="med" len="med"/>
+            <a:tailEnd type="none" w="med" len="med"/>
+          </a:ln>
+        </p:spPr>
+        <p:style>
+          <a:lnRef idx="1">
+            <a:schemeClr val="accent1"/>
+          </a:lnRef>
+          <a:fillRef idx="0">
+            <a:schemeClr val="accent1"/>
+          </a:fillRef>
+          <a:effectRef idx="0">
+            <a:schemeClr val="accent1"/>
+          </a:effectRef>
+          <a:fontRef idx="minor">
+            <a:schemeClr val="tx1"/>
+          </a:fontRef>
+        </p:style>
+      </p:cxnSp>
+      <p:cxnSp>
+        <p:nvCxnSpPr>
+          <p:cNvPr id="37" name="Straight Arrow Connector 36"/>
+          <p:cNvCxnSpPr/>
+          <p:nvPr/>
+        </p:nvCxnSpPr>
+        <p:spPr>
+          <a:xfrm>
+            <a:off x="390618" y="2342202"/>
+            <a:ext cx="1196051" cy="0"/>
+          </a:xfrm>
+          <a:prstGeom prst="straightConnector1">
+            <a:avLst/>
+          </a:prstGeom>
+          <a:ln w="19050">
+            <a:solidFill>
+              <a:srgbClr val="00B050"/>
+            </a:solidFill>
+            <a:prstDash val="sysDash"/>
+            <a:headEnd type="arrow" w="med" len="med"/>
+            <a:tailEnd type="none" w="med" len="med"/>
+          </a:ln>
+        </p:spPr>
+        <p:style>
+          <a:lnRef idx="1">
+            <a:schemeClr val="accent1"/>
+          </a:lnRef>
+          <a:fillRef idx="0">
+            <a:schemeClr val="accent1"/>
+          </a:fillRef>
+          <a:effectRef idx="0">
+            <a:schemeClr val="accent1"/>
+          </a:effectRef>
+          <a:fontRef idx="minor">
+            <a:schemeClr val="tx1"/>
+          </a:fontRef>
+        </p:style>
+      </p:cxnSp>
+      <p:sp>
+        <p:nvSpPr>
+          <p:cNvPr id="39" name="Rectangle 62"/>
+          <p:cNvSpPr/>
+          <p:nvPr/>
+        </p:nvSpPr>
+        <p:spPr>
+          <a:xfrm>
+            <a:off x="7696200" y="591251"/>
+            <a:ext cx="1371600" cy="346760"/>
+          </a:xfrm>
+          <a:prstGeom prst="rect">
+            <a:avLst/>
+          </a:prstGeom>
+          <a:solidFill>
+            <a:schemeClr val="accent5">
+              <a:lumMod val="75000"/>
+            </a:schemeClr>
+          </a:solidFill>
+          <a:ln w="19050">
+            <a:solidFill>
+              <a:schemeClr val="accent5">
+                <a:lumMod val="75000"/>
+              </a:schemeClr>
+            </a:solidFill>
+          </a:ln>
+          <a:effectLst/>
+        </p:spPr>
+        <p:style>
+          <a:lnRef idx="1">
+            <a:schemeClr val="accent2"/>
+          </a:lnRef>
+          <a:fillRef idx="2">
+            <a:schemeClr val="accent2"/>
+          </a:fillRef>
+          <a:effectRef idx="1">
+            <a:schemeClr val="accent2"/>
+          </a:effectRef>
+          <a:fontRef idx="minor">
+            <a:schemeClr val="dk1"/>
+          </a:fontRef>
+        </p:style>
+        <p:txBody>
+          <a:bodyPr rtlCol="0" anchor="ctr"/>
+          <a:lstStyle/>
+          <a:p>
+            <a:pPr algn="ctr"/>
+            <a:r>
+              <a:rPr lang="en-US" sz="1600" dirty="0" smtClean="0">
+                <a:solidFill>
+                  <a:schemeClr val="bg1"/>
+                </a:solidFill>
+              </a:rPr>
+              <a:t>:</a:t>
+            </a:r>
+            <a:r>
+              <a:rPr lang="en-US" sz="1600" dirty="0" err="1" smtClean="0">
+                <a:solidFill>
+                  <a:schemeClr val="bg1"/>
+                </a:solidFill>
+              </a:rPr>
+              <a:t>EventsCenter</a:t>
+            </a:r>
+            <a:endParaRPr lang="en-SG" sz="1600" dirty="0">
+              <a:solidFill>
+                <a:schemeClr val="bg1"/>
+              </a:solidFill>
+            </a:endParaRPr>
+          </a:p>
+        </p:txBody>
+      </p:sp>
+      <p:cxnSp>
+        <p:nvCxnSpPr>
+          <p:cNvPr id="40" name="Straight Connector 39"/>
+          <p:cNvCxnSpPr/>
+          <p:nvPr/>
+        </p:nvCxnSpPr>
+        <p:spPr>
+          <a:xfrm>
+            <a:off x="8616802" y="944305"/>
+            <a:ext cx="0" cy="1723059"/>
+          </a:xfrm>
+          <a:prstGeom prst="line">
+            <a:avLst/>
+          </a:prstGeom>
+          <a:ln w="19050">
+            <a:solidFill>
+              <a:schemeClr val="accent5">
+                <a:lumMod val="75000"/>
+              </a:schemeClr>
+            </a:solidFill>
+            <a:prstDash val="sysDash"/>
+          </a:ln>
+          <a:effectLst/>
+        </p:spPr>
+        <p:style>
+          <a:lnRef idx="1">
+            <a:schemeClr val="accent1"/>
+          </a:lnRef>
+          <a:fillRef idx="2">
+            <a:schemeClr val="accent1"/>
+          </a:fillRef>
+          <a:effectRef idx="1">
+            <a:schemeClr val="accent1"/>
+          </a:effectRef>
+          <a:fontRef idx="minor">
+            <a:schemeClr val="dk1"/>
+          </a:fontRef>
+        </p:style>
+      </p:cxnSp>
+      <p:sp>
+        <p:nvSpPr>
+          <p:cNvPr id="41" name="Rectangle 40"/>
+          <p:cNvSpPr/>
+          <p:nvPr/>
+        </p:nvSpPr>
+        <p:spPr>
+          <a:xfrm>
+            <a:off x="8544794" y="1961202"/>
+            <a:ext cx="142006" cy="176787"/>
+          </a:xfrm>
+          <a:prstGeom prst="rect">
+            <a:avLst/>
+          </a:prstGeom>
+          <a:solidFill>
+            <a:schemeClr val="accent5">
+              <a:lumMod val="75000"/>
+            </a:schemeClr>
+          </a:solidFill>
+          <a:ln>
+            <a:solidFill>
+              <a:schemeClr val="accent5">
+                <a:lumMod val="75000"/>
+              </a:schemeClr>
+            </a:solidFill>
+          </a:ln>
+          <a:effectLst/>
+        </p:spPr>
+        <p:style>
+          <a:lnRef idx="1">
+            <a:schemeClr val="accent3"/>
+          </a:lnRef>
+          <a:fillRef idx="2">
+            <a:schemeClr val="accent3"/>
+          </a:fillRef>
+          <a:effectRef idx="1">
+            <a:schemeClr val="accent3"/>
+          </a:effectRef>
+          <a:fontRef idx="minor">
+            <a:schemeClr val="dk1"/>
+          </a:fontRef>
+        </p:style>
+        <p:txBody>
+          <a:bodyPr rtlCol="0" anchor="ctr"/>
+          <a:lstStyle/>
+          <a:p>
+            <a:pPr algn="ctr"/>
+            <a:endParaRPr lang="en-SG" sz="1400">
+              <a:solidFill>
+                <a:schemeClr val="dk1"/>
+              </a:solidFill>
+            </a:endParaRPr>
+          </a:p>
+        </p:txBody>
+      </p:sp>
+      <p:cxnSp>
+        <p:nvCxnSpPr>
+          <p:cNvPr id="42" name="Straight Arrow Connector 41"/>
+          <p:cNvCxnSpPr/>
+          <p:nvPr/>
+        </p:nvCxnSpPr>
+        <p:spPr>
+          <a:xfrm>
+            <a:off x="5943992" y="1961202"/>
+            <a:ext cx="2568438" cy="0"/>
+          </a:xfrm>
+          <a:prstGeom prst="straightConnector1">
+            <a:avLst/>
+          </a:prstGeom>
+          <a:ln w="19050">
+            <a:solidFill>
+              <a:srgbClr val="7030A0"/>
+            </a:solidFill>
+            <a:tailEnd type="arrow"/>
+          </a:ln>
+        </p:spPr>
+        <p:style>
+          <a:lnRef idx="1">
+            <a:schemeClr val="accent1"/>
+          </a:lnRef>
+          <a:fillRef idx="0">
+            <a:schemeClr val="accent1"/>
+          </a:fillRef>
+          <a:effectRef idx="0">
+            <a:schemeClr val="accent1"/>
+          </a:effectRef>
+          <a:fontRef idx="minor">
+            <a:schemeClr val="tx1"/>
+          </a:fontRef>
+        </p:style>
+      </p:cxnSp>
+      <p:cxnSp>
+        <p:nvCxnSpPr>
+          <p:cNvPr id="44" name="Straight Arrow Connector 43"/>
+          <p:cNvCxnSpPr/>
+          <p:nvPr/>
+        </p:nvCxnSpPr>
+        <p:spPr>
+          <a:xfrm>
+            <a:off x="5943992" y="2137989"/>
+            <a:ext cx="2549946" cy="0"/>
+          </a:xfrm>
+          <a:prstGeom prst="straightConnector1">
+            <a:avLst/>
+          </a:prstGeom>
+          <a:ln w="19050">
+            <a:solidFill>
+              <a:schemeClr val="accent5">
+                <a:lumMod val="75000"/>
+              </a:schemeClr>
+            </a:solidFill>
+            <a:prstDash val="sysDash"/>
+            <a:headEnd type="arrow" w="med" len="med"/>
+            <a:tailEnd type="none" w="med" len="med"/>
+          </a:ln>
+        </p:spPr>
+        <p:style>
+          <a:lnRef idx="1">
+            <a:schemeClr val="accent1"/>
+          </a:lnRef>
+          <a:fillRef idx="0">
+            <a:schemeClr val="accent1"/>
+          </a:fillRef>
+          <a:effectRef idx="0">
+            <a:schemeClr val="accent1"/>
+          </a:effectRef>
+          <a:fontRef idx="minor">
+            <a:schemeClr val="tx1"/>
+          </a:fontRef>
+        </p:style>
+      </p:cxnSp>
+      <p:cxnSp>
+        <p:nvCxnSpPr>
+          <p:cNvPr id="85" name="Straight Connector 84"/>
+          <p:cNvCxnSpPr/>
+          <p:nvPr/>
+        </p:nvCxnSpPr>
+        <p:spPr>
+          <a:xfrm flipH="1">
+            <a:off x="314394" y="1099672"/>
+            <a:ext cx="24" cy="1598671"/>
+          </a:xfrm>
+          <a:prstGeom prst="line">
+            <a:avLst/>
+          </a:prstGeom>
+          <a:ln w="19050">
+            <a:solidFill>
+              <a:schemeClr val="tx1"/>
+            </a:solidFill>
+            <a:prstDash val="sysDash"/>
+          </a:ln>
+          <a:effectLst/>
+        </p:spPr>
+        <p:style>
+          <a:lnRef idx="1">
+            <a:schemeClr val="accent1"/>
+          </a:lnRef>
+          <a:fillRef idx="2">
+            <a:schemeClr val="accent1"/>
+          </a:fillRef>
+          <a:effectRef idx="1">
+            <a:schemeClr val="accent1"/>
+          </a:effectRef>
+          <a:fontRef idx="minor">
+            <a:schemeClr val="dk1"/>
+          </a:fontRef>
+        </p:style>
+      </p:cxnSp>
+      <p:sp>
+        <p:nvSpPr>
+          <p:cNvPr id="71" name="Rectangle 62"/>
+          <p:cNvSpPr/>
+          <p:nvPr/>
+        </p:nvSpPr>
+        <p:spPr>
+          <a:xfrm>
+            <a:off x="1107673" y="4309495"/>
+            <a:ext cx="1093635" cy="346760"/>
+          </a:xfrm>
+          <a:prstGeom prst="rect">
+            <a:avLst/>
+          </a:prstGeom>
+          <a:solidFill>
+            <a:srgbClr val="00B050"/>
+          </a:solidFill>
+          <a:ln w="19050">
+            <a:solidFill>
+              <a:srgbClr val="00B050"/>
+            </a:solidFill>
+          </a:ln>
+          <a:effectLst/>
+        </p:spPr>
+        <p:style>
+          <a:lnRef idx="1">
+            <a:schemeClr val="accent2"/>
+          </a:lnRef>
+          <a:fillRef idx="2">
+            <a:schemeClr val="accent2"/>
+          </a:fillRef>
+          <a:effectRef idx="1">
+            <a:schemeClr val="accent2"/>
+          </a:effectRef>
+          <a:fontRef idx="minor">
+            <a:schemeClr val="dk1"/>
+          </a:fontRef>
+        </p:style>
+        <p:txBody>
+          <a:bodyPr rtlCol="0" anchor="ctr"/>
+          <a:lstStyle/>
+          <a:p>
+            <a:pPr algn="ctr"/>
+            <a:r>
+              <a:rPr lang="en-US" sz="1600" dirty="0" smtClean="0">
+                <a:solidFill>
+                  <a:schemeClr val="bg1"/>
+                </a:solidFill>
+              </a:rPr>
+              <a:t>:UI</a:t>
+            </a:r>
+            <a:endParaRPr lang="en-SG" sz="1600" dirty="0">
+              <a:solidFill>
+                <a:schemeClr val="bg1"/>
+              </a:solidFill>
+            </a:endParaRPr>
+          </a:p>
+        </p:txBody>
+      </p:sp>
+      <p:cxnSp>
+        <p:nvCxnSpPr>
+          <p:cNvPr id="73" name="Straight Connector 72"/>
+          <p:cNvCxnSpPr/>
+          <p:nvPr/>
+        </p:nvCxnSpPr>
+        <p:spPr>
+          <a:xfrm>
+            <a:off x="1654490" y="4673166"/>
+            <a:ext cx="0" cy="1723059"/>
+          </a:xfrm>
+          <a:prstGeom prst="line">
+            <a:avLst/>
+          </a:prstGeom>
+          <a:ln w="19050">
+            <a:solidFill>
+              <a:srgbClr val="00B050"/>
+            </a:solidFill>
+            <a:prstDash val="sysDash"/>
+          </a:ln>
+          <a:effectLst/>
+        </p:spPr>
+        <p:style>
+          <a:lnRef idx="1">
+            <a:schemeClr val="accent1"/>
+          </a:lnRef>
+          <a:fillRef idx="2">
+            <a:schemeClr val="accent1"/>
+          </a:fillRef>
+          <a:effectRef idx="1">
+            <a:schemeClr val="accent1"/>
+          </a:effectRef>
+          <a:fontRef idx="minor">
+            <a:schemeClr val="dk1"/>
+          </a:fontRef>
+        </p:style>
+      </p:cxnSp>
+      <p:sp>
+        <p:nvSpPr>
+          <p:cNvPr id="75" name="Rectangle 74"/>
+          <p:cNvSpPr/>
+          <p:nvPr/>
+        </p:nvSpPr>
+        <p:spPr>
+          <a:xfrm>
+            <a:off x="1582482" y="5023861"/>
+            <a:ext cx="152400" cy="1019910"/>
+          </a:xfrm>
+          <a:prstGeom prst="rect">
+            <a:avLst/>
+          </a:prstGeom>
+          <a:solidFill>
+            <a:srgbClr val="00B050"/>
+          </a:solidFill>
+          <a:ln>
+            <a:solidFill>
+              <a:srgbClr val="00B050"/>
+            </a:solidFill>
+          </a:ln>
+          <a:effectLst/>
+        </p:spPr>
+        <p:style>
+          <a:lnRef idx="1">
+            <a:schemeClr val="accent3"/>
+          </a:lnRef>
+          <a:fillRef idx="2">
+            <a:schemeClr val="accent3"/>
+          </a:fillRef>
+          <a:effectRef idx="1">
+            <a:schemeClr val="accent3"/>
+          </a:effectRef>
+          <a:fontRef idx="minor">
+            <a:schemeClr val="dk1"/>
+          </a:fontRef>
+        </p:style>
+        <p:txBody>
+          <a:bodyPr rtlCol="0" anchor="ctr"/>
+          <a:lstStyle/>
+          <a:p>
+            <a:pPr algn="ctr"/>
+            <a:endParaRPr lang="en-SG" sz="1400">
+              <a:solidFill>
+                <a:schemeClr val="dk1"/>
+              </a:solidFill>
+            </a:endParaRPr>
+          </a:p>
+        </p:txBody>
+      </p:sp>
+      <p:grpSp>
+        <p:nvGrpSpPr>
+          <p:cNvPr id="76" name="Actor"/>
+          <p:cNvGrpSpPr/>
+          <p:nvPr/>
+        </p:nvGrpSpPr>
+        <p:grpSpPr>
+          <a:xfrm>
+            <a:off x="148213" y="4234969"/>
+            <a:ext cx="324036" cy="573410"/>
+            <a:chOff x="3239901" y="4149080"/>
+            <a:chExt cx="648072" cy="1146820"/>
+          </a:xfrm>
+        </p:grpSpPr>
+        <p:sp>
+          <p:nvSpPr>
+            <p:cNvPr id="77" name="Flowchart: Connector 76"/>
+            <p:cNvSpPr/>
+            <p:nvPr/>
+          </p:nvSpPr>
+          <p:spPr>
+            <a:xfrm>
+              <a:off x="3419872" y="4149080"/>
+              <a:ext cx="288032" cy="288032"/>
+            </a:xfrm>
+            <a:prstGeom prst="flowChartConnector">
+              <a:avLst/>
+            </a:prstGeom>
+            <a:solidFill>
+              <a:schemeClr val="bg1">
+                <a:lumMod val="85000"/>
+              </a:schemeClr>
+            </a:solidFill>
+            <a:ln w="28575">
+              <a:solidFill>
+                <a:schemeClr val="tx1"/>
+              </a:solidFill>
+            </a:ln>
+            <a:effectLst/>
+          </p:spPr>
+          <p:style>
+            <a:lnRef idx="1">
+              <a:schemeClr val="accent4"/>
+            </a:lnRef>
+            <a:fillRef idx="2">
+              <a:schemeClr val="accent4"/>
+            </a:fillRef>
+            <a:effectRef idx="1">
+              <a:schemeClr val="accent4"/>
+            </a:effectRef>
+            <a:fontRef idx="minor">
+              <a:schemeClr val="dk1"/>
+            </a:fontRef>
+          </p:style>
+          <p:txBody>
+            <a:bodyPr rtlCol="0" anchor="ctr"/>
+            <a:lstStyle/>
+            <a:p>
+              <a:pPr algn="ctr"/>
+              <a:endParaRPr lang="en-SG"/>
+            </a:p>
+          </p:txBody>
+        </p:sp>
+        <p:cxnSp>
+          <p:nvCxnSpPr>
+            <p:cNvPr id="78" name="Straight Connector 77"/>
+            <p:cNvCxnSpPr>
+              <a:stCxn id="77" idx="4"/>
+            </p:cNvCxnSpPr>
+            <p:nvPr/>
+          </p:nvCxnSpPr>
+          <p:spPr>
+            <a:xfrm>
+              <a:off x="3563888" y="4437112"/>
+              <a:ext cx="0" cy="504056"/>
+            </a:xfrm>
+            <a:prstGeom prst="line">
+              <a:avLst/>
+            </a:prstGeom>
+            <a:ln w="28575">
+              <a:solidFill>
+                <a:schemeClr val="tx1"/>
+              </a:solidFill>
+            </a:ln>
+            <a:effectLst/>
+          </p:spPr>
+          <p:style>
+            <a:lnRef idx="1">
+              <a:schemeClr val="accent4"/>
+            </a:lnRef>
+            <a:fillRef idx="2">
+              <a:schemeClr val="accent4"/>
+            </a:fillRef>
+            <a:effectRef idx="1">
+              <a:schemeClr val="accent4"/>
+            </a:effectRef>
+            <a:fontRef idx="minor">
+              <a:schemeClr val="dk1"/>
+            </a:fontRef>
+          </p:style>
+        </p:cxnSp>
+        <p:sp>
+          <p:nvSpPr>
+            <p:cNvPr id="79" name="Freeform 78"/>
+            <p:cNvSpPr/>
+            <p:nvPr/>
+          </p:nvSpPr>
+          <p:spPr>
+            <a:xfrm>
+              <a:off x="3324225" y="4933950"/>
+              <a:ext cx="479425" cy="361950"/>
+            </a:xfrm>
+            <a:custGeom>
+              <a:avLst/>
+              <a:gdLst>
+                <a:gd name="connsiteX0" fmla="*/ 0 w 479425"/>
+                <a:gd name="connsiteY0" fmla="*/ 355600 h 361950"/>
+                <a:gd name="connsiteX1" fmla="*/ 241300 w 479425"/>
+                <a:gd name="connsiteY1" fmla="*/ 0 h 361950"/>
+                <a:gd name="connsiteX2" fmla="*/ 479425 w 479425"/>
+                <a:gd name="connsiteY2" fmla="*/ 361950 h 361950"/>
+              </a:gdLst>
+              <a:ahLst/>
+              <a:cxnLst>
+                <a:cxn ang="0">
+                  <a:pos x="connsiteX0" y="connsiteY0"/>
+                </a:cxn>
+                <a:cxn ang="0">
+                  <a:pos x="connsiteX1" y="connsiteY1"/>
+                </a:cxn>
+                <a:cxn ang="0">
+                  <a:pos x="connsiteX2" y="connsiteY2"/>
+                </a:cxn>
+              </a:cxnLst>
+              <a:rect l="l" t="t" r="r" b="b"/>
+              <a:pathLst>
+                <a:path w="479425" h="361950">
+                  <a:moveTo>
+                    <a:pt x="0" y="355600"/>
+                  </a:moveTo>
+                  <a:lnTo>
+                    <a:pt x="241300" y="0"/>
+                  </a:lnTo>
+                  <a:lnTo>
+                    <a:pt x="479425" y="361950"/>
+                  </a:lnTo>
+                </a:path>
+              </a:pathLst>
+            </a:custGeom>
+            <a:noFill/>
+            <a:ln w="28575">
+              <a:solidFill>
+                <a:schemeClr val="tx1"/>
+              </a:solidFill>
+            </a:ln>
+            <a:effectLst/>
+          </p:spPr>
+          <p:style>
+            <a:lnRef idx="1">
+              <a:schemeClr val="accent4"/>
+            </a:lnRef>
+            <a:fillRef idx="2">
+              <a:schemeClr val="accent4"/>
+            </a:fillRef>
+            <a:effectRef idx="1">
+              <a:schemeClr val="accent4"/>
+            </a:effectRef>
+            <a:fontRef idx="minor">
+              <a:schemeClr val="dk1"/>
+            </a:fontRef>
+          </p:style>
+          <p:txBody>
+            <a:bodyPr rtlCol="0" anchor="ctr"/>
+            <a:lstStyle/>
+            <a:p>
+              <a:pPr algn="ctr"/>
+              <a:endParaRPr lang="en-SG"/>
+            </a:p>
+          </p:txBody>
+        </p:sp>
+        <p:cxnSp>
+          <p:nvCxnSpPr>
+            <p:cNvPr id="80" name="Straight Connector 79"/>
+            <p:cNvCxnSpPr/>
+            <p:nvPr/>
+          </p:nvCxnSpPr>
+          <p:spPr>
+            <a:xfrm>
+              <a:off x="3239901" y="4509120"/>
+              <a:ext cx="648072" cy="0"/>
+            </a:xfrm>
+            <a:prstGeom prst="line">
+              <a:avLst/>
+            </a:prstGeom>
+            <a:ln w="28575">
+              <a:solidFill>
+                <a:schemeClr val="tx1"/>
+              </a:solidFill>
+            </a:ln>
+            <a:effectLst/>
+          </p:spPr>
+          <p:style>
+            <a:lnRef idx="1">
+              <a:schemeClr val="accent4"/>
+            </a:lnRef>
+            <a:fillRef idx="2">
+              <a:schemeClr val="accent4"/>
+            </a:fillRef>
+            <a:effectRef idx="1">
+              <a:schemeClr val="accent4"/>
+            </a:effectRef>
+            <a:fontRef idx="minor">
+              <a:schemeClr val="dk1"/>
+            </a:fontRef>
+          </p:style>
+        </p:cxnSp>
+      </p:grpSp>
+      <p:sp>
+        <p:nvSpPr>
+          <p:cNvPr id="81" name="Rectangle 62"/>
+          <p:cNvSpPr/>
+          <p:nvPr/>
+        </p:nvSpPr>
+        <p:spPr>
+          <a:xfrm>
+            <a:off x="3331396" y="4313182"/>
+            <a:ext cx="1093635" cy="346760"/>
+          </a:xfrm>
+          <a:prstGeom prst="rect">
+            <a:avLst/>
+          </a:prstGeom>
+          <a:solidFill>
+            <a:srgbClr val="0070C0"/>
+          </a:solidFill>
+          <a:ln w="19050">
+            <a:solidFill>
+              <a:srgbClr val="0070C0"/>
+            </a:solidFill>
+          </a:ln>
+          <a:effectLst/>
+        </p:spPr>
+        <p:style>
+          <a:lnRef idx="1">
+            <a:schemeClr val="accent2"/>
+          </a:lnRef>
+          <a:fillRef idx="2">
+            <a:schemeClr val="accent2"/>
+          </a:fillRef>
+          <a:effectRef idx="1">
+            <a:schemeClr val="accent2"/>
+          </a:effectRef>
+          <a:fontRef idx="minor">
+            <a:schemeClr val="dk1"/>
+          </a:fontRef>
+        </p:style>
+        <p:txBody>
+          <a:bodyPr rtlCol="0" anchor="ctr"/>
+          <a:lstStyle/>
+          <a:p>
+            <a:pPr algn="ctr"/>
+            <a:r>
+              <a:rPr lang="en-US" sz="1600" dirty="0" smtClean="0">
+                <a:solidFill>
+                  <a:schemeClr val="bg1"/>
+                </a:solidFill>
+              </a:rPr>
+              <a:t>:Logic</a:t>
+            </a:r>
+            <a:endParaRPr lang="en-SG" sz="1600" dirty="0">
+              <a:solidFill>
+                <a:schemeClr val="bg1"/>
+              </a:solidFill>
+            </a:endParaRPr>
+          </a:p>
+        </p:txBody>
+      </p:sp>
+      <p:cxnSp>
+        <p:nvCxnSpPr>
+          <p:cNvPr id="82" name="Straight Connector 81"/>
+          <p:cNvCxnSpPr/>
+          <p:nvPr/>
+        </p:nvCxnSpPr>
+        <p:spPr>
+          <a:xfrm>
+            <a:off x="3878213" y="4676853"/>
+            <a:ext cx="0" cy="1723059"/>
+          </a:xfrm>
+          <a:prstGeom prst="line">
+            <a:avLst/>
+          </a:prstGeom>
+          <a:ln w="19050">
+            <a:solidFill>
+              <a:srgbClr val="0070C0"/>
+            </a:solidFill>
+            <a:prstDash val="sysDash"/>
+          </a:ln>
+          <a:effectLst/>
+        </p:spPr>
+        <p:style>
+          <a:lnRef idx="1">
+            <a:schemeClr val="accent1"/>
+          </a:lnRef>
+          <a:fillRef idx="2">
+            <a:schemeClr val="accent1"/>
+          </a:fillRef>
+          <a:effectRef idx="1">
+            <a:schemeClr val="accent1"/>
+          </a:effectRef>
+          <a:fontRef idx="minor">
+            <a:schemeClr val="dk1"/>
+          </a:fontRef>
+        </p:style>
+      </p:cxnSp>
+      <p:sp>
+        <p:nvSpPr>
+          <p:cNvPr id="83" name="Rectangle 82"/>
+          <p:cNvSpPr/>
+          <p:nvPr/>
+        </p:nvSpPr>
+        <p:spPr>
+          <a:xfrm>
+            <a:off x="3806205" y="5135046"/>
+            <a:ext cx="144016" cy="832525"/>
+          </a:xfrm>
+          <a:prstGeom prst="rect">
+            <a:avLst/>
+          </a:prstGeom>
+          <a:solidFill>
+            <a:srgbClr val="0070C0"/>
+          </a:solidFill>
+          <a:ln>
+            <a:solidFill>
+              <a:srgbClr val="0070C0"/>
+            </a:solidFill>
+          </a:ln>
+          <a:effectLst/>
+        </p:spPr>
+        <p:style>
+          <a:lnRef idx="1">
+            <a:schemeClr val="accent3"/>
+          </a:lnRef>
+          <a:fillRef idx="2">
+            <a:schemeClr val="accent3"/>
+          </a:fillRef>
+          <a:effectRef idx="1">
+            <a:schemeClr val="accent3"/>
+          </a:effectRef>
+          <a:fontRef idx="minor">
+            <a:schemeClr val="dk1"/>
+          </a:fontRef>
+        </p:style>
+        <p:txBody>
+          <a:bodyPr rtlCol="0" anchor="ctr"/>
+          <a:lstStyle/>
+          <a:p>
+            <a:pPr algn="ctr"/>
+            <a:endParaRPr lang="en-SG" sz="1400">
+              <a:solidFill>
+                <a:schemeClr val="dk1"/>
+              </a:solidFill>
+            </a:endParaRPr>
+          </a:p>
+        </p:txBody>
+      </p:sp>
+      <p:sp>
+        <p:nvSpPr>
+          <p:cNvPr id="84" name="Rectangle 62"/>
+          <p:cNvSpPr/>
+          <p:nvPr/>
+        </p:nvSpPr>
+        <p:spPr>
+          <a:xfrm>
+            <a:off x="5312596" y="4309495"/>
+            <a:ext cx="1093635" cy="346760"/>
+          </a:xfrm>
+          <a:prstGeom prst="rect">
+            <a:avLst/>
+          </a:prstGeom>
+          <a:solidFill>
+            <a:srgbClr val="7030A0"/>
+          </a:solidFill>
+          <a:ln w="19050">
+            <a:solidFill>
+              <a:srgbClr val="7030A0"/>
+            </a:solidFill>
+          </a:ln>
+          <a:effectLst/>
+        </p:spPr>
+        <p:style>
+          <a:lnRef idx="1">
+            <a:schemeClr val="accent2"/>
+          </a:lnRef>
+          <a:fillRef idx="2">
+            <a:schemeClr val="accent2"/>
+          </a:fillRef>
+          <a:effectRef idx="1">
+            <a:schemeClr val="accent2"/>
+          </a:effectRef>
+          <a:fontRef idx="minor">
+            <a:schemeClr val="dk1"/>
+          </a:fontRef>
+        </p:style>
+        <p:txBody>
+          <a:bodyPr rtlCol="0" anchor="ctr"/>
+          <a:lstStyle/>
+          <a:p>
+            <a:pPr algn="ctr"/>
+            <a:r>
+              <a:rPr lang="en-US" sz="1600" dirty="0" smtClean="0">
+                <a:solidFill>
+                  <a:schemeClr val="bg1"/>
+                </a:solidFill>
+              </a:rPr>
+              <a:t>:Model</a:t>
+            </a:r>
+            <a:endParaRPr lang="en-SG" sz="1600" dirty="0">
+              <a:solidFill>
+                <a:schemeClr val="bg1"/>
+              </a:solidFill>
+            </a:endParaRPr>
+          </a:p>
+        </p:txBody>
+      </p:sp>
+      <p:cxnSp>
+        <p:nvCxnSpPr>
+          <p:cNvPr id="86" name="Straight Connector 85"/>
+          <p:cNvCxnSpPr/>
+          <p:nvPr/>
+        </p:nvCxnSpPr>
+        <p:spPr>
+          <a:xfrm>
+            <a:off x="5859413" y="4673166"/>
+            <a:ext cx="0" cy="1723059"/>
+          </a:xfrm>
+          <a:prstGeom prst="line">
+            <a:avLst/>
+          </a:prstGeom>
+          <a:ln w="19050">
+            <a:solidFill>
+              <a:srgbClr val="7030A0"/>
+            </a:solidFill>
+            <a:prstDash val="sysDash"/>
+          </a:ln>
+          <a:effectLst/>
+        </p:spPr>
+        <p:style>
+          <a:lnRef idx="1">
+            <a:schemeClr val="accent1"/>
+          </a:lnRef>
+          <a:fillRef idx="2">
+            <a:schemeClr val="accent1"/>
+          </a:fillRef>
+          <a:effectRef idx="1">
+            <a:schemeClr val="accent1"/>
+          </a:effectRef>
+          <a:fontRef idx="minor">
+            <a:schemeClr val="dk1"/>
+          </a:fontRef>
+        </p:style>
+      </p:cxnSp>
+      <p:sp>
+        <p:nvSpPr>
+          <p:cNvPr id="87" name="Rectangle 86"/>
+          <p:cNvSpPr/>
+          <p:nvPr/>
+        </p:nvSpPr>
+        <p:spPr>
+          <a:xfrm>
+            <a:off x="5787405" y="5239977"/>
+            <a:ext cx="142006" cy="651394"/>
+          </a:xfrm>
+          <a:prstGeom prst="rect">
+            <a:avLst/>
+          </a:prstGeom>
+          <a:solidFill>
+            <a:srgbClr val="7030A0"/>
+          </a:solidFill>
+          <a:ln>
+            <a:solidFill>
+              <a:srgbClr val="7030A0"/>
+            </a:solidFill>
+          </a:ln>
+          <a:effectLst/>
+        </p:spPr>
+        <p:style>
+          <a:lnRef idx="1">
+            <a:schemeClr val="accent3"/>
+          </a:lnRef>
+          <a:fillRef idx="2">
+            <a:schemeClr val="accent3"/>
+          </a:fillRef>
+          <a:effectRef idx="1">
+            <a:schemeClr val="accent3"/>
+          </a:effectRef>
+          <a:fontRef idx="minor">
+            <a:schemeClr val="dk1"/>
+          </a:fontRef>
+        </p:style>
+        <p:txBody>
+          <a:bodyPr rtlCol="0" anchor="ctr"/>
+          <a:lstStyle/>
+          <a:p>
+            <a:pPr algn="ctr"/>
+            <a:endParaRPr lang="en-SG" sz="1400">
+              <a:solidFill>
+                <a:schemeClr val="dk1"/>
+              </a:solidFill>
+            </a:endParaRPr>
+          </a:p>
+        </p:txBody>
+      </p:sp>
+      <p:cxnSp>
+        <p:nvCxnSpPr>
+          <p:cNvPr id="88" name="Straight Arrow Connector 87"/>
+          <p:cNvCxnSpPr/>
+          <p:nvPr/>
+        </p:nvCxnSpPr>
+        <p:spPr>
+          <a:xfrm>
+            <a:off x="462631" y="5027548"/>
+            <a:ext cx="1119851" cy="0"/>
+          </a:xfrm>
+          <a:prstGeom prst="straightConnector1">
+            <a:avLst/>
+          </a:prstGeom>
+          <a:ln w="19050">
+            <a:solidFill>
+              <a:schemeClr val="tx1"/>
+            </a:solidFill>
+            <a:tailEnd type="arrow"/>
+          </a:ln>
+        </p:spPr>
+        <p:style>
+          <a:lnRef idx="1">
+            <a:schemeClr val="accent1"/>
+          </a:lnRef>
+          <a:fillRef idx="0">
+            <a:schemeClr val="accent1"/>
+          </a:fillRef>
+          <a:effectRef idx="0">
+            <a:schemeClr val="accent1"/>
+          </a:effectRef>
+          <a:fontRef idx="minor">
+            <a:schemeClr val="tx1"/>
+          </a:fontRef>
+        </p:style>
+      </p:cxnSp>
+      <p:sp>
+        <p:nvSpPr>
+          <p:cNvPr id="89" name="TextBox 88"/>
+          <p:cNvSpPr txBox="1"/>
+          <p:nvPr/>
+        </p:nvSpPr>
+        <p:spPr>
+          <a:xfrm>
+            <a:off x="462630" y="5047449"/>
+            <a:ext cx="1015480" cy="369332"/>
+          </a:xfrm>
+          <a:prstGeom prst="rect">
+            <a:avLst/>
+          </a:prstGeom>
+          <a:noFill/>
+        </p:spPr>
+        <p:txBody>
+          <a:bodyPr wrap="square" lIns="0" tIns="0" rIns="0" bIns="0" rtlCol="0">
+            <a:spAutoFit/>
+          </a:bodyPr>
+          <a:lstStyle/>
+          <a:p>
+            <a:r>
+              <a:rPr lang="en-US" sz="1200" dirty="0" err="1"/>
+              <a:t>e</a:t>
+            </a:r>
+            <a:r>
+              <a:rPr lang="en-US" sz="1200" dirty="0" err="1" smtClean="0"/>
+              <a:t>ditlabel</a:t>
+            </a:r>
+            <a:r>
+              <a:rPr lang="en-US" sz="1200" dirty="0" smtClean="0"/>
+              <a:t> </a:t>
+            </a:r>
+          </a:p>
+          <a:p>
+            <a:r>
+              <a:rPr lang="en-US" sz="1200" dirty="0" smtClean="0"/>
+              <a:t>Friends allies</a:t>
+            </a:r>
+            <a:endParaRPr lang="en-US" sz="1200" dirty="0"/>
+          </a:p>
+        </p:txBody>
+      </p:sp>
+      <p:cxnSp>
+        <p:nvCxnSpPr>
+          <p:cNvPr id="90" name="Straight Arrow Connector 89"/>
+          <p:cNvCxnSpPr/>
+          <p:nvPr/>
+        </p:nvCxnSpPr>
+        <p:spPr>
+          <a:xfrm>
+            <a:off x="1734882" y="5135047"/>
+            <a:ext cx="2071323" cy="0"/>
+          </a:xfrm>
+          <a:prstGeom prst="straightConnector1">
+            <a:avLst/>
+          </a:prstGeom>
+          <a:ln w="19050">
+            <a:solidFill>
+              <a:srgbClr val="00B050"/>
+            </a:solidFill>
+            <a:tailEnd type="arrow"/>
+          </a:ln>
+        </p:spPr>
+        <p:style>
+          <a:lnRef idx="1">
+            <a:schemeClr val="accent1"/>
+          </a:lnRef>
+          <a:fillRef idx="0">
+            <a:schemeClr val="accent1"/>
+          </a:fillRef>
+          <a:effectRef idx="0">
+            <a:schemeClr val="accent1"/>
+          </a:effectRef>
+          <a:fontRef idx="minor">
+            <a:schemeClr val="tx1"/>
+          </a:fontRef>
+        </p:style>
+      </p:cxnSp>
+      <p:sp>
+        <p:nvSpPr>
+          <p:cNvPr id="91" name="TextBox 90"/>
+          <p:cNvSpPr txBox="1"/>
+          <p:nvPr/>
+        </p:nvSpPr>
+        <p:spPr>
+          <a:xfrm>
+            <a:off x="1908423" y="5158308"/>
+            <a:ext cx="1908358" cy="184666"/>
+          </a:xfrm>
+          <a:prstGeom prst="rect">
+            <a:avLst/>
+          </a:prstGeom>
+          <a:noFill/>
+        </p:spPr>
+        <p:txBody>
+          <a:bodyPr wrap="square" lIns="0" tIns="0" rIns="0" bIns="0" rtlCol="0">
+            <a:spAutoFit/>
+          </a:bodyPr>
+          <a:lstStyle/>
+          <a:p>
+            <a:r>
+              <a:rPr lang="en-US" sz="1200" dirty="0" smtClean="0">
+                <a:solidFill>
+                  <a:srgbClr val="0070C0"/>
+                </a:solidFill>
+              </a:rPr>
+              <a:t>execute</a:t>
+            </a:r>
+            <a:r>
+              <a:rPr lang="en-US" sz="1200" dirty="0" smtClean="0">
+                <a:solidFill>
+                  <a:srgbClr val="0070C0"/>
+                </a:solidFill>
+              </a:rPr>
+              <a:t>(“</a:t>
+            </a:r>
+            <a:r>
+              <a:rPr lang="en-US" sz="1200" dirty="0" err="1" smtClean="0">
+                <a:solidFill>
+                  <a:srgbClr val="0070C0"/>
+                </a:solidFill>
+              </a:rPr>
+              <a:t>editlabel</a:t>
+            </a:r>
+            <a:r>
+              <a:rPr lang="en-US" sz="1200" dirty="0" smtClean="0">
+                <a:solidFill>
+                  <a:srgbClr val="0070C0"/>
+                </a:solidFill>
+              </a:rPr>
+              <a:t> friends”)</a:t>
+            </a:r>
+            <a:endParaRPr lang="en-US" sz="1200" dirty="0">
+              <a:solidFill>
+                <a:srgbClr val="0070C0"/>
+              </a:solidFill>
+            </a:endParaRPr>
+          </a:p>
+        </p:txBody>
+      </p:sp>
+      <p:cxnSp>
+        <p:nvCxnSpPr>
+          <p:cNvPr id="92" name="Straight Arrow Connector 91"/>
+          <p:cNvCxnSpPr/>
+          <p:nvPr/>
+        </p:nvCxnSpPr>
+        <p:spPr>
+          <a:xfrm>
+            <a:off x="3950221" y="5239978"/>
+            <a:ext cx="1837184" cy="0"/>
+          </a:xfrm>
+          <a:prstGeom prst="straightConnector1">
+            <a:avLst/>
+          </a:prstGeom>
+          <a:ln w="19050">
+            <a:solidFill>
+              <a:srgbClr val="0070C0"/>
+            </a:solidFill>
+            <a:tailEnd type="arrow"/>
+          </a:ln>
+        </p:spPr>
+        <p:style>
+          <a:lnRef idx="1">
+            <a:schemeClr val="accent1"/>
+          </a:lnRef>
+          <a:fillRef idx="0">
+            <a:schemeClr val="accent1"/>
+          </a:fillRef>
+          <a:effectRef idx="0">
+            <a:schemeClr val="accent1"/>
+          </a:effectRef>
+          <a:fontRef idx="minor">
+            <a:schemeClr val="tx1"/>
+          </a:fontRef>
+        </p:style>
+      </p:cxnSp>
+      <p:sp>
+        <p:nvSpPr>
+          <p:cNvPr id="93" name="TextBox 92"/>
+          <p:cNvSpPr txBox="1"/>
+          <p:nvPr/>
+        </p:nvSpPr>
+        <p:spPr>
+          <a:xfrm>
+            <a:off x="4173874" y="5235252"/>
+            <a:ext cx="1736395" cy="215444"/>
+          </a:xfrm>
+          <a:prstGeom prst="rect">
+            <a:avLst/>
+          </a:prstGeom>
+          <a:noFill/>
+        </p:spPr>
+        <p:txBody>
+          <a:bodyPr wrap="square" lIns="0" tIns="0" rIns="0" bIns="0" rtlCol="0">
+            <a:spAutoFit/>
+          </a:bodyPr>
+          <a:lstStyle/>
+          <a:p>
+            <a:r>
+              <a:rPr lang="en-US" sz="1400" dirty="0" err="1" smtClean="0">
+                <a:solidFill>
+                  <a:srgbClr val="7030A0"/>
+                </a:solidFill>
+              </a:rPr>
+              <a:t>editLabelsInTask</a:t>
+            </a:r>
+            <a:r>
+              <a:rPr lang="en-US" sz="1400" dirty="0" smtClean="0">
+                <a:solidFill>
+                  <a:srgbClr val="7030A0"/>
+                </a:solidFill>
+              </a:rPr>
+              <a:t>(t)</a:t>
+            </a:r>
+            <a:endParaRPr lang="en-US" sz="1400" dirty="0">
+              <a:solidFill>
+                <a:srgbClr val="7030A0"/>
+              </a:solidFill>
+            </a:endParaRPr>
+          </a:p>
+        </p:txBody>
+      </p:sp>
+      <p:sp>
+        <p:nvSpPr>
+          <p:cNvPr id="94" name="TextBox 93"/>
+          <p:cNvSpPr txBox="1"/>
+          <p:nvPr/>
+        </p:nvSpPr>
+        <p:spPr>
+          <a:xfrm>
+            <a:off x="6069843" y="5389225"/>
+            <a:ext cx="2438400" cy="215444"/>
+          </a:xfrm>
+          <a:prstGeom prst="rect">
+            <a:avLst/>
+          </a:prstGeom>
+          <a:noFill/>
+        </p:spPr>
+        <p:txBody>
+          <a:bodyPr wrap="square" lIns="0" tIns="0" rIns="0" bIns="0" rtlCol="0">
+            <a:spAutoFit/>
+          </a:bodyPr>
+          <a:lstStyle/>
+          <a:p>
+            <a:r>
+              <a:rPr lang="en-US" sz="1400" dirty="0" smtClean="0">
+                <a:solidFill>
+                  <a:schemeClr val="accent5">
+                    <a:lumMod val="75000"/>
+                  </a:schemeClr>
+                </a:solidFill>
+              </a:rPr>
+              <a:t>post(</a:t>
+            </a:r>
+            <a:r>
+              <a:rPr lang="en-US" sz="1400" dirty="0" err="1" smtClean="0">
+                <a:solidFill>
+                  <a:schemeClr val="accent5">
+                    <a:lumMod val="75000"/>
+                  </a:schemeClr>
+                </a:solidFill>
+              </a:rPr>
+              <a:t>AddressBookChangedEvent</a:t>
+            </a:r>
+            <a:r>
+              <a:rPr lang="en-US" sz="1400" dirty="0" smtClean="0">
+                <a:solidFill>
+                  <a:schemeClr val="accent5">
+                    <a:lumMod val="75000"/>
+                  </a:schemeClr>
+                </a:solidFill>
+              </a:rPr>
+              <a:t>)</a:t>
+            </a:r>
+            <a:endParaRPr lang="en-US" sz="1400" dirty="0">
+              <a:solidFill>
+                <a:schemeClr val="accent5">
+                  <a:lumMod val="75000"/>
+                </a:schemeClr>
+              </a:solidFill>
+            </a:endParaRPr>
+          </a:p>
+        </p:txBody>
+      </p:sp>
+      <p:cxnSp>
+        <p:nvCxnSpPr>
+          <p:cNvPr id="95" name="Straight Arrow Connector 94"/>
+          <p:cNvCxnSpPr/>
+          <p:nvPr/>
+        </p:nvCxnSpPr>
+        <p:spPr>
+          <a:xfrm>
+            <a:off x="3950221" y="5892250"/>
+            <a:ext cx="1837184" cy="0"/>
+          </a:xfrm>
+          <a:prstGeom prst="straightConnector1">
+            <a:avLst/>
+          </a:prstGeom>
+          <a:ln w="19050">
+            <a:solidFill>
+              <a:srgbClr val="7030A0"/>
+            </a:solidFill>
+            <a:prstDash val="sysDash"/>
+            <a:headEnd type="arrow" w="med" len="med"/>
+            <a:tailEnd type="none" w="med" len="med"/>
+          </a:ln>
+        </p:spPr>
+        <p:style>
+          <a:lnRef idx="1">
+            <a:schemeClr val="accent1"/>
+          </a:lnRef>
+          <a:fillRef idx="0">
+            <a:schemeClr val="accent1"/>
+          </a:fillRef>
+          <a:effectRef idx="0">
+            <a:schemeClr val="accent1"/>
+          </a:effectRef>
+          <a:fontRef idx="minor">
+            <a:schemeClr val="tx1"/>
+          </a:fontRef>
+        </p:style>
+      </p:cxnSp>
+      <p:cxnSp>
+        <p:nvCxnSpPr>
+          <p:cNvPr id="96" name="Straight Arrow Connector 95"/>
+          <p:cNvCxnSpPr/>
+          <p:nvPr/>
+        </p:nvCxnSpPr>
+        <p:spPr>
+          <a:xfrm>
+            <a:off x="1734882" y="5967571"/>
+            <a:ext cx="2058118" cy="0"/>
+          </a:xfrm>
+          <a:prstGeom prst="straightConnector1">
+            <a:avLst/>
+          </a:prstGeom>
+          <a:ln w="19050">
+            <a:solidFill>
+              <a:srgbClr val="0070C0"/>
+            </a:solidFill>
+            <a:prstDash val="sysDash"/>
+            <a:headEnd type="arrow" w="med" len="med"/>
+            <a:tailEnd type="none" w="med" len="med"/>
+          </a:ln>
+        </p:spPr>
+        <p:style>
+          <a:lnRef idx="1">
+            <a:schemeClr val="accent1"/>
+          </a:lnRef>
+          <a:fillRef idx="0">
+            <a:schemeClr val="accent1"/>
+          </a:fillRef>
+          <a:effectRef idx="0">
+            <a:schemeClr val="accent1"/>
+          </a:effectRef>
+          <a:fontRef idx="minor">
+            <a:schemeClr val="tx1"/>
+          </a:fontRef>
+        </p:style>
+      </p:cxnSp>
+      <p:cxnSp>
+        <p:nvCxnSpPr>
+          <p:cNvPr id="97" name="Straight Arrow Connector 96"/>
+          <p:cNvCxnSpPr/>
+          <p:nvPr/>
+        </p:nvCxnSpPr>
+        <p:spPr>
+          <a:xfrm>
+            <a:off x="386431" y="6043771"/>
+            <a:ext cx="1196051" cy="0"/>
+          </a:xfrm>
+          <a:prstGeom prst="straightConnector1">
+            <a:avLst/>
+          </a:prstGeom>
+          <a:ln w="19050">
+            <a:solidFill>
+              <a:srgbClr val="00B050"/>
+            </a:solidFill>
+            <a:prstDash val="sysDash"/>
+            <a:headEnd type="arrow" w="med" len="med"/>
+            <a:tailEnd type="none" w="med" len="med"/>
+          </a:ln>
+        </p:spPr>
+        <p:style>
+          <a:lnRef idx="1">
+            <a:schemeClr val="accent1"/>
+          </a:lnRef>
+          <a:fillRef idx="0">
+            <a:schemeClr val="accent1"/>
+          </a:fillRef>
+          <a:effectRef idx="0">
+            <a:schemeClr val="accent1"/>
+          </a:effectRef>
+          <a:fontRef idx="minor">
+            <a:schemeClr val="tx1"/>
+          </a:fontRef>
+        </p:style>
+      </p:cxnSp>
+      <p:sp>
+        <p:nvSpPr>
+          <p:cNvPr id="98" name="Rectangle 62"/>
+          <p:cNvSpPr/>
+          <p:nvPr/>
+        </p:nvSpPr>
+        <p:spPr>
+          <a:xfrm>
+            <a:off x="7692013" y="4292820"/>
+            <a:ext cx="1371600" cy="346760"/>
+          </a:xfrm>
+          <a:prstGeom prst="rect">
+            <a:avLst/>
+          </a:prstGeom>
+          <a:solidFill>
+            <a:schemeClr val="accent5">
+              <a:lumMod val="75000"/>
+            </a:schemeClr>
+          </a:solidFill>
+          <a:ln w="19050">
+            <a:solidFill>
+              <a:schemeClr val="accent5">
+                <a:lumMod val="75000"/>
+              </a:schemeClr>
+            </a:solidFill>
+          </a:ln>
+          <a:effectLst/>
+        </p:spPr>
+        <p:style>
+          <a:lnRef idx="1">
+            <a:schemeClr val="accent2"/>
+          </a:lnRef>
+          <a:fillRef idx="2">
+            <a:schemeClr val="accent2"/>
+          </a:fillRef>
+          <a:effectRef idx="1">
+            <a:schemeClr val="accent2"/>
+          </a:effectRef>
+          <a:fontRef idx="minor">
+            <a:schemeClr val="dk1"/>
+          </a:fontRef>
+        </p:style>
+        <p:txBody>
+          <a:bodyPr rtlCol="0" anchor="ctr"/>
+          <a:lstStyle/>
+          <a:p>
+            <a:pPr algn="ctr"/>
+            <a:r>
+              <a:rPr lang="en-US" sz="1600" dirty="0" smtClean="0">
+                <a:solidFill>
+                  <a:schemeClr val="bg1"/>
+                </a:solidFill>
+              </a:rPr>
+              <a:t>:</a:t>
+            </a:r>
+            <a:r>
+              <a:rPr lang="en-US" sz="1600" dirty="0" err="1" smtClean="0">
+                <a:solidFill>
+                  <a:schemeClr val="bg1"/>
+                </a:solidFill>
+              </a:rPr>
+              <a:t>EventsCenter</a:t>
+            </a:r>
+            <a:endParaRPr lang="en-SG" sz="1600" dirty="0">
+              <a:solidFill>
+                <a:schemeClr val="bg1"/>
+              </a:solidFill>
+            </a:endParaRPr>
+          </a:p>
+        </p:txBody>
+      </p:sp>
+      <p:cxnSp>
+        <p:nvCxnSpPr>
+          <p:cNvPr id="99" name="Straight Connector 98"/>
+          <p:cNvCxnSpPr/>
+          <p:nvPr/>
+        </p:nvCxnSpPr>
+        <p:spPr>
+          <a:xfrm>
+            <a:off x="8612615" y="4645874"/>
+            <a:ext cx="0" cy="1723059"/>
+          </a:xfrm>
+          <a:prstGeom prst="line">
+            <a:avLst/>
+          </a:prstGeom>
+          <a:ln w="19050">
+            <a:solidFill>
+              <a:schemeClr val="accent5">
+                <a:lumMod val="75000"/>
+              </a:schemeClr>
+            </a:solidFill>
+            <a:prstDash val="sysDash"/>
+          </a:ln>
+          <a:effectLst/>
+        </p:spPr>
+        <p:style>
+          <a:lnRef idx="1">
+            <a:schemeClr val="accent1"/>
+          </a:lnRef>
+          <a:fillRef idx="2">
+            <a:schemeClr val="accent1"/>
+          </a:fillRef>
+          <a:effectRef idx="1">
+            <a:schemeClr val="accent1"/>
+          </a:effectRef>
+          <a:fontRef idx="minor">
+            <a:schemeClr val="dk1"/>
+          </a:fontRef>
+        </p:style>
+      </p:cxnSp>
+      <p:sp>
+        <p:nvSpPr>
+          <p:cNvPr id="100" name="Rectangle 99"/>
+          <p:cNvSpPr/>
+          <p:nvPr/>
+        </p:nvSpPr>
+        <p:spPr>
+          <a:xfrm>
+            <a:off x="8540607" y="5662771"/>
+            <a:ext cx="142006" cy="176787"/>
+          </a:xfrm>
+          <a:prstGeom prst="rect">
+            <a:avLst/>
+          </a:prstGeom>
+          <a:solidFill>
+            <a:schemeClr val="accent5">
+              <a:lumMod val="75000"/>
+            </a:schemeClr>
+          </a:solidFill>
+          <a:ln>
+            <a:solidFill>
+              <a:schemeClr val="accent5">
+                <a:lumMod val="75000"/>
+              </a:schemeClr>
+            </a:solidFill>
+          </a:ln>
+          <a:effectLst/>
+        </p:spPr>
+        <p:style>
+          <a:lnRef idx="1">
+            <a:schemeClr val="accent3"/>
+          </a:lnRef>
+          <a:fillRef idx="2">
+            <a:schemeClr val="accent3"/>
+          </a:fillRef>
+          <a:effectRef idx="1">
+            <a:schemeClr val="accent3"/>
+          </a:effectRef>
+          <a:fontRef idx="minor">
+            <a:schemeClr val="dk1"/>
+          </a:fontRef>
+        </p:style>
+        <p:txBody>
+          <a:bodyPr rtlCol="0" anchor="ctr"/>
+          <a:lstStyle/>
+          <a:p>
+            <a:pPr algn="ctr"/>
+            <a:endParaRPr lang="en-SG" sz="1400">
+              <a:solidFill>
+                <a:schemeClr val="dk1"/>
+              </a:solidFill>
+            </a:endParaRPr>
+          </a:p>
+        </p:txBody>
+      </p:sp>
+      <p:cxnSp>
+        <p:nvCxnSpPr>
+          <p:cNvPr id="101" name="Straight Arrow Connector 100"/>
+          <p:cNvCxnSpPr/>
+          <p:nvPr/>
+        </p:nvCxnSpPr>
+        <p:spPr>
+          <a:xfrm>
+            <a:off x="5939805" y="5662771"/>
+            <a:ext cx="2568438" cy="0"/>
+          </a:xfrm>
+          <a:prstGeom prst="straightConnector1">
+            <a:avLst/>
+          </a:prstGeom>
+          <a:ln w="19050">
+            <a:solidFill>
+              <a:srgbClr val="7030A0"/>
+            </a:solidFill>
+            <a:tailEnd type="arrow"/>
+          </a:ln>
+        </p:spPr>
+        <p:style>
+          <a:lnRef idx="1">
+            <a:schemeClr val="accent1"/>
+          </a:lnRef>
+          <a:fillRef idx="0">
+            <a:schemeClr val="accent1"/>
+          </a:fillRef>
+          <a:effectRef idx="0">
+            <a:schemeClr val="accent1"/>
+          </a:effectRef>
+          <a:fontRef idx="minor">
+            <a:schemeClr val="tx1"/>
+          </a:fontRef>
+        </p:style>
+      </p:cxnSp>
+      <p:cxnSp>
+        <p:nvCxnSpPr>
+          <p:cNvPr id="102" name="Straight Arrow Connector 101"/>
+          <p:cNvCxnSpPr/>
+          <p:nvPr/>
+        </p:nvCxnSpPr>
+        <p:spPr>
+          <a:xfrm>
+            <a:off x="5939805" y="5839558"/>
+            <a:ext cx="2549946" cy="0"/>
+          </a:xfrm>
+          <a:prstGeom prst="straightConnector1">
+            <a:avLst/>
+          </a:prstGeom>
+          <a:ln w="19050">
+            <a:solidFill>
+              <a:schemeClr val="accent5">
+                <a:lumMod val="75000"/>
+              </a:schemeClr>
+            </a:solidFill>
+            <a:prstDash val="sysDash"/>
+            <a:headEnd type="arrow" w="med" len="med"/>
+            <a:tailEnd type="none" w="med" len="med"/>
+          </a:ln>
+        </p:spPr>
+        <p:style>
+          <a:lnRef idx="1">
+            <a:schemeClr val="accent1"/>
+          </a:lnRef>
+          <a:fillRef idx="0">
+            <a:schemeClr val="accent1"/>
+          </a:fillRef>
+          <a:effectRef idx="0">
+            <a:schemeClr val="accent1"/>
+          </a:effectRef>
+          <a:fontRef idx="minor">
+            <a:schemeClr val="tx1"/>
+          </a:fontRef>
+        </p:style>
+      </p:cxnSp>
+      <p:cxnSp>
+        <p:nvCxnSpPr>
+          <p:cNvPr id="103" name="Straight Connector 102"/>
+          <p:cNvCxnSpPr/>
+          <p:nvPr/>
+        </p:nvCxnSpPr>
+        <p:spPr>
+          <a:xfrm flipH="1">
+            <a:off x="310207" y="4801241"/>
+            <a:ext cx="24" cy="1598671"/>
+          </a:xfrm>
+          <a:prstGeom prst="line">
+            <a:avLst/>
+          </a:prstGeom>
+          <a:ln w="19050">
+            <a:solidFill>
+              <a:schemeClr val="tx1"/>
+            </a:solidFill>
+            <a:prstDash val="sysDash"/>
+          </a:ln>
+          <a:effectLst/>
+        </p:spPr>
+        <p:style>
+          <a:lnRef idx="1">
+            <a:schemeClr val="accent1"/>
+          </a:lnRef>
+          <a:fillRef idx="2">
+            <a:schemeClr val="accent1"/>
+          </a:fillRef>
+          <a:effectRef idx="1">
+            <a:schemeClr val="accent1"/>
+          </a:effectRef>
+          <a:fontRef idx="minor">
+            <a:schemeClr val="dk1"/>
+          </a:fontRef>
+        </p:style>
+      </p:cxnSp>
+    </p:spTree>
+    <p:extLst>
+      <p:ext uri="{BB962C8B-B14F-4D97-AF65-F5344CB8AC3E}">
+        <p14:creationId xmlns:p14="http://schemas.microsoft.com/office/powerpoint/2010/main" val="2927111328"/>
       </p:ext>
     </p:extLst>
   </p:cSld>

</xml_diff>

<commit_message>
Remove old sequence diagram from ppt
</commit_message>
<xml_diff>
--- a/docs/diagrams/HighLevelSequenceDiagrams.pptx
+++ b/docs/diagrams/HighLevelSequenceDiagrams.pptx
@@ -5,11 +5,10 @@
     <p:sldMasterId id="2147483648" r:id="rId1"/>
   </p:sldMasterIdLst>
   <p:notesMasterIdLst>
-    <p:notesMasterId r:id="rId4"/>
+    <p:notesMasterId r:id="rId3"/>
   </p:notesMasterIdLst>
   <p:sldIdLst>
     <p:sldId id="266" r:id="rId2"/>
-    <p:sldId id="267" r:id="rId3"/>
   </p:sldIdLst>
   <p:sldSz cx="9144000" cy="6858000" type="screen4x3"/>
   <p:notesSz cx="6858000" cy="9144000"/>
@@ -209,7 +208,7 @@
           <a:p>
             <a:fld id="{F5CC4B3F-88C1-4FFA-B1B6-F41C21DC6924}" type="datetimeFigureOut">
               <a:rPr lang="en-US" smtClean="0"/>
-              <a:t>3/18/2017</a:t>
+              <a:t>3/19/2017</a:t>
             </a:fld>
             <a:endParaRPr lang="en-US"/>
           </a:p>
@@ -658,7 +657,7 @@
           <a:p>
             <a:fld id="{78C97017-6FC3-485B-9764-EAC9E56C1D49}" type="datetimeFigureOut">
               <a:rPr lang="en-US" smtClean="0"/>
-              <a:t>3/18/2017</a:t>
+              <a:t>3/19/2017</a:t>
             </a:fld>
             <a:endParaRPr lang="en-US"/>
           </a:p>
@@ -828,7 +827,7 @@
           <a:p>
             <a:fld id="{78C97017-6FC3-485B-9764-EAC9E56C1D49}" type="datetimeFigureOut">
               <a:rPr lang="en-US" smtClean="0"/>
-              <a:t>3/18/2017</a:t>
+              <a:t>3/19/2017</a:t>
             </a:fld>
             <a:endParaRPr lang="en-US"/>
           </a:p>
@@ -1008,7 +1007,7 @@
           <a:p>
             <a:fld id="{78C97017-6FC3-485B-9764-EAC9E56C1D49}" type="datetimeFigureOut">
               <a:rPr lang="en-US" smtClean="0"/>
-              <a:t>3/18/2017</a:t>
+              <a:t>3/19/2017</a:t>
             </a:fld>
             <a:endParaRPr lang="en-US"/>
           </a:p>
@@ -1178,7 +1177,7 @@
           <a:p>
             <a:fld id="{78C97017-6FC3-485B-9764-EAC9E56C1D49}" type="datetimeFigureOut">
               <a:rPr lang="en-US" smtClean="0"/>
-              <a:t>3/18/2017</a:t>
+              <a:t>3/19/2017</a:t>
             </a:fld>
             <a:endParaRPr lang="en-US"/>
           </a:p>
@@ -1424,7 +1423,7 @@
           <a:p>
             <a:fld id="{78C97017-6FC3-485B-9764-EAC9E56C1D49}" type="datetimeFigureOut">
               <a:rPr lang="en-US" smtClean="0"/>
-              <a:t>3/18/2017</a:t>
+              <a:t>3/19/2017</a:t>
             </a:fld>
             <a:endParaRPr lang="en-US"/>
           </a:p>
@@ -1712,7 +1711,7 @@
           <a:p>
             <a:fld id="{78C97017-6FC3-485B-9764-EAC9E56C1D49}" type="datetimeFigureOut">
               <a:rPr lang="en-US" smtClean="0"/>
-              <a:t>3/18/2017</a:t>
+              <a:t>3/19/2017</a:t>
             </a:fld>
             <a:endParaRPr lang="en-US"/>
           </a:p>
@@ -2134,7 +2133,7 @@
           <a:p>
             <a:fld id="{78C97017-6FC3-485B-9764-EAC9E56C1D49}" type="datetimeFigureOut">
               <a:rPr lang="en-US" smtClean="0"/>
-              <a:t>3/18/2017</a:t>
+              <a:t>3/19/2017</a:t>
             </a:fld>
             <a:endParaRPr lang="en-US"/>
           </a:p>
@@ -2252,7 +2251,7 @@
           <a:p>
             <a:fld id="{78C97017-6FC3-485B-9764-EAC9E56C1D49}" type="datetimeFigureOut">
               <a:rPr lang="en-US" smtClean="0"/>
-              <a:t>3/18/2017</a:t>
+              <a:t>3/19/2017</a:t>
             </a:fld>
             <a:endParaRPr lang="en-US"/>
           </a:p>
@@ -2347,7 +2346,7 @@
           <a:p>
             <a:fld id="{78C97017-6FC3-485B-9764-EAC9E56C1D49}" type="datetimeFigureOut">
               <a:rPr lang="en-US" smtClean="0"/>
-              <a:t>3/18/2017</a:t>
+              <a:t>3/19/2017</a:t>
             </a:fld>
             <a:endParaRPr lang="en-US"/>
           </a:p>
@@ -2624,7 +2623,7 @@
           <a:p>
             <a:fld id="{78C97017-6FC3-485B-9764-EAC9E56C1D49}" type="datetimeFigureOut">
               <a:rPr lang="en-US" smtClean="0"/>
-              <a:t>3/18/2017</a:t>
+              <a:t>3/19/2017</a:t>
             </a:fld>
             <a:endParaRPr lang="en-US"/>
           </a:p>
@@ -2877,7 +2876,7 @@
           <a:p>
             <a:fld id="{78C97017-6FC3-485B-9764-EAC9E56C1D49}" type="datetimeFigureOut">
               <a:rPr lang="en-US" smtClean="0"/>
-              <a:t>3/18/2017</a:t>
+              <a:t>3/19/2017</a:t>
             </a:fld>
             <a:endParaRPr lang="en-US"/>
           </a:p>
@@ -3090,7 +3089,7 @@
           <a:p>
             <a:fld id="{78C97017-6FC3-485B-9764-EAC9E56C1D49}" type="datetimeFigureOut">
               <a:rPr lang="en-US" smtClean="0"/>
-              <a:t>3/18/2017</a:t>
+              <a:t>3/19/2017</a:t>
             </a:fld>
             <a:endParaRPr lang="en-US"/>
           </a:p>
@@ -6086,2754 +6085,6 @@
     <p:extLst>
       <p:ext uri="{BB962C8B-B14F-4D97-AF65-F5344CB8AC3E}">
         <p14:creationId xmlns:p14="http://schemas.microsoft.com/office/powerpoint/2010/main" val="4023378879"/>
-      </p:ext>
-    </p:extLst>
-  </p:cSld>
-  <p:clrMapOvr>
-    <a:masterClrMapping/>
-  </p:clrMapOvr>
-</p:sld>
-</file>
-
-<file path=ppt/slides/slide2.xml><?xml version="1.0" encoding="utf-8"?>
-<p:sld xmlns:a="http://schemas.openxmlformats.org/drawingml/2006/main" xmlns:r="http://schemas.openxmlformats.org/officeDocument/2006/relationships" xmlns:p="http://schemas.openxmlformats.org/presentationml/2006/main">
-  <p:cSld>
-    <p:spTree>
-      <p:nvGrpSpPr>
-        <p:cNvPr id="1" name=""/>
-        <p:cNvGrpSpPr/>
-        <p:nvPr/>
-      </p:nvGrpSpPr>
-      <p:grpSpPr>
-        <a:xfrm>
-          <a:off x="0" y="0"/>
-          <a:ext cx="0" cy="0"/>
-          <a:chOff x="0" y="0"/>
-          <a:chExt cx="0" cy="0"/>
-        </a:xfrm>
-      </p:grpSpPr>
-      <p:sp>
-        <p:nvSpPr>
-          <p:cNvPr id="2" name="Rectangle 62"/>
-          <p:cNvSpPr/>
-          <p:nvPr/>
-        </p:nvSpPr>
-        <p:spPr>
-          <a:xfrm>
-            <a:off x="1111860" y="607926"/>
-            <a:ext cx="1093635" cy="346760"/>
-          </a:xfrm>
-          <a:prstGeom prst="rect">
-            <a:avLst/>
-          </a:prstGeom>
-          <a:solidFill>
-            <a:srgbClr val="00B050"/>
-          </a:solidFill>
-          <a:ln w="19050">
-            <a:solidFill>
-              <a:srgbClr val="00B050"/>
-            </a:solidFill>
-          </a:ln>
-          <a:effectLst/>
-        </p:spPr>
-        <p:style>
-          <a:lnRef idx="1">
-            <a:schemeClr val="accent2"/>
-          </a:lnRef>
-          <a:fillRef idx="2">
-            <a:schemeClr val="accent2"/>
-          </a:fillRef>
-          <a:effectRef idx="1">
-            <a:schemeClr val="accent2"/>
-          </a:effectRef>
-          <a:fontRef idx="minor">
-            <a:schemeClr val="dk1"/>
-          </a:fontRef>
-        </p:style>
-        <p:txBody>
-          <a:bodyPr rtlCol="0" anchor="ctr"/>
-          <a:lstStyle/>
-          <a:p>
-            <a:pPr algn="ctr"/>
-            <a:r>
-              <a:rPr lang="en-US" sz="1600" dirty="0" smtClean="0">
-                <a:solidFill>
-                  <a:schemeClr val="bg1"/>
-                </a:solidFill>
-              </a:rPr>
-              <a:t>:UI</a:t>
-            </a:r>
-            <a:endParaRPr lang="en-SG" sz="1600" dirty="0">
-              <a:solidFill>
-                <a:schemeClr val="bg1"/>
-              </a:solidFill>
-            </a:endParaRPr>
-          </a:p>
-        </p:txBody>
-      </p:sp>
-      <p:cxnSp>
-        <p:nvCxnSpPr>
-          <p:cNvPr id="5" name="Straight Connector 4"/>
-          <p:cNvCxnSpPr/>
-          <p:nvPr/>
-        </p:nvCxnSpPr>
-        <p:spPr>
-          <a:xfrm>
-            <a:off x="1658677" y="971597"/>
-            <a:ext cx="0" cy="1723059"/>
-          </a:xfrm>
-          <a:prstGeom prst="line">
-            <a:avLst/>
-          </a:prstGeom>
-          <a:ln w="19050">
-            <a:solidFill>
-              <a:srgbClr val="00B050"/>
-            </a:solidFill>
-            <a:prstDash val="sysDash"/>
-          </a:ln>
-          <a:effectLst/>
-        </p:spPr>
-        <p:style>
-          <a:lnRef idx="1">
-            <a:schemeClr val="accent1"/>
-          </a:lnRef>
-          <a:fillRef idx="2">
-            <a:schemeClr val="accent1"/>
-          </a:fillRef>
-          <a:effectRef idx="1">
-            <a:schemeClr val="accent1"/>
-          </a:effectRef>
-          <a:fontRef idx="minor">
-            <a:schemeClr val="dk1"/>
-          </a:fontRef>
-        </p:style>
-      </p:cxnSp>
-      <p:sp>
-        <p:nvSpPr>
-          <p:cNvPr id="6" name="Rectangle 5"/>
-          <p:cNvSpPr/>
-          <p:nvPr/>
-        </p:nvSpPr>
-        <p:spPr>
-          <a:xfrm>
-            <a:off x="1586669" y="1322292"/>
-            <a:ext cx="152400" cy="1019910"/>
-          </a:xfrm>
-          <a:prstGeom prst="rect">
-            <a:avLst/>
-          </a:prstGeom>
-          <a:solidFill>
-            <a:srgbClr val="00B050"/>
-          </a:solidFill>
-          <a:ln>
-            <a:solidFill>
-              <a:srgbClr val="00B050"/>
-            </a:solidFill>
-          </a:ln>
-          <a:effectLst/>
-        </p:spPr>
-        <p:style>
-          <a:lnRef idx="1">
-            <a:schemeClr val="accent3"/>
-          </a:lnRef>
-          <a:fillRef idx="2">
-            <a:schemeClr val="accent3"/>
-          </a:fillRef>
-          <a:effectRef idx="1">
-            <a:schemeClr val="accent3"/>
-          </a:effectRef>
-          <a:fontRef idx="minor">
-            <a:schemeClr val="dk1"/>
-          </a:fontRef>
-        </p:style>
-        <p:txBody>
-          <a:bodyPr rtlCol="0" anchor="ctr"/>
-          <a:lstStyle/>
-          <a:p>
-            <a:pPr algn="ctr"/>
-            <a:endParaRPr lang="en-SG" sz="1400">
-              <a:solidFill>
-                <a:schemeClr val="dk1"/>
-              </a:solidFill>
-            </a:endParaRPr>
-          </a:p>
-        </p:txBody>
-      </p:sp>
-      <p:grpSp>
-        <p:nvGrpSpPr>
-          <p:cNvPr id="7" name="Actor"/>
-          <p:cNvGrpSpPr/>
-          <p:nvPr/>
-        </p:nvGrpSpPr>
-        <p:grpSpPr>
-          <a:xfrm>
-            <a:off x="152400" y="533400"/>
-            <a:ext cx="324036" cy="573410"/>
-            <a:chOff x="3239901" y="4149080"/>
-            <a:chExt cx="648072" cy="1146820"/>
-          </a:xfrm>
-        </p:grpSpPr>
-        <p:sp>
-          <p:nvSpPr>
-            <p:cNvPr id="8" name="Flowchart: Connector 7"/>
-            <p:cNvSpPr/>
-            <p:nvPr/>
-          </p:nvSpPr>
-          <p:spPr>
-            <a:xfrm>
-              <a:off x="3419872" y="4149080"/>
-              <a:ext cx="288032" cy="288032"/>
-            </a:xfrm>
-            <a:prstGeom prst="flowChartConnector">
-              <a:avLst/>
-            </a:prstGeom>
-            <a:solidFill>
-              <a:schemeClr val="bg1">
-                <a:lumMod val="85000"/>
-              </a:schemeClr>
-            </a:solidFill>
-            <a:ln w="28575">
-              <a:solidFill>
-                <a:schemeClr val="tx1"/>
-              </a:solidFill>
-            </a:ln>
-            <a:effectLst/>
-          </p:spPr>
-          <p:style>
-            <a:lnRef idx="1">
-              <a:schemeClr val="accent4"/>
-            </a:lnRef>
-            <a:fillRef idx="2">
-              <a:schemeClr val="accent4"/>
-            </a:fillRef>
-            <a:effectRef idx="1">
-              <a:schemeClr val="accent4"/>
-            </a:effectRef>
-            <a:fontRef idx="minor">
-              <a:schemeClr val="dk1"/>
-            </a:fontRef>
-          </p:style>
-          <p:txBody>
-            <a:bodyPr rtlCol="0" anchor="ctr"/>
-            <a:lstStyle/>
-            <a:p>
-              <a:pPr algn="ctr"/>
-              <a:endParaRPr lang="en-SG"/>
-            </a:p>
-          </p:txBody>
-        </p:sp>
-        <p:cxnSp>
-          <p:nvCxnSpPr>
-            <p:cNvPr id="9" name="Straight Connector 8"/>
-            <p:cNvCxnSpPr>
-              <a:stCxn id="8" idx="4"/>
-            </p:cNvCxnSpPr>
-            <p:nvPr/>
-          </p:nvCxnSpPr>
-          <p:spPr>
-            <a:xfrm>
-              <a:off x="3563888" y="4437112"/>
-              <a:ext cx="0" cy="504056"/>
-            </a:xfrm>
-            <a:prstGeom prst="line">
-              <a:avLst/>
-            </a:prstGeom>
-            <a:ln w="28575">
-              <a:solidFill>
-                <a:schemeClr val="tx1"/>
-              </a:solidFill>
-            </a:ln>
-            <a:effectLst/>
-          </p:spPr>
-          <p:style>
-            <a:lnRef idx="1">
-              <a:schemeClr val="accent4"/>
-            </a:lnRef>
-            <a:fillRef idx="2">
-              <a:schemeClr val="accent4"/>
-            </a:fillRef>
-            <a:effectRef idx="1">
-              <a:schemeClr val="accent4"/>
-            </a:effectRef>
-            <a:fontRef idx="minor">
-              <a:schemeClr val="dk1"/>
-            </a:fontRef>
-          </p:style>
-        </p:cxnSp>
-        <p:sp>
-          <p:nvSpPr>
-            <p:cNvPr id="10" name="Freeform 9"/>
-            <p:cNvSpPr/>
-            <p:nvPr/>
-          </p:nvSpPr>
-          <p:spPr>
-            <a:xfrm>
-              <a:off x="3324225" y="4933950"/>
-              <a:ext cx="479425" cy="361950"/>
-            </a:xfrm>
-            <a:custGeom>
-              <a:avLst/>
-              <a:gdLst>
-                <a:gd name="connsiteX0" fmla="*/ 0 w 479425"/>
-                <a:gd name="connsiteY0" fmla="*/ 355600 h 361950"/>
-                <a:gd name="connsiteX1" fmla="*/ 241300 w 479425"/>
-                <a:gd name="connsiteY1" fmla="*/ 0 h 361950"/>
-                <a:gd name="connsiteX2" fmla="*/ 479425 w 479425"/>
-                <a:gd name="connsiteY2" fmla="*/ 361950 h 361950"/>
-              </a:gdLst>
-              <a:ahLst/>
-              <a:cxnLst>
-                <a:cxn ang="0">
-                  <a:pos x="connsiteX0" y="connsiteY0"/>
-                </a:cxn>
-                <a:cxn ang="0">
-                  <a:pos x="connsiteX1" y="connsiteY1"/>
-                </a:cxn>
-                <a:cxn ang="0">
-                  <a:pos x="connsiteX2" y="connsiteY2"/>
-                </a:cxn>
-              </a:cxnLst>
-              <a:rect l="l" t="t" r="r" b="b"/>
-              <a:pathLst>
-                <a:path w="479425" h="361950">
-                  <a:moveTo>
-                    <a:pt x="0" y="355600"/>
-                  </a:moveTo>
-                  <a:lnTo>
-                    <a:pt x="241300" y="0"/>
-                  </a:lnTo>
-                  <a:lnTo>
-                    <a:pt x="479425" y="361950"/>
-                  </a:lnTo>
-                </a:path>
-              </a:pathLst>
-            </a:custGeom>
-            <a:noFill/>
-            <a:ln w="28575">
-              <a:solidFill>
-                <a:schemeClr val="tx1"/>
-              </a:solidFill>
-            </a:ln>
-            <a:effectLst/>
-          </p:spPr>
-          <p:style>
-            <a:lnRef idx="1">
-              <a:schemeClr val="accent4"/>
-            </a:lnRef>
-            <a:fillRef idx="2">
-              <a:schemeClr val="accent4"/>
-            </a:fillRef>
-            <a:effectRef idx="1">
-              <a:schemeClr val="accent4"/>
-            </a:effectRef>
-            <a:fontRef idx="minor">
-              <a:schemeClr val="dk1"/>
-            </a:fontRef>
-          </p:style>
-          <p:txBody>
-            <a:bodyPr rtlCol="0" anchor="ctr"/>
-            <a:lstStyle/>
-            <a:p>
-              <a:pPr algn="ctr"/>
-              <a:endParaRPr lang="en-SG"/>
-            </a:p>
-          </p:txBody>
-        </p:sp>
-        <p:cxnSp>
-          <p:nvCxnSpPr>
-            <p:cNvPr id="11" name="Straight Connector 10"/>
-            <p:cNvCxnSpPr/>
-            <p:nvPr/>
-          </p:nvCxnSpPr>
-          <p:spPr>
-            <a:xfrm>
-              <a:off x="3239901" y="4509120"/>
-              <a:ext cx="648072" cy="0"/>
-            </a:xfrm>
-            <a:prstGeom prst="line">
-              <a:avLst/>
-            </a:prstGeom>
-            <a:ln w="28575">
-              <a:solidFill>
-                <a:schemeClr val="tx1"/>
-              </a:solidFill>
-            </a:ln>
-            <a:effectLst/>
-          </p:spPr>
-          <p:style>
-            <a:lnRef idx="1">
-              <a:schemeClr val="accent4"/>
-            </a:lnRef>
-            <a:fillRef idx="2">
-              <a:schemeClr val="accent4"/>
-            </a:fillRef>
-            <a:effectRef idx="1">
-              <a:schemeClr val="accent4"/>
-            </a:effectRef>
-            <a:fontRef idx="minor">
-              <a:schemeClr val="dk1"/>
-            </a:fontRef>
-          </p:style>
-        </p:cxnSp>
-      </p:grpSp>
-      <p:sp>
-        <p:nvSpPr>
-          <p:cNvPr id="16" name="Rectangle 62"/>
-          <p:cNvSpPr/>
-          <p:nvPr/>
-        </p:nvSpPr>
-        <p:spPr>
-          <a:xfrm>
-            <a:off x="3335583" y="611613"/>
-            <a:ext cx="1093635" cy="346760"/>
-          </a:xfrm>
-          <a:prstGeom prst="rect">
-            <a:avLst/>
-          </a:prstGeom>
-          <a:solidFill>
-            <a:srgbClr val="0070C0"/>
-          </a:solidFill>
-          <a:ln w="19050">
-            <a:solidFill>
-              <a:srgbClr val="0070C0"/>
-            </a:solidFill>
-          </a:ln>
-          <a:effectLst/>
-        </p:spPr>
-        <p:style>
-          <a:lnRef idx="1">
-            <a:schemeClr val="accent2"/>
-          </a:lnRef>
-          <a:fillRef idx="2">
-            <a:schemeClr val="accent2"/>
-          </a:fillRef>
-          <a:effectRef idx="1">
-            <a:schemeClr val="accent2"/>
-          </a:effectRef>
-          <a:fontRef idx="minor">
-            <a:schemeClr val="dk1"/>
-          </a:fontRef>
-        </p:style>
-        <p:txBody>
-          <a:bodyPr rtlCol="0" anchor="ctr"/>
-          <a:lstStyle/>
-          <a:p>
-            <a:pPr algn="ctr"/>
-            <a:r>
-              <a:rPr lang="en-US" sz="1600" dirty="0" smtClean="0">
-                <a:solidFill>
-                  <a:schemeClr val="bg1"/>
-                </a:solidFill>
-              </a:rPr>
-              <a:t>:Logic</a:t>
-            </a:r>
-            <a:endParaRPr lang="en-SG" sz="1600" dirty="0">
-              <a:solidFill>
-                <a:schemeClr val="bg1"/>
-              </a:solidFill>
-            </a:endParaRPr>
-          </a:p>
-        </p:txBody>
-      </p:sp>
-      <p:cxnSp>
-        <p:nvCxnSpPr>
-          <p:cNvPr id="17" name="Straight Connector 16"/>
-          <p:cNvCxnSpPr/>
-          <p:nvPr/>
-        </p:nvCxnSpPr>
-        <p:spPr>
-          <a:xfrm>
-            <a:off x="3882400" y="975284"/>
-            <a:ext cx="0" cy="1723059"/>
-          </a:xfrm>
-          <a:prstGeom prst="line">
-            <a:avLst/>
-          </a:prstGeom>
-          <a:ln w="19050">
-            <a:solidFill>
-              <a:srgbClr val="0070C0"/>
-            </a:solidFill>
-            <a:prstDash val="sysDash"/>
-          </a:ln>
-          <a:effectLst/>
-        </p:spPr>
-        <p:style>
-          <a:lnRef idx="1">
-            <a:schemeClr val="accent1"/>
-          </a:lnRef>
-          <a:fillRef idx="2">
-            <a:schemeClr val="accent1"/>
-          </a:fillRef>
-          <a:effectRef idx="1">
-            <a:schemeClr val="accent1"/>
-          </a:effectRef>
-          <a:fontRef idx="minor">
-            <a:schemeClr val="dk1"/>
-          </a:fontRef>
-        </p:style>
-      </p:cxnSp>
-      <p:sp>
-        <p:nvSpPr>
-          <p:cNvPr id="18" name="Rectangle 17"/>
-          <p:cNvSpPr/>
-          <p:nvPr/>
-        </p:nvSpPr>
-        <p:spPr>
-          <a:xfrm>
-            <a:off x="3810392" y="1433477"/>
-            <a:ext cx="144016" cy="832525"/>
-          </a:xfrm>
-          <a:prstGeom prst="rect">
-            <a:avLst/>
-          </a:prstGeom>
-          <a:solidFill>
-            <a:srgbClr val="0070C0"/>
-          </a:solidFill>
-          <a:ln>
-            <a:solidFill>
-              <a:srgbClr val="0070C0"/>
-            </a:solidFill>
-          </a:ln>
-          <a:effectLst/>
-        </p:spPr>
-        <p:style>
-          <a:lnRef idx="1">
-            <a:schemeClr val="accent3"/>
-          </a:lnRef>
-          <a:fillRef idx="2">
-            <a:schemeClr val="accent3"/>
-          </a:fillRef>
-          <a:effectRef idx="1">
-            <a:schemeClr val="accent3"/>
-          </a:effectRef>
-          <a:fontRef idx="minor">
-            <a:schemeClr val="dk1"/>
-          </a:fontRef>
-        </p:style>
-        <p:txBody>
-          <a:bodyPr rtlCol="0" anchor="ctr"/>
-          <a:lstStyle/>
-          <a:p>
-            <a:pPr algn="ctr"/>
-            <a:endParaRPr lang="en-SG" sz="1400">
-              <a:solidFill>
-                <a:schemeClr val="dk1"/>
-              </a:solidFill>
-            </a:endParaRPr>
-          </a:p>
-        </p:txBody>
-      </p:sp>
-      <p:sp>
-        <p:nvSpPr>
-          <p:cNvPr id="19" name="Rectangle 62"/>
-          <p:cNvSpPr/>
-          <p:nvPr/>
-        </p:nvSpPr>
-        <p:spPr>
-          <a:xfrm>
-            <a:off x="5316783" y="607926"/>
-            <a:ext cx="1093635" cy="346760"/>
-          </a:xfrm>
-          <a:prstGeom prst="rect">
-            <a:avLst/>
-          </a:prstGeom>
-          <a:solidFill>
-            <a:srgbClr val="7030A0"/>
-          </a:solidFill>
-          <a:ln w="19050">
-            <a:solidFill>
-              <a:srgbClr val="7030A0"/>
-            </a:solidFill>
-          </a:ln>
-          <a:effectLst/>
-        </p:spPr>
-        <p:style>
-          <a:lnRef idx="1">
-            <a:schemeClr val="accent2"/>
-          </a:lnRef>
-          <a:fillRef idx="2">
-            <a:schemeClr val="accent2"/>
-          </a:fillRef>
-          <a:effectRef idx="1">
-            <a:schemeClr val="accent2"/>
-          </a:effectRef>
-          <a:fontRef idx="minor">
-            <a:schemeClr val="dk1"/>
-          </a:fontRef>
-        </p:style>
-        <p:txBody>
-          <a:bodyPr rtlCol="0" anchor="ctr"/>
-          <a:lstStyle/>
-          <a:p>
-            <a:pPr algn="ctr"/>
-            <a:r>
-              <a:rPr lang="en-US" sz="1600" dirty="0" smtClean="0">
-                <a:solidFill>
-                  <a:schemeClr val="bg1"/>
-                </a:solidFill>
-              </a:rPr>
-              <a:t>:Model</a:t>
-            </a:r>
-            <a:endParaRPr lang="en-SG" sz="1600" dirty="0">
-              <a:solidFill>
-                <a:schemeClr val="bg1"/>
-              </a:solidFill>
-            </a:endParaRPr>
-          </a:p>
-        </p:txBody>
-      </p:sp>
-      <p:cxnSp>
-        <p:nvCxnSpPr>
-          <p:cNvPr id="20" name="Straight Connector 19"/>
-          <p:cNvCxnSpPr/>
-          <p:nvPr/>
-        </p:nvCxnSpPr>
-        <p:spPr>
-          <a:xfrm>
-            <a:off x="5863600" y="971597"/>
-            <a:ext cx="0" cy="1723059"/>
-          </a:xfrm>
-          <a:prstGeom prst="line">
-            <a:avLst/>
-          </a:prstGeom>
-          <a:ln w="19050">
-            <a:solidFill>
-              <a:srgbClr val="7030A0"/>
-            </a:solidFill>
-            <a:prstDash val="sysDash"/>
-          </a:ln>
-          <a:effectLst/>
-        </p:spPr>
-        <p:style>
-          <a:lnRef idx="1">
-            <a:schemeClr val="accent1"/>
-          </a:lnRef>
-          <a:fillRef idx="2">
-            <a:schemeClr val="accent1"/>
-          </a:fillRef>
-          <a:effectRef idx="1">
-            <a:schemeClr val="accent1"/>
-          </a:effectRef>
-          <a:fontRef idx="minor">
-            <a:schemeClr val="dk1"/>
-          </a:fontRef>
-        </p:style>
-      </p:cxnSp>
-      <p:sp>
-        <p:nvSpPr>
-          <p:cNvPr id="21" name="Rectangle 20"/>
-          <p:cNvSpPr/>
-          <p:nvPr/>
-        </p:nvSpPr>
-        <p:spPr>
-          <a:xfrm>
-            <a:off x="5791592" y="1538408"/>
-            <a:ext cx="142006" cy="651394"/>
-          </a:xfrm>
-          <a:prstGeom prst="rect">
-            <a:avLst/>
-          </a:prstGeom>
-          <a:solidFill>
-            <a:srgbClr val="7030A0"/>
-          </a:solidFill>
-          <a:ln>
-            <a:solidFill>
-              <a:srgbClr val="7030A0"/>
-            </a:solidFill>
-          </a:ln>
-          <a:effectLst/>
-        </p:spPr>
-        <p:style>
-          <a:lnRef idx="1">
-            <a:schemeClr val="accent3"/>
-          </a:lnRef>
-          <a:fillRef idx="2">
-            <a:schemeClr val="accent3"/>
-          </a:fillRef>
-          <a:effectRef idx="1">
-            <a:schemeClr val="accent3"/>
-          </a:effectRef>
-          <a:fontRef idx="minor">
-            <a:schemeClr val="dk1"/>
-          </a:fontRef>
-        </p:style>
-        <p:txBody>
-          <a:bodyPr rtlCol="0" anchor="ctr"/>
-          <a:lstStyle/>
-          <a:p>
-            <a:pPr algn="ctr"/>
-            <a:endParaRPr lang="en-SG" sz="1400">
-              <a:solidFill>
-                <a:schemeClr val="dk1"/>
-              </a:solidFill>
-            </a:endParaRPr>
-          </a:p>
-        </p:txBody>
-      </p:sp>
-      <p:cxnSp>
-        <p:nvCxnSpPr>
-          <p:cNvPr id="23" name="Straight Arrow Connector 22"/>
-          <p:cNvCxnSpPr/>
-          <p:nvPr/>
-        </p:nvCxnSpPr>
-        <p:spPr>
-          <a:xfrm>
-            <a:off x="466818" y="1325979"/>
-            <a:ext cx="1119851" cy="0"/>
-          </a:xfrm>
-          <a:prstGeom prst="straightConnector1">
-            <a:avLst/>
-          </a:prstGeom>
-          <a:ln w="19050">
-            <a:solidFill>
-              <a:schemeClr val="tx1"/>
-            </a:solidFill>
-            <a:tailEnd type="arrow"/>
-          </a:ln>
-        </p:spPr>
-        <p:style>
-          <a:lnRef idx="1">
-            <a:schemeClr val="accent1"/>
-          </a:lnRef>
-          <a:fillRef idx="0">
-            <a:schemeClr val="accent1"/>
-          </a:fillRef>
-          <a:effectRef idx="0">
-            <a:schemeClr val="accent1"/>
-          </a:effectRef>
-          <a:fontRef idx="minor">
-            <a:schemeClr val="tx1"/>
-          </a:fontRef>
-        </p:style>
-      </p:cxnSp>
-      <p:sp>
-        <p:nvSpPr>
-          <p:cNvPr id="24" name="TextBox 23"/>
-          <p:cNvSpPr txBox="1"/>
-          <p:nvPr/>
-        </p:nvSpPr>
-        <p:spPr>
-          <a:xfrm>
-            <a:off x="466817" y="1345880"/>
-            <a:ext cx="1015480" cy="215444"/>
-          </a:xfrm>
-          <a:prstGeom prst="rect">
-            <a:avLst/>
-          </a:prstGeom>
-          <a:noFill/>
-        </p:spPr>
-        <p:txBody>
-          <a:bodyPr wrap="square" lIns="0" tIns="0" rIns="0" bIns="0" rtlCol="0">
-            <a:spAutoFit/>
-          </a:bodyPr>
-          <a:lstStyle/>
-          <a:p>
-            <a:r>
-              <a:rPr lang="en-US" sz="1400" dirty="0" smtClean="0"/>
-              <a:t>delete </a:t>
-            </a:r>
-            <a:r>
-              <a:rPr lang="en-US" sz="1400" dirty="0" smtClean="0"/>
-              <a:t>friends</a:t>
-            </a:r>
-            <a:endParaRPr lang="en-US" sz="1400" dirty="0"/>
-          </a:p>
-        </p:txBody>
-      </p:sp>
-      <p:cxnSp>
-        <p:nvCxnSpPr>
-          <p:cNvPr id="25" name="Straight Arrow Connector 24"/>
-          <p:cNvCxnSpPr/>
-          <p:nvPr/>
-        </p:nvCxnSpPr>
-        <p:spPr>
-          <a:xfrm>
-            <a:off x="1739069" y="1433478"/>
-            <a:ext cx="2071323" cy="0"/>
-          </a:xfrm>
-          <a:prstGeom prst="straightConnector1">
-            <a:avLst/>
-          </a:prstGeom>
-          <a:ln w="19050">
-            <a:solidFill>
-              <a:srgbClr val="00B050"/>
-            </a:solidFill>
-            <a:tailEnd type="arrow"/>
-          </a:ln>
-        </p:spPr>
-        <p:style>
-          <a:lnRef idx="1">
-            <a:schemeClr val="accent1"/>
-          </a:lnRef>
-          <a:fillRef idx="0">
-            <a:schemeClr val="accent1"/>
-          </a:fillRef>
-          <a:effectRef idx="0">
-            <a:schemeClr val="accent1"/>
-          </a:effectRef>
-          <a:fontRef idx="minor">
-            <a:schemeClr val="tx1"/>
-          </a:fontRef>
-        </p:style>
-      </p:cxnSp>
-      <p:sp>
-        <p:nvSpPr>
-          <p:cNvPr id="26" name="TextBox 25"/>
-          <p:cNvSpPr txBox="1"/>
-          <p:nvPr/>
-        </p:nvSpPr>
-        <p:spPr>
-          <a:xfrm>
-            <a:off x="1837124" y="1453602"/>
-            <a:ext cx="1908358" cy="215444"/>
-          </a:xfrm>
-          <a:prstGeom prst="rect">
-            <a:avLst/>
-          </a:prstGeom>
-          <a:noFill/>
-        </p:spPr>
-        <p:txBody>
-          <a:bodyPr wrap="square" lIns="0" tIns="0" rIns="0" bIns="0" rtlCol="0">
-            <a:spAutoFit/>
-          </a:bodyPr>
-          <a:lstStyle/>
-          <a:p>
-            <a:r>
-              <a:rPr lang="en-US" sz="1400" dirty="0" smtClean="0">
-                <a:solidFill>
-                  <a:srgbClr val="0070C0"/>
-                </a:solidFill>
-              </a:rPr>
-              <a:t>execute(“delete </a:t>
-            </a:r>
-            <a:r>
-              <a:rPr lang="en-US" sz="1400" dirty="0" smtClean="0">
-                <a:solidFill>
-                  <a:srgbClr val="0070C0"/>
-                </a:solidFill>
-              </a:rPr>
-              <a:t>friends”)</a:t>
-            </a:r>
-            <a:endParaRPr lang="en-US" sz="1400" dirty="0">
-              <a:solidFill>
-                <a:srgbClr val="0070C0"/>
-              </a:solidFill>
-            </a:endParaRPr>
-          </a:p>
-        </p:txBody>
-      </p:sp>
-      <p:cxnSp>
-        <p:nvCxnSpPr>
-          <p:cNvPr id="28" name="Straight Arrow Connector 27"/>
-          <p:cNvCxnSpPr/>
-          <p:nvPr/>
-        </p:nvCxnSpPr>
-        <p:spPr>
-          <a:xfrm>
-            <a:off x="3954408" y="1538409"/>
-            <a:ext cx="1837184" cy="0"/>
-          </a:xfrm>
-          <a:prstGeom prst="straightConnector1">
-            <a:avLst/>
-          </a:prstGeom>
-          <a:ln w="19050">
-            <a:solidFill>
-              <a:srgbClr val="0070C0"/>
-            </a:solidFill>
-            <a:tailEnd type="arrow"/>
-          </a:ln>
-        </p:spPr>
-        <p:style>
-          <a:lnRef idx="1">
-            <a:schemeClr val="accent1"/>
-          </a:lnRef>
-          <a:fillRef idx="0">
-            <a:schemeClr val="accent1"/>
-          </a:fillRef>
-          <a:effectRef idx="0">
-            <a:schemeClr val="accent1"/>
-          </a:effectRef>
-          <a:fontRef idx="minor">
-            <a:schemeClr val="tx1"/>
-          </a:fontRef>
-        </p:style>
-      </p:cxnSp>
-      <p:sp>
-        <p:nvSpPr>
-          <p:cNvPr id="29" name="TextBox 28"/>
-          <p:cNvSpPr txBox="1"/>
-          <p:nvPr/>
-        </p:nvSpPr>
-        <p:spPr>
-          <a:xfrm>
-            <a:off x="4022833" y="1534924"/>
-            <a:ext cx="1736395" cy="215444"/>
-          </a:xfrm>
-          <a:prstGeom prst="rect">
-            <a:avLst/>
-          </a:prstGeom>
-          <a:noFill/>
-        </p:spPr>
-        <p:txBody>
-          <a:bodyPr wrap="square" lIns="0" tIns="0" rIns="0" bIns="0" rtlCol="0">
-            <a:spAutoFit/>
-          </a:bodyPr>
-          <a:lstStyle/>
-          <a:p>
-            <a:r>
-              <a:rPr lang="en-US" sz="1400" dirty="0" err="1" smtClean="0">
-                <a:solidFill>
-                  <a:srgbClr val="7030A0"/>
-                </a:solidFill>
-              </a:rPr>
-              <a:t>deleteLabelFromTask</a:t>
-            </a:r>
-            <a:r>
-              <a:rPr lang="en-US" sz="1400" dirty="0" smtClean="0">
-                <a:solidFill>
-                  <a:srgbClr val="7030A0"/>
-                </a:solidFill>
-              </a:rPr>
-              <a:t>(t)</a:t>
-            </a:r>
-            <a:endParaRPr lang="en-US" sz="1400" dirty="0">
-              <a:solidFill>
-                <a:srgbClr val="7030A0"/>
-              </a:solidFill>
-            </a:endParaRPr>
-          </a:p>
-        </p:txBody>
-      </p:sp>
-      <p:sp>
-        <p:nvSpPr>
-          <p:cNvPr id="33" name="TextBox 32"/>
-          <p:cNvSpPr txBox="1"/>
-          <p:nvPr/>
-        </p:nvSpPr>
-        <p:spPr>
-          <a:xfrm>
-            <a:off x="6074030" y="1687656"/>
-            <a:ext cx="2438400" cy="215444"/>
-          </a:xfrm>
-          <a:prstGeom prst="rect">
-            <a:avLst/>
-          </a:prstGeom>
-          <a:noFill/>
-        </p:spPr>
-        <p:txBody>
-          <a:bodyPr wrap="square" lIns="0" tIns="0" rIns="0" bIns="0" rtlCol="0">
-            <a:spAutoFit/>
-          </a:bodyPr>
-          <a:lstStyle/>
-          <a:p>
-            <a:r>
-              <a:rPr lang="en-US" sz="1400" dirty="0" smtClean="0">
-                <a:solidFill>
-                  <a:schemeClr val="accent5">
-                    <a:lumMod val="75000"/>
-                  </a:schemeClr>
-                </a:solidFill>
-              </a:rPr>
-              <a:t>post(</a:t>
-            </a:r>
-            <a:r>
-              <a:rPr lang="en-US" sz="1400" dirty="0" err="1" smtClean="0">
-                <a:solidFill>
-                  <a:schemeClr val="accent5">
-                    <a:lumMod val="75000"/>
-                  </a:schemeClr>
-                </a:solidFill>
-              </a:rPr>
-              <a:t>AddressBookChangedEvent</a:t>
-            </a:r>
-            <a:r>
-              <a:rPr lang="en-US" sz="1400" dirty="0" smtClean="0">
-                <a:solidFill>
-                  <a:schemeClr val="accent5">
-                    <a:lumMod val="75000"/>
-                  </a:schemeClr>
-                </a:solidFill>
-              </a:rPr>
-              <a:t>)</a:t>
-            </a:r>
-            <a:endParaRPr lang="en-US" sz="1400" dirty="0">
-              <a:solidFill>
-                <a:schemeClr val="accent5">
-                  <a:lumMod val="75000"/>
-                </a:schemeClr>
-              </a:solidFill>
-            </a:endParaRPr>
-          </a:p>
-        </p:txBody>
-      </p:sp>
-      <p:cxnSp>
-        <p:nvCxnSpPr>
-          <p:cNvPr id="34" name="Straight Arrow Connector 33"/>
-          <p:cNvCxnSpPr/>
-          <p:nvPr/>
-        </p:nvCxnSpPr>
-        <p:spPr>
-          <a:xfrm>
-            <a:off x="3954408" y="2190681"/>
-            <a:ext cx="1837184" cy="0"/>
-          </a:xfrm>
-          <a:prstGeom prst="straightConnector1">
-            <a:avLst/>
-          </a:prstGeom>
-          <a:ln w="19050">
-            <a:solidFill>
-              <a:srgbClr val="7030A0"/>
-            </a:solidFill>
-            <a:prstDash val="sysDash"/>
-            <a:headEnd type="arrow" w="med" len="med"/>
-            <a:tailEnd type="none" w="med" len="med"/>
-          </a:ln>
-        </p:spPr>
-        <p:style>
-          <a:lnRef idx="1">
-            <a:schemeClr val="accent1"/>
-          </a:lnRef>
-          <a:fillRef idx="0">
-            <a:schemeClr val="accent1"/>
-          </a:fillRef>
-          <a:effectRef idx="0">
-            <a:schemeClr val="accent1"/>
-          </a:effectRef>
-          <a:fontRef idx="minor">
-            <a:schemeClr val="tx1"/>
-          </a:fontRef>
-        </p:style>
-      </p:cxnSp>
-      <p:cxnSp>
-        <p:nvCxnSpPr>
-          <p:cNvPr id="35" name="Straight Arrow Connector 34"/>
-          <p:cNvCxnSpPr/>
-          <p:nvPr/>
-        </p:nvCxnSpPr>
-        <p:spPr>
-          <a:xfrm>
-            <a:off x="1739069" y="2266002"/>
-            <a:ext cx="2058118" cy="0"/>
-          </a:xfrm>
-          <a:prstGeom prst="straightConnector1">
-            <a:avLst/>
-          </a:prstGeom>
-          <a:ln w="19050">
-            <a:solidFill>
-              <a:srgbClr val="0070C0"/>
-            </a:solidFill>
-            <a:prstDash val="sysDash"/>
-            <a:headEnd type="arrow" w="med" len="med"/>
-            <a:tailEnd type="none" w="med" len="med"/>
-          </a:ln>
-        </p:spPr>
-        <p:style>
-          <a:lnRef idx="1">
-            <a:schemeClr val="accent1"/>
-          </a:lnRef>
-          <a:fillRef idx="0">
-            <a:schemeClr val="accent1"/>
-          </a:fillRef>
-          <a:effectRef idx="0">
-            <a:schemeClr val="accent1"/>
-          </a:effectRef>
-          <a:fontRef idx="minor">
-            <a:schemeClr val="tx1"/>
-          </a:fontRef>
-        </p:style>
-      </p:cxnSp>
-      <p:cxnSp>
-        <p:nvCxnSpPr>
-          <p:cNvPr id="37" name="Straight Arrow Connector 36"/>
-          <p:cNvCxnSpPr/>
-          <p:nvPr/>
-        </p:nvCxnSpPr>
-        <p:spPr>
-          <a:xfrm>
-            <a:off x="390618" y="2342202"/>
-            <a:ext cx="1196051" cy="0"/>
-          </a:xfrm>
-          <a:prstGeom prst="straightConnector1">
-            <a:avLst/>
-          </a:prstGeom>
-          <a:ln w="19050">
-            <a:solidFill>
-              <a:srgbClr val="00B050"/>
-            </a:solidFill>
-            <a:prstDash val="sysDash"/>
-            <a:headEnd type="arrow" w="med" len="med"/>
-            <a:tailEnd type="none" w="med" len="med"/>
-          </a:ln>
-        </p:spPr>
-        <p:style>
-          <a:lnRef idx="1">
-            <a:schemeClr val="accent1"/>
-          </a:lnRef>
-          <a:fillRef idx="0">
-            <a:schemeClr val="accent1"/>
-          </a:fillRef>
-          <a:effectRef idx="0">
-            <a:schemeClr val="accent1"/>
-          </a:effectRef>
-          <a:fontRef idx="minor">
-            <a:schemeClr val="tx1"/>
-          </a:fontRef>
-        </p:style>
-      </p:cxnSp>
-      <p:sp>
-        <p:nvSpPr>
-          <p:cNvPr id="39" name="Rectangle 62"/>
-          <p:cNvSpPr/>
-          <p:nvPr/>
-        </p:nvSpPr>
-        <p:spPr>
-          <a:xfrm>
-            <a:off x="7696200" y="591251"/>
-            <a:ext cx="1371600" cy="346760"/>
-          </a:xfrm>
-          <a:prstGeom prst="rect">
-            <a:avLst/>
-          </a:prstGeom>
-          <a:solidFill>
-            <a:schemeClr val="accent5">
-              <a:lumMod val="75000"/>
-            </a:schemeClr>
-          </a:solidFill>
-          <a:ln w="19050">
-            <a:solidFill>
-              <a:schemeClr val="accent5">
-                <a:lumMod val="75000"/>
-              </a:schemeClr>
-            </a:solidFill>
-          </a:ln>
-          <a:effectLst/>
-        </p:spPr>
-        <p:style>
-          <a:lnRef idx="1">
-            <a:schemeClr val="accent2"/>
-          </a:lnRef>
-          <a:fillRef idx="2">
-            <a:schemeClr val="accent2"/>
-          </a:fillRef>
-          <a:effectRef idx="1">
-            <a:schemeClr val="accent2"/>
-          </a:effectRef>
-          <a:fontRef idx="minor">
-            <a:schemeClr val="dk1"/>
-          </a:fontRef>
-        </p:style>
-        <p:txBody>
-          <a:bodyPr rtlCol="0" anchor="ctr"/>
-          <a:lstStyle/>
-          <a:p>
-            <a:pPr algn="ctr"/>
-            <a:r>
-              <a:rPr lang="en-US" sz="1600" dirty="0" smtClean="0">
-                <a:solidFill>
-                  <a:schemeClr val="bg1"/>
-                </a:solidFill>
-              </a:rPr>
-              <a:t>:</a:t>
-            </a:r>
-            <a:r>
-              <a:rPr lang="en-US" sz="1600" dirty="0" err="1" smtClean="0">
-                <a:solidFill>
-                  <a:schemeClr val="bg1"/>
-                </a:solidFill>
-              </a:rPr>
-              <a:t>EventsCenter</a:t>
-            </a:r>
-            <a:endParaRPr lang="en-SG" sz="1600" dirty="0">
-              <a:solidFill>
-                <a:schemeClr val="bg1"/>
-              </a:solidFill>
-            </a:endParaRPr>
-          </a:p>
-        </p:txBody>
-      </p:sp>
-      <p:cxnSp>
-        <p:nvCxnSpPr>
-          <p:cNvPr id="40" name="Straight Connector 39"/>
-          <p:cNvCxnSpPr/>
-          <p:nvPr/>
-        </p:nvCxnSpPr>
-        <p:spPr>
-          <a:xfrm>
-            <a:off x="8616802" y="944305"/>
-            <a:ext cx="0" cy="1723059"/>
-          </a:xfrm>
-          <a:prstGeom prst="line">
-            <a:avLst/>
-          </a:prstGeom>
-          <a:ln w="19050">
-            <a:solidFill>
-              <a:schemeClr val="accent5">
-                <a:lumMod val="75000"/>
-              </a:schemeClr>
-            </a:solidFill>
-            <a:prstDash val="sysDash"/>
-          </a:ln>
-          <a:effectLst/>
-        </p:spPr>
-        <p:style>
-          <a:lnRef idx="1">
-            <a:schemeClr val="accent1"/>
-          </a:lnRef>
-          <a:fillRef idx="2">
-            <a:schemeClr val="accent1"/>
-          </a:fillRef>
-          <a:effectRef idx="1">
-            <a:schemeClr val="accent1"/>
-          </a:effectRef>
-          <a:fontRef idx="minor">
-            <a:schemeClr val="dk1"/>
-          </a:fontRef>
-        </p:style>
-      </p:cxnSp>
-      <p:sp>
-        <p:nvSpPr>
-          <p:cNvPr id="41" name="Rectangle 40"/>
-          <p:cNvSpPr/>
-          <p:nvPr/>
-        </p:nvSpPr>
-        <p:spPr>
-          <a:xfrm>
-            <a:off x="8544794" y="1961202"/>
-            <a:ext cx="142006" cy="176787"/>
-          </a:xfrm>
-          <a:prstGeom prst="rect">
-            <a:avLst/>
-          </a:prstGeom>
-          <a:solidFill>
-            <a:schemeClr val="accent5">
-              <a:lumMod val="75000"/>
-            </a:schemeClr>
-          </a:solidFill>
-          <a:ln>
-            <a:solidFill>
-              <a:schemeClr val="accent5">
-                <a:lumMod val="75000"/>
-              </a:schemeClr>
-            </a:solidFill>
-          </a:ln>
-          <a:effectLst/>
-        </p:spPr>
-        <p:style>
-          <a:lnRef idx="1">
-            <a:schemeClr val="accent3"/>
-          </a:lnRef>
-          <a:fillRef idx="2">
-            <a:schemeClr val="accent3"/>
-          </a:fillRef>
-          <a:effectRef idx="1">
-            <a:schemeClr val="accent3"/>
-          </a:effectRef>
-          <a:fontRef idx="minor">
-            <a:schemeClr val="dk1"/>
-          </a:fontRef>
-        </p:style>
-        <p:txBody>
-          <a:bodyPr rtlCol="0" anchor="ctr"/>
-          <a:lstStyle/>
-          <a:p>
-            <a:pPr algn="ctr"/>
-            <a:endParaRPr lang="en-SG" sz="1400">
-              <a:solidFill>
-                <a:schemeClr val="dk1"/>
-              </a:solidFill>
-            </a:endParaRPr>
-          </a:p>
-        </p:txBody>
-      </p:sp>
-      <p:cxnSp>
-        <p:nvCxnSpPr>
-          <p:cNvPr id="42" name="Straight Arrow Connector 41"/>
-          <p:cNvCxnSpPr/>
-          <p:nvPr/>
-        </p:nvCxnSpPr>
-        <p:spPr>
-          <a:xfrm>
-            <a:off x="5943992" y="1961202"/>
-            <a:ext cx="2568438" cy="0"/>
-          </a:xfrm>
-          <a:prstGeom prst="straightConnector1">
-            <a:avLst/>
-          </a:prstGeom>
-          <a:ln w="19050">
-            <a:solidFill>
-              <a:srgbClr val="7030A0"/>
-            </a:solidFill>
-            <a:tailEnd type="arrow"/>
-          </a:ln>
-        </p:spPr>
-        <p:style>
-          <a:lnRef idx="1">
-            <a:schemeClr val="accent1"/>
-          </a:lnRef>
-          <a:fillRef idx="0">
-            <a:schemeClr val="accent1"/>
-          </a:fillRef>
-          <a:effectRef idx="0">
-            <a:schemeClr val="accent1"/>
-          </a:effectRef>
-          <a:fontRef idx="minor">
-            <a:schemeClr val="tx1"/>
-          </a:fontRef>
-        </p:style>
-      </p:cxnSp>
-      <p:cxnSp>
-        <p:nvCxnSpPr>
-          <p:cNvPr id="44" name="Straight Arrow Connector 43"/>
-          <p:cNvCxnSpPr/>
-          <p:nvPr/>
-        </p:nvCxnSpPr>
-        <p:spPr>
-          <a:xfrm>
-            <a:off x="5943992" y="2137989"/>
-            <a:ext cx="2549946" cy="0"/>
-          </a:xfrm>
-          <a:prstGeom prst="straightConnector1">
-            <a:avLst/>
-          </a:prstGeom>
-          <a:ln w="19050">
-            <a:solidFill>
-              <a:schemeClr val="accent5">
-                <a:lumMod val="75000"/>
-              </a:schemeClr>
-            </a:solidFill>
-            <a:prstDash val="sysDash"/>
-            <a:headEnd type="arrow" w="med" len="med"/>
-            <a:tailEnd type="none" w="med" len="med"/>
-          </a:ln>
-        </p:spPr>
-        <p:style>
-          <a:lnRef idx="1">
-            <a:schemeClr val="accent1"/>
-          </a:lnRef>
-          <a:fillRef idx="0">
-            <a:schemeClr val="accent1"/>
-          </a:fillRef>
-          <a:effectRef idx="0">
-            <a:schemeClr val="accent1"/>
-          </a:effectRef>
-          <a:fontRef idx="minor">
-            <a:schemeClr val="tx1"/>
-          </a:fontRef>
-        </p:style>
-      </p:cxnSp>
-      <p:cxnSp>
-        <p:nvCxnSpPr>
-          <p:cNvPr id="85" name="Straight Connector 84"/>
-          <p:cNvCxnSpPr/>
-          <p:nvPr/>
-        </p:nvCxnSpPr>
-        <p:spPr>
-          <a:xfrm flipH="1">
-            <a:off x="314394" y="1099672"/>
-            <a:ext cx="24" cy="1598671"/>
-          </a:xfrm>
-          <a:prstGeom prst="line">
-            <a:avLst/>
-          </a:prstGeom>
-          <a:ln w="19050">
-            <a:solidFill>
-              <a:schemeClr val="tx1"/>
-            </a:solidFill>
-            <a:prstDash val="sysDash"/>
-          </a:ln>
-          <a:effectLst/>
-        </p:spPr>
-        <p:style>
-          <a:lnRef idx="1">
-            <a:schemeClr val="accent1"/>
-          </a:lnRef>
-          <a:fillRef idx="2">
-            <a:schemeClr val="accent1"/>
-          </a:fillRef>
-          <a:effectRef idx="1">
-            <a:schemeClr val="accent1"/>
-          </a:effectRef>
-          <a:fontRef idx="minor">
-            <a:schemeClr val="dk1"/>
-          </a:fontRef>
-        </p:style>
-      </p:cxnSp>
-      <p:sp>
-        <p:nvSpPr>
-          <p:cNvPr id="71" name="Rectangle 62"/>
-          <p:cNvSpPr/>
-          <p:nvPr/>
-        </p:nvSpPr>
-        <p:spPr>
-          <a:xfrm>
-            <a:off x="1107673" y="4309495"/>
-            <a:ext cx="1093635" cy="346760"/>
-          </a:xfrm>
-          <a:prstGeom prst="rect">
-            <a:avLst/>
-          </a:prstGeom>
-          <a:solidFill>
-            <a:srgbClr val="00B050"/>
-          </a:solidFill>
-          <a:ln w="19050">
-            <a:solidFill>
-              <a:srgbClr val="00B050"/>
-            </a:solidFill>
-          </a:ln>
-          <a:effectLst/>
-        </p:spPr>
-        <p:style>
-          <a:lnRef idx="1">
-            <a:schemeClr val="accent2"/>
-          </a:lnRef>
-          <a:fillRef idx="2">
-            <a:schemeClr val="accent2"/>
-          </a:fillRef>
-          <a:effectRef idx="1">
-            <a:schemeClr val="accent2"/>
-          </a:effectRef>
-          <a:fontRef idx="minor">
-            <a:schemeClr val="dk1"/>
-          </a:fontRef>
-        </p:style>
-        <p:txBody>
-          <a:bodyPr rtlCol="0" anchor="ctr"/>
-          <a:lstStyle/>
-          <a:p>
-            <a:pPr algn="ctr"/>
-            <a:r>
-              <a:rPr lang="en-US" sz="1600" dirty="0" smtClean="0">
-                <a:solidFill>
-                  <a:schemeClr val="bg1"/>
-                </a:solidFill>
-              </a:rPr>
-              <a:t>:UI</a:t>
-            </a:r>
-            <a:endParaRPr lang="en-SG" sz="1600" dirty="0">
-              <a:solidFill>
-                <a:schemeClr val="bg1"/>
-              </a:solidFill>
-            </a:endParaRPr>
-          </a:p>
-        </p:txBody>
-      </p:sp>
-      <p:cxnSp>
-        <p:nvCxnSpPr>
-          <p:cNvPr id="73" name="Straight Connector 72"/>
-          <p:cNvCxnSpPr/>
-          <p:nvPr/>
-        </p:nvCxnSpPr>
-        <p:spPr>
-          <a:xfrm>
-            <a:off x="1654490" y="4673166"/>
-            <a:ext cx="0" cy="1723059"/>
-          </a:xfrm>
-          <a:prstGeom prst="line">
-            <a:avLst/>
-          </a:prstGeom>
-          <a:ln w="19050">
-            <a:solidFill>
-              <a:srgbClr val="00B050"/>
-            </a:solidFill>
-            <a:prstDash val="sysDash"/>
-          </a:ln>
-          <a:effectLst/>
-        </p:spPr>
-        <p:style>
-          <a:lnRef idx="1">
-            <a:schemeClr val="accent1"/>
-          </a:lnRef>
-          <a:fillRef idx="2">
-            <a:schemeClr val="accent1"/>
-          </a:fillRef>
-          <a:effectRef idx="1">
-            <a:schemeClr val="accent1"/>
-          </a:effectRef>
-          <a:fontRef idx="minor">
-            <a:schemeClr val="dk1"/>
-          </a:fontRef>
-        </p:style>
-      </p:cxnSp>
-      <p:sp>
-        <p:nvSpPr>
-          <p:cNvPr id="75" name="Rectangle 74"/>
-          <p:cNvSpPr/>
-          <p:nvPr/>
-        </p:nvSpPr>
-        <p:spPr>
-          <a:xfrm>
-            <a:off x="1582482" y="5023861"/>
-            <a:ext cx="152400" cy="1019910"/>
-          </a:xfrm>
-          <a:prstGeom prst="rect">
-            <a:avLst/>
-          </a:prstGeom>
-          <a:solidFill>
-            <a:srgbClr val="00B050"/>
-          </a:solidFill>
-          <a:ln>
-            <a:solidFill>
-              <a:srgbClr val="00B050"/>
-            </a:solidFill>
-          </a:ln>
-          <a:effectLst/>
-        </p:spPr>
-        <p:style>
-          <a:lnRef idx="1">
-            <a:schemeClr val="accent3"/>
-          </a:lnRef>
-          <a:fillRef idx="2">
-            <a:schemeClr val="accent3"/>
-          </a:fillRef>
-          <a:effectRef idx="1">
-            <a:schemeClr val="accent3"/>
-          </a:effectRef>
-          <a:fontRef idx="minor">
-            <a:schemeClr val="dk1"/>
-          </a:fontRef>
-        </p:style>
-        <p:txBody>
-          <a:bodyPr rtlCol="0" anchor="ctr"/>
-          <a:lstStyle/>
-          <a:p>
-            <a:pPr algn="ctr"/>
-            <a:endParaRPr lang="en-SG" sz="1400">
-              <a:solidFill>
-                <a:schemeClr val="dk1"/>
-              </a:solidFill>
-            </a:endParaRPr>
-          </a:p>
-        </p:txBody>
-      </p:sp>
-      <p:grpSp>
-        <p:nvGrpSpPr>
-          <p:cNvPr id="76" name="Actor"/>
-          <p:cNvGrpSpPr/>
-          <p:nvPr/>
-        </p:nvGrpSpPr>
-        <p:grpSpPr>
-          <a:xfrm>
-            <a:off x="148213" y="4234969"/>
-            <a:ext cx="324036" cy="573410"/>
-            <a:chOff x="3239901" y="4149080"/>
-            <a:chExt cx="648072" cy="1146820"/>
-          </a:xfrm>
-        </p:grpSpPr>
-        <p:sp>
-          <p:nvSpPr>
-            <p:cNvPr id="77" name="Flowchart: Connector 76"/>
-            <p:cNvSpPr/>
-            <p:nvPr/>
-          </p:nvSpPr>
-          <p:spPr>
-            <a:xfrm>
-              <a:off x="3419872" y="4149080"/>
-              <a:ext cx="288032" cy="288032"/>
-            </a:xfrm>
-            <a:prstGeom prst="flowChartConnector">
-              <a:avLst/>
-            </a:prstGeom>
-            <a:solidFill>
-              <a:schemeClr val="bg1">
-                <a:lumMod val="85000"/>
-              </a:schemeClr>
-            </a:solidFill>
-            <a:ln w="28575">
-              <a:solidFill>
-                <a:schemeClr val="tx1"/>
-              </a:solidFill>
-            </a:ln>
-            <a:effectLst/>
-          </p:spPr>
-          <p:style>
-            <a:lnRef idx="1">
-              <a:schemeClr val="accent4"/>
-            </a:lnRef>
-            <a:fillRef idx="2">
-              <a:schemeClr val="accent4"/>
-            </a:fillRef>
-            <a:effectRef idx="1">
-              <a:schemeClr val="accent4"/>
-            </a:effectRef>
-            <a:fontRef idx="minor">
-              <a:schemeClr val="dk1"/>
-            </a:fontRef>
-          </p:style>
-          <p:txBody>
-            <a:bodyPr rtlCol="0" anchor="ctr"/>
-            <a:lstStyle/>
-            <a:p>
-              <a:pPr algn="ctr"/>
-              <a:endParaRPr lang="en-SG"/>
-            </a:p>
-          </p:txBody>
-        </p:sp>
-        <p:cxnSp>
-          <p:nvCxnSpPr>
-            <p:cNvPr id="78" name="Straight Connector 77"/>
-            <p:cNvCxnSpPr>
-              <a:stCxn id="77" idx="4"/>
-            </p:cNvCxnSpPr>
-            <p:nvPr/>
-          </p:nvCxnSpPr>
-          <p:spPr>
-            <a:xfrm>
-              <a:off x="3563888" y="4437112"/>
-              <a:ext cx="0" cy="504056"/>
-            </a:xfrm>
-            <a:prstGeom prst="line">
-              <a:avLst/>
-            </a:prstGeom>
-            <a:ln w="28575">
-              <a:solidFill>
-                <a:schemeClr val="tx1"/>
-              </a:solidFill>
-            </a:ln>
-            <a:effectLst/>
-          </p:spPr>
-          <p:style>
-            <a:lnRef idx="1">
-              <a:schemeClr val="accent4"/>
-            </a:lnRef>
-            <a:fillRef idx="2">
-              <a:schemeClr val="accent4"/>
-            </a:fillRef>
-            <a:effectRef idx="1">
-              <a:schemeClr val="accent4"/>
-            </a:effectRef>
-            <a:fontRef idx="minor">
-              <a:schemeClr val="dk1"/>
-            </a:fontRef>
-          </p:style>
-        </p:cxnSp>
-        <p:sp>
-          <p:nvSpPr>
-            <p:cNvPr id="79" name="Freeform 78"/>
-            <p:cNvSpPr/>
-            <p:nvPr/>
-          </p:nvSpPr>
-          <p:spPr>
-            <a:xfrm>
-              <a:off x="3324225" y="4933950"/>
-              <a:ext cx="479425" cy="361950"/>
-            </a:xfrm>
-            <a:custGeom>
-              <a:avLst/>
-              <a:gdLst>
-                <a:gd name="connsiteX0" fmla="*/ 0 w 479425"/>
-                <a:gd name="connsiteY0" fmla="*/ 355600 h 361950"/>
-                <a:gd name="connsiteX1" fmla="*/ 241300 w 479425"/>
-                <a:gd name="connsiteY1" fmla="*/ 0 h 361950"/>
-                <a:gd name="connsiteX2" fmla="*/ 479425 w 479425"/>
-                <a:gd name="connsiteY2" fmla="*/ 361950 h 361950"/>
-              </a:gdLst>
-              <a:ahLst/>
-              <a:cxnLst>
-                <a:cxn ang="0">
-                  <a:pos x="connsiteX0" y="connsiteY0"/>
-                </a:cxn>
-                <a:cxn ang="0">
-                  <a:pos x="connsiteX1" y="connsiteY1"/>
-                </a:cxn>
-                <a:cxn ang="0">
-                  <a:pos x="connsiteX2" y="connsiteY2"/>
-                </a:cxn>
-              </a:cxnLst>
-              <a:rect l="l" t="t" r="r" b="b"/>
-              <a:pathLst>
-                <a:path w="479425" h="361950">
-                  <a:moveTo>
-                    <a:pt x="0" y="355600"/>
-                  </a:moveTo>
-                  <a:lnTo>
-                    <a:pt x="241300" y="0"/>
-                  </a:lnTo>
-                  <a:lnTo>
-                    <a:pt x="479425" y="361950"/>
-                  </a:lnTo>
-                </a:path>
-              </a:pathLst>
-            </a:custGeom>
-            <a:noFill/>
-            <a:ln w="28575">
-              <a:solidFill>
-                <a:schemeClr val="tx1"/>
-              </a:solidFill>
-            </a:ln>
-            <a:effectLst/>
-          </p:spPr>
-          <p:style>
-            <a:lnRef idx="1">
-              <a:schemeClr val="accent4"/>
-            </a:lnRef>
-            <a:fillRef idx="2">
-              <a:schemeClr val="accent4"/>
-            </a:fillRef>
-            <a:effectRef idx="1">
-              <a:schemeClr val="accent4"/>
-            </a:effectRef>
-            <a:fontRef idx="minor">
-              <a:schemeClr val="dk1"/>
-            </a:fontRef>
-          </p:style>
-          <p:txBody>
-            <a:bodyPr rtlCol="0" anchor="ctr"/>
-            <a:lstStyle/>
-            <a:p>
-              <a:pPr algn="ctr"/>
-              <a:endParaRPr lang="en-SG"/>
-            </a:p>
-          </p:txBody>
-        </p:sp>
-        <p:cxnSp>
-          <p:nvCxnSpPr>
-            <p:cNvPr id="80" name="Straight Connector 79"/>
-            <p:cNvCxnSpPr/>
-            <p:nvPr/>
-          </p:nvCxnSpPr>
-          <p:spPr>
-            <a:xfrm>
-              <a:off x="3239901" y="4509120"/>
-              <a:ext cx="648072" cy="0"/>
-            </a:xfrm>
-            <a:prstGeom prst="line">
-              <a:avLst/>
-            </a:prstGeom>
-            <a:ln w="28575">
-              <a:solidFill>
-                <a:schemeClr val="tx1"/>
-              </a:solidFill>
-            </a:ln>
-            <a:effectLst/>
-          </p:spPr>
-          <p:style>
-            <a:lnRef idx="1">
-              <a:schemeClr val="accent4"/>
-            </a:lnRef>
-            <a:fillRef idx="2">
-              <a:schemeClr val="accent4"/>
-            </a:fillRef>
-            <a:effectRef idx="1">
-              <a:schemeClr val="accent4"/>
-            </a:effectRef>
-            <a:fontRef idx="minor">
-              <a:schemeClr val="dk1"/>
-            </a:fontRef>
-          </p:style>
-        </p:cxnSp>
-      </p:grpSp>
-      <p:sp>
-        <p:nvSpPr>
-          <p:cNvPr id="81" name="Rectangle 62"/>
-          <p:cNvSpPr/>
-          <p:nvPr/>
-        </p:nvSpPr>
-        <p:spPr>
-          <a:xfrm>
-            <a:off x="3331396" y="4313182"/>
-            <a:ext cx="1093635" cy="346760"/>
-          </a:xfrm>
-          <a:prstGeom prst="rect">
-            <a:avLst/>
-          </a:prstGeom>
-          <a:solidFill>
-            <a:srgbClr val="0070C0"/>
-          </a:solidFill>
-          <a:ln w="19050">
-            <a:solidFill>
-              <a:srgbClr val="0070C0"/>
-            </a:solidFill>
-          </a:ln>
-          <a:effectLst/>
-        </p:spPr>
-        <p:style>
-          <a:lnRef idx="1">
-            <a:schemeClr val="accent2"/>
-          </a:lnRef>
-          <a:fillRef idx="2">
-            <a:schemeClr val="accent2"/>
-          </a:fillRef>
-          <a:effectRef idx="1">
-            <a:schemeClr val="accent2"/>
-          </a:effectRef>
-          <a:fontRef idx="minor">
-            <a:schemeClr val="dk1"/>
-          </a:fontRef>
-        </p:style>
-        <p:txBody>
-          <a:bodyPr rtlCol="0" anchor="ctr"/>
-          <a:lstStyle/>
-          <a:p>
-            <a:pPr algn="ctr"/>
-            <a:r>
-              <a:rPr lang="en-US" sz="1600" dirty="0" smtClean="0">
-                <a:solidFill>
-                  <a:schemeClr val="bg1"/>
-                </a:solidFill>
-              </a:rPr>
-              <a:t>:Logic</a:t>
-            </a:r>
-            <a:endParaRPr lang="en-SG" sz="1600" dirty="0">
-              <a:solidFill>
-                <a:schemeClr val="bg1"/>
-              </a:solidFill>
-            </a:endParaRPr>
-          </a:p>
-        </p:txBody>
-      </p:sp>
-      <p:cxnSp>
-        <p:nvCxnSpPr>
-          <p:cNvPr id="82" name="Straight Connector 81"/>
-          <p:cNvCxnSpPr/>
-          <p:nvPr/>
-        </p:nvCxnSpPr>
-        <p:spPr>
-          <a:xfrm>
-            <a:off x="3878213" y="4676853"/>
-            <a:ext cx="0" cy="1723059"/>
-          </a:xfrm>
-          <a:prstGeom prst="line">
-            <a:avLst/>
-          </a:prstGeom>
-          <a:ln w="19050">
-            <a:solidFill>
-              <a:srgbClr val="0070C0"/>
-            </a:solidFill>
-            <a:prstDash val="sysDash"/>
-          </a:ln>
-          <a:effectLst/>
-        </p:spPr>
-        <p:style>
-          <a:lnRef idx="1">
-            <a:schemeClr val="accent1"/>
-          </a:lnRef>
-          <a:fillRef idx="2">
-            <a:schemeClr val="accent1"/>
-          </a:fillRef>
-          <a:effectRef idx="1">
-            <a:schemeClr val="accent1"/>
-          </a:effectRef>
-          <a:fontRef idx="minor">
-            <a:schemeClr val="dk1"/>
-          </a:fontRef>
-        </p:style>
-      </p:cxnSp>
-      <p:sp>
-        <p:nvSpPr>
-          <p:cNvPr id="83" name="Rectangle 82"/>
-          <p:cNvSpPr/>
-          <p:nvPr/>
-        </p:nvSpPr>
-        <p:spPr>
-          <a:xfrm>
-            <a:off x="3806205" y="5135046"/>
-            <a:ext cx="144016" cy="832525"/>
-          </a:xfrm>
-          <a:prstGeom prst="rect">
-            <a:avLst/>
-          </a:prstGeom>
-          <a:solidFill>
-            <a:srgbClr val="0070C0"/>
-          </a:solidFill>
-          <a:ln>
-            <a:solidFill>
-              <a:srgbClr val="0070C0"/>
-            </a:solidFill>
-          </a:ln>
-          <a:effectLst/>
-        </p:spPr>
-        <p:style>
-          <a:lnRef idx="1">
-            <a:schemeClr val="accent3"/>
-          </a:lnRef>
-          <a:fillRef idx="2">
-            <a:schemeClr val="accent3"/>
-          </a:fillRef>
-          <a:effectRef idx="1">
-            <a:schemeClr val="accent3"/>
-          </a:effectRef>
-          <a:fontRef idx="minor">
-            <a:schemeClr val="dk1"/>
-          </a:fontRef>
-        </p:style>
-        <p:txBody>
-          <a:bodyPr rtlCol="0" anchor="ctr"/>
-          <a:lstStyle/>
-          <a:p>
-            <a:pPr algn="ctr"/>
-            <a:endParaRPr lang="en-SG" sz="1400">
-              <a:solidFill>
-                <a:schemeClr val="dk1"/>
-              </a:solidFill>
-            </a:endParaRPr>
-          </a:p>
-        </p:txBody>
-      </p:sp>
-      <p:sp>
-        <p:nvSpPr>
-          <p:cNvPr id="84" name="Rectangle 62"/>
-          <p:cNvSpPr/>
-          <p:nvPr/>
-        </p:nvSpPr>
-        <p:spPr>
-          <a:xfrm>
-            <a:off x="5312596" y="4309495"/>
-            <a:ext cx="1093635" cy="346760"/>
-          </a:xfrm>
-          <a:prstGeom prst="rect">
-            <a:avLst/>
-          </a:prstGeom>
-          <a:solidFill>
-            <a:srgbClr val="7030A0"/>
-          </a:solidFill>
-          <a:ln w="19050">
-            <a:solidFill>
-              <a:srgbClr val="7030A0"/>
-            </a:solidFill>
-          </a:ln>
-          <a:effectLst/>
-        </p:spPr>
-        <p:style>
-          <a:lnRef idx="1">
-            <a:schemeClr val="accent2"/>
-          </a:lnRef>
-          <a:fillRef idx="2">
-            <a:schemeClr val="accent2"/>
-          </a:fillRef>
-          <a:effectRef idx="1">
-            <a:schemeClr val="accent2"/>
-          </a:effectRef>
-          <a:fontRef idx="minor">
-            <a:schemeClr val="dk1"/>
-          </a:fontRef>
-        </p:style>
-        <p:txBody>
-          <a:bodyPr rtlCol="0" anchor="ctr"/>
-          <a:lstStyle/>
-          <a:p>
-            <a:pPr algn="ctr"/>
-            <a:r>
-              <a:rPr lang="en-US" sz="1600" dirty="0" smtClean="0">
-                <a:solidFill>
-                  <a:schemeClr val="bg1"/>
-                </a:solidFill>
-              </a:rPr>
-              <a:t>:Model</a:t>
-            </a:r>
-            <a:endParaRPr lang="en-SG" sz="1600" dirty="0">
-              <a:solidFill>
-                <a:schemeClr val="bg1"/>
-              </a:solidFill>
-            </a:endParaRPr>
-          </a:p>
-        </p:txBody>
-      </p:sp>
-      <p:cxnSp>
-        <p:nvCxnSpPr>
-          <p:cNvPr id="86" name="Straight Connector 85"/>
-          <p:cNvCxnSpPr/>
-          <p:nvPr/>
-        </p:nvCxnSpPr>
-        <p:spPr>
-          <a:xfrm>
-            <a:off x="5859413" y="4673166"/>
-            <a:ext cx="0" cy="1723059"/>
-          </a:xfrm>
-          <a:prstGeom prst="line">
-            <a:avLst/>
-          </a:prstGeom>
-          <a:ln w="19050">
-            <a:solidFill>
-              <a:srgbClr val="7030A0"/>
-            </a:solidFill>
-            <a:prstDash val="sysDash"/>
-          </a:ln>
-          <a:effectLst/>
-        </p:spPr>
-        <p:style>
-          <a:lnRef idx="1">
-            <a:schemeClr val="accent1"/>
-          </a:lnRef>
-          <a:fillRef idx="2">
-            <a:schemeClr val="accent1"/>
-          </a:fillRef>
-          <a:effectRef idx="1">
-            <a:schemeClr val="accent1"/>
-          </a:effectRef>
-          <a:fontRef idx="minor">
-            <a:schemeClr val="dk1"/>
-          </a:fontRef>
-        </p:style>
-      </p:cxnSp>
-      <p:sp>
-        <p:nvSpPr>
-          <p:cNvPr id="87" name="Rectangle 86"/>
-          <p:cNvSpPr/>
-          <p:nvPr/>
-        </p:nvSpPr>
-        <p:spPr>
-          <a:xfrm>
-            <a:off x="5787405" y="5239977"/>
-            <a:ext cx="142006" cy="651394"/>
-          </a:xfrm>
-          <a:prstGeom prst="rect">
-            <a:avLst/>
-          </a:prstGeom>
-          <a:solidFill>
-            <a:srgbClr val="7030A0"/>
-          </a:solidFill>
-          <a:ln>
-            <a:solidFill>
-              <a:srgbClr val="7030A0"/>
-            </a:solidFill>
-          </a:ln>
-          <a:effectLst/>
-        </p:spPr>
-        <p:style>
-          <a:lnRef idx="1">
-            <a:schemeClr val="accent3"/>
-          </a:lnRef>
-          <a:fillRef idx="2">
-            <a:schemeClr val="accent3"/>
-          </a:fillRef>
-          <a:effectRef idx="1">
-            <a:schemeClr val="accent3"/>
-          </a:effectRef>
-          <a:fontRef idx="minor">
-            <a:schemeClr val="dk1"/>
-          </a:fontRef>
-        </p:style>
-        <p:txBody>
-          <a:bodyPr rtlCol="0" anchor="ctr"/>
-          <a:lstStyle/>
-          <a:p>
-            <a:pPr algn="ctr"/>
-            <a:endParaRPr lang="en-SG" sz="1400">
-              <a:solidFill>
-                <a:schemeClr val="dk1"/>
-              </a:solidFill>
-            </a:endParaRPr>
-          </a:p>
-        </p:txBody>
-      </p:sp>
-      <p:cxnSp>
-        <p:nvCxnSpPr>
-          <p:cNvPr id="88" name="Straight Arrow Connector 87"/>
-          <p:cNvCxnSpPr/>
-          <p:nvPr/>
-        </p:nvCxnSpPr>
-        <p:spPr>
-          <a:xfrm>
-            <a:off x="462631" y="5027548"/>
-            <a:ext cx="1119851" cy="0"/>
-          </a:xfrm>
-          <a:prstGeom prst="straightConnector1">
-            <a:avLst/>
-          </a:prstGeom>
-          <a:ln w="19050">
-            <a:solidFill>
-              <a:schemeClr val="tx1"/>
-            </a:solidFill>
-            <a:tailEnd type="arrow"/>
-          </a:ln>
-        </p:spPr>
-        <p:style>
-          <a:lnRef idx="1">
-            <a:schemeClr val="accent1"/>
-          </a:lnRef>
-          <a:fillRef idx="0">
-            <a:schemeClr val="accent1"/>
-          </a:fillRef>
-          <a:effectRef idx="0">
-            <a:schemeClr val="accent1"/>
-          </a:effectRef>
-          <a:fontRef idx="minor">
-            <a:schemeClr val="tx1"/>
-          </a:fontRef>
-        </p:style>
-      </p:cxnSp>
-      <p:sp>
-        <p:nvSpPr>
-          <p:cNvPr id="89" name="TextBox 88"/>
-          <p:cNvSpPr txBox="1"/>
-          <p:nvPr/>
-        </p:nvSpPr>
-        <p:spPr>
-          <a:xfrm>
-            <a:off x="462630" y="5047449"/>
-            <a:ext cx="1015480" cy="369332"/>
-          </a:xfrm>
-          <a:prstGeom prst="rect">
-            <a:avLst/>
-          </a:prstGeom>
-          <a:noFill/>
-        </p:spPr>
-        <p:txBody>
-          <a:bodyPr wrap="square" lIns="0" tIns="0" rIns="0" bIns="0" rtlCol="0">
-            <a:spAutoFit/>
-          </a:bodyPr>
-          <a:lstStyle/>
-          <a:p>
-            <a:r>
-              <a:rPr lang="en-US" sz="1200" dirty="0" err="1"/>
-              <a:t>e</a:t>
-            </a:r>
-            <a:r>
-              <a:rPr lang="en-US" sz="1200" dirty="0" err="1" smtClean="0"/>
-              <a:t>ditlabel</a:t>
-            </a:r>
-            <a:r>
-              <a:rPr lang="en-US" sz="1200" dirty="0" smtClean="0"/>
-              <a:t> </a:t>
-            </a:r>
-          </a:p>
-          <a:p>
-            <a:r>
-              <a:rPr lang="en-US" sz="1200" dirty="0" smtClean="0"/>
-              <a:t>Friends allies</a:t>
-            </a:r>
-            <a:endParaRPr lang="en-US" sz="1200" dirty="0"/>
-          </a:p>
-        </p:txBody>
-      </p:sp>
-      <p:cxnSp>
-        <p:nvCxnSpPr>
-          <p:cNvPr id="90" name="Straight Arrow Connector 89"/>
-          <p:cNvCxnSpPr/>
-          <p:nvPr/>
-        </p:nvCxnSpPr>
-        <p:spPr>
-          <a:xfrm>
-            <a:off x="1734882" y="5135047"/>
-            <a:ext cx="2071323" cy="0"/>
-          </a:xfrm>
-          <a:prstGeom prst="straightConnector1">
-            <a:avLst/>
-          </a:prstGeom>
-          <a:ln w="19050">
-            <a:solidFill>
-              <a:srgbClr val="00B050"/>
-            </a:solidFill>
-            <a:tailEnd type="arrow"/>
-          </a:ln>
-        </p:spPr>
-        <p:style>
-          <a:lnRef idx="1">
-            <a:schemeClr val="accent1"/>
-          </a:lnRef>
-          <a:fillRef idx="0">
-            <a:schemeClr val="accent1"/>
-          </a:fillRef>
-          <a:effectRef idx="0">
-            <a:schemeClr val="accent1"/>
-          </a:effectRef>
-          <a:fontRef idx="minor">
-            <a:schemeClr val="tx1"/>
-          </a:fontRef>
-        </p:style>
-      </p:cxnSp>
-      <p:sp>
-        <p:nvSpPr>
-          <p:cNvPr id="91" name="TextBox 90"/>
-          <p:cNvSpPr txBox="1"/>
-          <p:nvPr/>
-        </p:nvSpPr>
-        <p:spPr>
-          <a:xfrm>
-            <a:off x="1908423" y="5158308"/>
-            <a:ext cx="1908358" cy="184666"/>
-          </a:xfrm>
-          <a:prstGeom prst="rect">
-            <a:avLst/>
-          </a:prstGeom>
-          <a:noFill/>
-        </p:spPr>
-        <p:txBody>
-          <a:bodyPr wrap="square" lIns="0" tIns="0" rIns="0" bIns="0" rtlCol="0">
-            <a:spAutoFit/>
-          </a:bodyPr>
-          <a:lstStyle/>
-          <a:p>
-            <a:r>
-              <a:rPr lang="en-US" sz="1200" dirty="0" smtClean="0">
-                <a:solidFill>
-                  <a:srgbClr val="0070C0"/>
-                </a:solidFill>
-              </a:rPr>
-              <a:t>execute</a:t>
-            </a:r>
-            <a:r>
-              <a:rPr lang="en-US" sz="1200" dirty="0" smtClean="0">
-                <a:solidFill>
-                  <a:srgbClr val="0070C0"/>
-                </a:solidFill>
-              </a:rPr>
-              <a:t>(“</a:t>
-            </a:r>
-            <a:r>
-              <a:rPr lang="en-US" sz="1200" dirty="0" err="1" smtClean="0">
-                <a:solidFill>
-                  <a:srgbClr val="0070C0"/>
-                </a:solidFill>
-              </a:rPr>
-              <a:t>editlabel</a:t>
-            </a:r>
-            <a:r>
-              <a:rPr lang="en-US" sz="1200" dirty="0" smtClean="0">
-                <a:solidFill>
-                  <a:srgbClr val="0070C0"/>
-                </a:solidFill>
-              </a:rPr>
-              <a:t> friends”)</a:t>
-            </a:r>
-            <a:endParaRPr lang="en-US" sz="1200" dirty="0">
-              <a:solidFill>
-                <a:srgbClr val="0070C0"/>
-              </a:solidFill>
-            </a:endParaRPr>
-          </a:p>
-        </p:txBody>
-      </p:sp>
-      <p:cxnSp>
-        <p:nvCxnSpPr>
-          <p:cNvPr id="92" name="Straight Arrow Connector 91"/>
-          <p:cNvCxnSpPr/>
-          <p:nvPr/>
-        </p:nvCxnSpPr>
-        <p:spPr>
-          <a:xfrm>
-            <a:off x="3950221" y="5239978"/>
-            <a:ext cx="1837184" cy="0"/>
-          </a:xfrm>
-          <a:prstGeom prst="straightConnector1">
-            <a:avLst/>
-          </a:prstGeom>
-          <a:ln w="19050">
-            <a:solidFill>
-              <a:srgbClr val="0070C0"/>
-            </a:solidFill>
-            <a:tailEnd type="arrow"/>
-          </a:ln>
-        </p:spPr>
-        <p:style>
-          <a:lnRef idx="1">
-            <a:schemeClr val="accent1"/>
-          </a:lnRef>
-          <a:fillRef idx="0">
-            <a:schemeClr val="accent1"/>
-          </a:fillRef>
-          <a:effectRef idx="0">
-            <a:schemeClr val="accent1"/>
-          </a:effectRef>
-          <a:fontRef idx="minor">
-            <a:schemeClr val="tx1"/>
-          </a:fontRef>
-        </p:style>
-      </p:cxnSp>
-      <p:sp>
-        <p:nvSpPr>
-          <p:cNvPr id="93" name="TextBox 92"/>
-          <p:cNvSpPr txBox="1"/>
-          <p:nvPr/>
-        </p:nvSpPr>
-        <p:spPr>
-          <a:xfrm>
-            <a:off x="4173874" y="5235252"/>
-            <a:ext cx="1736395" cy="215444"/>
-          </a:xfrm>
-          <a:prstGeom prst="rect">
-            <a:avLst/>
-          </a:prstGeom>
-          <a:noFill/>
-        </p:spPr>
-        <p:txBody>
-          <a:bodyPr wrap="square" lIns="0" tIns="0" rIns="0" bIns="0" rtlCol="0">
-            <a:spAutoFit/>
-          </a:bodyPr>
-          <a:lstStyle/>
-          <a:p>
-            <a:r>
-              <a:rPr lang="en-US" sz="1400" dirty="0" err="1" smtClean="0">
-                <a:solidFill>
-                  <a:srgbClr val="7030A0"/>
-                </a:solidFill>
-              </a:rPr>
-              <a:t>editLabelsInTask</a:t>
-            </a:r>
-            <a:r>
-              <a:rPr lang="en-US" sz="1400" dirty="0" smtClean="0">
-                <a:solidFill>
-                  <a:srgbClr val="7030A0"/>
-                </a:solidFill>
-              </a:rPr>
-              <a:t>(t)</a:t>
-            </a:r>
-            <a:endParaRPr lang="en-US" sz="1400" dirty="0">
-              <a:solidFill>
-                <a:srgbClr val="7030A0"/>
-              </a:solidFill>
-            </a:endParaRPr>
-          </a:p>
-        </p:txBody>
-      </p:sp>
-      <p:sp>
-        <p:nvSpPr>
-          <p:cNvPr id="94" name="TextBox 93"/>
-          <p:cNvSpPr txBox="1"/>
-          <p:nvPr/>
-        </p:nvSpPr>
-        <p:spPr>
-          <a:xfrm>
-            <a:off x="6069843" y="5389225"/>
-            <a:ext cx="2438400" cy="215444"/>
-          </a:xfrm>
-          <a:prstGeom prst="rect">
-            <a:avLst/>
-          </a:prstGeom>
-          <a:noFill/>
-        </p:spPr>
-        <p:txBody>
-          <a:bodyPr wrap="square" lIns="0" tIns="0" rIns="0" bIns="0" rtlCol="0">
-            <a:spAutoFit/>
-          </a:bodyPr>
-          <a:lstStyle/>
-          <a:p>
-            <a:r>
-              <a:rPr lang="en-US" sz="1400" dirty="0" smtClean="0">
-                <a:solidFill>
-                  <a:schemeClr val="accent5">
-                    <a:lumMod val="75000"/>
-                  </a:schemeClr>
-                </a:solidFill>
-              </a:rPr>
-              <a:t>post(</a:t>
-            </a:r>
-            <a:r>
-              <a:rPr lang="en-US" sz="1400" dirty="0" err="1" smtClean="0">
-                <a:solidFill>
-                  <a:schemeClr val="accent5">
-                    <a:lumMod val="75000"/>
-                  </a:schemeClr>
-                </a:solidFill>
-              </a:rPr>
-              <a:t>AddressBookChangedEvent</a:t>
-            </a:r>
-            <a:r>
-              <a:rPr lang="en-US" sz="1400" dirty="0" smtClean="0">
-                <a:solidFill>
-                  <a:schemeClr val="accent5">
-                    <a:lumMod val="75000"/>
-                  </a:schemeClr>
-                </a:solidFill>
-              </a:rPr>
-              <a:t>)</a:t>
-            </a:r>
-            <a:endParaRPr lang="en-US" sz="1400" dirty="0">
-              <a:solidFill>
-                <a:schemeClr val="accent5">
-                  <a:lumMod val="75000"/>
-                </a:schemeClr>
-              </a:solidFill>
-            </a:endParaRPr>
-          </a:p>
-        </p:txBody>
-      </p:sp>
-      <p:cxnSp>
-        <p:nvCxnSpPr>
-          <p:cNvPr id="95" name="Straight Arrow Connector 94"/>
-          <p:cNvCxnSpPr/>
-          <p:nvPr/>
-        </p:nvCxnSpPr>
-        <p:spPr>
-          <a:xfrm>
-            <a:off x="3950221" y="5892250"/>
-            <a:ext cx="1837184" cy="0"/>
-          </a:xfrm>
-          <a:prstGeom prst="straightConnector1">
-            <a:avLst/>
-          </a:prstGeom>
-          <a:ln w="19050">
-            <a:solidFill>
-              <a:srgbClr val="7030A0"/>
-            </a:solidFill>
-            <a:prstDash val="sysDash"/>
-            <a:headEnd type="arrow" w="med" len="med"/>
-            <a:tailEnd type="none" w="med" len="med"/>
-          </a:ln>
-        </p:spPr>
-        <p:style>
-          <a:lnRef idx="1">
-            <a:schemeClr val="accent1"/>
-          </a:lnRef>
-          <a:fillRef idx="0">
-            <a:schemeClr val="accent1"/>
-          </a:fillRef>
-          <a:effectRef idx="0">
-            <a:schemeClr val="accent1"/>
-          </a:effectRef>
-          <a:fontRef idx="minor">
-            <a:schemeClr val="tx1"/>
-          </a:fontRef>
-        </p:style>
-      </p:cxnSp>
-      <p:cxnSp>
-        <p:nvCxnSpPr>
-          <p:cNvPr id="96" name="Straight Arrow Connector 95"/>
-          <p:cNvCxnSpPr/>
-          <p:nvPr/>
-        </p:nvCxnSpPr>
-        <p:spPr>
-          <a:xfrm>
-            <a:off x="1734882" y="5967571"/>
-            <a:ext cx="2058118" cy="0"/>
-          </a:xfrm>
-          <a:prstGeom prst="straightConnector1">
-            <a:avLst/>
-          </a:prstGeom>
-          <a:ln w="19050">
-            <a:solidFill>
-              <a:srgbClr val="0070C0"/>
-            </a:solidFill>
-            <a:prstDash val="sysDash"/>
-            <a:headEnd type="arrow" w="med" len="med"/>
-            <a:tailEnd type="none" w="med" len="med"/>
-          </a:ln>
-        </p:spPr>
-        <p:style>
-          <a:lnRef idx="1">
-            <a:schemeClr val="accent1"/>
-          </a:lnRef>
-          <a:fillRef idx="0">
-            <a:schemeClr val="accent1"/>
-          </a:fillRef>
-          <a:effectRef idx="0">
-            <a:schemeClr val="accent1"/>
-          </a:effectRef>
-          <a:fontRef idx="minor">
-            <a:schemeClr val="tx1"/>
-          </a:fontRef>
-        </p:style>
-      </p:cxnSp>
-      <p:cxnSp>
-        <p:nvCxnSpPr>
-          <p:cNvPr id="97" name="Straight Arrow Connector 96"/>
-          <p:cNvCxnSpPr/>
-          <p:nvPr/>
-        </p:nvCxnSpPr>
-        <p:spPr>
-          <a:xfrm>
-            <a:off x="386431" y="6043771"/>
-            <a:ext cx="1196051" cy="0"/>
-          </a:xfrm>
-          <a:prstGeom prst="straightConnector1">
-            <a:avLst/>
-          </a:prstGeom>
-          <a:ln w="19050">
-            <a:solidFill>
-              <a:srgbClr val="00B050"/>
-            </a:solidFill>
-            <a:prstDash val="sysDash"/>
-            <a:headEnd type="arrow" w="med" len="med"/>
-            <a:tailEnd type="none" w="med" len="med"/>
-          </a:ln>
-        </p:spPr>
-        <p:style>
-          <a:lnRef idx="1">
-            <a:schemeClr val="accent1"/>
-          </a:lnRef>
-          <a:fillRef idx="0">
-            <a:schemeClr val="accent1"/>
-          </a:fillRef>
-          <a:effectRef idx="0">
-            <a:schemeClr val="accent1"/>
-          </a:effectRef>
-          <a:fontRef idx="minor">
-            <a:schemeClr val="tx1"/>
-          </a:fontRef>
-        </p:style>
-      </p:cxnSp>
-      <p:sp>
-        <p:nvSpPr>
-          <p:cNvPr id="98" name="Rectangle 62"/>
-          <p:cNvSpPr/>
-          <p:nvPr/>
-        </p:nvSpPr>
-        <p:spPr>
-          <a:xfrm>
-            <a:off x="7692013" y="4292820"/>
-            <a:ext cx="1371600" cy="346760"/>
-          </a:xfrm>
-          <a:prstGeom prst="rect">
-            <a:avLst/>
-          </a:prstGeom>
-          <a:solidFill>
-            <a:schemeClr val="accent5">
-              <a:lumMod val="75000"/>
-            </a:schemeClr>
-          </a:solidFill>
-          <a:ln w="19050">
-            <a:solidFill>
-              <a:schemeClr val="accent5">
-                <a:lumMod val="75000"/>
-              </a:schemeClr>
-            </a:solidFill>
-          </a:ln>
-          <a:effectLst/>
-        </p:spPr>
-        <p:style>
-          <a:lnRef idx="1">
-            <a:schemeClr val="accent2"/>
-          </a:lnRef>
-          <a:fillRef idx="2">
-            <a:schemeClr val="accent2"/>
-          </a:fillRef>
-          <a:effectRef idx="1">
-            <a:schemeClr val="accent2"/>
-          </a:effectRef>
-          <a:fontRef idx="minor">
-            <a:schemeClr val="dk1"/>
-          </a:fontRef>
-        </p:style>
-        <p:txBody>
-          <a:bodyPr rtlCol="0" anchor="ctr"/>
-          <a:lstStyle/>
-          <a:p>
-            <a:pPr algn="ctr"/>
-            <a:r>
-              <a:rPr lang="en-US" sz="1600" dirty="0" smtClean="0">
-                <a:solidFill>
-                  <a:schemeClr val="bg1"/>
-                </a:solidFill>
-              </a:rPr>
-              <a:t>:</a:t>
-            </a:r>
-            <a:r>
-              <a:rPr lang="en-US" sz="1600" dirty="0" err="1" smtClean="0">
-                <a:solidFill>
-                  <a:schemeClr val="bg1"/>
-                </a:solidFill>
-              </a:rPr>
-              <a:t>EventsCenter</a:t>
-            </a:r>
-            <a:endParaRPr lang="en-SG" sz="1600" dirty="0">
-              <a:solidFill>
-                <a:schemeClr val="bg1"/>
-              </a:solidFill>
-            </a:endParaRPr>
-          </a:p>
-        </p:txBody>
-      </p:sp>
-      <p:cxnSp>
-        <p:nvCxnSpPr>
-          <p:cNvPr id="99" name="Straight Connector 98"/>
-          <p:cNvCxnSpPr/>
-          <p:nvPr/>
-        </p:nvCxnSpPr>
-        <p:spPr>
-          <a:xfrm>
-            <a:off x="8612615" y="4645874"/>
-            <a:ext cx="0" cy="1723059"/>
-          </a:xfrm>
-          <a:prstGeom prst="line">
-            <a:avLst/>
-          </a:prstGeom>
-          <a:ln w="19050">
-            <a:solidFill>
-              <a:schemeClr val="accent5">
-                <a:lumMod val="75000"/>
-              </a:schemeClr>
-            </a:solidFill>
-            <a:prstDash val="sysDash"/>
-          </a:ln>
-          <a:effectLst/>
-        </p:spPr>
-        <p:style>
-          <a:lnRef idx="1">
-            <a:schemeClr val="accent1"/>
-          </a:lnRef>
-          <a:fillRef idx="2">
-            <a:schemeClr val="accent1"/>
-          </a:fillRef>
-          <a:effectRef idx="1">
-            <a:schemeClr val="accent1"/>
-          </a:effectRef>
-          <a:fontRef idx="minor">
-            <a:schemeClr val="dk1"/>
-          </a:fontRef>
-        </p:style>
-      </p:cxnSp>
-      <p:sp>
-        <p:nvSpPr>
-          <p:cNvPr id="100" name="Rectangle 99"/>
-          <p:cNvSpPr/>
-          <p:nvPr/>
-        </p:nvSpPr>
-        <p:spPr>
-          <a:xfrm>
-            <a:off x="8540607" y="5662771"/>
-            <a:ext cx="142006" cy="176787"/>
-          </a:xfrm>
-          <a:prstGeom prst="rect">
-            <a:avLst/>
-          </a:prstGeom>
-          <a:solidFill>
-            <a:schemeClr val="accent5">
-              <a:lumMod val="75000"/>
-            </a:schemeClr>
-          </a:solidFill>
-          <a:ln>
-            <a:solidFill>
-              <a:schemeClr val="accent5">
-                <a:lumMod val="75000"/>
-              </a:schemeClr>
-            </a:solidFill>
-          </a:ln>
-          <a:effectLst/>
-        </p:spPr>
-        <p:style>
-          <a:lnRef idx="1">
-            <a:schemeClr val="accent3"/>
-          </a:lnRef>
-          <a:fillRef idx="2">
-            <a:schemeClr val="accent3"/>
-          </a:fillRef>
-          <a:effectRef idx="1">
-            <a:schemeClr val="accent3"/>
-          </a:effectRef>
-          <a:fontRef idx="minor">
-            <a:schemeClr val="dk1"/>
-          </a:fontRef>
-        </p:style>
-        <p:txBody>
-          <a:bodyPr rtlCol="0" anchor="ctr"/>
-          <a:lstStyle/>
-          <a:p>
-            <a:pPr algn="ctr"/>
-            <a:endParaRPr lang="en-SG" sz="1400">
-              <a:solidFill>
-                <a:schemeClr val="dk1"/>
-              </a:solidFill>
-            </a:endParaRPr>
-          </a:p>
-        </p:txBody>
-      </p:sp>
-      <p:cxnSp>
-        <p:nvCxnSpPr>
-          <p:cNvPr id="101" name="Straight Arrow Connector 100"/>
-          <p:cNvCxnSpPr/>
-          <p:nvPr/>
-        </p:nvCxnSpPr>
-        <p:spPr>
-          <a:xfrm>
-            <a:off x="5939805" y="5662771"/>
-            <a:ext cx="2568438" cy="0"/>
-          </a:xfrm>
-          <a:prstGeom prst="straightConnector1">
-            <a:avLst/>
-          </a:prstGeom>
-          <a:ln w="19050">
-            <a:solidFill>
-              <a:srgbClr val="7030A0"/>
-            </a:solidFill>
-            <a:tailEnd type="arrow"/>
-          </a:ln>
-        </p:spPr>
-        <p:style>
-          <a:lnRef idx="1">
-            <a:schemeClr val="accent1"/>
-          </a:lnRef>
-          <a:fillRef idx="0">
-            <a:schemeClr val="accent1"/>
-          </a:fillRef>
-          <a:effectRef idx="0">
-            <a:schemeClr val="accent1"/>
-          </a:effectRef>
-          <a:fontRef idx="minor">
-            <a:schemeClr val="tx1"/>
-          </a:fontRef>
-        </p:style>
-      </p:cxnSp>
-      <p:cxnSp>
-        <p:nvCxnSpPr>
-          <p:cNvPr id="102" name="Straight Arrow Connector 101"/>
-          <p:cNvCxnSpPr/>
-          <p:nvPr/>
-        </p:nvCxnSpPr>
-        <p:spPr>
-          <a:xfrm>
-            <a:off x="5939805" y="5839558"/>
-            <a:ext cx="2549946" cy="0"/>
-          </a:xfrm>
-          <a:prstGeom prst="straightConnector1">
-            <a:avLst/>
-          </a:prstGeom>
-          <a:ln w="19050">
-            <a:solidFill>
-              <a:schemeClr val="accent5">
-                <a:lumMod val="75000"/>
-              </a:schemeClr>
-            </a:solidFill>
-            <a:prstDash val="sysDash"/>
-            <a:headEnd type="arrow" w="med" len="med"/>
-            <a:tailEnd type="none" w="med" len="med"/>
-          </a:ln>
-        </p:spPr>
-        <p:style>
-          <a:lnRef idx="1">
-            <a:schemeClr val="accent1"/>
-          </a:lnRef>
-          <a:fillRef idx="0">
-            <a:schemeClr val="accent1"/>
-          </a:fillRef>
-          <a:effectRef idx="0">
-            <a:schemeClr val="accent1"/>
-          </a:effectRef>
-          <a:fontRef idx="minor">
-            <a:schemeClr val="tx1"/>
-          </a:fontRef>
-        </p:style>
-      </p:cxnSp>
-      <p:cxnSp>
-        <p:nvCxnSpPr>
-          <p:cNvPr id="103" name="Straight Connector 102"/>
-          <p:cNvCxnSpPr/>
-          <p:nvPr/>
-        </p:nvCxnSpPr>
-        <p:spPr>
-          <a:xfrm flipH="1">
-            <a:off x="310207" y="4801241"/>
-            <a:ext cx="24" cy="1598671"/>
-          </a:xfrm>
-          <a:prstGeom prst="line">
-            <a:avLst/>
-          </a:prstGeom>
-          <a:ln w="19050">
-            <a:solidFill>
-              <a:schemeClr val="tx1"/>
-            </a:solidFill>
-            <a:prstDash val="sysDash"/>
-          </a:ln>
-          <a:effectLst/>
-        </p:spPr>
-        <p:style>
-          <a:lnRef idx="1">
-            <a:schemeClr val="accent1"/>
-          </a:lnRef>
-          <a:fillRef idx="2">
-            <a:schemeClr val="accent1"/>
-          </a:fillRef>
-          <a:effectRef idx="1">
-            <a:schemeClr val="accent1"/>
-          </a:effectRef>
-          <a:fontRef idx="minor">
-            <a:schemeClr val="dk1"/>
-          </a:fontRef>
-        </p:style>
-      </p:cxnSp>
-    </p:spTree>
-    <p:extLst>
-      <p:ext uri="{BB962C8B-B14F-4D97-AF65-F5344CB8AC3E}">
-        <p14:creationId xmlns:p14="http://schemas.microsoft.com/office/powerpoint/2010/main" val="2927111328"/>
       </p:ext>
     </p:extLst>
   </p:cSld>

</xml_diff>

<commit_message>
Updated images in dev guide
</commit_message>
<xml_diff>
--- a/docs/diagrams/HighLevelSequenceDiagrams.pptx
+++ b/docs/diagrams/HighLevelSequenceDiagrams.pptx
@@ -107,6 +107,22 @@
       </a:defRPr>
     </a:lvl9pPr>
   </p:defaultTextStyle>
+  <p:extLst>
+    <p:ext uri="{EFAFB233-063F-42B5-8137-9DF3F51BA10A}">
+      <p15:sldGuideLst xmlns:p15="http://schemas.microsoft.com/office/powerpoint/2012/main">
+        <p15:guide id="1" orient="horz" pos="1488">
+          <p15:clr>
+            <a:srgbClr val="A4A3A4"/>
+          </p15:clr>
+        </p15:guide>
+        <p15:guide id="2" pos="2880">
+          <p15:clr>
+            <a:srgbClr val="A4A3A4"/>
+          </p15:clr>
+        </p15:guide>
+      </p15:sldGuideLst>
+    </p:ext>
+  </p:extLst>
 </p:presentation>
 </file>
 
@@ -192,7 +208,7 @@
           <a:p>
             <a:fld id="{F5CC4B3F-88C1-4FFA-B1B6-F41C21DC6924}" type="datetimeFigureOut">
               <a:rPr lang="en-US" smtClean="0"/>
-              <a:t>10/16/2016</a:t>
+              <a:t>23-Mar-17</a:t>
             </a:fld>
             <a:endParaRPr lang="en-US"/>
           </a:p>
@@ -256,38 +272,37 @@
           <a:p>
             <a:pPr lvl="0"/>
             <a:r>
-              <a:rPr lang="en-US" smtClean="0"/>
+              <a:rPr lang="en-US"/>
               <a:t>Click to edit Master text styles</a:t>
             </a:r>
           </a:p>
           <a:p>
             <a:pPr lvl="1"/>
             <a:r>
-              <a:rPr lang="en-US" smtClean="0"/>
+              <a:rPr lang="en-US"/>
               <a:t>Second level</a:t>
             </a:r>
           </a:p>
           <a:p>
             <a:pPr lvl="2"/>
             <a:r>
-              <a:rPr lang="en-US" smtClean="0"/>
+              <a:rPr lang="en-US"/>
               <a:t>Third level</a:t>
             </a:r>
           </a:p>
           <a:p>
             <a:pPr lvl="3"/>
             <a:r>
-              <a:rPr lang="en-US" smtClean="0"/>
+              <a:rPr lang="en-US"/>
               <a:t>Fourth level</a:t>
             </a:r>
           </a:p>
           <a:p>
             <a:pPr lvl="4"/>
             <a:r>
-              <a:rPr lang="en-US" smtClean="0"/>
+              <a:rPr lang="en-US"/>
               <a:t>Fifth level</a:t>
             </a:r>
-            <a:endParaRPr lang="en-US"/>
           </a:p>
         </p:txBody>
       </p:sp>
@@ -498,10 +513,9 @@
           <a:lstStyle/>
           <a:p>
             <a:r>
-              <a:rPr lang="en-US" smtClean="0"/>
+              <a:rPr lang="en-US"/>
               <a:t>Click to edit Master title style</a:t>
             </a:r>
-            <a:endParaRPr lang="en-US"/>
           </a:p>
         </p:txBody>
       </p:sp>
@@ -617,10 +631,9 @@
           </a:lstStyle>
           <a:p>
             <a:r>
-              <a:rPr lang="en-US" smtClean="0"/>
+              <a:rPr lang="en-US"/>
               <a:t>Click to edit Master subtitle style</a:t>
             </a:r>
-            <a:endParaRPr lang="en-US"/>
           </a:p>
         </p:txBody>
       </p:sp>
@@ -641,7 +654,7 @@
           <a:p>
             <a:fld id="{78C97017-6FC3-485B-9764-EAC9E56C1D49}" type="datetimeFigureOut">
               <a:rPr lang="en-US" smtClean="0"/>
-              <a:t>10/16/2016</a:t>
+              <a:t>23-Mar-17</a:t>
             </a:fld>
             <a:endParaRPr lang="en-US"/>
           </a:p>
@@ -735,10 +748,9 @@
           <a:lstStyle/>
           <a:p>
             <a:r>
-              <a:rPr lang="en-US" smtClean="0"/>
+              <a:rPr lang="en-US"/>
               <a:t>Click to edit Master title style</a:t>
             </a:r>
-            <a:endParaRPr lang="en-US"/>
           </a:p>
         </p:txBody>
       </p:sp>
@@ -759,38 +771,37 @@
           <a:p>
             <a:pPr lvl="0"/>
             <a:r>
-              <a:rPr lang="en-US" smtClean="0"/>
+              <a:rPr lang="en-US"/>
               <a:t>Click to edit Master text styles</a:t>
             </a:r>
           </a:p>
           <a:p>
             <a:pPr lvl="1"/>
             <a:r>
-              <a:rPr lang="en-US" smtClean="0"/>
+              <a:rPr lang="en-US"/>
               <a:t>Second level</a:t>
             </a:r>
           </a:p>
           <a:p>
             <a:pPr lvl="2"/>
             <a:r>
-              <a:rPr lang="en-US" smtClean="0"/>
+              <a:rPr lang="en-US"/>
               <a:t>Third level</a:t>
             </a:r>
           </a:p>
           <a:p>
             <a:pPr lvl="3"/>
             <a:r>
-              <a:rPr lang="en-US" smtClean="0"/>
+              <a:rPr lang="en-US"/>
               <a:t>Fourth level</a:t>
             </a:r>
           </a:p>
           <a:p>
             <a:pPr lvl="4"/>
             <a:r>
-              <a:rPr lang="en-US" smtClean="0"/>
+              <a:rPr lang="en-US"/>
               <a:t>Fifth level</a:t>
             </a:r>
-            <a:endParaRPr lang="en-US"/>
           </a:p>
         </p:txBody>
       </p:sp>
@@ -811,7 +822,7 @@
           <a:p>
             <a:fld id="{78C97017-6FC3-485B-9764-EAC9E56C1D49}" type="datetimeFigureOut">
               <a:rPr lang="en-US" smtClean="0"/>
-              <a:t>10/16/2016</a:t>
+              <a:t>23-Mar-17</a:t>
             </a:fld>
             <a:endParaRPr lang="en-US"/>
           </a:p>
@@ -910,10 +921,9 @@
           <a:lstStyle/>
           <a:p>
             <a:r>
-              <a:rPr lang="en-US" smtClean="0"/>
+              <a:rPr lang="en-US"/>
               <a:t>Click to edit Master title style</a:t>
             </a:r>
-            <a:endParaRPr lang="en-US"/>
           </a:p>
         </p:txBody>
       </p:sp>
@@ -939,38 +949,37 @@
           <a:p>
             <a:pPr lvl="0"/>
             <a:r>
-              <a:rPr lang="en-US" smtClean="0"/>
+              <a:rPr lang="en-US"/>
               <a:t>Click to edit Master text styles</a:t>
             </a:r>
           </a:p>
           <a:p>
             <a:pPr lvl="1"/>
             <a:r>
-              <a:rPr lang="en-US" smtClean="0"/>
+              <a:rPr lang="en-US"/>
               <a:t>Second level</a:t>
             </a:r>
           </a:p>
           <a:p>
             <a:pPr lvl="2"/>
             <a:r>
-              <a:rPr lang="en-US" smtClean="0"/>
+              <a:rPr lang="en-US"/>
               <a:t>Third level</a:t>
             </a:r>
           </a:p>
           <a:p>
             <a:pPr lvl="3"/>
             <a:r>
-              <a:rPr lang="en-US" smtClean="0"/>
+              <a:rPr lang="en-US"/>
               <a:t>Fourth level</a:t>
             </a:r>
           </a:p>
           <a:p>
             <a:pPr lvl="4"/>
             <a:r>
-              <a:rPr lang="en-US" smtClean="0"/>
+              <a:rPr lang="en-US"/>
               <a:t>Fifth level</a:t>
             </a:r>
-            <a:endParaRPr lang="en-US"/>
           </a:p>
         </p:txBody>
       </p:sp>
@@ -991,7 +1000,7 @@
           <a:p>
             <a:fld id="{78C97017-6FC3-485B-9764-EAC9E56C1D49}" type="datetimeFigureOut">
               <a:rPr lang="en-US" smtClean="0"/>
-              <a:t>10/16/2016</a:t>
+              <a:t>23-Mar-17</a:t>
             </a:fld>
             <a:endParaRPr lang="en-US"/>
           </a:p>
@@ -1085,10 +1094,9 @@
           <a:lstStyle/>
           <a:p>
             <a:r>
-              <a:rPr lang="en-US" smtClean="0"/>
+              <a:rPr lang="en-US"/>
               <a:t>Click to edit Master title style</a:t>
             </a:r>
-            <a:endParaRPr lang="en-US"/>
           </a:p>
         </p:txBody>
       </p:sp>
@@ -1109,38 +1117,37 @@
           <a:p>
             <a:pPr lvl="0"/>
             <a:r>
-              <a:rPr lang="en-US" smtClean="0"/>
+              <a:rPr lang="en-US"/>
               <a:t>Click to edit Master text styles</a:t>
             </a:r>
           </a:p>
           <a:p>
             <a:pPr lvl="1"/>
             <a:r>
-              <a:rPr lang="en-US" smtClean="0"/>
+              <a:rPr lang="en-US"/>
               <a:t>Second level</a:t>
             </a:r>
           </a:p>
           <a:p>
             <a:pPr lvl="2"/>
             <a:r>
-              <a:rPr lang="en-US" smtClean="0"/>
+              <a:rPr lang="en-US"/>
               <a:t>Third level</a:t>
             </a:r>
           </a:p>
           <a:p>
             <a:pPr lvl="3"/>
             <a:r>
-              <a:rPr lang="en-US" smtClean="0"/>
+              <a:rPr lang="en-US"/>
               <a:t>Fourth level</a:t>
             </a:r>
           </a:p>
           <a:p>
             <a:pPr lvl="4"/>
             <a:r>
-              <a:rPr lang="en-US" smtClean="0"/>
+              <a:rPr lang="en-US"/>
               <a:t>Fifth level</a:t>
             </a:r>
-            <a:endParaRPr lang="en-US"/>
           </a:p>
         </p:txBody>
       </p:sp>
@@ -1161,7 +1168,7 @@
           <a:p>
             <a:fld id="{78C97017-6FC3-485B-9764-EAC9E56C1D49}" type="datetimeFigureOut">
               <a:rPr lang="en-US" smtClean="0"/>
-              <a:t>10/16/2016</a:t>
+              <a:t>23-Mar-17</a:t>
             </a:fld>
             <a:endParaRPr lang="en-US"/>
           </a:p>
@@ -1264,10 +1271,9 @@
           </a:lstStyle>
           <a:p>
             <a:r>
-              <a:rPr lang="en-US" smtClean="0"/>
+              <a:rPr lang="en-US"/>
               <a:t>Click to edit Master title style</a:t>
             </a:r>
-            <a:endParaRPr lang="en-US"/>
           </a:p>
         </p:txBody>
       </p:sp>
@@ -1384,7 +1390,7 @@
           <a:p>
             <a:pPr lvl="0"/>
             <a:r>
-              <a:rPr lang="en-US" smtClean="0"/>
+              <a:rPr lang="en-US"/>
               <a:t>Click to edit Master text styles</a:t>
             </a:r>
           </a:p>
@@ -1407,7 +1413,7 @@
           <a:p>
             <a:fld id="{78C97017-6FC3-485B-9764-EAC9E56C1D49}" type="datetimeFigureOut">
               <a:rPr lang="en-US" smtClean="0"/>
-              <a:t>10/16/2016</a:t>
+              <a:t>23-Mar-17</a:t>
             </a:fld>
             <a:endParaRPr lang="en-US"/>
           </a:p>
@@ -1501,10 +1507,9 @@
           <a:lstStyle/>
           <a:p>
             <a:r>
-              <a:rPr lang="en-US" smtClean="0"/>
+              <a:rPr lang="en-US"/>
               <a:t>Click to edit Master title style</a:t>
             </a:r>
-            <a:endParaRPr lang="en-US"/>
           </a:p>
         </p:txBody>
       </p:sp>
@@ -1558,38 +1563,37 @@
           <a:p>
             <a:pPr lvl="0"/>
             <a:r>
-              <a:rPr lang="en-US" smtClean="0"/>
+              <a:rPr lang="en-US"/>
               <a:t>Click to edit Master text styles</a:t>
             </a:r>
           </a:p>
           <a:p>
             <a:pPr lvl="1"/>
             <a:r>
-              <a:rPr lang="en-US" smtClean="0"/>
+              <a:rPr lang="en-US"/>
               <a:t>Second level</a:t>
             </a:r>
           </a:p>
           <a:p>
             <a:pPr lvl="2"/>
             <a:r>
-              <a:rPr lang="en-US" smtClean="0"/>
+              <a:rPr lang="en-US"/>
               <a:t>Third level</a:t>
             </a:r>
           </a:p>
           <a:p>
             <a:pPr lvl="3"/>
             <a:r>
-              <a:rPr lang="en-US" smtClean="0"/>
+              <a:rPr lang="en-US"/>
               <a:t>Fourth level</a:t>
             </a:r>
           </a:p>
           <a:p>
             <a:pPr lvl="4"/>
             <a:r>
-              <a:rPr lang="en-US" smtClean="0"/>
+              <a:rPr lang="en-US"/>
               <a:t>Fifth level</a:t>
             </a:r>
-            <a:endParaRPr lang="en-US"/>
           </a:p>
         </p:txBody>
       </p:sp>
@@ -1643,38 +1647,37 @@
           <a:p>
             <a:pPr lvl="0"/>
             <a:r>
-              <a:rPr lang="en-US" smtClean="0"/>
+              <a:rPr lang="en-US"/>
               <a:t>Click to edit Master text styles</a:t>
             </a:r>
           </a:p>
           <a:p>
             <a:pPr lvl="1"/>
             <a:r>
-              <a:rPr lang="en-US" smtClean="0"/>
+              <a:rPr lang="en-US"/>
               <a:t>Second level</a:t>
             </a:r>
           </a:p>
           <a:p>
             <a:pPr lvl="2"/>
             <a:r>
-              <a:rPr lang="en-US" smtClean="0"/>
+              <a:rPr lang="en-US"/>
               <a:t>Third level</a:t>
             </a:r>
           </a:p>
           <a:p>
             <a:pPr lvl="3"/>
             <a:r>
-              <a:rPr lang="en-US" smtClean="0"/>
+              <a:rPr lang="en-US"/>
               <a:t>Fourth level</a:t>
             </a:r>
           </a:p>
           <a:p>
             <a:pPr lvl="4"/>
             <a:r>
-              <a:rPr lang="en-US" smtClean="0"/>
+              <a:rPr lang="en-US"/>
               <a:t>Fifth level</a:t>
             </a:r>
-            <a:endParaRPr lang="en-US"/>
           </a:p>
         </p:txBody>
       </p:sp>
@@ -1695,7 +1698,7 @@
           <a:p>
             <a:fld id="{78C97017-6FC3-485B-9764-EAC9E56C1D49}" type="datetimeFigureOut">
               <a:rPr lang="en-US" smtClean="0"/>
-              <a:t>10/16/2016</a:t>
+              <a:t>23-Mar-17</a:t>
             </a:fld>
             <a:endParaRPr lang="en-US"/>
           </a:p>
@@ -1793,10 +1796,9 @@
           </a:lstStyle>
           <a:p>
             <a:r>
-              <a:rPr lang="en-US" smtClean="0"/>
+              <a:rPr lang="en-US"/>
               <a:t>Click to edit Master title style</a:t>
             </a:r>
-            <a:endParaRPr lang="en-US"/>
           </a:p>
         </p:txBody>
       </p:sp>
@@ -1859,7 +1861,7 @@
           <a:p>
             <a:pPr lvl="0"/>
             <a:r>
-              <a:rPr lang="en-US" smtClean="0"/>
+              <a:rPr lang="en-US"/>
               <a:t>Click to edit Master text styles</a:t>
             </a:r>
           </a:p>
@@ -1915,38 +1917,37 @@
           <a:p>
             <a:pPr lvl="0"/>
             <a:r>
-              <a:rPr lang="en-US" smtClean="0"/>
+              <a:rPr lang="en-US"/>
               <a:t>Click to edit Master text styles</a:t>
             </a:r>
           </a:p>
           <a:p>
             <a:pPr lvl="1"/>
             <a:r>
-              <a:rPr lang="en-US" smtClean="0"/>
+              <a:rPr lang="en-US"/>
               <a:t>Second level</a:t>
             </a:r>
           </a:p>
           <a:p>
             <a:pPr lvl="2"/>
             <a:r>
-              <a:rPr lang="en-US" smtClean="0"/>
+              <a:rPr lang="en-US"/>
               <a:t>Third level</a:t>
             </a:r>
           </a:p>
           <a:p>
             <a:pPr lvl="3"/>
             <a:r>
-              <a:rPr lang="en-US" smtClean="0"/>
+              <a:rPr lang="en-US"/>
               <a:t>Fourth level</a:t>
             </a:r>
           </a:p>
           <a:p>
             <a:pPr lvl="4"/>
             <a:r>
-              <a:rPr lang="en-US" smtClean="0"/>
+              <a:rPr lang="en-US"/>
               <a:t>Fifth level</a:t>
             </a:r>
-            <a:endParaRPr lang="en-US"/>
           </a:p>
         </p:txBody>
       </p:sp>
@@ -2009,7 +2010,7 @@
           <a:p>
             <a:pPr lvl="0"/>
             <a:r>
-              <a:rPr lang="en-US" smtClean="0"/>
+              <a:rPr lang="en-US"/>
               <a:t>Click to edit Master text styles</a:t>
             </a:r>
           </a:p>
@@ -2065,38 +2066,37 @@
           <a:p>
             <a:pPr lvl="0"/>
             <a:r>
-              <a:rPr lang="en-US" smtClean="0"/>
+              <a:rPr lang="en-US"/>
               <a:t>Click to edit Master text styles</a:t>
             </a:r>
           </a:p>
           <a:p>
             <a:pPr lvl="1"/>
             <a:r>
-              <a:rPr lang="en-US" smtClean="0"/>
+              <a:rPr lang="en-US"/>
               <a:t>Second level</a:t>
             </a:r>
           </a:p>
           <a:p>
             <a:pPr lvl="2"/>
             <a:r>
-              <a:rPr lang="en-US" smtClean="0"/>
+              <a:rPr lang="en-US"/>
               <a:t>Third level</a:t>
             </a:r>
           </a:p>
           <a:p>
             <a:pPr lvl="3"/>
             <a:r>
-              <a:rPr lang="en-US" smtClean="0"/>
+              <a:rPr lang="en-US"/>
               <a:t>Fourth level</a:t>
             </a:r>
           </a:p>
           <a:p>
             <a:pPr lvl="4"/>
             <a:r>
-              <a:rPr lang="en-US" smtClean="0"/>
+              <a:rPr lang="en-US"/>
               <a:t>Fifth level</a:t>
             </a:r>
-            <a:endParaRPr lang="en-US"/>
           </a:p>
         </p:txBody>
       </p:sp>
@@ -2117,7 +2117,7 @@
           <a:p>
             <a:fld id="{78C97017-6FC3-485B-9764-EAC9E56C1D49}" type="datetimeFigureOut">
               <a:rPr lang="en-US" smtClean="0"/>
-              <a:t>10/16/2016</a:t>
+              <a:t>23-Mar-17</a:t>
             </a:fld>
             <a:endParaRPr lang="en-US"/>
           </a:p>
@@ -2211,10 +2211,9 @@
           <a:lstStyle/>
           <a:p>
             <a:r>
-              <a:rPr lang="en-US" smtClean="0"/>
+              <a:rPr lang="en-US"/>
               <a:t>Click to edit Master title style</a:t>
             </a:r>
-            <a:endParaRPr lang="en-US"/>
           </a:p>
         </p:txBody>
       </p:sp>
@@ -2235,7 +2234,7 @@
           <a:p>
             <a:fld id="{78C97017-6FC3-485B-9764-EAC9E56C1D49}" type="datetimeFigureOut">
               <a:rPr lang="en-US" smtClean="0"/>
-              <a:t>10/16/2016</a:t>
+              <a:t>23-Mar-17</a:t>
             </a:fld>
             <a:endParaRPr lang="en-US"/>
           </a:p>
@@ -2330,7 +2329,7 @@
           <a:p>
             <a:fld id="{78C97017-6FC3-485B-9764-EAC9E56C1D49}" type="datetimeFigureOut">
               <a:rPr lang="en-US" smtClean="0"/>
-              <a:t>10/16/2016</a:t>
+              <a:t>23-Mar-17</a:t>
             </a:fld>
             <a:endParaRPr lang="en-US"/>
           </a:p>
@@ -2433,10 +2432,9 @@
           </a:lstStyle>
           <a:p>
             <a:r>
-              <a:rPr lang="en-US" smtClean="0"/>
+              <a:rPr lang="en-US"/>
               <a:t>Click to edit Master title style</a:t>
             </a:r>
-            <a:endParaRPr lang="en-US"/>
           </a:p>
         </p:txBody>
       </p:sp>
@@ -2490,38 +2488,37 @@
           <a:p>
             <a:pPr lvl="0"/>
             <a:r>
-              <a:rPr lang="en-US" smtClean="0"/>
+              <a:rPr lang="en-US"/>
               <a:t>Click to edit Master text styles</a:t>
             </a:r>
           </a:p>
           <a:p>
             <a:pPr lvl="1"/>
             <a:r>
-              <a:rPr lang="en-US" smtClean="0"/>
+              <a:rPr lang="en-US"/>
               <a:t>Second level</a:t>
             </a:r>
           </a:p>
           <a:p>
             <a:pPr lvl="2"/>
             <a:r>
-              <a:rPr lang="en-US" smtClean="0"/>
+              <a:rPr lang="en-US"/>
               <a:t>Third level</a:t>
             </a:r>
           </a:p>
           <a:p>
             <a:pPr lvl="3"/>
             <a:r>
-              <a:rPr lang="en-US" smtClean="0"/>
+              <a:rPr lang="en-US"/>
               <a:t>Fourth level</a:t>
             </a:r>
           </a:p>
           <a:p>
             <a:pPr lvl="4"/>
             <a:r>
-              <a:rPr lang="en-US" smtClean="0"/>
+              <a:rPr lang="en-US"/>
               <a:t>Fifth level</a:t>
             </a:r>
-            <a:endParaRPr lang="en-US"/>
           </a:p>
         </p:txBody>
       </p:sp>
@@ -2584,7 +2581,7 @@
           <a:p>
             <a:pPr lvl="0"/>
             <a:r>
-              <a:rPr lang="en-US" smtClean="0"/>
+              <a:rPr lang="en-US"/>
               <a:t>Click to edit Master text styles</a:t>
             </a:r>
           </a:p>
@@ -2607,7 +2604,7 @@
           <a:p>
             <a:fld id="{78C97017-6FC3-485B-9764-EAC9E56C1D49}" type="datetimeFigureOut">
               <a:rPr lang="en-US" smtClean="0"/>
-              <a:t>10/16/2016</a:t>
+              <a:t>23-Mar-17</a:t>
             </a:fld>
             <a:endParaRPr lang="en-US"/>
           </a:p>
@@ -2710,10 +2707,9 @@
           </a:lstStyle>
           <a:p>
             <a:r>
-              <a:rPr lang="en-US" smtClean="0"/>
+              <a:rPr lang="en-US"/>
               <a:t>Click to edit Master title style</a:t>
             </a:r>
-            <a:endParaRPr lang="en-US"/>
           </a:p>
         </p:txBody>
       </p:sp>
@@ -2837,7 +2833,7 @@
           <a:p>
             <a:pPr lvl="0"/>
             <a:r>
-              <a:rPr lang="en-US" smtClean="0"/>
+              <a:rPr lang="en-US"/>
               <a:t>Click to edit Master text styles</a:t>
             </a:r>
           </a:p>
@@ -2860,7 +2856,7 @@
           <a:p>
             <a:fld id="{78C97017-6FC3-485B-9764-EAC9E56C1D49}" type="datetimeFigureOut">
               <a:rPr lang="en-US" smtClean="0"/>
-              <a:t>10/16/2016</a:t>
+              <a:t>23-Mar-17</a:t>
             </a:fld>
             <a:endParaRPr lang="en-US"/>
           </a:p>
@@ -2969,10 +2965,9 @@
           <a:lstStyle/>
           <a:p>
             <a:r>
-              <a:rPr lang="en-US" smtClean="0"/>
+              <a:rPr lang="en-US"/>
               <a:t>Click to edit Master title style</a:t>
             </a:r>
-            <a:endParaRPr lang="en-US"/>
           </a:p>
         </p:txBody>
       </p:sp>
@@ -3003,38 +2998,37 @@
           <a:p>
             <a:pPr lvl="0"/>
             <a:r>
-              <a:rPr lang="en-US" smtClean="0"/>
+              <a:rPr lang="en-US"/>
               <a:t>Click to edit Master text styles</a:t>
             </a:r>
           </a:p>
           <a:p>
             <a:pPr lvl="1"/>
             <a:r>
-              <a:rPr lang="en-US" smtClean="0"/>
+              <a:rPr lang="en-US"/>
               <a:t>Second level</a:t>
             </a:r>
           </a:p>
           <a:p>
             <a:pPr lvl="2"/>
             <a:r>
-              <a:rPr lang="en-US" smtClean="0"/>
+              <a:rPr lang="en-US"/>
               <a:t>Third level</a:t>
             </a:r>
           </a:p>
           <a:p>
             <a:pPr lvl="3"/>
             <a:r>
-              <a:rPr lang="en-US" smtClean="0"/>
+              <a:rPr lang="en-US"/>
               <a:t>Fourth level</a:t>
             </a:r>
           </a:p>
           <a:p>
             <a:pPr lvl="4"/>
             <a:r>
-              <a:rPr lang="en-US" smtClean="0"/>
+              <a:rPr lang="en-US"/>
               <a:t>Fifth level</a:t>
             </a:r>
-            <a:endParaRPr lang="en-US"/>
           </a:p>
         </p:txBody>
       </p:sp>
@@ -3073,7 +3067,7 @@
           <a:p>
             <a:fld id="{78C97017-6FC3-485B-9764-EAC9E56C1D49}" type="datetimeFigureOut">
               <a:rPr lang="en-US" smtClean="0"/>
-              <a:t>10/16/2016</a:t>
+              <a:t>23-Mar-17</a:t>
             </a:fld>
             <a:endParaRPr lang="en-US"/>
           </a:p>
@@ -3492,7 +3486,7 @@
           <a:p>
             <a:pPr algn="ctr"/>
             <a:r>
-              <a:rPr lang="en-US" sz="1600" dirty="0" smtClean="0">
+              <a:rPr lang="en-US" sz="1600" dirty="0">
                 <a:solidFill>
                   <a:schemeClr val="bg1"/>
                 </a:solidFill>
@@ -3856,7 +3850,7 @@
           <a:p>
             <a:pPr algn="ctr"/>
             <a:r>
-              <a:rPr lang="en-US" sz="1600" dirty="0" smtClean="0">
+              <a:rPr lang="en-US" sz="1600" dirty="0">
                 <a:solidFill>
                   <a:schemeClr val="bg1"/>
                 </a:solidFill>
@@ -4003,7 +3997,7 @@
           <a:p>
             <a:pPr algn="ctr"/>
             <a:r>
-              <a:rPr lang="en-US" sz="1600" dirty="0" smtClean="0">
+              <a:rPr lang="en-US" sz="1600" dirty="0">
                 <a:solidFill>
                   <a:schemeClr val="bg1"/>
                 </a:solidFill>
@@ -4165,10 +4159,9 @@
           <a:lstStyle/>
           <a:p>
             <a:r>
-              <a:rPr lang="en-US" sz="1400" dirty="0" smtClean="0"/>
+              <a:rPr lang="en-US" sz="1400" dirty="0"/>
               <a:t>delete 1</a:t>
             </a:r>
-            <a:endParaRPr lang="en-US" sz="1400" dirty="0"/>
           </a:p>
         </p:txBody>
       </p:sp>
@@ -4231,18 +4224,13 @@
           <a:lstStyle/>
           <a:p>
             <a:r>
-              <a:rPr lang="en-US" sz="1400" dirty="0" smtClean="0">
+              <a:rPr lang="en-US" sz="1400" dirty="0">
                 <a:solidFill>
                   <a:srgbClr val="0070C0"/>
                 </a:solidFill>
               </a:rPr>
               <a:t>execute(“delete 1”)</a:t>
             </a:r>
-            <a:endParaRPr lang="en-US" sz="1400" dirty="0">
-              <a:solidFill>
-                <a:srgbClr val="0070C0"/>
-              </a:solidFill>
-            </a:endParaRPr>
           </a:p>
         </p:txBody>
       </p:sp>
@@ -4305,26 +4293,21 @@
           <a:lstStyle/>
           <a:p>
             <a:r>
-              <a:rPr lang="en-US" sz="1400" dirty="0" err="1" smtClean="0">
+              <a:rPr lang="en-US" sz="1400" dirty="0" err="1">
                 <a:solidFill>
                   <a:srgbClr val="7030A0"/>
                 </a:solidFill>
               </a:rPr>
-              <a:t>deletePerson</a:t>
-            </a:r>
-            <a:r>
-              <a:rPr lang="en-US" sz="1400" dirty="0" smtClean="0">
+              <a:t>deleteTask</a:t>
+            </a:r>
+            <a:r>
+              <a:rPr lang="en-US" sz="1400" dirty="0">
                 <a:solidFill>
                   <a:srgbClr val="7030A0"/>
                 </a:solidFill>
               </a:rPr>
               <a:t>(p)</a:t>
             </a:r>
-            <a:endParaRPr lang="en-US" sz="1400" dirty="0">
-              <a:solidFill>
-                <a:srgbClr val="7030A0"/>
-              </a:solidFill>
-            </a:endParaRPr>
           </a:p>
         </p:txBody>
       </p:sp>
@@ -4351,7 +4334,7 @@
           <a:lstStyle/>
           <a:p>
             <a:r>
-              <a:rPr lang="en-US" sz="1400" dirty="0" smtClean="0">
+              <a:rPr lang="en-US" sz="1400" dirty="0">
                 <a:solidFill>
                   <a:schemeClr val="accent5">
                     <a:lumMod val="75000"/>
@@ -4361,17 +4344,17 @@
               <a:t>post(</a:t>
             </a:r>
             <a:r>
-              <a:rPr lang="en-US" sz="1400" dirty="0" err="1" smtClean="0">
+              <a:rPr lang="en-US" sz="1400" dirty="0" err="1">
                 <a:solidFill>
                   <a:schemeClr val="accent5">
                     <a:lumMod val="75000"/>
                   </a:schemeClr>
                 </a:solidFill>
               </a:rPr>
-              <a:t>AddressBookChangedEvent</a:t>
-            </a:r>
-            <a:r>
-              <a:rPr lang="en-US" sz="1400" dirty="0" smtClean="0">
+              <a:t>TaskListChangedEvent</a:t>
+            </a:r>
+            <a:r>
+              <a:rPr lang="en-US" sz="1400" dirty="0">
                 <a:solidFill>
                   <a:schemeClr val="accent5">
                     <a:lumMod val="75000"/>
@@ -4380,13 +4363,6 @@
               </a:rPr>
               <a:t>)</a:t>
             </a:r>
-            <a:endParaRPr lang="en-US" sz="1400" dirty="0">
-              <a:solidFill>
-                <a:schemeClr val="accent5">
-                  <a:lumMod val="75000"/>
-                </a:schemeClr>
-              </a:solidFill>
-            </a:endParaRPr>
           </a:p>
         </p:txBody>
       </p:sp>
@@ -4552,7 +4528,7 @@
           <a:p>
             <a:pPr algn="ctr"/>
             <a:r>
-              <a:rPr lang="en-US" sz="1600" dirty="0" smtClean="0">
+              <a:rPr lang="en-US" sz="1600" dirty="0">
                 <a:solidFill>
                   <a:schemeClr val="bg1"/>
                 </a:solidFill>
@@ -4560,7 +4536,7 @@
               <a:t>:</a:t>
             </a:r>
             <a:r>
-              <a:rPr lang="en-US" sz="1600" dirty="0" err="1" smtClean="0">
+              <a:rPr lang="en-US" sz="1600" dirty="0" err="1">
                 <a:solidFill>
                   <a:schemeClr val="bg1"/>
                 </a:solidFill>
@@ -4793,7 +4769,7 @@
           <a:p>
             <a:pPr algn="ctr"/>
             <a:r>
-              <a:rPr lang="en-US" sz="1600" dirty="0" smtClean="0">
+              <a:rPr lang="en-US" sz="1600" dirty="0">
                 <a:solidFill>
                   <a:schemeClr val="bg1"/>
                 </a:solidFill>
@@ -4925,7 +4901,7 @@
           <a:lstStyle/>
           <a:p>
             <a:r>
-              <a:rPr lang="en-US" sz="1400" dirty="0" smtClean="0">
+              <a:rPr lang="en-US" sz="1400" dirty="0">
                 <a:solidFill>
                   <a:schemeClr val="accent5">
                     <a:lumMod val="75000"/>
@@ -4935,17 +4911,17 @@
               <a:t>post(</a:t>
             </a:r>
             <a:r>
-              <a:rPr lang="en-US" sz="1400" dirty="0" err="1" smtClean="0">
+              <a:rPr lang="en-US" sz="1400" dirty="0" err="1">
                 <a:solidFill>
                   <a:schemeClr val="accent5">
                     <a:lumMod val="75000"/>
                   </a:schemeClr>
                 </a:solidFill>
               </a:rPr>
-              <a:t>AddressBookChangedEvent</a:t>
-            </a:r>
-            <a:r>
-              <a:rPr lang="en-US" sz="1400" dirty="0" smtClean="0">
+              <a:t>TaskListChangedEvent</a:t>
+            </a:r>
+            <a:r>
+              <a:rPr lang="en-US" sz="1400" dirty="0">
                 <a:solidFill>
                   <a:schemeClr val="accent5">
                     <a:lumMod val="75000"/>
@@ -4954,13 +4930,6 @@
               </a:rPr>
               <a:t>)</a:t>
             </a:r>
-            <a:endParaRPr lang="en-US" sz="1400" dirty="0">
-              <a:solidFill>
-                <a:schemeClr val="accent5">
-                  <a:lumMod val="75000"/>
-                </a:schemeClr>
-              </a:solidFill>
-            </a:endParaRPr>
           </a:p>
         </p:txBody>
       </p:sp>
@@ -5052,7 +5021,7 @@
           <a:p>
             <a:pPr algn="ctr"/>
             <a:r>
-              <a:rPr lang="en-US" sz="1600" dirty="0" smtClean="0">
+              <a:rPr lang="en-US" sz="1600" dirty="0">
                 <a:solidFill>
                   <a:schemeClr val="bg1"/>
                 </a:solidFill>
@@ -5060,7 +5029,7 @@
               <a:t>:</a:t>
             </a:r>
             <a:r>
-              <a:rPr lang="en-US" sz="1600" dirty="0" err="1" smtClean="0">
+              <a:rPr lang="en-US" sz="1600" dirty="0" err="1">
                 <a:solidFill>
                   <a:schemeClr val="bg1"/>
                 </a:solidFill>
@@ -5307,17 +5276,17 @@
           <a:lstStyle/>
           <a:p>
             <a:r>
-              <a:rPr lang="en-US" sz="1400" dirty="0" err="1" smtClean="0">
+              <a:rPr lang="en-US" sz="1400">
                 <a:solidFill>
                   <a:schemeClr val="accent6">
                     <a:lumMod val="75000"/>
                   </a:schemeClr>
                 </a:solidFill>
               </a:rPr>
-              <a:t>handleAddresssBookChangedEvent</a:t>
-            </a:r>
-            <a:r>
-              <a:rPr lang="en-US" sz="1400" dirty="0" smtClean="0">
+              <a:t>handleTaskListChangedEvent</a:t>
+            </a:r>
+            <a:r>
+              <a:rPr lang="en-US" sz="1400" dirty="0">
                 <a:solidFill>
                   <a:schemeClr val="accent6">
                     <a:lumMod val="75000"/>
@@ -5326,13 +5295,6 @@
               </a:rPr>
               <a:t>()</a:t>
             </a:r>
-            <a:endParaRPr lang="en-US" sz="1400" dirty="0">
-              <a:solidFill>
-                <a:schemeClr val="accent6">
-                  <a:lumMod val="75000"/>
-                </a:schemeClr>
-              </a:solidFill>
-            </a:endParaRPr>
           </a:p>
         </p:txBody>
       </p:sp>
@@ -5417,7 +5379,7 @@
           <a:p>
             <a:pPr algn="ctr"/>
             <a:r>
-              <a:rPr lang="en-US" sz="1600" dirty="0" smtClean="0">
+              <a:rPr lang="en-US" sz="1600" dirty="0">
                 <a:solidFill>
                   <a:schemeClr val="bg1"/>
                 </a:solidFill>
@@ -5620,26 +5582,21 @@
           <a:lstStyle/>
           <a:p>
             <a:r>
-              <a:rPr lang="en-US" sz="1400" dirty="0" err="1" smtClean="0">
+              <a:rPr lang="en-US" sz="1400" dirty="0" err="1">
                 <a:solidFill>
                   <a:srgbClr val="00B050"/>
                 </a:solidFill>
               </a:rPr>
-              <a:t>handleAddresssBookChangedEvent</a:t>
-            </a:r>
-            <a:r>
-              <a:rPr lang="en-US" sz="1400" dirty="0" smtClean="0">
+              <a:t>handleTaskListChangedEvent</a:t>
+            </a:r>
+            <a:r>
+              <a:rPr lang="en-US" sz="1400" dirty="0">
                 <a:solidFill>
                   <a:srgbClr val="00B050"/>
                 </a:solidFill>
               </a:rPr>
               <a:t>()</a:t>
             </a:r>
-            <a:endParaRPr lang="en-US" sz="1400" dirty="0">
-              <a:solidFill>
-                <a:srgbClr val="00B050"/>
-              </a:solidFill>
-            </a:endParaRPr>
           </a:p>
         </p:txBody>
       </p:sp>
@@ -5826,18 +5783,13 @@
           <a:p>
             <a:pPr algn="r"/>
             <a:r>
-              <a:rPr lang="en-US" sz="1400" dirty="0" smtClean="0">
+              <a:rPr lang="en-US" sz="1400" dirty="0">
                 <a:solidFill>
                   <a:srgbClr val="00B050"/>
                 </a:solidFill>
               </a:rPr>
               <a:t>Update status bar</a:t>
             </a:r>
-            <a:endParaRPr lang="en-US" sz="1400" dirty="0">
-              <a:solidFill>
-                <a:srgbClr val="00B050"/>
-              </a:solidFill>
-            </a:endParaRPr>
           </a:p>
         </p:txBody>
       </p:sp>
@@ -6027,7 +5979,7 @@
           <a:lstStyle/>
           <a:p>
             <a:r>
-              <a:rPr lang="en-US" sz="1400" dirty="0" smtClean="0">
+              <a:rPr lang="en-US" sz="1400" dirty="0">
                 <a:solidFill>
                   <a:schemeClr val="accent6">
                     <a:lumMod val="75000"/>
@@ -6037,7 +5989,7 @@
               <a:t>Save </a:t>
             </a:r>
             <a:br>
-              <a:rPr lang="en-US" sz="1400" dirty="0" smtClean="0">
+              <a:rPr lang="en-US" sz="1400" dirty="0">
                 <a:solidFill>
                   <a:schemeClr val="accent6">
                     <a:lumMod val="75000"/>
@@ -6046,7 +5998,7 @@
               </a:rPr>
             </a:br>
             <a:r>
-              <a:rPr lang="en-US" sz="1400" dirty="0" smtClean="0">
+              <a:rPr lang="en-US" sz="1400" dirty="0">
                 <a:solidFill>
                   <a:schemeClr val="accent6">
                     <a:lumMod val="75000"/>
@@ -6055,13 +6007,6 @@
               </a:rPr>
               <a:t>to file</a:t>
             </a:r>
-            <a:endParaRPr lang="en-US" sz="1400" dirty="0">
-              <a:solidFill>
-                <a:schemeClr val="accent6">
-                  <a:lumMod val="75000"/>
-                </a:schemeClr>
-              </a:solidFill>
-            </a:endParaRPr>
           </a:p>
         </p:txBody>
       </p:sp>

</xml_diff>

<commit_message>
Updated pptx for diagrams
</commit_message>
<xml_diff>
--- a/docs/diagrams/HighLevelSequenceDiagrams.pptx
+++ b/docs/diagrams/HighLevelSequenceDiagrams.pptx
@@ -208,7 +208,7 @@
           <a:p>
             <a:fld id="{F5CC4B3F-88C1-4FFA-B1B6-F41C21DC6924}" type="datetimeFigureOut">
               <a:rPr lang="en-US" smtClean="0"/>
-              <a:t>3/19/2017</a:t>
+              <a:t>3/23/2017</a:t>
             </a:fld>
             <a:endParaRPr lang="en-US"/>
           </a:p>
@@ -657,7 +657,7 @@
           <a:p>
             <a:fld id="{78C97017-6FC3-485B-9764-EAC9E56C1D49}" type="datetimeFigureOut">
               <a:rPr lang="en-US" smtClean="0"/>
-              <a:t>3/19/2017</a:t>
+              <a:t>3/23/2017</a:t>
             </a:fld>
             <a:endParaRPr lang="en-US"/>
           </a:p>
@@ -827,7 +827,7 @@
           <a:p>
             <a:fld id="{78C97017-6FC3-485B-9764-EAC9E56C1D49}" type="datetimeFigureOut">
               <a:rPr lang="en-US" smtClean="0"/>
-              <a:t>3/19/2017</a:t>
+              <a:t>3/23/2017</a:t>
             </a:fld>
             <a:endParaRPr lang="en-US"/>
           </a:p>
@@ -1007,7 +1007,7 @@
           <a:p>
             <a:fld id="{78C97017-6FC3-485B-9764-EAC9E56C1D49}" type="datetimeFigureOut">
               <a:rPr lang="en-US" smtClean="0"/>
-              <a:t>3/19/2017</a:t>
+              <a:t>3/23/2017</a:t>
             </a:fld>
             <a:endParaRPr lang="en-US"/>
           </a:p>
@@ -1177,7 +1177,7 @@
           <a:p>
             <a:fld id="{78C97017-6FC3-485B-9764-EAC9E56C1D49}" type="datetimeFigureOut">
               <a:rPr lang="en-US" smtClean="0"/>
-              <a:t>3/19/2017</a:t>
+              <a:t>3/23/2017</a:t>
             </a:fld>
             <a:endParaRPr lang="en-US"/>
           </a:p>
@@ -1423,7 +1423,7 @@
           <a:p>
             <a:fld id="{78C97017-6FC3-485B-9764-EAC9E56C1D49}" type="datetimeFigureOut">
               <a:rPr lang="en-US" smtClean="0"/>
-              <a:t>3/19/2017</a:t>
+              <a:t>3/23/2017</a:t>
             </a:fld>
             <a:endParaRPr lang="en-US"/>
           </a:p>
@@ -1711,7 +1711,7 @@
           <a:p>
             <a:fld id="{78C97017-6FC3-485B-9764-EAC9E56C1D49}" type="datetimeFigureOut">
               <a:rPr lang="en-US" smtClean="0"/>
-              <a:t>3/19/2017</a:t>
+              <a:t>3/23/2017</a:t>
             </a:fld>
             <a:endParaRPr lang="en-US"/>
           </a:p>
@@ -2133,7 +2133,7 @@
           <a:p>
             <a:fld id="{78C97017-6FC3-485B-9764-EAC9E56C1D49}" type="datetimeFigureOut">
               <a:rPr lang="en-US" smtClean="0"/>
-              <a:t>3/19/2017</a:t>
+              <a:t>3/23/2017</a:t>
             </a:fld>
             <a:endParaRPr lang="en-US"/>
           </a:p>
@@ -2251,7 +2251,7 @@
           <a:p>
             <a:fld id="{78C97017-6FC3-485B-9764-EAC9E56C1D49}" type="datetimeFigureOut">
               <a:rPr lang="en-US" smtClean="0"/>
-              <a:t>3/19/2017</a:t>
+              <a:t>3/23/2017</a:t>
             </a:fld>
             <a:endParaRPr lang="en-US"/>
           </a:p>
@@ -2346,7 +2346,7 @@
           <a:p>
             <a:fld id="{78C97017-6FC3-485B-9764-EAC9E56C1D49}" type="datetimeFigureOut">
               <a:rPr lang="en-US" smtClean="0"/>
-              <a:t>3/19/2017</a:t>
+              <a:t>3/23/2017</a:t>
             </a:fld>
             <a:endParaRPr lang="en-US"/>
           </a:p>
@@ -2623,7 +2623,7 @@
           <a:p>
             <a:fld id="{78C97017-6FC3-485B-9764-EAC9E56C1D49}" type="datetimeFigureOut">
               <a:rPr lang="en-US" smtClean="0"/>
-              <a:t>3/19/2017</a:t>
+              <a:t>3/23/2017</a:t>
             </a:fld>
             <a:endParaRPr lang="en-US"/>
           </a:p>
@@ -2876,7 +2876,7 @@
           <a:p>
             <a:fld id="{78C97017-6FC3-485B-9764-EAC9E56C1D49}" type="datetimeFigureOut">
               <a:rPr lang="en-US" smtClean="0"/>
-              <a:t>3/19/2017</a:t>
+              <a:t>3/23/2017</a:t>
             </a:fld>
             <a:endParaRPr lang="en-US"/>
           </a:p>
@@ -3089,7 +3089,7 @@
           <a:p>
             <a:fld id="{78C97017-6FC3-485B-9764-EAC9E56C1D49}" type="datetimeFigureOut">
               <a:rPr lang="en-US" smtClean="0"/>
-              <a:t>3/19/2017</a:t>
+              <a:t>3/23/2017</a:t>
             </a:fld>
             <a:endParaRPr lang="en-US"/>
           </a:p>
@@ -4326,7 +4326,7 @@
                   <a:srgbClr val="7030A0"/>
                 </a:solidFill>
               </a:rPr>
-              <a:t>deletePerson</a:t>
+              <a:t>deleteTask</a:t>
             </a:r>
             <a:r>
               <a:rPr lang="en-US" sz="1400" dirty="0" smtClean="0">
@@ -4334,7 +4334,15 @@
                   <a:srgbClr val="7030A0"/>
                 </a:solidFill>
               </a:rPr>
-              <a:t>(p)</a:t>
+              <a:t>(p</a:t>
+            </a:r>
+            <a:r>
+              <a:rPr lang="en-US" sz="1400" dirty="0" smtClean="0">
+                <a:solidFill>
+                  <a:srgbClr val="7030A0"/>
+                </a:solidFill>
+              </a:rPr>
+              <a:t>)</a:t>
             </a:r>
             <a:endParaRPr lang="en-US" sz="1400" dirty="0">
               <a:solidFill>
@@ -4384,7 +4392,17 @@
                   </a:schemeClr>
                 </a:solidFill>
               </a:rPr>
-              <a:t>AddressBookChangedEvent</a:t>
+              <a:t>TaskManager</a:t>
+            </a:r>
+            <a:r>
+              <a:rPr lang="en-US" sz="1400" dirty="0" err="1" smtClean="0">
+                <a:solidFill>
+                  <a:schemeClr val="accent5">
+                    <a:lumMod val="75000"/>
+                  </a:schemeClr>
+                </a:solidFill>
+              </a:rPr>
+              <a:t>ChangedEvent</a:t>
             </a:r>
             <a:r>
               <a:rPr lang="en-US" sz="1400" dirty="0" smtClean="0">
@@ -4958,7 +4976,7 @@
                   </a:schemeClr>
                 </a:solidFill>
               </a:rPr>
-              <a:t>AddressBookChangedEvent</a:t>
+              <a:t>TaskManagerChangedEvent</a:t>
             </a:r>
             <a:r>
               <a:rPr lang="en-US" sz="1400" dirty="0" smtClean="0">
@@ -5330,7 +5348,7 @@
                   </a:schemeClr>
                 </a:solidFill>
               </a:rPr>
-              <a:t>handleAddresssBookChangedEvent</a:t>
+              <a:t>handleTaskManagerChangedEvent</a:t>
             </a:r>
             <a:r>
               <a:rPr lang="en-US" sz="1400" dirty="0" smtClean="0">
@@ -5641,7 +5659,7 @@
                   <a:srgbClr val="00B050"/>
                 </a:solidFill>
               </a:rPr>
-              <a:t>handleAddresssBookChangedEvent</a:t>
+              <a:t>handleTaskManagerChangedEvent</a:t>
             </a:r>
             <a:r>
               <a:rPr lang="en-US" sz="1400" dirty="0" smtClean="0">
@@ -6091,6 +6109,13 @@
   <p:clrMapOvr>
     <a:masterClrMapping/>
   </p:clrMapOvr>
+  <p:timing>
+    <p:tnLst>
+      <p:par>
+        <p:cTn id="1" dur="indefinite" restart="never" nodeType="tmRoot"/>
+      </p:par>
+    </p:tnLst>
+  </p:timing>
 </p:sld>
 </file>
 

</xml_diff>

<commit_message>
Updates Pictures in Dev Guide
</commit_message>
<xml_diff>
--- a/docs/diagrams/HighLevelSequenceDiagrams.pptx
+++ b/docs/diagrams/HighLevelSequenceDiagrams.pptx
@@ -208,7 +208,7 @@
           <a:p>
             <a:fld id="{F5CC4B3F-88C1-4FFA-B1B6-F41C21DC6924}" type="datetimeFigureOut">
               <a:rPr lang="en-US" smtClean="0"/>
-              <a:t>3/22/17</a:t>
+              <a:t>3/23/17</a:t>
             </a:fld>
             <a:endParaRPr lang="en-US"/>
           </a:p>
@@ -657,7 +657,7 @@
           <a:p>
             <a:fld id="{78C97017-6FC3-485B-9764-EAC9E56C1D49}" type="datetimeFigureOut">
               <a:rPr lang="en-US" smtClean="0"/>
-              <a:t>3/22/17</a:t>
+              <a:t>3/23/17</a:t>
             </a:fld>
             <a:endParaRPr lang="en-US"/>
           </a:p>
@@ -827,7 +827,7 @@
           <a:p>
             <a:fld id="{78C97017-6FC3-485B-9764-EAC9E56C1D49}" type="datetimeFigureOut">
               <a:rPr lang="en-US" smtClean="0"/>
-              <a:t>3/22/17</a:t>
+              <a:t>3/23/17</a:t>
             </a:fld>
             <a:endParaRPr lang="en-US"/>
           </a:p>
@@ -1007,7 +1007,7 @@
           <a:p>
             <a:fld id="{78C97017-6FC3-485B-9764-EAC9E56C1D49}" type="datetimeFigureOut">
               <a:rPr lang="en-US" smtClean="0"/>
-              <a:t>3/22/17</a:t>
+              <a:t>3/23/17</a:t>
             </a:fld>
             <a:endParaRPr lang="en-US"/>
           </a:p>
@@ -1177,7 +1177,7 @@
           <a:p>
             <a:fld id="{78C97017-6FC3-485B-9764-EAC9E56C1D49}" type="datetimeFigureOut">
               <a:rPr lang="en-US" smtClean="0"/>
-              <a:t>3/22/17</a:t>
+              <a:t>3/23/17</a:t>
             </a:fld>
             <a:endParaRPr lang="en-US"/>
           </a:p>
@@ -1423,7 +1423,7 @@
           <a:p>
             <a:fld id="{78C97017-6FC3-485B-9764-EAC9E56C1D49}" type="datetimeFigureOut">
               <a:rPr lang="en-US" smtClean="0"/>
-              <a:t>3/22/17</a:t>
+              <a:t>3/23/17</a:t>
             </a:fld>
             <a:endParaRPr lang="en-US"/>
           </a:p>
@@ -1711,7 +1711,7 @@
           <a:p>
             <a:fld id="{78C97017-6FC3-485B-9764-EAC9E56C1D49}" type="datetimeFigureOut">
               <a:rPr lang="en-US" smtClean="0"/>
-              <a:t>3/22/17</a:t>
+              <a:t>3/23/17</a:t>
             </a:fld>
             <a:endParaRPr lang="en-US"/>
           </a:p>
@@ -2133,7 +2133,7 @@
           <a:p>
             <a:fld id="{78C97017-6FC3-485B-9764-EAC9E56C1D49}" type="datetimeFigureOut">
               <a:rPr lang="en-US" smtClean="0"/>
-              <a:t>3/22/17</a:t>
+              <a:t>3/23/17</a:t>
             </a:fld>
             <a:endParaRPr lang="en-US"/>
           </a:p>
@@ -2251,7 +2251,7 @@
           <a:p>
             <a:fld id="{78C97017-6FC3-485B-9764-EAC9E56C1D49}" type="datetimeFigureOut">
               <a:rPr lang="en-US" smtClean="0"/>
-              <a:t>3/22/17</a:t>
+              <a:t>3/23/17</a:t>
             </a:fld>
             <a:endParaRPr lang="en-US"/>
           </a:p>
@@ -2346,7 +2346,7 @@
           <a:p>
             <a:fld id="{78C97017-6FC3-485B-9764-EAC9E56C1D49}" type="datetimeFigureOut">
               <a:rPr lang="en-US" smtClean="0"/>
-              <a:t>3/22/17</a:t>
+              <a:t>3/23/17</a:t>
             </a:fld>
             <a:endParaRPr lang="en-US"/>
           </a:p>
@@ -2623,7 +2623,7 @@
           <a:p>
             <a:fld id="{78C97017-6FC3-485B-9764-EAC9E56C1D49}" type="datetimeFigureOut">
               <a:rPr lang="en-US" smtClean="0"/>
-              <a:t>3/22/17</a:t>
+              <a:t>3/23/17</a:t>
             </a:fld>
             <a:endParaRPr lang="en-US"/>
           </a:p>
@@ -2876,7 +2876,7 @@
           <a:p>
             <a:fld id="{78C97017-6FC3-485B-9764-EAC9E56C1D49}" type="datetimeFigureOut">
               <a:rPr lang="en-US" smtClean="0"/>
-              <a:t>3/22/17</a:t>
+              <a:t>3/23/17</a:t>
             </a:fld>
             <a:endParaRPr lang="en-US"/>
           </a:p>
@@ -3089,7 +3089,7 @@
           <a:p>
             <a:fld id="{78C97017-6FC3-485B-9764-EAC9E56C1D49}" type="datetimeFigureOut">
               <a:rPr lang="en-US" smtClean="0"/>
-              <a:t>3/22/17</a:t>
+              <a:t>3/23/17</a:t>
             </a:fld>
             <a:endParaRPr lang="en-US"/>
           </a:p>
@@ -4167,7 +4167,7 @@
         <p:spPr>
           <a:xfrm>
             <a:off x="466818" y="1345880"/>
-            <a:ext cx="860170" cy="400110"/>
+            <a:ext cx="860170" cy="307777"/>
           </a:xfrm>
           <a:prstGeom prst="rect">
             <a:avLst/>
@@ -4181,20 +4181,16 @@
           <a:lstStyle/>
           <a:p>
             <a:r>
-              <a:rPr lang="en-US" sz="1400" dirty="0" smtClean="0"/>
-              <a:t>edit</a:t>
-            </a:r>
-            <a:r>
-              <a:rPr lang="en-US" sz="1400" dirty="0" smtClean="0"/>
-              <a:t> 1 </a:t>
-            </a:r>
-          </a:p>
-          <a:p>
-            <a:r>
-              <a:rPr lang="en-US" sz="1200" dirty="0" smtClean="0"/>
+              <a:rPr lang="en-US" sz="1000" dirty="0" smtClean="0"/>
+              <a:t>edit 1 </a:t>
+            </a:r>
+          </a:p>
+          <a:p>
+            <a:r>
+              <a:rPr lang="en-US" sz="1000" dirty="0" smtClean="0"/>
               <a:t>[KEYWORDS]</a:t>
             </a:r>
-            <a:endParaRPr lang="en-US" sz="1200" dirty="0"/>
+            <a:endParaRPr lang="en-US" sz="1000" dirty="0"/>
           </a:p>
         </p:txBody>
       </p:sp>
@@ -4262,15 +4258,7 @@
                   <a:srgbClr val="0070C0"/>
                 </a:solidFill>
               </a:rPr>
-              <a:t>execute</a:t>
-            </a:r>
-            <a:r>
-              <a:rPr lang="en-US" sz="1400" dirty="0" smtClean="0">
-                <a:solidFill>
-                  <a:srgbClr val="0070C0"/>
-                </a:solidFill>
-              </a:rPr>
-              <a:t>(“edit 1 [KEYWORDS]”)</a:t>
+              <a:t>execute(“edit 1 [KEYWORDS]”)</a:t>
             </a:r>
             <a:endParaRPr lang="en-US" sz="1400" dirty="0">
               <a:solidFill>
@@ -4344,15 +4332,7 @@
                   <a:srgbClr val="7030A0"/>
                 </a:solidFill>
               </a:rPr>
-              <a:t>edit</a:t>
-            </a:r>
-            <a:r>
-              <a:rPr lang="en-US" sz="1400" dirty="0" err="1" smtClean="0">
-                <a:solidFill>
-                  <a:srgbClr val="7030A0"/>
-                </a:solidFill>
-              </a:rPr>
-              <a:t>Task</a:t>
+              <a:t>editTask</a:t>
             </a:r>
             <a:r>
               <a:rPr lang="en-US" sz="1400" dirty="0" smtClean="0">
@@ -4360,15 +4340,7 @@
                   <a:srgbClr val="7030A0"/>
                 </a:solidFill>
               </a:rPr>
-              <a:t>(p</a:t>
-            </a:r>
-            <a:r>
-              <a:rPr lang="en-US" sz="1400" dirty="0" smtClean="0">
-                <a:solidFill>
-                  <a:srgbClr val="7030A0"/>
-                </a:solidFill>
-              </a:rPr>
-              <a:t>)</a:t>
+              <a:t>(p)</a:t>
             </a:r>
             <a:endParaRPr lang="en-US" sz="1400" dirty="0">
               <a:solidFill>
@@ -4387,7 +4359,7 @@
         <p:spPr>
           <a:xfrm>
             <a:off x="6074030" y="1687656"/>
-            <a:ext cx="2438400" cy="215444"/>
+            <a:ext cx="2438400" cy="184666"/>
           </a:xfrm>
           <a:prstGeom prst="rect">
             <a:avLst/>
@@ -4401,7 +4373,7 @@
           <a:lstStyle/>
           <a:p>
             <a:r>
-              <a:rPr lang="en-US" sz="1400" dirty="0" smtClean="0">
+              <a:rPr lang="en-US" sz="1200" dirty="0" smtClean="0">
                 <a:solidFill>
                   <a:schemeClr val="accent5">
                     <a:lumMod val="75000"/>
@@ -4411,7 +4383,7 @@
               <a:t>post(</a:t>
             </a:r>
             <a:r>
-              <a:rPr lang="en-US" sz="1400" dirty="0" err="1" smtClean="0">
+              <a:rPr lang="en-US" sz="1200" dirty="0" err="1" smtClean="0">
                 <a:solidFill>
                   <a:schemeClr val="accent5">
                     <a:lumMod val="75000"/>
@@ -4421,7 +4393,7 @@
               <a:t>TaskManagerChangedEvent</a:t>
             </a:r>
             <a:r>
-              <a:rPr lang="en-US" sz="1400" dirty="0" smtClean="0">
+              <a:rPr lang="en-US" sz="1200" dirty="0" smtClean="0">
                 <a:solidFill>
                   <a:schemeClr val="accent5">
                     <a:lumMod val="75000"/>
@@ -4430,7 +4402,7 @@
               </a:rPr>
               <a:t>)</a:t>
             </a:r>
-            <a:endParaRPr lang="en-US" sz="1400" dirty="0">
+            <a:endParaRPr lang="en-US" sz="1200" dirty="0">
               <a:solidFill>
                 <a:schemeClr val="accent5">
                   <a:lumMod val="75000"/>
@@ -5343,7 +5315,7 @@
         <p:spPr>
           <a:xfrm>
             <a:off x="5036330" y="5065911"/>
-            <a:ext cx="2659870" cy="215444"/>
+            <a:ext cx="2659870" cy="184666"/>
           </a:xfrm>
           <a:prstGeom prst="rect">
             <a:avLst/>
@@ -5357,7 +5329,7 @@
           <a:lstStyle/>
           <a:p>
             <a:r>
-              <a:rPr lang="en-US" sz="1400" dirty="0" err="1" smtClean="0">
+              <a:rPr lang="en-US" sz="1200" dirty="0" err="1" smtClean="0">
                 <a:solidFill>
                   <a:schemeClr val="accent6">
                     <a:lumMod val="75000"/>
@@ -5367,7 +5339,7 @@
               <a:t>handleTaskManagerChangedEvent</a:t>
             </a:r>
             <a:r>
-              <a:rPr lang="en-US" sz="1400" dirty="0" smtClean="0">
+              <a:rPr lang="en-US" sz="1200" dirty="0" smtClean="0">
                 <a:solidFill>
                   <a:schemeClr val="accent6">
                     <a:lumMod val="75000"/>
@@ -5376,7 +5348,7 @@
               </a:rPr>
               <a:t>()</a:t>
             </a:r>
-            <a:endParaRPr lang="en-US" sz="1400" dirty="0">
+            <a:endParaRPr lang="en-US" sz="1200" dirty="0">
               <a:solidFill>
                 <a:schemeClr val="accent6">
                   <a:lumMod val="75000"/>
@@ -5656,7 +5628,7 @@
         <p:spPr>
           <a:xfrm>
             <a:off x="1416276" y="5395369"/>
-            <a:ext cx="2659870" cy="215444"/>
+            <a:ext cx="2659870" cy="184666"/>
           </a:xfrm>
           <a:prstGeom prst="rect">
             <a:avLst/>
@@ -5670,7 +5642,7 @@
           <a:lstStyle/>
           <a:p>
             <a:r>
-              <a:rPr lang="en-US" sz="1400" dirty="0" err="1" smtClean="0">
+              <a:rPr lang="en-US" sz="1200" dirty="0" err="1" smtClean="0">
                 <a:solidFill>
                   <a:srgbClr val="00B050"/>
                 </a:solidFill>
@@ -5678,14 +5650,14 @@
               <a:t>handleTaskManagerChangedEvent</a:t>
             </a:r>
             <a:r>
-              <a:rPr lang="en-US" sz="1400" dirty="0" smtClean="0">
+              <a:rPr lang="en-US" sz="1200" dirty="0" smtClean="0">
                 <a:solidFill>
                   <a:srgbClr val="00B050"/>
                 </a:solidFill>
               </a:rPr>
               <a:t>()</a:t>
             </a:r>
-            <a:endParaRPr lang="en-US" sz="1400" dirty="0">
+            <a:endParaRPr lang="en-US" sz="1200" dirty="0">
               <a:solidFill>
                 <a:srgbClr val="00B050"/>
               </a:solidFill>

</xml_diff>

<commit_message>
Update sequence diagrams and description
</commit_message>
<xml_diff>
--- a/docs/diagrams/HighLevelSequenceDiagrams.pptx
+++ b/docs/diagrams/HighLevelSequenceDiagrams.pptx
@@ -107,6 +107,22 @@
       </a:defRPr>
     </a:lvl9pPr>
   </p:defaultTextStyle>
+  <p:extLst>
+    <p:ext uri="{EFAFB233-063F-42B5-8137-9DF3F51BA10A}">
+      <p15:sldGuideLst xmlns:p15="http://schemas.microsoft.com/office/powerpoint/2012/main">
+        <p15:guide id="1" orient="horz" pos="1488">
+          <p15:clr>
+            <a:srgbClr val="A4A3A4"/>
+          </p15:clr>
+        </p15:guide>
+        <p15:guide id="2" pos="2880">
+          <p15:clr>
+            <a:srgbClr val="A4A3A4"/>
+          </p15:clr>
+        </p15:guide>
+      </p15:sldGuideLst>
+    </p:ext>
+  </p:extLst>
 </p:presentation>
 </file>
 
@@ -192,7 +208,7 @@
           <a:p>
             <a:fld id="{F5CC4B3F-88C1-4FFA-B1B6-F41C21DC6924}" type="datetimeFigureOut">
               <a:rPr lang="en-US" smtClean="0"/>
-              <a:t>10/16/2016</a:t>
+              <a:t>3/23/2017</a:t>
             </a:fld>
             <a:endParaRPr lang="en-US"/>
           </a:p>
@@ -256,38 +272,37 @@
           <a:p>
             <a:pPr lvl="0"/>
             <a:r>
-              <a:rPr lang="en-US" smtClean="0"/>
+              <a:rPr lang="en-US"/>
               <a:t>Click to edit Master text styles</a:t>
             </a:r>
           </a:p>
           <a:p>
             <a:pPr lvl="1"/>
             <a:r>
-              <a:rPr lang="en-US" smtClean="0"/>
+              <a:rPr lang="en-US"/>
               <a:t>Second level</a:t>
             </a:r>
           </a:p>
           <a:p>
             <a:pPr lvl="2"/>
             <a:r>
-              <a:rPr lang="en-US" smtClean="0"/>
+              <a:rPr lang="en-US"/>
               <a:t>Third level</a:t>
             </a:r>
           </a:p>
           <a:p>
             <a:pPr lvl="3"/>
             <a:r>
-              <a:rPr lang="en-US" smtClean="0"/>
+              <a:rPr lang="en-US"/>
               <a:t>Fourth level</a:t>
             </a:r>
           </a:p>
           <a:p>
             <a:pPr lvl="4"/>
             <a:r>
-              <a:rPr lang="en-US" smtClean="0"/>
+              <a:rPr lang="en-US"/>
               <a:t>Fifth level</a:t>
             </a:r>
-            <a:endParaRPr lang="en-US"/>
           </a:p>
         </p:txBody>
       </p:sp>
@@ -498,10 +513,9 @@
           <a:lstStyle/>
           <a:p>
             <a:r>
-              <a:rPr lang="en-US" smtClean="0"/>
+              <a:rPr lang="en-US"/>
               <a:t>Click to edit Master title style</a:t>
             </a:r>
-            <a:endParaRPr lang="en-US"/>
           </a:p>
         </p:txBody>
       </p:sp>
@@ -617,10 +631,9 @@
           </a:lstStyle>
           <a:p>
             <a:r>
-              <a:rPr lang="en-US" smtClean="0"/>
+              <a:rPr lang="en-US"/>
               <a:t>Click to edit Master subtitle style</a:t>
             </a:r>
-            <a:endParaRPr lang="en-US"/>
           </a:p>
         </p:txBody>
       </p:sp>
@@ -641,7 +654,7 @@
           <a:p>
             <a:fld id="{78C97017-6FC3-485B-9764-EAC9E56C1D49}" type="datetimeFigureOut">
               <a:rPr lang="en-US" smtClean="0"/>
-              <a:t>10/16/2016</a:t>
+              <a:t>3/23/2017</a:t>
             </a:fld>
             <a:endParaRPr lang="en-US"/>
           </a:p>
@@ -735,10 +748,9 @@
           <a:lstStyle/>
           <a:p>
             <a:r>
-              <a:rPr lang="en-US" smtClean="0"/>
+              <a:rPr lang="en-US"/>
               <a:t>Click to edit Master title style</a:t>
             </a:r>
-            <a:endParaRPr lang="en-US"/>
           </a:p>
         </p:txBody>
       </p:sp>
@@ -759,38 +771,37 @@
           <a:p>
             <a:pPr lvl="0"/>
             <a:r>
-              <a:rPr lang="en-US" smtClean="0"/>
+              <a:rPr lang="en-US"/>
               <a:t>Click to edit Master text styles</a:t>
             </a:r>
           </a:p>
           <a:p>
             <a:pPr lvl="1"/>
             <a:r>
-              <a:rPr lang="en-US" smtClean="0"/>
+              <a:rPr lang="en-US"/>
               <a:t>Second level</a:t>
             </a:r>
           </a:p>
           <a:p>
             <a:pPr lvl="2"/>
             <a:r>
-              <a:rPr lang="en-US" smtClean="0"/>
+              <a:rPr lang="en-US"/>
               <a:t>Third level</a:t>
             </a:r>
           </a:p>
           <a:p>
             <a:pPr lvl="3"/>
             <a:r>
-              <a:rPr lang="en-US" smtClean="0"/>
+              <a:rPr lang="en-US"/>
               <a:t>Fourth level</a:t>
             </a:r>
           </a:p>
           <a:p>
             <a:pPr lvl="4"/>
             <a:r>
-              <a:rPr lang="en-US" smtClean="0"/>
+              <a:rPr lang="en-US"/>
               <a:t>Fifth level</a:t>
             </a:r>
-            <a:endParaRPr lang="en-US"/>
           </a:p>
         </p:txBody>
       </p:sp>
@@ -811,7 +822,7 @@
           <a:p>
             <a:fld id="{78C97017-6FC3-485B-9764-EAC9E56C1D49}" type="datetimeFigureOut">
               <a:rPr lang="en-US" smtClean="0"/>
-              <a:t>10/16/2016</a:t>
+              <a:t>3/23/2017</a:t>
             </a:fld>
             <a:endParaRPr lang="en-US"/>
           </a:p>
@@ -910,10 +921,9 @@
           <a:lstStyle/>
           <a:p>
             <a:r>
-              <a:rPr lang="en-US" smtClean="0"/>
+              <a:rPr lang="en-US"/>
               <a:t>Click to edit Master title style</a:t>
             </a:r>
-            <a:endParaRPr lang="en-US"/>
           </a:p>
         </p:txBody>
       </p:sp>
@@ -939,38 +949,37 @@
           <a:p>
             <a:pPr lvl="0"/>
             <a:r>
-              <a:rPr lang="en-US" smtClean="0"/>
+              <a:rPr lang="en-US"/>
               <a:t>Click to edit Master text styles</a:t>
             </a:r>
           </a:p>
           <a:p>
             <a:pPr lvl="1"/>
             <a:r>
-              <a:rPr lang="en-US" smtClean="0"/>
+              <a:rPr lang="en-US"/>
               <a:t>Second level</a:t>
             </a:r>
           </a:p>
           <a:p>
             <a:pPr lvl="2"/>
             <a:r>
-              <a:rPr lang="en-US" smtClean="0"/>
+              <a:rPr lang="en-US"/>
               <a:t>Third level</a:t>
             </a:r>
           </a:p>
           <a:p>
             <a:pPr lvl="3"/>
             <a:r>
-              <a:rPr lang="en-US" smtClean="0"/>
+              <a:rPr lang="en-US"/>
               <a:t>Fourth level</a:t>
             </a:r>
           </a:p>
           <a:p>
             <a:pPr lvl="4"/>
             <a:r>
-              <a:rPr lang="en-US" smtClean="0"/>
+              <a:rPr lang="en-US"/>
               <a:t>Fifth level</a:t>
             </a:r>
-            <a:endParaRPr lang="en-US"/>
           </a:p>
         </p:txBody>
       </p:sp>
@@ -991,7 +1000,7 @@
           <a:p>
             <a:fld id="{78C97017-6FC3-485B-9764-EAC9E56C1D49}" type="datetimeFigureOut">
               <a:rPr lang="en-US" smtClean="0"/>
-              <a:t>10/16/2016</a:t>
+              <a:t>3/23/2017</a:t>
             </a:fld>
             <a:endParaRPr lang="en-US"/>
           </a:p>
@@ -1085,10 +1094,9 @@
           <a:lstStyle/>
           <a:p>
             <a:r>
-              <a:rPr lang="en-US" smtClean="0"/>
+              <a:rPr lang="en-US"/>
               <a:t>Click to edit Master title style</a:t>
             </a:r>
-            <a:endParaRPr lang="en-US"/>
           </a:p>
         </p:txBody>
       </p:sp>
@@ -1109,38 +1117,37 @@
           <a:p>
             <a:pPr lvl="0"/>
             <a:r>
-              <a:rPr lang="en-US" smtClean="0"/>
+              <a:rPr lang="en-US"/>
               <a:t>Click to edit Master text styles</a:t>
             </a:r>
           </a:p>
           <a:p>
             <a:pPr lvl="1"/>
             <a:r>
-              <a:rPr lang="en-US" smtClean="0"/>
+              <a:rPr lang="en-US"/>
               <a:t>Second level</a:t>
             </a:r>
           </a:p>
           <a:p>
             <a:pPr lvl="2"/>
             <a:r>
-              <a:rPr lang="en-US" smtClean="0"/>
+              <a:rPr lang="en-US"/>
               <a:t>Third level</a:t>
             </a:r>
           </a:p>
           <a:p>
             <a:pPr lvl="3"/>
             <a:r>
-              <a:rPr lang="en-US" smtClean="0"/>
+              <a:rPr lang="en-US"/>
               <a:t>Fourth level</a:t>
             </a:r>
           </a:p>
           <a:p>
             <a:pPr lvl="4"/>
             <a:r>
-              <a:rPr lang="en-US" smtClean="0"/>
+              <a:rPr lang="en-US"/>
               <a:t>Fifth level</a:t>
             </a:r>
-            <a:endParaRPr lang="en-US"/>
           </a:p>
         </p:txBody>
       </p:sp>
@@ -1161,7 +1168,7 @@
           <a:p>
             <a:fld id="{78C97017-6FC3-485B-9764-EAC9E56C1D49}" type="datetimeFigureOut">
               <a:rPr lang="en-US" smtClean="0"/>
-              <a:t>10/16/2016</a:t>
+              <a:t>3/23/2017</a:t>
             </a:fld>
             <a:endParaRPr lang="en-US"/>
           </a:p>
@@ -1264,10 +1271,9 @@
           </a:lstStyle>
           <a:p>
             <a:r>
-              <a:rPr lang="en-US" smtClean="0"/>
+              <a:rPr lang="en-US"/>
               <a:t>Click to edit Master title style</a:t>
             </a:r>
-            <a:endParaRPr lang="en-US"/>
           </a:p>
         </p:txBody>
       </p:sp>
@@ -1384,7 +1390,7 @@
           <a:p>
             <a:pPr lvl="0"/>
             <a:r>
-              <a:rPr lang="en-US" smtClean="0"/>
+              <a:rPr lang="en-US"/>
               <a:t>Click to edit Master text styles</a:t>
             </a:r>
           </a:p>
@@ -1407,7 +1413,7 @@
           <a:p>
             <a:fld id="{78C97017-6FC3-485B-9764-EAC9E56C1D49}" type="datetimeFigureOut">
               <a:rPr lang="en-US" smtClean="0"/>
-              <a:t>10/16/2016</a:t>
+              <a:t>3/23/2017</a:t>
             </a:fld>
             <a:endParaRPr lang="en-US"/>
           </a:p>
@@ -1501,10 +1507,9 @@
           <a:lstStyle/>
           <a:p>
             <a:r>
-              <a:rPr lang="en-US" smtClean="0"/>
+              <a:rPr lang="en-US"/>
               <a:t>Click to edit Master title style</a:t>
             </a:r>
-            <a:endParaRPr lang="en-US"/>
           </a:p>
         </p:txBody>
       </p:sp>
@@ -1558,38 +1563,37 @@
           <a:p>
             <a:pPr lvl="0"/>
             <a:r>
-              <a:rPr lang="en-US" smtClean="0"/>
+              <a:rPr lang="en-US"/>
               <a:t>Click to edit Master text styles</a:t>
             </a:r>
           </a:p>
           <a:p>
             <a:pPr lvl="1"/>
             <a:r>
-              <a:rPr lang="en-US" smtClean="0"/>
+              <a:rPr lang="en-US"/>
               <a:t>Second level</a:t>
             </a:r>
           </a:p>
           <a:p>
             <a:pPr lvl="2"/>
             <a:r>
-              <a:rPr lang="en-US" smtClean="0"/>
+              <a:rPr lang="en-US"/>
               <a:t>Third level</a:t>
             </a:r>
           </a:p>
           <a:p>
             <a:pPr lvl="3"/>
             <a:r>
-              <a:rPr lang="en-US" smtClean="0"/>
+              <a:rPr lang="en-US"/>
               <a:t>Fourth level</a:t>
             </a:r>
           </a:p>
           <a:p>
             <a:pPr lvl="4"/>
             <a:r>
-              <a:rPr lang="en-US" smtClean="0"/>
+              <a:rPr lang="en-US"/>
               <a:t>Fifth level</a:t>
             </a:r>
-            <a:endParaRPr lang="en-US"/>
           </a:p>
         </p:txBody>
       </p:sp>
@@ -1643,38 +1647,37 @@
           <a:p>
             <a:pPr lvl="0"/>
             <a:r>
-              <a:rPr lang="en-US" smtClean="0"/>
+              <a:rPr lang="en-US"/>
               <a:t>Click to edit Master text styles</a:t>
             </a:r>
           </a:p>
           <a:p>
             <a:pPr lvl="1"/>
             <a:r>
-              <a:rPr lang="en-US" smtClean="0"/>
+              <a:rPr lang="en-US"/>
               <a:t>Second level</a:t>
             </a:r>
           </a:p>
           <a:p>
             <a:pPr lvl="2"/>
             <a:r>
-              <a:rPr lang="en-US" smtClean="0"/>
+              <a:rPr lang="en-US"/>
               <a:t>Third level</a:t>
             </a:r>
           </a:p>
           <a:p>
             <a:pPr lvl="3"/>
             <a:r>
-              <a:rPr lang="en-US" smtClean="0"/>
+              <a:rPr lang="en-US"/>
               <a:t>Fourth level</a:t>
             </a:r>
           </a:p>
           <a:p>
             <a:pPr lvl="4"/>
             <a:r>
-              <a:rPr lang="en-US" smtClean="0"/>
+              <a:rPr lang="en-US"/>
               <a:t>Fifth level</a:t>
             </a:r>
-            <a:endParaRPr lang="en-US"/>
           </a:p>
         </p:txBody>
       </p:sp>
@@ -1695,7 +1698,7 @@
           <a:p>
             <a:fld id="{78C97017-6FC3-485B-9764-EAC9E56C1D49}" type="datetimeFigureOut">
               <a:rPr lang="en-US" smtClean="0"/>
-              <a:t>10/16/2016</a:t>
+              <a:t>3/23/2017</a:t>
             </a:fld>
             <a:endParaRPr lang="en-US"/>
           </a:p>
@@ -1793,10 +1796,9 @@
           </a:lstStyle>
           <a:p>
             <a:r>
-              <a:rPr lang="en-US" smtClean="0"/>
+              <a:rPr lang="en-US"/>
               <a:t>Click to edit Master title style</a:t>
             </a:r>
-            <a:endParaRPr lang="en-US"/>
           </a:p>
         </p:txBody>
       </p:sp>
@@ -1859,7 +1861,7 @@
           <a:p>
             <a:pPr lvl="0"/>
             <a:r>
-              <a:rPr lang="en-US" smtClean="0"/>
+              <a:rPr lang="en-US"/>
               <a:t>Click to edit Master text styles</a:t>
             </a:r>
           </a:p>
@@ -1915,38 +1917,37 @@
           <a:p>
             <a:pPr lvl="0"/>
             <a:r>
-              <a:rPr lang="en-US" smtClean="0"/>
+              <a:rPr lang="en-US"/>
               <a:t>Click to edit Master text styles</a:t>
             </a:r>
           </a:p>
           <a:p>
             <a:pPr lvl="1"/>
             <a:r>
-              <a:rPr lang="en-US" smtClean="0"/>
+              <a:rPr lang="en-US"/>
               <a:t>Second level</a:t>
             </a:r>
           </a:p>
           <a:p>
             <a:pPr lvl="2"/>
             <a:r>
-              <a:rPr lang="en-US" smtClean="0"/>
+              <a:rPr lang="en-US"/>
               <a:t>Third level</a:t>
             </a:r>
           </a:p>
           <a:p>
             <a:pPr lvl="3"/>
             <a:r>
-              <a:rPr lang="en-US" smtClean="0"/>
+              <a:rPr lang="en-US"/>
               <a:t>Fourth level</a:t>
             </a:r>
           </a:p>
           <a:p>
             <a:pPr lvl="4"/>
             <a:r>
-              <a:rPr lang="en-US" smtClean="0"/>
+              <a:rPr lang="en-US"/>
               <a:t>Fifth level</a:t>
             </a:r>
-            <a:endParaRPr lang="en-US"/>
           </a:p>
         </p:txBody>
       </p:sp>
@@ -2009,7 +2010,7 @@
           <a:p>
             <a:pPr lvl="0"/>
             <a:r>
-              <a:rPr lang="en-US" smtClean="0"/>
+              <a:rPr lang="en-US"/>
               <a:t>Click to edit Master text styles</a:t>
             </a:r>
           </a:p>
@@ -2065,38 +2066,37 @@
           <a:p>
             <a:pPr lvl="0"/>
             <a:r>
-              <a:rPr lang="en-US" smtClean="0"/>
+              <a:rPr lang="en-US"/>
               <a:t>Click to edit Master text styles</a:t>
             </a:r>
           </a:p>
           <a:p>
             <a:pPr lvl="1"/>
             <a:r>
-              <a:rPr lang="en-US" smtClean="0"/>
+              <a:rPr lang="en-US"/>
               <a:t>Second level</a:t>
             </a:r>
           </a:p>
           <a:p>
             <a:pPr lvl="2"/>
             <a:r>
-              <a:rPr lang="en-US" smtClean="0"/>
+              <a:rPr lang="en-US"/>
               <a:t>Third level</a:t>
             </a:r>
           </a:p>
           <a:p>
             <a:pPr lvl="3"/>
             <a:r>
-              <a:rPr lang="en-US" smtClean="0"/>
+              <a:rPr lang="en-US"/>
               <a:t>Fourth level</a:t>
             </a:r>
           </a:p>
           <a:p>
             <a:pPr lvl="4"/>
             <a:r>
-              <a:rPr lang="en-US" smtClean="0"/>
+              <a:rPr lang="en-US"/>
               <a:t>Fifth level</a:t>
             </a:r>
-            <a:endParaRPr lang="en-US"/>
           </a:p>
         </p:txBody>
       </p:sp>
@@ -2117,7 +2117,7 @@
           <a:p>
             <a:fld id="{78C97017-6FC3-485B-9764-EAC9E56C1D49}" type="datetimeFigureOut">
               <a:rPr lang="en-US" smtClean="0"/>
-              <a:t>10/16/2016</a:t>
+              <a:t>3/23/2017</a:t>
             </a:fld>
             <a:endParaRPr lang="en-US"/>
           </a:p>
@@ -2211,10 +2211,9 @@
           <a:lstStyle/>
           <a:p>
             <a:r>
-              <a:rPr lang="en-US" smtClean="0"/>
+              <a:rPr lang="en-US"/>
               <a:t>Click to edit Master title style</a:t>
             </a:r>
-            <a:endParaRPr lang="en-US"/>
           </a:p>
         </p:txBody>
       </p:sp>
@@ -2235,7 +2234,7 @@
           <a:p>
             <a:fld id="{78C97017-6FC3-485B-9764-EAC9E56C1D49}" type="datetimeFigureOut">
               <a:rPr lang="en-US" smtClean="0"/>
-              <a:t>10/16/2016</a:t>
+              <a:t>3/23/2017</a:t>
             </a:fld>
             <a:endParaRPr lang="en-US"/>
           </a:p>
@@ -2330,7 +2329,7 @@
           <a:p>
             <a:fld id="{78C97017-6FC3-485B-9764-EAC9E56C1D49}" type="datetimeFigureOut">
               <a:rPr lang="en-US" smtClean="0"/>
-              <a:t>10/16/2016</a:t>
+              <a:t>3/23/2017</a:t>
             </a:fld>
             <a:endParaRPr lang="en-US"/>
           </a:p>
@@ -2433,10 +2432,9 @@
           </a:lstStyle>
           <a:p>
             <a:r>
-              <a:rPr lang="en-US" smtClean="0"/>
+              <a:rPr lang="en-US"/>
               <a:t>Click to edit Master title style</a:t>
             </a:r>
-            <a:endParaRPr lang="en-US"/>
           </a:p>
         </p:txBody>
       </p:sp>
@@ -2490,38 +2488,37 @@
           <a:p>
             <a:pPr lvl="0"/>
             <a:r>
-              <a:rPr lang="en-US" smtClean="0"/>
+              <a:rPr lang="en-US"/>
               <a:t>Click to edit Master text styles</a:t>
             </a:r>
           </a:p>
           <a:p>
             <a:pPr lvl="1"/>
             <a:r>
-              <a:rPr lang="en-US" smtClean="0"/>
+              <a:rPr lang="en-US"/>
               <a:t>Second level</a:t>
             </a:r>
           </a:p>
           <a:p>
             <a:pPr lvl="2"/>
             <a:r>
-              <a:rPr lang="en-US" smtClean="0"/>
+              <a:rPr lang="en-US"/>
               <a:t>Third level</a:t>
             </a:r>
           </a:p>
           <a:p>
             <a:pPr lvl="3"/>
             <a:r>
-              <a:rPr lang="en-US" smtClean="0"/>
+              <a:rPr lang="en-US"/>
               <a:t>Fourth level</a:t>
             </a:r>
           </a:p>
           <a:p>
             <a:pPr lvl="4"/>
             <a:r>
-              <a:rPr lang="en-US" smtClean="0"/>
+              <a:rPr lang="en-US"/>
               <a:t>Fifth level</a:t>
             </a:r>
-            <a:endParaRPr lang="en-US"/>
           </a:p>
         </p:txBody>
       </p:sp>
@@ -2584,7 +2581,7 @@
           <a:p>
             <a:pPr lvl="0"/>
             <a:r>
-              <a:rPr lang="en-US" smtClean="0"/>
+              <a:rPr lang="en-US"/>
               <a:t>Click to edit Master text styles</a:t>
             </a:r>
           </a:p>
@@ -2607,7 +2604,7 @@
           <a:p>
             <a:fld id="{78C97017-6FC3-485B-9764-EAC9E56C1D49}" type="datetimeFigureOut">
               <a:rPr lang="en-US" smtClean="0"/>
-              <a:t>10/16/2016</a:t>
+              <a:t>3/23/2017</a:t>
             </a:fld>
             <a:endParaRPr lang="en-US"/>
           </a:p>
@@ -2710,10 +2707,9 @@
           </a:lstStyle>
           <a:p>
             <a:r>
-              <a:rPr lang="en-US" smtClean="0"/>
+              <a:rPr lang="en-US"/>
               <a:t>Click to edit Master title style</a:t>
             </a:r>
-            <a:endParaRPr lang="en-US"/>
           </a:p>
         </p:txBody>
       </p:sp>
@@ -2837,7 +2833,7 @@
           <a:p>
             <a:pPr lvl="0"/>
             <a:r>
-              <a:rPr lang="en-US" smtClean="0"/>
+              <a:rPr lang="en-US"/>
               <a:t>Click to edit Master text styles</a:t>
             </a:r>
           </a:p>
@@ -2860,7 +2856,7 @@
           <a:p>
             <a:fld id="{78C97017-6FC3-485B-9764-EAC9E56C1D49}" type="datetimeFigureOut">
               <a:rPr lang="en-US" smtClean="0"/>
-              <a:t>10/16/2016</a:t>
+              <a:t>3/23/2017</a:t>
             </a:fld>
             <a:endParaRPr lang="en-US"/>
           </a:p>
@@ -2969,10 +2965,9 @@
           <a:lstStyle/>
           <a:p>
             <a:r>
-              <a:rPr lang="en-US" smtClean="0"/>
+              <a:rPr lang="en-US"/>
               <a:t>Click to edit Master title style</a:t>
             </a:r>
-            <a:endParaRPr lang="en-US"/>
           </a:p>
         </p:txBody>
       </p:sp>
@@ -3003,38 +2998,37 @@
           <a:p>
             <a:pPr lvl="0"/>
             <a:r>
-              <a:rPr lang="en-US" smtClean="0"/>
+              <a:rPr lang="en-US"/>
               <a:t>Click to edit Master text styles</a:t>
             </a:r>
           </a:p>
           <a:p>
             <a:pPr lvl="1"/>
             <a:r>
-              <a:rPr lang="en-US" smtClean="0"/>
+              <a:rPr lang="en-US"/>
               <a:t>Second level</a:t>
             </a:r>
           </a:p>
           <a:p>
             <a:pPr lvl="2"/>
             <a:r>
-              <a:rPr lang="en-US" smtClean="0"/>
+              <a:rPr lang="en-US"/>
               <a:t>Third level</a:t>
             </a:r>
           </a:p>
           <a:p>
             <a:pPr lvl="3"/>
             <a:r>
-              <a:rPr lang="en-US" smtClean="0"/>
+              <a:rPr lang="en-US"/>
               <a:t>Fourth level</a:t>
             </a:r>
           </a:p>
           <a:p>
             <a:pPr lvl="4"/>
             <a:r>
-              <a:rPr lang="en-US" smtClean="0"/>
+              <a:rPr lang="en-US"/>
               <a:t>Fifth level</a:t>
             </a:r>
-            <a:endParaRPr lang="en-US"/>
           </a:p>
         </p:txBody>
       </p:sp>
@@ -3073,7 +3067,7 @@
           <a:p>
             <a:fld id="{78C97017-6FC3-485B-9764-EAC9E56C1D49}" type="datetimeFigureOut">
               <a:rPr lang="en-US" smtClean="0"/>
-              <a:t>10/16/2016</a:t>
+              <a:t>3/23/2017</a:t>
             </a:fld>
             <a:endParaRPr lang="en-US"/>
           </a:p>
@@ -3492,7 +3486,7 @@
           <a:p>
             <a:pPr algn="ctr"/>
             <a:r>
-              <a:rPr lang="en-US" sz="1600" dirty="0" smtClean="0">
+              <a:rPr lang="en-US" sz="1600" dirty="0">
                 <a:solidFill>
                   <a:schemeClr val="bg1"/>
                 </a:solidFill>
@@ -3856,7 +3850,7 @@
           <a:p>
             <a:pPr algn="ctr"/>
             <a:r>
-              <a:rPr lang="en-US" sz="1600" dirty="0" smtClean="0">
+              <a:rPr lang="en-US" sz="1600" dirty="0">
                 <a:solidFill>
                   <a:schemeClr val="bg1"/>
                 </a:solidFill>
@@ -4003,7 +3997,7 @@
           <a:p>
             <a:pPr algn="ctr"/>
             <a:r>
-              <a:rPr lang="en-US" sz="1600" dirty="0" smtClean="0">
+              <a:rPr lang="en-US" sz="1600" dirty="0">
                 <a:solidFill>
                   <a:schemeClr val="bg1"/>
                 </a:solidFill>
@@ -4150,8 +4144,8 @@
         </p:nvSpPr>
         <p:spPr>
           <a:xfrm>
-            <a:off x="466818" y="1345880"/>
-            <a:ext cx="860170" cy="215444"/>
+            <a:off x="477617" y="1362185"/>
+            <a:ext cx="999365" cy="215444"/>
           </a:xfrm>
           <a:prstGeom prst="rect">
             <a:avLst/>
@@ -4165,10 +4159,9 @@
           <a:lstStyle/>
           <a:p>
             <a:r>
-              <a:rPr lang="en-US" sz="1400" dirty="0" smtClean="0"/>
-              <a:t>delete 1</a:t>
-            </a:r>
-            <a:endParaRPr lang="en-US" sz="1400" dirty="0"/>
+              <a:rPr lang="en-US" sz="1400" dirty="0"/>
+              <a:t>delete task 1</a:t>
+            </a:r>
           </a:p>
         </p:txBody>
       </p:sp>
@@ -4216,8 +4209,8 @@
         </p:nvSpPr>
         <p:spPr>
           <a:xfrm>
-            <a:off x="2166172" y="1453379"/>
-            <a:ext cx="1424846" cy="215444"/>
+            <a:off x="1998750" y="1453379"/>
+            <a:ext cx="1592268" cy="215444"/>
           </a:xfrm>
           <a:prstGeom prst="rect">
             <a:avLst/>
@@ -4231,18 +4224,13 @@
           <a:lstStyle/>
           <a:p>
             <a:r>
-              <a:rPr lang="en-US" sz="1400" dirty="0" smtClean="0">
+              <a:rPr lang="en-US" sz="1400" dirty="0">
                 <a:solidFill>
                   <a:srgbClr val="0070C0"/>
                 </a:solidFill>
               </a:rPr>
-              <a:t>execute(“delete 1”)</a:t>
-            </a:r>
-            <a:endParaRPr lang="en-US" sz="1400" dirty="0">
-              <a:solidFill>
-                <a:srgbClr val="0070C0"/>
-              </a:solidFill>
-            </a:endParaRPr>
+              <a:t>execute(“delete t 1”)</a:t>
+            </a:r>
           </a:p>
         </p:txBody>
       </p:sp>
@@ -4305,26 +4293,21 @@
           <a:lstStyle/>
           <a:p>
             <a:r>
-              <a:rPr lang="en-US" sz="1400" dirty="0" err="1" smtClean="0">
+              <a:rPr lang="en-US" sz="1400" dirty="0" err="1">
                 <a:solidFill>
                   <a:srgbClr val="7030A0"/>
                 </a:solidFill>
               </a:rPr>
-              <a:t>deletePerson</a:t>
-            </a:r>
-            <a:r>
-              <a:rPr lang="en-US" sz="1400" dirty="0" smtClean="0">
+              <a:t>deleteTask</a:t>
+            </a:r>
+            <a:r>
+              <a:rPr lang="en-US" sz="1400" dirty="0">
                 <a:solidFill>
                   <a:srgbClr val="7030A0"/>
                 </a:solidFill>
               </a:rPr>
-              <a:t>(p)</a:t>
-            </a:r>
-            <a:endParaRPr lang="en-US" sz="1400" dirty="0">
-              <a:solidFill>
-                <a:srgbClr val="7030A0"/>
-              </a:solidFill>
-            </a:endParaRPr>
+              <a:t>(t)</a:t>
+            </a:r>
           </a:p>
         </p:txBody>
       </p:sp>
@@ -4351,7 +4334,7 @@
           <a:lstStyle/>
           <a:p>
             <a:r>
-              <a:rPr lang="en-US" sz="1400" dirty="0" smtClean="0">
+              <a:rPr lang="en-US" sz="1400" dirty="0">
                 <a:solidFill>
                   <a:schemeClr val="accent5">
                     <a:lumMod val="75000"/>
@@ -4361,17 +4344,17 @@
               <a:t>post(</a:t>
             </a:r>
             <a:r>
-              <a:rPr lang="en-US" sz="1400" dirty="0" err="1" smtClean="0">
+              <a:rPr lang="en-US" sz="1400" dirty="0" err="1">
                 <a:solidFill>
                   <a:schemeClr val="accent5">
                     <a:lumMod val="75000"/>
                   </a:schemeClr>
                 </a:solidFill>
               </a:rPr>
-              <a:t>AddressBookChangedEvent</a:t>
-            </a:r>
-            <a:r>
-              <a:rPr lang="en-US" sz="1400" dirty="0" smtClean="0">
+              <a:t>UserInboxChangedEvent</a:t>
+            </a:r>
+            <a:r>
+              <a:rPr lang="en-US" sz="1400" dirty="0">
                 <a:solidFill>
                   <a:schemeClr val="accent5">
                     <a:lumMod val="75000"/>
@@ -4380,13 +4363,6 @@
               </a:rPr>
               <a:t>)</a:t>
             </a:r>
-            <a:endParaRPr lang="en-US" sz="1400" dirty="0">
-              <a:solidFill>
-                <a:schemeClr val="accent5">
-                  <a:lumMod val="75000"/>
-                </a:schemeClr>
-              </a:solidFill>
-            </a:endParaRPr>
           </a:p>
         </p:txBody>
       </p:sp>
@@ -4552,7 +4528,7 @@
           <a:p>
             <a:pPr algn="ctr"/>
             <a:r>
-              <a:rPr lang="en-US" sz="1600" dirty="0" smtClean="0">
+              <a:rPr lang="en-US" sz="1600" dirty="0">
                 <a:solidFill>
                   <a:schemeClr val="bg1"/>
                 </a:solidFill>
@@ -4560,7 +4536,7 @@
               <a:t>:</a:t>
             </a:r>
             <a:r>
-              <a:rPr lang="en-US" sz="1600" dirty="0" err="1" smtClean="0">
+              <a:rPr lang="en-US" sz="1600" dirty="0" err="1">
                 <a:solidFill>
                   <a:schemeClr val="bg1"/>
                 </a:solidFill>
@@ -4793,7 +4769,7 @@
           <a:p>
             <a:pPr algn="ctr"/>
             <a:r>
-              <a:rPr lang="en-US" sz="1600" dirty="0" smtClean="0">
+              <a:rPr lang="en-US" sz="1600" dirty="0">
                 <a:solidFill>
                   <a:schemeClr val="bg1"/>
                 </a:solidFill>
@@ -4925,7 +4901,7 @@
           <a:lstStyle/>
           <a:p>
             <a:r>
-              <a:rPr lang="en-US" sz="1400" dirty="0" smtClean="0">
+              <a:rPr lang="en-US" sz="1400" dirty="0">
                 <a:solidFill>
                   <a:schemeClr val="accent5">
                     <a:lumMod val="75000"/>
@@ -4935,17 +4911,17 @@
               <a:t>post(</a:t>
             </a:r>
             <a:r>
-              <a:rPr lang="en-US" sz="1400" dirty="0" err="1" smtClean="0">
+              <a:rPr lang="en-US" sz="1400" dirty="0" err="1">
                 <a:solidFill>
                   <a:schemeClr val="accent5">
                     <a:lumMod val="75000"/>
                   </a:schemeClr>
                 </a:solidFill>
               </a:rPr>
-              <a:t>AddressBookChangedEvent</a:t>
-            </a:r>
-            <a:r>
-              <a:rPr lang="en-US" sz="1400" dirty="0" smtClean="0">
+              <a:t>UserInboxChangedEvent</a:t>
+            </a:r>
+            <a:r>
+              <a:rPr lang="en-US" sz="1400" dirty="0">
                 <a:solidFill>
                   <a:schemeClr val="accent5">
                     <a:lumMod val="75000"/>
@@ -4954,13 +4930,6 @@
               </a:rPr>
               <a:t>)</a:t>
             </a:r>
-            <a:endParaRPr lang="en-US" sz="1400" dirty="0">
-              <a:solidFill>
-                <a:schemeClr val="accent5">
-                  <a:lumMod val="75000"/>
-                </a:schemeClr>
-              </a:solidFill>
-            </a:endParaRPr>
           </a:p>
         </p:txBody>
       </p:sp>
@@ -5052,7 +5021,7 @@
           <a:p>
             <a:pPr algn="ctr"/>
             <a:r>
-              <a:rPr lang="en-US" sz="1600" dirty="0" smtClean="0">
+              <a:rPr lang="en-US" sz="1600" dirty="0">
                 <a:solidFill>
                   <a:schemeClr val="bg1"/>
                 </a:solidFill>
@@ -5060,7 +5029,7 @@
               <a:t>:</a:t>
             </a:r>
             <a:r>
-              <a:rPr lang="en-US" sz="1600" dirty="0" err="1" smtClean="0">
+              <a:rPr lang="en-US" sz="1600" dirty="0" err="1">
                 <a:solidFill>
                   <a:schemeClr val="bg1"/>
                 </a:solidFill>
@@ -5307,17 +5276,17 @@
           <a:lstStyle/>
           <a:p>
             <a:r>
-              <a:rPr lang="en-US" sz="1400" dirty="0" err="1" smtClean="0">
+              <a:rPr lang="en-US" sz="1400" dirty="0" err="1">
                 <a:solidFill>
                   <a:schemeClr val="accent6">
                     <a:lumMod val="75000"/>
                   </a:schemeClr>
                 </a:solidFill>
               </a:rPr>
-              <a:t>handleAddresssBookChangedEvent</a:t>
-            </a:r>
-            <a:r>
-              <a:rPr lang="en-US" sz="1400" dirty="0" smtClean="0">
+              <a:t>handleUserInboxChangedEvent</a:t>
+            </a:r>
+            <a:r>
+              <a:rPr lang="en-US" sz="1400" dirty="0">
                 <a:solidFill>
                   <a:schemeClr val="accent6">
                     <a:lumMod val="75000"/>
@@ -5326,13 +5295,6 @@
               </a:rPr>
               <a:t>()</a:t>
             </a:r>
-            <a:endParaRPr lang="en-US" sz="1400" dirty="0">
-              <a:solidFill>
-                <a:schemeClr val="accent6">
-                  <a:lumMod val="75000"/>
-                </a:schemeClr>
-              </a:solidFill>
-            </a:endParaRPr>
           </a:p>
         </p:txBody>
       </p:sp>
@@ -5417,7 +5379,7 @@
           <a:p>
             <a:pPr algn="ctr"/>
             <a:r>
-              <a:rPr lang="en-US" sz="1600" dirty="0" smtClean="0">
+              <a:rPr lang="en-US" sz="1600" dirty="0">
                 <a:solidFill>
                   <a:schemeClr val="bg1"/>
                 </a:solidFill>
@@ -5620,26 +5582,21 @@
           <a:lstStyle/>
           <a:p>
             <a:r>
-              <a:rPr lang="en-US" sz="1400" dirty="0" err="1" smtClean="0">
+              <a:rPr lang="en-US" sz="1400" dirty="0" err="1">
                 <a:solidFill>
                   <a:srgbClr val="00B050"/>
                 </a:solidFill>
               </a:rPr>
-              <a:t>handleAddresssBookChangedEvent</a:t>
-            </a:r>
-            <a:r>
-              <a:rPr lang="en-US" sz="1400" dirty="0" smtClean="0">
+              <a:t>handleUserInboxChangedEvent</a:t>
+            </a:r>
+            <a:r>
+              <a:rPr lang="en-US" sz="1400" dirty="0">
                 <a:solidFill>
                   <a:srgbClr val="00B050"/>
                 </a:solidFill>
               </a:rPr>
               <a:t>()</a:t>
             </a:r>
-            <a:endParaRPr lang="en-US" sz="1400" dirty="0">
-              <a:solidFill>
-                <a:srgbClr val="00B050"/>
-              </a:solidFill>
-            </a:endParaRPr>
           </a:p>
         </p:txBody>
       </p:sp>
@@ -5826,18 +5783,13 @@
           <a:p>
             <a:pPr algn="r"/>
             <a:r>
-              <a:rPr lang="en-US" sz="1400" dirty="0" smtClean="0">
+              <a:rPr lang="en-US" sz="1400" dirty="0">
                 <a:solidFill>
                   <a:srgbClr val="00B050"/>
                 </a:solidFill>
               </a:rPr>
               <a:t>Update status bar</a:t>
             </a:r>
-            <a:endParaRPr lang="en-US" sz="1400" dirty="0">
-              <a:solidFill>
-                <a:srgbClr val="00B050"/>
-              </a:solidFill>
-            </a:endParaRPr>
           </a:p>
         </p:txBody>
       </p:sp>
@@ -6027,7 +5979,7 @@
           <a:lstStyle/>
           <a:p>
             <a:r>
-              <a:rPr lang="en-US" sz="1400" dirty="0" smtClean="0">
+              <a:rPr lang="en-US" sz="1400" dirty="0">
                 <a:solidFill>
                   <a:schemeClr val="accent6">
                     <a:lumMod val="75000"/>
@@ -6037,7 +5989,7 @@
               <a:t>Save </a:t>
             </a:r>
             <a:br>
-              <a:rPr lang="en-US" sz="1400" dirty="0" smtClean="0">
+              <a:rPr lang="en-US" sz="1400" dirty="0">
                 <a:solidFill>
                   <a:schemeClr val="accent6">
                     <a:lumMod val="75000"/>
@@ -6046,7 +5998,7 @@
               </a:rPr>
             </a:br>
             <a:r>
-              <a:rPr lang="en-US" sz="1400" dirty="0" smtClean="0">
+              <a:rPr lang="en-US" sz="1400" dirty="0">
                 <a:solidFill>
                   <a:schemeClr val="accent6">
                     <a:lumMod val="75000"/>
@@ -6055,13 +6007,6 @@
               </a:rPr>
               <a:t>to file</a:t>
             </a:r>
-            <a:endParaRPr lang="en-US" sz="1400" dirty="0">
-              <a:solidFill>
-                <a:schemeClr val="accent6">
-                  <a:lumMod val="75000"/>
-                </a:schemeClr>
-              </a:solidFill>
-            </a:endParaRPr>
           </a:p>
         </p:txBody>
       </p:sp>

</xml_diff>

<commit_message>
Modified diagrams and DeveloperGuide.md
</commit_message>
<xml_diff>
--- a/docs/diagrams/HighLevelSequenceDiagrams.pptx
+++ b/docs/diagrams/HighLevelSequenceDiagrams.pptx
@@ -107,6 +107,22 @@
       </a:defRPr>
     </a:lvl9pPr>
   </p:defaultTextStyle>
+  <p:extLst>
+    <p:ext uri="{EFAFB233-063F-42B5-8137-9DF3F51BA10A}">
+      <p15:sldGuideLst xmlns:p15="http://schemas.microsoft.com/office/powerpoint/2012/main">
+        <p15:guide id="1" orient="horz" pos="1488">
+          <p15:clr>
+            <a:srgbClr val="A4A3A4"/>
+          </p15:clr>
+        </p15:guide>
+        <p15:guide id="2" pos="2880">
+          <p15:clr>
+            <a:srgbClr val="A4A3A4"/>
+          </p15:clr>
+        </p15:guide>
+      </p15:sldGuideLst>
+    </p:ext>
+  </p:extLst>
 </p:presentation>
 </file>
 
@@ -192,7 +208,7 @@
           <a:p>
             <a:fld id="{F5CC4B3F-88C1-4FFA-B1B6-F41C21DC6924}" type="datetimeFigureOut">
               <a:rPr lang="en-US" smtClean="0"/>
-              <a:t>10/16/2016</a:t>
+              <a:t>3/23/2017</a:t>
             </a:fld>
             <a:endParaRPr lang="en-US"/>
           </a:p>
@@ -460,6 +476,90 @@
 </p:notesMaster>
 </file>
 
+<file path=ppt/notesSlides/notesSlide1.xml><?xml version="1.0" encoding="utf-8"?>
+<p:notes xmlns:a="http://schemas.openxmlformats.org/drawingml/2006/main" xmlns:r="http://schemas.openxmlformats.org/officeDocument/2006/relationships" xmlns:p="http://schemas.openxmlformats.org/presentationml/2006/main">
+  <p:cSld>
+    <p:spTree>
+      <p:nvGrpSpPr>
+        <p:cNvPr id="1" name=""/>
+        <p:cNvGrpSpPr/>
+        <p:nvPr/>
+      </p:nvGrpSpPr>
+      <p:grpSpPr>
+        <a:xfrm>
+          <a:off x="0" y="0"/>
+          <a:ext cx="0" cy="0"/>
+          <a:chOff x="0" y="0"/>
+          <a:chExt cx="0" cy="0"/>
+        </a:xfrm>
+      </p:grpSpPr>
+      <p:sp>
+        <p:nvSpPr>
+          <p:cNvPr id="2" name="Slide Image Placeholder 1"/>
+          <p:cNvSpPr>
+            <a:spLocks noGrp="1" noRot="1" noChangeAspect="1"/>
+          </p:cNvSpPr>
+          <p:nvPr>
+            <p:ph type="sldImg"/>
+          </p:nvPr>
+        </p:nvSpPr>
+        <p:spPr/>
+      </p:sp>
+      <p:sp>
+        <p:nvSpPr>
+          <p:cNvPr id="3" name="Notes Placeholder 2"/>
+          <p:cNvSpPr>
+            <a:spLocks noGrp="1"/>
+          </p:cNvSpPr>
+          <p:nvPr>
+            <p:ph type="body" idx="1"/>
+          </p:nvPr>
+        </p:nvSpPr>
+        <p:spPr/>
+        <p:txBody>
+          <a:bodyPr/>
+          <a:lstStyle/>
+          <a:p>
+            <a:endParaRPr lang="en-US" dirty="0"/>
+          </a:p>
+        </p:txBody>
+      </p:sp>
+      <p:sp>
+        <p:nvSpPr>
+          <p:cNvPr id="4" name="Slide Number Placeholder 3"/>
+          <p:cNvSpPr>
+            <a:spLocks noGrp="1"/>
+          </p:cNvSpPr>
+          <p:nvPr>
+            <p:ph type="sldNum" sz="quarter" idx="10"/>
+          </p:nvPr>
+        </p:nvSpPr>
+        <p:spPr/>
+        <p:txBody>
+          <a:bodyPr/>
+          <a:lstStyle/>
+          <a:p>
+            <a:fld id="{5A7AB025-77E3-4BD1-A2FD-B3183DBA47A3}" type="slidenum">
+              <a:rPr lang="en-US" smtClean="0"/>
+              <a:t>1</a:t>
+            </a:fld>
+            <a:endParaRPr lang="en-US"/>
+          </a:p>
+        </p:txBody>
+      </p:sp>
+    </p:spTree>
+    <p:extLst>
+      <p:ext uri="{BB962C8B-B14F-4D97-AF65-F5344CB8AC3E}">
+        <p14:creationId xmlns:p14="http://schemas.microsoft.com/office/powerpoint/2010/main" val="950723908"/>
+      </p:ext>
+    </p:extLst>
+  </p:cSld>
+  <p:clrMapOvr>
+    <a:masterClrMapping/>
+  </p:clrMapOvr>
+</p:notes>
+</file>
+
 <file path=ppt/slideLayouts/slideLayout1.xml><?xml version="1.0" encoding="utf-8"?>
 <p:sldLayout xmlns:a="http://schemas.openxmlformats.org/drawingml/2006/main" xmlns:r="http://schemas.openxmlformats.org/officeDocument/2006/relationships" xmlns:p="http://schemas.openxmlformats.org/presentationml/2006/main" type="title" preserve="1">
   <p:cSld name="Title Slide">
@@ -641,7 +741,7 @@
           <a:p>
             <a:fld id="{78C97017-6FC3-485B-9764-EAC9E56C1D49}" type="datetimeFigureOut">
               <a:rPr lang="en-US" smtClean="0"/>
-              <a:t>10/16/2016</a:t>
+              <a:t>3/23/2017</a:t>
             </a:fld>
             <a:endParaRPr lang="en-US"/>
           </a:p>
@@ -811,7 +911,7 @@
           <a:p>
             <a:fld id="{78C97017-6FC3-485B-9764-EAC9E56C1D49}" type="datetimeFigureOut">
               <a:rPr lang="en-US" smtClean="0"/>
-              <a:t>10/16/2016</a:t>
+              <a:t>3/23/2017</a:t>
             </a:fld>
             <a:endParaRPr lang="en-US"/>
           </a:p>
@@ -991,7 +1091,7 @@
           <a:p>
             <a:fld id="{78C97017-6FC3-485B-9764-EAC9E56C1D49}" type="datetimeFigureOut">
               <a:rPr lang="en-US" smtClean="0"/>
-              <a:t>10/16/2016</a:t>
+              <a:t>3/23/2017</a:t>
             </a:fld>
             <a:endParaRPr lang="en-US"/>
           </a:p>
@@ -1161,7 +1261,7 @@
           <a:p>
             <a:fld id="{78C97017-6FC3-485B-9764-EAC9E56C1D49}" type="datetimeFigureOut">
               <a:rPr lang="en-US" smtClean="0"/>
-              <a:t>10/16/2016</a:t>
+              <a:t>3/23/2017</a:t>
             </a:fld>
             <a:endParaRPr lang="en-US"/>
           </a:p>
@@ -1407,7 +1507,7 @@
           <a:p>
             <a:fld id="{78C97017-6FC3-485B-9764-EAC9E56C1D49}" type="datetimeFigureOut">
               <a:rPr lang="en-US" smtClean="0"/>
-              <a:t>10/16/2016</a:t>
+              <a:t>3/23/2017</a:t>
             </a:fld>
             <a:endParaRPr lang="en-US"/>
           </a:p>
@@ -1695,7 +1795,7 @@
           <a:p>
             <a:fld id="{78C97017-6FC3-485B-9764-EAC9E56C1D49}" type="datetimeFigureOut">
               <a:rPr lang="en-US" smtClean="0"/>
-              <a:t>10/16/2016</a:t>
+              <a:t>3/23/2017</a:t>
             </a:fld>
             <a:endParaRPr lang="en-US"/>
           </a:p>
@@ -2117,7 +2217,7 @@
           <a:p>
             <a:fld id="{78C97017-6FC3-485B-9764-EAC9E56C1D49}" type="datetimeFigureOut">
               <a:rPr lang="en-US" smtClean="0"/>
-              <a:t>10/16/2016</a:t>
+              <a:t>3/23/2017</a:t>
             </a:fld>
             <a:endParaRPr lang="en-US"/>
           </a:p>
@@ -2235,7 +2335,7 @@
           <a:p>
             <a:fld id="{78C97017-6FC3-485B-9764-EAC9E56C1D49}" type="datetimeFigureOut">
               <a:rPr lang="en-US" smtClean="0"/>
-              <a:t>10/16/2016</a:t>
+              <a:t>3/23/2017</a:t>
             </a:fld>
             <a:endParaRPr lang="en-US"/>
           </a:p>
@@ -2330,7 +2430,7 @@
           <a:p>
             <a:fld id="{78C97017-6FC3-485B-9764-EAC9E56C1D49}" type="datetimeFigureOut">
               <a:rPr lang="en-US" smtClean="0"/>
-              <a:t>10/16/2016</a:t>
+              <a:t>3/23/2017</a:t>
             </a:fld>
             <a:endParaRPr lang="en-US"/>
           </a:p>
@@ -2607,7 +2707,7 @@
           <a:p>
             <a:fld id="{78C97017-6FC3-485B-9764-EAC9E56C1D49}" type="datetimeFigureOut">
               <a:rPr lang="en-US" smtClean="0"/>
-              <a:t>10/16/2016</a:t>
+              <a:t>3/23/2017</a:t>
             </a:fld>
             <a:endParaRPr lang="en-US"/>
           </a:p>
@@ -2860,7 +2960,7 @@
           <a:p>
             <a:fld id="{78C97017-6FC3-485B-9764-EAC9E56C1D49}" type="datetimeFigureOut">
               <a:rPr lang="en-US" smtClean="0"/>
-              <a:t>10/16/2016</a:t>
+              <a:t>3/23/2017</a:t>
             </a:fld>
             <a:endParaRPr lang="en-US"/>
           </a:p>
@@ -3073,7 +3173,7 @@
           <a:p>
             <a:fld id="{78C97017-6FC3-485B-9764-EAC9E56C1D49}" type="datetimeFigureOut">
               <a:rPr lang="en-US" smtClean="0"/>
-              <a:t>10/16/2016</a:t>
+              <a:t>3/23/2017</a:t>
             </a:fld>
             <a:endParaRPr lang="en-US"/>
           </a:p>
@@ -4310,7 +4410,7 @@
                   <a:srgbClr val="7030A0"/>
                 </a:solidFill>
               </a:rPr>
-              <a:t>deletePerson</a:t>
+              <a:t>deleteTask</a:t>
             </a:r>
             <a:r>
               <a:rPr lang="en-US" sz="1400" dirty="0" smtClean="0">
@@ -4318,7 +4418,7 @@
                   <a:srgbClr val="7030A0"/>
                 </a:solidFill>
               </a:rPr>
-              <a:t>(p)</a:t>
+              <a:t>(t)</a:t>
             </a:r>
             <a:endParaRPr lang="en-US" sz="1400" dirty="0">
               <a:solidFill>
@@ -4368,7 +4468,7 @@
                   </a:schemeClr>
                 </a:solidFill>
               </a:rPr>
-              <a:t>AddressBookChangedEvent</a:t>
+              <a:t>TaskListChangedEvent</a:t>
             </a:r>
             <a:r>
               <a:rPr lang="en-US" sz="1400" dirty="0" smtClean="0">
@@ -4942,7 +5042,7 @@
                   </a:schemeClr>
                 </a:solidFill>
               </a:rPr>
-              <a:t>AddressBookChangedEvent</a:t>
+              <a:t>TaskListChangedEvent</a:t>
             </a:r>
             <a:r>
               <a:rPr lang="en-US" sz="1400" dirty="0" smtClean="0">
@@ -5314,7 +5414,7 @@
                   </a:schemeClr>
                 </a:solidFill>
               </a:rPr>
-              <a:t>handleAddresssBookChangedEvent</a:t>
+              <a:t>handleTaskListChangedEvent</a:t>
             </a:r>
             <a:r>
               <a:rPr lang="en-US" sz="1400" dirty="0" smtClean="0">
@@ -5605,7 +5705,7 @@
         </p:nvSpPr>
         <p:spPr>
           <a:xfrm>
-            <a:off x="1416276" y="5395369"/>
+            <a:off x="1600200" y="5395369"/>
             <a:ext cx="2659870" cy="215444"/>
           </a:xfrm>
           <a:prstGeom prst="rect">
@@ -5625,7 +5725,7 @@
                   <a:srgbClr val="00B050"/>
                 </a:solidFill>
               </a:rPr>
-              <a:t>handleAddresssBookChangedEvent</a:t>
+              <a:t>handleTaskListChangedEvent</a:t>
             </a:r>
             <a:r>
               <a:rPr lang="en-US" sz="1400" dirty="0" smtClean="0">

</xml_diff>

<commit_message>
Editing the developer guide
</commit_message>
<xml_diff>
--- a/docs/diagrams/HighLevelSequenceDiagrams.pptx
+++ b/docs/diagrams/HighLevelSequenceDiagrams.pptx
@@ -107,6 +107,22 @@
       </a:defRPr>
     </a:lvl9pPr>
   </p:defaultTextStyle>
+  <p:extLst>
+    <p:ext uri="{EFAFB233-063F-42B5-8137-9DF3F51BA10A}">
+      <p15:sldGuideLst xmlns:p15="http://schemas.microsoft.com/office/powerpoint/2012/main">
+        <p15:guide id="1" orient="horz" pos="1488">
+          <p15:clr>
+            <a:srgbClr val="A4A3A4"/>
+          </p15:clr>
+        </p15:guide>
+        <p15:guide id="2" pos="2880">
+          <p15:clr>
+            <a:srgbClr val="A4A3A4"/>
+          </p15:clr>
+        </p15:guide>
+      </p15:sldGuideLst>
+    </p:ext>
+  </p:extLst>
 </p:presentation>
 </file>
 
@@ -192,7 +208,7 @@
           <a:p>
             <a:fld id="{F5CC4B3F-88C1-4FFA-B1B6-F41C21DC6924}" type="datetimeFigureOut">
               <a:rPr lang="en-US" smtClean="0"/>
-              <a:t>10/16/2016</a:t>
+              <a:t>3/22/2017</a:t>
             </a:fld>
             <a:endParaRPr lang="en-US"/>
           </a:p>
@@ -641,7 +657,7 @@
           <a:p>
             <a:fld id="{78C97017-6FC3-485B-9764-EAC9E56C1D49}" type="datetimeFigureOut">
               <a:rPr lang="en-US" smtClean="0"/>
-              <a:t>10/16/2016</a:t>
+              <a:t>3/22/2017</a:t>
             </a:fld>
             <a:endParaRPr lang="en-US"/>
           </a:p>
@@ -811,7 +827,7 @@
           <a:p>
             <a:fld id="{78C97017-6FC3-485B-9764-EAC9E56C1D49}" type="datetimeFigureOut">
               <a:rPr lang="en-US" smtClean="0"/>
-              <a:t>10/16/2016</a:t>
+              <a:t>3/22/2017</a:t>
             </a:fld>
             <a:endParaRPr lang="en-US"/>
           </a:p>
@@ -991,7 +1007,7 @@
           <a:p>
             <a:fld id="{78C97017-6FC3-485B-9764-EAC9E56C1D49}" type="datetimeFigureOut">
               <a:rPr lang="en-US" smtClean="0"/>
-              <a:t>10/16/2016</a:t>
+              <a:t>3/22/2017</a:t>
             </a:fld>
             <a:endParaRPr lang="en-US"/>
           </a:p>
@@ -1161,7 +1177,7 @@
           <a:p>
             <a:fld id="{78C97017-6FC3-485B-9764-EAC9E56C1D49}" type="datetimeFigureOut">
               <a:rPr lang="en-US" smtClean="0"/>
-              <a:t>10/16/2016</a:t>
+              <a:t>3/22/2017</a:t>
             </a:fld>
             <a:endParaRPr lang="en-US"/>
           </a:p>
@@ -1407,7 +1423,7 @@
           <a:p>
             <a:fld id="{78C97017-6FC3-485B-9764-EAC9E56C1D49}" type="datetimeFigureOut">
               <a:rPr lang="en-US" smtClean="0"/>
-              <a:t>10/16/2016</a:t>
+              <a:t>3/22/2017</a:t>
             </a:fld>
             <a:endParaRPr lang="en-US"/>
           </a:p>
@@ -1695,7 +1711,7 @@
           <a:p>
             <a:fld id="{78C97017-6FC3-485B-9764-EAC9E56C1D49}" type="datetimeFigureOut">
               <a:rPr lang="en-US" smtClean="0"/>
-              <a:t>10/16/2016</a:t>
+              <a:t>3/22/2017</a:t>
             </a:fld>
             <a:endParaRPr lang="en-US"/>
           </a:p>
@@ -2117,7 +2133,7 @@
           <a:p>
             <a:fld id="{78C97017-6FC3-485B-9764-EAC9E56C1D49}" type="datetimeFigureOut">
               <a:rPr lang="en-US" smtClean="0"/>
-              <a:t>10/16/2016</a:t>
+              <a:t>3/22/2017</a:t>
             </a:fld>
             <a:endParaRPr lang="en-US"/>
           </a:p>
@@ -2235,7 +2251,7 @@
           <a:p>
             <a:fld id="{78C97017-6FC3-485B-9764-EAC9E56C1D49}" type="datetimeFigureOut">
               <a:rPr lang="en-US" smtClean="0"/>
-              <a:t>10/16/2016</a:t>
+              <a:t>3/22/2017</a:t>
             </a:fld>
             <a:endParaRPr lang="en-US"/>
           </a:p>
@@ -2330,7 +2346,7 @@
           <a:p>
             <a:fld id="{78C97017-6FC3-485B-9764-EAC9E56C1D49}" type="datetimeFigureOut">
               <a:rPr lang="en-US" smtClean="0"/>
-              <a:t>10/16/2016</a:t>
+              <a:t>3/22/2017</a:t>
             </a:fld>
             <a:endParaRPr lang="en-US"/>
           </a:p>
@@ -2607,7 +2623,7 @@
           <a:p>
             <a:fld id="{78C97017-6FC3-485B-9764-EAC9E56C1D49}" type="datetimeFigureOut">
               <a:rPr lang="en-US" smtClean="0"/>
-              <a:t>10/16/2016</a:t>
+              <a:t>3/22/2017</a:t>
             </a:fld>
             <a:endParaRPr lang="en-US"/>
           </a:p>
@@ -2860,7 +2876,7 @@
           <a:p>
             <a:fld id="{78C97017-6FC3-485B-9764-EAC9E56C1D49}" type="datetimeFigureOut">
               <a:rPr lang="en-US" smtClean="0"/>
-              <a:t>10/16/2016</a:t>
+              <a:t>3/22/2017</a:t>
             </a:fld>
             <a:endParaRPr lang="en-US"/>
           </a:p>
@@ -3073,7 +3089,7 @@
           <a:p>
             <a:fld id="{78C97017-6FC3-485B-9764-EAC9E56C1D49}" type="datetimeFigureOut">
               <a:rPr lang="en-US" smtClean="0"/>
-              <a:t>10/16/2016</a:t>
+              <a:t>3/22/2017</a:t>
             </a:fld>
             <a:endParaRPr lang="en-US"/>
           </a:p>
@@ -4166,7 +4182,7 @@
           <a:p>
             <a:r>
               <a:rPr lang="en-US" sz="1400" dirty="0" smtClean="0"/>
-              <a:t>delete 1</a:t>
+              <a:t>delete d1</a:t>
             </a:r>
             <a:endParaRPr lang="en-US" sz="1400" dirty="0"/>
           </a:p>
@@ -4216,8 +4232,8 @@
         </p:nvSpPr>
         <p:spPr>
           <a:xfrm>
-            <a:off x="2166172" y="1453379"/>
-            <a:ext cx="1424846" cy="215444"/>
+            <a:off x="2084433" y="1453379"/>
+            <a:ext cx="1506585" cy="215444"/>
           </a:xfrm>
           <a:prstGeom prst="rect">
             <a:avLst/>
@@ -4236,7 +4252,7 @@
                   <a:srgbClr val="0070C0"/>
                 </a:solidFill>
               </a:rPr>
-              <a:t>execute(“delete 1”)</a:t>
+              <a:t>execute(“delete d1”)</a:t>
             </a:r>
             <a:endParaRPr lang="en-US" sz="1400" dirty="0">
               <a:solidFill>
@@ -4310,7 +4326,7 @@
                   <a:srgbClr val="7030A0"/>
                 </a:solidFill>
               </a:rPr>
-              <a:t>deletePerson</a:t>
+              <a:t>deleteDeadline</a:t>
             </a:r>
             <a:r>
               <a:rPr lang="en-US" sz="1400" dirty="0" smtClean="0">
@@ -4368,7 +4384,7 @@
                   </a:schemeClr>
                 </a:solidFill>
               </a:rPr>
-              <a:t>AddressBookChangedEvent</a:t>
+              <a:t>ToDoListChangedEvent</a:t>
             </a:r>
             <a:r>
               <a:rPr lang="en-US" sz="1400" dirty="0" smtClean="0">
@@ -4942,7 +4958,7 @@
                   </a:schemeClr>
                 </a:solidFill>
               </a:rPr>
-              <a:t>AddressBookChangedEvent</a:t>
+              <a:t>ToDoListChangedEvent</a:t>
             </a:r>
             <a:r>
               <a:rPr lang="en-US" sz="1400" dirty="0" smtClean="0">
@@ -5314,7 +5330,7 @@
                   </a:schemeClr>
                 </a:solidFill>
               </a:rPr>
-              <a:t>handleAddresssBookChangedEvent</a:t>
+              <a:t>handleToDoListChangedEvent</a:t>
             </a:r>
             <a:r>
               <a:rPr lang="en-US" sz="1400" dirty="0" smtClean="0">
@@ -5625,7 +5641,7 @@
                   <a:srgbClr val="00B050"/>
                 </a:solidFill>
               </a:rPr>
-              <a:t>handleAddresssBookChangedEvent</a:t>
+              <a:t>handleToDoListChangedEvent</a:t>
             </a:r>
             <a:r>
               <a:rPr lang="en-US" sz="1400" dirty="0" smtClean="0">

</xml_diff>

<commit_message>
Update references to Person and AddressBook to Task and TaskList
</commit_message>
<xml_diff>
--- a/docs/diagrams/HighLevelSequenceDiagrams.pptx
+++ b/docs/diagrams/HighLevelSequenceDiagrams.pptx
@@ -107,6 +107,22 @@
       </a:defRPr>
     </a:lvl9pPr>
   </p:defaultTextStyle>
+  <p:extLst>
+    <p:ext uri="{EFAFB233-063F-42B5-8137-9DF3F51BA10A}">
+      <p15:sldGuideLst xmlns:p15="http://schemas.microsoft.com/office/powerpoint/2012/main">
+        <p15:guide id="1" orient="horz" pos="1488">
+          <p15:clr>
+            <a:srgbClr val="A4A3A4"/>
+          </p15:clr>
+        </p15:guide>
+        <p15:guide id="2" pos="2880">
+          <p15:clr>
+            <a:srgbClr val="A4A3A4"/>
+          </p15:clr>
+        </p15:guide>
+      </p15:sldGuideLst>
+    </p:ext>
+  </p:extLst>
 </p:presentation>
 </file>
 
@@ -192,7 +208,7 @@
           <a:p>
             <a:fld id="{F5CC4B3F-88C1-4FFA-B1B6-F41C21DC6924}" type="datetimeFigureOut">
               <a:rPr lang="en-US" smtClean="0"/>
-              <a:t>10/16/2016</a:t>
+              <a:t>3/24/17</a:t>
             </a:fld>
             <a:endParaRPr lang="en-US"/>
           </a:p>
@@ -641,7 +657,7 @@
           <a:p>
             <a:fld id="{78C97017-6FC3-485B-9764-EAC9E56C1D49}" type="datetimeFigureOut">
               <a:rPr lang="en-US" smtClean="0"/>
-              <a:t>10/16/2016</a:t>
+              <a:t>3/24/17</a:t>
             </a:fld>
             <a:endParaRPr lang="en-US"/>
           </a:p>
@@ -811,7 +827,7 @@
           <a:p>
             <a:fld id="{78C97017-6FC3-485B-9764-EAC9E56C1D49}" type="datetimeFigureOut">
               <a:rPr lang="en-US" smtClean="0"/>
-              <a:t>10/16/2016</a:t>
+              <a:t>3/24/17</a:t>
             </a:fld>
             <a:endParaRPr lang="en-US"/>
           </a:p>
@@ -991,7 +1007,7 @@
           <a:p>
             <a:fld id="{78C97017-6FC3-485B-9764-EAC9E56C1D49}" type="datetimeFigureOut">
               <a:rPr lang="en-US" smtClean="0"/>
-              <a:t>10/16/2016</a:t>
+              <a:t>3/24/17</a:t>
             </a:fld>
             <a:endParaRPr lang="en-US"/>
           </a:p>
@@ -1161,7 +1177,7 @@
           <a:p>
             <a:fld id="{78C97017-6FC3-485B-9764-EAC9E56C1D49}" type="datetimeFigureOut">
               <a:rPr lang="en-US" smtClean="0"/>
-              <a:t>10/16/2016</a:t>
+              <a:t>3/24/17</a:t>
             </a:fld>
             <a:endParaRPr lang="en-US"/>
           </a:p>
@@ -1407,7 +1423,7 @@
           <a:p>
             <a:fld id="{78C97017-6FC3-485B-9764-EAC9E56C1D49}" type="datetimeFigureOut">
               <a:rPr lang="en-US" smtClean="0"/>
-              <a:t>10/16/2016</a:t>
+              <a:t>3/24/17</a:t>
             </a:fld>
             <a:endParaRPr lang="en-US"/>
           </a:p>
@@ -1695,7 +1711,7 @@
           <a:p>
             <a:fld id="{78C97017-6FC3-485B-9764-EAC9E56C1D49}" type="datetimeFigureOut">
               <a:rPr lang="en-US" smtClean="0"/>
-              <a:t>10/16/2016</a:t>
+              <a:t>3/24/17</a:t>
             </a:fld>
             <a:endParaRPr lang="en-US"/>
           </a:p>
@@ -2117,7 +2133,7 @@
           <a:p>
             <a:fld id="{78C97017-6FC3-485B-9764-EAC9E56C1D49}" type="datetimeFigureOut">
               <a:rPr lang="en-US" smtClean="0"/>
-              <a:t>10/16/2016</a:t>
+              <a:t>3/24/17</a:t>
             </a:fld>
             <a:endParaRPr lang="en-US"/>
           </a:p>
@@ -2235,7 +2251,7 @@
           <a:p>
             <a:fld id="{78C97017-6FC3-485B-9764-EAC9E56C1D49}" type="datetimeFigureOut">
               <a:rPr lang="en-US" smtClean="0"/>
-              <a:t>10/16/2016</a:t>
+              <a:t>3/24/17</a:t>
             </a:fld>
             <a:endParaRPr lang="en-US"/>
           </a:p>
@@ -2330,7 +2346,7 @@
           <a:p>
             <a:fld id="{78C97017-6FC3-485B-9764-EAC9E56C1D49}" type="datetimeFigureOut">
               <a:rPr lang="en-US" smtClean="0"/>
-              <a:t>10/16/2016</a:t>
+              <a:t>3/24/17</a:t>
             </a:fld>
             <a:endParaRPr lang="en-US"/>
           </a:p>
@@ -2607,7 +2623,7 @@
           <a:p>
             <a:fld id="{78C97017-6FC3-485B-9764-EAC9E56C1D49}" type="datetimeFigureOut">
               <a:rPr lang="en-US" smtClean="0"/>
-              <a:t>10/16/2016</a:t>
+              <a:t>3/24/17</a:t>
             </a:fld>
             <a:endParaRPr lang="en-US"/>
           </a:p>
@@ -2860,7 +2876,7 @@
           <a:p>
             <a:fld id="{78C97017-6FC3-485B-9764-EAC9E56C1D49}" type="datetimeFigureOut">
               <a:rPr lang="en-US" smtClean="0"/>
-              <a:t>10/16/2016</a:t>
+              <a:t>3/24/17</a:t>
             </a:fld>
             <a:endParaRPr lang="en-US"/>
           </a:p>
@@ -3073,7 +3089,7 @@
           <a:p>
             <a:fld id="{78C97017-6FC3-485B-9764-EAC9E56C1D49}" type="datetimeFigureOut">
               <a:rPr lang="en-US" smtClean="0"/>
-              <a:t>10/16/2016</a:t>
+              <a:t>3/24/17</a:t>
             </a:fld>
             <a:endParaRPr lang="en-US"/>
           </a:p>
@@ -4151,7 +4167,7 @@
         <p:spPr>
           <a:xfrm>
             <a:off x="466818" y="1345880"/>
-            <a:ext cx="860170" cy="215444"/>
+            <a:ext cx="860170" cy="184666"/>
           </a:xfrm>
           <a:prstGeom prst="rect">
             <a:avLst/>
@@ -4165,10 +4181,10 @@
           <a:lstStyle/>
           <a:p>
             <a:r>
-              <a:rPr lang="en-US" sz="1400" dirty="0" smtClean="0"/>
+              <a:rPr lang="en-US" sz="1200" dirty="0" smtClean="0"/>
               <a:t>delete 1</a:t>
             </a:r>
-            <a:endParaRPr lang="en-US" sz="1400" dirty="0"/>
+            <a:endParaRPr lang="en-US" sz="1200" dirty="0"/>
           </a:p>
         </p:txBody>
       </p:sp>
@@ -4217,7 +4233,7 @@
         <p:spPr>
           <a:xfrm>
             <a:off x="2166172" y="1453379"/>
-            <a:ext cx="1424846" cy="215444"/>
+            <a:ext cx="1424846" cy="184666"/>
           </a:xfrm>
           <a:prstGeom prst="rect">
             <a:avLst/>
@@ -4231,14 +4247,14 @@
           <a:lstStyle/>
           <a:p>
             <a:r>
-              <a:rPr lang="en-US" sz="1400" dirty="0" smtClean="0">
+              <a:rPr lang="en-US" sz="1200" dirty="0" smtClean="0">
                 <a:solidFill>
                   <a:srgbClr val="0070C0"/>
                 </a:solidFill>
               </a:rPr>
               <a:t>execute(“delete 1”)</a:t>
             </a:r>
-            <a:endParaRPr lang="en-US" sz="1400" dirty="0">
+            <a:endParaRPr lang="en-US" sz="1200" dirty="0">
               <a:solidFill>
                 <a:srgbClr val="0070C0"/>
               </a:solidFill>
@@ -4291,7 +4307,7 @@
         <p:spPr>
           <a:xfrm>
             <a:off x="4299772" y="1542583"/>
-            <a:ext cx="1424846" cy="215444"/>
+            <a:ext cx="1424846" cy="184666"/>
           </a:xfrm>
           <a:prstGeom prst="rect">
             <a:avLst/>
@@ -4305,22 +4321,22 @@
           <a:lstStyle/>
           <a:p>
             <a:r>
-              <a:rPr lang="en-US" sz="1400" dirty="0" err="1" smtClean="0">
+              <a:rPr lang="en-US" sz="1200" dirty="0" err="1" smtClean="0">
                 <a:solidFill>
                   <a:srgbClr val="7030A0"/>
                 </a:solidFill>
               </a:rPr>
-              <a:t>deletePerson</a:t>
-            </a:r>
-            <a:r>
-              <a:rPr lang="en-US" sz="1400" dirty="0" smtClean="0">
+              <a:t>deleteTask</a:t>
+            </a:r>
+            <a:r>
+              <a:rPr lang="en-US" sz="1200" dirty="0" smtClean="0">
                 <a:solidFill>
                   <a:srgbClr val="7030A0"/>
                 </a:solidFill>
               </a:rPr>
               <a:t>(p)</a:t>
             </a:r>
-            <a:endParaRPr lang="en-US" sz="1400" dirty="0">
+            <a:endParaRPr lang="en-US" sz="1200" dirty="0">
               <a:solidFill>
                 <a:srgbClr val="7030A0"/>
               </a:solidFill>
@@ -4337,7 +4353,7 @@
         <p:spPr>
           <a:xfrm>
             <a:off x="6074030" y="1687656"/>
-            <a:ext cx="2438400" cy="215444"/>
+            <a:ext cx="2438400" cy="184666"/>
           </a:xfrm>
           <a:prstGeom prst="rect">
             <a:avLst/>
@@ -4351,7 +4367,7 @@
           <a:lstStyle/>
           <a:p>
             <a:r>
-              <a:rPr lang="en-US" sz="1400" dirty="0" smtClean="0">
+              <a:rPr lang="en-US" sz="1200" dirty="0" smtClean="0">
                 <a:solidFill>
                   <a:schemeClr val="accent5">
                     <a:lumMod val="75000"/>
@@ -4361,17 +4377,17 @@
               <a:t>post(</a:t>
             </a:r>
             <a:r>
-              <a:rPr lang="en-US" sz="1400" dirty="0" err="1" smtClean="0">
+              <a:rPr lang="en-US" sz="1200" dirty="0" err="1" smtClean="0">
                 <a:solidFill>
                   <a:schemeClr val="accent5">
                     <a:lumMod val="75000"/>
                   </a:schemeClr>
                 </a:solidFill>
               </a:rPr>
-              <a:t>AddressBookChangedEvent</a:t>
-            </a:r>
-            <a:r>
-              <a:rPr lang="en-US" sz="1400" dirty="0" smtClean="0">
+              <a:t>TaskListChangedEvent</a:t>
+            </a:r>
+            <a:r>
+              <a:rPr lang="en-US" sz="1200" dirty="0" smtClean="0">
                 <a:solidFill>
                   <a:schemeClr val="accent5">
                     <a:lumMod val="75000"/>
@@ -4380,7 +4396,7 @@
               </a:rPr>
               <a:t>)</a:t>
             </a:r>
-            <a:endParaRPr lang="en-US" sz="1400" dirty="0">
+            <a:endParaRPr lang="en-US" sz="1200" dirty="0">
               <a:solidFill>
                 <a:schemeClr val="accent5">
                   <a:lumMod val="75000"/>
@@ -4911,7 +4927,7 @@
         <p:spPr>
           <a:xfrm>
             <a:off x="1810094" y="4797674"/>
-            <a:ext cx="2716635" cy="215444"/>
+            <a:ext cx="2716635" cy="184666"/>
           </a:xfrm>
           <a:prstGeom prst="rect">
             <a:avLst/>
@@ -4925,7 +4941,7 @@
           <a:lstStyle/>
           <a:p>
             <a:r>
-              <a:rPr lang="en-US" sz="1400" dirty="0" smtClean="0">
+              <a:rPr lang="en-US" sz="1200" dirty="0" smtClean="0">
                 <a:solidFill>
                   <a:schemeClr val="accent5">
                     <a:lumMod val="75000"/>
@@ -4935,17 +4951,17 @@
               <a:t>post(</a:t>
             </a:r>
             <a:r>
-              <a:rPr lang="en-US" sz="1400" dirty="0" err="1" smtClean="0">
+              <a:rPr lang="en-US" sz="1200" dirty="0" err="1" smtClean="0">
                 <a:solidFill>
                   <a:schemeClr val="accent5">
                     <a:lumMod val="75000"/>
                   </a:schemeClr>
                 </a:solidFill>
               </a:rPr>
-              <a:t>AddressBookChangedEvent</a:t>
-            </a:r>
-            <a:r>
-              <a:rPr lang="en-US" sz="1400" dirty="0" smtClean="0">
+              <a:t>TaskListChangedEvent</a:t>
+            </a:r>
+            <a:r>
+              <a:rPr lang="en-US" sz="1200" dirty="0" smtClean="0">
                 <a:solidFill>
                   <a:schemeClr val="accent5">
                     <a:lumMod val="75000"/>
@@ -4954,7 +4970,7 @@
               </a:rPr>
               <a:t>)</a:t>
             </a:r>
-            <a:endParaRPr lang="en-US" sz="1400" dirty="0">
+            <a:endParaRPr lang="en-US" sz="1200" dirty="0">
               <a:solidFill>
                 <a:schemeClr val="accent5">
                   <a:lumMod val="75000"/>
@@ -5293,7 +5309,7 @@
         <p:spPr>
           <a:xfrm>
             <a:off x="5036330" y="5065911"/>
-            <a:ext cx="2659870" cy="215444"/>
+            <a:ext cx="2659870" cy="184666"/>
           </a:xfrm>
           <a:prstGeom prst="rect">
             <a:avLst/>
@@ -5307,17 +5323,17 @@
           <a:lstStyle/>
           <a:p>
             <a:r>
-              <a:rPr lang="en-US" sz="1400" dirty="0" err="1" smtClean="0">
+              <a:rPr lang="en-US" sz="1200" dirty="0" err="1" smtClean="0">
                 <a:solidFill>
                   <a:schemeClr val="accent6">
                     <a:lumMod val="75000"/>
                   </a:schemeClr>
                 </a:solidFill>
               </a:rPr>
-              <a:t>handleAddresssBookChangedEvent</a:t>
-            </a:r>
-            <a:r>
-              <a:rPr lang="en-US" sz="1400" dirty="0" smtClean="0">
+              <a:t>handleTaskListChangedEvent</a:t>
+            </a:r>
+            <a:r>
+              <a:rPr lang="en-US" sz="1200" dirty="0" smtClean="0">
                 <a:solidFill>
                   <a:schemeClr val="accent6">
                     <a:lumMod val="75000"/>
@@ -5326,7 +5342,7 @@
               </a:rPr>
               <a:t>()</a:t>
             </a:r>
-            <a:endParaRPr lang="en-US" sz="1400" dirty="0">
+            <a:endParaRPr lang="en-US" sz="1200" dirty="0">
               <a:solidFill>
                 <a:schemeClr val="accent6">
                   <a:lumMod val="75000"/>
@@ -5606,7 +5622,7 @@
         <p:spPr>
           <a:xfrm>
             <a:off x="1416276" y="5395369"/>
-            <a:ext cx="2659870" cy="215444"/>
+            <a:ext cx="2659870" cy="184666"/>
           </a:xfrm>
           <a:prstGeom prst="rect">
             <a:avLst/>
@@ -5620,22 +5636,22 @@
           <a:lstStyle/>
           <a:p>
             <a:r>
-              <a:rPr lang="en-US" sz="1400" dirty="0" err="1" smtClean="0">
+              <a:rPr lang="en-US" sz="1200" dirty="0" err="1" smtClean="0">
                 <a:solidFill>
                   <a:srgbClr val="00B050"/>
                 </a:solidFill>
               </a:rPr>
-              <a:t>handleAddresssBookChangedEvent</a:t>
-            </a:r>
-            <a:r>
-              <a:rPr lang="en-US" sz="1400" dirty="0" smtClean="0">
+              <a:t>handleTaskListChangedEvent</a:t>
+            </a:r>
+            <a:r>
+              <a:rPr lang="en-US" sz="1200" dirty="0" smtClean="0">
                 <a:solidFill>
                   <a:srgbClr val="00B050"/>
                 </a:solidFill>
               </a:rPr>
               <a:t>()</a:t>
             </a:r>
-            <a:endParaRPr lang="en-US" sz="1400" dirty="0">
+            <a:endParaRPr lang="en-US" sz="1200" dirty="0">
               <a:solidFill>
                 <a:srgbClr val="00B050"/>
               </a:solidFill>
@@ -5811,7 +5827,7 @@
         <p:spPr>
           <a:xfrm>
             <a:off x="194562" y="5444571"/>
-            <a:ext cx="794081" cy="430887"/>
+            <a:ext cx="794081" cy="369332"/>
           </a:xfrm>
           <a:prstGeom prst="rect">
             <a:avLst/>
@@ -5826,14 +5842,14 @@
           <a:p>
             <a:pPr algn="r"/>
             <a:r>
-              <a:rPr lang="en-US" sz="1400" dirty="0" smtClean="0">
+              <a:rPr lang="en-US" sz="1200" dirty="0" smtClean="0">
                 <a:solidFill>
                   <a:srgbClr val="00B050"/>
                 </a:solidFill>
               </a:rPr>
               <a:t>Update status bar</a:t>
             </a:r>
-            <a:endParaRPr lang="en-US" sz="1400" dirty="0">
+            <a:endParaRPr lang="en-US" sz="1200" dirty="0">
               <a:solidFill>
                 <a:srgbClr val="00B050"/>
               </a:solidFill>
@@ -6013,7 +6029,7 @@
         <p:spPr>
           <a:xfrm>
             <a:off x="8223953" y="5180992"/>
-            <a:ext cx="539047" cy="430887"/>
+            <a:ext cx="539047" cy="369332"/>
           </a:xfrm>
           <a:prstGeom prst="rect">
             <a:avLst/>
@@ -6027,7 +6043,7 @@
           <a:lstStyle/>
           <a:p>
             <a:r>
-              <a:rPr lang="en-US" sz="1400" dirty="0" smtClean="0">
+              <a:rPr lang="en-US" sz="1200" dirty="0" smtClean="0">
                 <a:solidFill>
                   <a:schemeClr val="accent6">
                     <a:lumMod val="75000"/>
@@ -6037,7 +6053,7 @@
               <a:t>Save </a:t>
             </a:r>
             <a:br>
-              <a:rPr lang="en-US" sz="1400" dirty="0" smtClean="0">
+              <a:rPr lang="en-US" sz="1200" dirty="0" smtClean="0">
                 <a:solidFill>
                   <a:schemeClr val="accent6">
                     <a:lumMod val="75000"/>
@@ -6046,7 +6062,7 @@
               </a:rPr>
             </a:br>
             <a:r>
-              <a:rPr lang="en-US" sz="1400" dirty="0" smtClean="0">
+              <a:rPr lang="en-US" sz="1200" dirty="0" smtClean="0">
                 <a:solidFill>
                   <a:schemeClr val="accent6">
                     <a:lumMod val="75000"/>
@@ -6055,7 +6071,7 @@
               </a:rPr>
               <a:t>to file</a:t>
             </a:r>
-            <a:endParaRPr lang="en-US" sz="1400" dirty="0">
+            <a:endParaRPr lang="en-US" sz="1200" dirty="0">
               <a:solidFill>
                 <a:schemeClr val="accent6">
                   <a:lumMod val="75000"/>

</xml_diff>

<commit_message>
Updated Sequence Diagrams and Ui Diagram.
</commit_message>
<xml_diff>
--- a/docs/diagrams/HighLevelSequenceDiagrams.pptx
+++ b/docs/diagrams/HighLevelSequenceDiagrams.pptx
@@ -107,6 +107,22 @@
       </a:defRPr>
     </a:lvl9pPr>
   </p:defaultTextStyle>
+  <p:extLst>
+    <p:ext uri="{EFAFB233-063F-42B5-8137-9DF3F51BA10A}">
+      <p15:sldGuideLst xmlns:p15="http://schemas.microsoft.com/office/powerpoint/2012/main">
+        <p15:guide id="1" orient="horz" pos="1488">
+          <p15:clr>
+            <a:srgbClr val="A4A3A4"/>
+          </p15:clr>
+        </p15:guide>
+        <p15:guide id="2" pos="2880">
+          <p15:clr>
+            <a:srgbClr val="A4A3A4"/>
+          </p15:clr>
+        </p15:guide>
+      </p15:sldGuideLst>
+    </p:ext>
+  </p:extLst>
 </p:presentation>
 </file>
 
@@ -192,7 +208,7 @@
           <a:p>
             <a:fld id="{F5CC4B3F-88C1-4FFA-B1B6-F41C21DC6924}" type="datetimeFigureOut">
               <a:rPr lang="en-US" smtClean="0"/>
-              <a:t>10/16/2016</a:t>
+              <a:t>3/24/17</a:t>
             </a:fld>
             <a:endParaRPr lang="en-US"/>
           </a:p>
@@ -641,7 +657,7 @@
           <a:p>
             <a:fld id="{78C97017-6FC3-485B-9764-EAC9E56C1D49}" type="datetimeFigureOut">
               <a:rPr lang="en-US" smtClean="0"/>
-              <a:t>10/16/2016</a:t>
+              <a:t>3/24/17</a:t>
             </a:fld>
             <a:endParaRPr lang="en-US"/>
           </a:p>
@@ -811,7 +827,7 @@
           <a:p>
             <a:fld id="{78C97017-6FC3-485B-9764-EAC9E56C1D49}" type="datetimeFigureOut">
               <a:rPr lang="en-US" smtClean="0"/>
-              <a:t>10/16/2016</a:t>
+              <a:t>3/24/17</a:t>
             </a:fld>
             <a:endParaRPr lang="en-US"/>
           </a:p>
@@ -991,7 +1007,7 @@
           <a:p>
             <a:fld id="{78C97017-6FC3-485B-9764-EAC9E56C1D49}" type="datetimeFigureOut">
               <a:rPr lang="en-US" smtClean="0"/>
-              <a:t>10/16/2016</a:t>
+              <a:t>3/24/17</a:t>
             </a:fld>
             <a:endParaRPr lang="en-US"/>
           </a:p>
@@ -1161,7 +1177,7 @@
           <a:p>
             <a:fld id="{78C97017-6FC3-485B-9764-EAC9E56C1D49}" type="datetimeFigureOut">
               <a:rPr lang="en-US" smtClean="0"/>
-              <a:t>10/16/2016</a:t>
+              <a:t>3/24/17</a:t>
             </a:fld>
             <a:endParaRPr lang="en-US"/>
           </a:p>
@@ -1407,7 +1423,7 @@
           <a:p>
             <a:fld id="{78C97017-6FC3-485B-9764-EAC9E56C1D49}" type="datetimeFigureOut">
               <a:rPr lang="en-US" smtClean="0"/>
-              <a:t>10/16/2016</a:t>
+              <a:t>3/24/17</a:t>
             </a:fld>
             <a:endParaRPr lang="en-US"/>
           </a:p>
@@ -1695,7 +1711,7 @@
           <a:p>
             <a:fld id="{78C97017-6FC3-485B-9764-EAC9E56C1D49}" type="datetimeFigureOut">
               <a:rPr lang="en-US" smtClean="0"/>
-              <a:t>10/16/2016</a:t>
+              <a:t>3/24/17</a:t>
             </a:fld>
             <a:endParaRPr lang="en-US"/>
           </a:p>
@@ -2117,7 +2133,7 @@
           <a:p>
             <a:fld id="{78C97017-6FC3-485B-9764-EAC9E56C1D49}" type="datetimeFigureOut">
               <a:rPr lang="en-US" smtClean="0"/>
-              <a:t>10/16/2016</a:t>
+              <a:t>3/24/17</a:t>
             </a:fld>
             <a:endParaRPr lang="en-US"/>
           </a:p>
@@ -2235,7 +2251,7 @@
           <a:p>
             <a:fld id="{78C97017-6FC3-485B-9764-EAC9E56C1D49}" type="datetimeFigureOut">
               <a:rPr lang="en-US" smtClean="0"/>
-              <a:t>10/16/2016</a:t>
+              <a:t>3/24/17</a:t>
             </a:fld>
             <a:endParaRPr lang="en-US"/>
           </a:p>
@@ -2330,7 +2346,7 @@
           <a:p>
             <a:fld id="{78C97017-6FC3-485B-9764-EAC9E56C1D49}" type="datetimeFigureOut">
               <a:rPr lang="en-US" smtClean="0"/>
-              <a:t>10/16/2016</a:t>
+              <a:t>3/24/17</a:t>
             </a:fld>
             <a:endParaRPr lang="en-US"/>
           </a:p>
@@ -2607,7 +2623,7 @@
           <a:p>
             <a:fld id="{78C97017-6FC3-485B-9764-EAC9E56C1D49}" type="datetimeFigureOut">
               <a:rPr lang="en-US" smtClean="0"/>
-              <a:t>10/16/2016</a:t>
+              <a:t>3/24/17</a:t>
             </a:fld>
             <a:endParaRPr lang="en-US"/>
           </a:p>
@@ -2860,7 +2876,7 @@
           <a:p>
             <a:fld id="{78C97017-6FC3-485B-9764-EAC9E56C1D49}" type="datetimeFigureOut">
               <a:rPr lang="en-US" smtClean="0"/>
-              <a:t>10/16/2016</a:t>
+              <a:t>3/24/17</a:t>
             </a:fld>
             <a:endParaRPr lang="en-US"/>
           </a:p>
@@ -3073,7 +3089,7 @@
           <a:p>
             <a:fld id="{78C97017-6FC3-485B-9764-EAC9E56C1D49}" type="datetimeFigureOut">
               <a:rPr lang="en-US" smtClean="0"/>
-              <a:t>10/16/2016</a:t>
+              <a:t>3/24/17</a:t>
             </a:fld>
             <a:endParaRPr lang="en-US"/>
           </a:p>
@@ -4310,7 +4326,7 @@
                   <a:srgbClr val="7030A0"/>
                 </a:solidFill>
               </a:rPr>
-              <a:t>deletePerson</a:t>
+              <a:t>deleteTask</a:t>
             </a:r>
             <a:r>
               <a:rPr lang="en-US" sz="1400" dirty="0" smtClean="0">
@@ -4318,7 +4334,7 @@
                   <a:srgbClr val="7030A0"/>
                 </a:solidFill>
               </a:rPr>
-              <a:t>(p)</a:t>
+              <a:t>(t)</a:t>
             </a:r>
             <a:endParaRPr lang="en-US" sz="1400" dirty="0">
               <a:solidFill>
@@ -4368,7 +4384,7 @@
                   </a:schemeClr>
                 </a:solidFill>
               </a:rPr>
-              <a:t>AddressBookChangedEvent</a:t>
+              <a:t>TaskManagerChangedEvent</a:t>
             </a:r>
             <a:r>
               <a:rPr lang="en-US" sz="1400" dirty="0" smtClean="0">
@@ -4942,7 +4958,7 @@
                   </a:schemeClr>
                 </a:solidFill>
               </a:rPr>
-              <a:t>AddressBookChangedEvent</a:t>
+              <a:t>TaskManagerChangedEvent</a:t>
             </a:r>
             <a:r>
               <a:rPr lang="en-US" sz="1400" dirty="0" smtClean="0">
@@ -5314,7 +5330,7 @@
                   </a:schemeClr>
                 </a:solidFill>
               </a:rPr>
-              <a:t>handleAddresssBookChangedEvent</a:t>
+              <a:t>handleTaskManagerChangedEvent</a:t>
             </a:r>
             <a:r>
               <a:rPr lang="en-US" sz="1400" dirty="0" smtClean="0">
@@ -5625,7 +5641,7 @@
                   <a:srgbClr val="00B050"/>
                 </a:solidFill>
               </a:rPr>
-              <a:t>handleAddresssBookChangedEvent</a:t>
+              <a:t>handleTaskManagerChangedEvent</a:t>
             </a:r>
             <a:r>
               <a:rPr lang="en-US" sz="1400" dirty="0" smtClean="0">

</xml_diff>

<commit_message>
Update sequence diagrams in developer guide
</commit_message>
<xml_diff>
--- a/docs/diagrams/HighLevelSequenceDiagrams.pptx
+++ b/docs/diagrams/HighLevelSequenceDiagrams.pptx
@@ -208,7 +208,7 @@
           <a:p>
             <a:fld id="{F5CC4B3F-88C1-4FFA-B1B6-F41C21DC6924}" type="datetimeFigureOut">
               <a:rPr lang="en-US" smtClean="0"/>
-              <a:t>3/12/17</a:t>
+              <a:t>3/24/17</a:t>
             </a:fld>
             <a:endParaRPr lang="en-US"/>
           </a:p>
@@ -657,7 +657,7 @@
           <a:p>
             <a:fld id="{78C97017-6FC3-485B-9764-EAC9E56C1D49}" type="datetimeFigureOut">
               <a:rPr lang="en-US" smtClean="0"/>
-              <a:t>3/12/17</a:t>
+              <a:t>3/24/17</a:t>
             </a:fld>
             <a:endParaRPr lang="en-US"/>
           </a:p>
@@ -827,7 +827,7 @@
           <a:p>
             <a:fld id="{78C97017-6FC3-485B-9764-EAC9E56C1D49}" type="datetimeFigureOut">
               <a:rPr lang="en-US" smtClean="0"/>
-              <a:t>3/12/17</a:t>
+              <a:t>3/24/17</a:t>
             </a:fld>
             <a:endParaRPr lang="en-US"/>
           </a:p>
@@ -1007,7 +1007,7 @@
           <a:p>
             <a:fld id="{78C97017-6FC3-485B-9764-EAC9E56C1D49}" type="datetimeFigureOut">
               <a:rPr lang="en-US" smtClean="0"/>
-              <a:t>3/12/17</a:t>
+              <a:t>3/24/17</a:t>
             </a:fld>
             <a:endParaRPr lang="en-US"/>
           </a:p>
@@ -1177,7 +1177,7 @@
           <a:p>
             <a:fld id="{78C97017-6FC3-485B-9764-EAC9E56C1D49}" type="datetimeFigureOut">
               <a:rPr lang="en-US" smtClean="0"/>
-              <a:t>3/12/17</a:t>
+              <a:t>3/24/17</a:t>
             </a:fld>
             <a:endParaRPr lang="en-US"/>
           </a:p>
@@ -1423,7 +1423,7 @@
           <a:p>
             <a:fld id="{78C97017-6FC3-485B-9764-EAC9E56C1D49}" type="datetimeFigureOut">
               <a:rPr lang="en-US" smtClean="0"/>
-              <a:t>3/12/17</a:t>
+              <a:t>3/24/17</a:t>
             </a:fld>
             <a:endParaRPr lang="en-US"/>
           </a:p>
@@ -1711,7 +1711,7 @@
           <a:p>
             <a:fld id="{78C97017-6FC3-485B-9764-EAC9E56C1D49}" type="datetimeFigureOut">
               <a:rPr lang="en-US" smtClean="0"/>
-              <a:t>3/12/17</a:t>
+              <a:t>3/24/17</a:t>
             </a:fld>
             <a:endParaRPr lang="en-US"/>
           </a:p>
@@ -2133,7 +2133,7 @@
           <a:p>
             <a:fld id="{78C97017-6FC3-485B-9764-EAC9E56C1D49}" type="datetimeFigureOut">
               <a:rPr lang="en-US" smtClean="0"/>
-              <a:t>3/12/17</a:t>
+              <a:t>3/24/17</a:t>
             </a:fld>
             <a:endParaRPr lang="en-US"/>
           </a:p>
@@ -2251,7 +2251,7 @@
           <a:p>
             <a:fld id="{78C97017-6FC3-485B-9764-EAC9E56C1D49}" type="datetimeFigureOut">
               <a:rPr lang="en-US" smtClean="0"/>
-              <a:t>3/12/17</a:t>
+              <a:t>3/24/17</a:t>
             </a:fld>
             <a:endParaRPr lang="en-US"/>
           </a:p>
@@ -2346,7 +2346,7 @@
           <a:p>
             <a:fld id="{78C97017-6FC3-485B-9764-EAC9E56C1D49}" type="datetimeFigureOut">
               <a:rPr lang="en-US" smtClean="0"/>
-              <a:t>3/12/17</a:t>
+              <a:t>3/24/17</a:t>
             </a:fld>
             <a:endParaRPr lang="en-US"/>
           </a:p>
@@ -2623,7 +2623,7 @@
           <a:p>
             <a:fld id="{78C97017-6FC3-485B-9764-EAC9E56C1D49}" type="datetimeFigureOut">
               <a:rPr lang="en-US" smtClean="0"/>
-              <a:t>3/12/17</a:t>
+              <a:t>3/24/17</a:t>
             </a:fld>
             <a:endParaRPr lang="en-US"/>
           </a:p>
@@ -2876,7 +2876,7 @@
           <a:p>
             <a:fld id="{78C97017-6FC3-485B-9764-EAC9E56C1D49}" type="datetimeFigureOut">
               <a:rPr lang="en-US" smtClean="0"/>
-              <a:t>3/12/17</a:t>
+              <a:t>3/24/17</a:t>
             </a:fld>
             <a:endParaRPr lang="en-US"/>
           </a:p>
@@ -3089,7 +3089,7 @@
           <a:p>
             <a:fld id="{78C97017-6FC3-485B-9764-EAC9E56C1D49}" type="datetimeFigureOut">
               <a:rPr lang="en-US" smtClean="0"/>
-              <a:t>3/12/17</a:t>
+              <a:t>3/24/17</a:t>
             </a:fld>
             <a:endParaRPr lang="en-US"/>
           </a:p>
@@ -4326,7 +4326,7 @@
                   <a:srgbClr val="7030A0"/>
                 </a:solidFill>
               </a:rPr>
-              <a:t>deletePerson</a:t>
+              <a:t>killTasks</a:t>
             </a:r>
             <a:r>
               <a:rPr lang="en-US" sz="1400" dirty="0" smtClean="0">
@@ -4334,7 +4334,15 @@
                   <a:srgbClr val="7030A0"/>
                 </a:solidFill>
               </a:rPr>
-              <a:t>(p)</a:t>
+              <a:t>(p</a:t>
+            </a:r>
+            <a:r>
+              <a:rPr lang="en-US" sz="1400" dirty="0" smtClean="0">
+                <a:solidFill>
+                  <a:srgbClr val="7030A0"/>
+                </a:solidFill>
+              </a:rPr>
+              <a:t>)</a:t>
             </a:r>
             <a:endParaRPr lang="en-US" sz="1400" dirty="0">
               <a:solidFill>

</xml_diff>

<commit_message>
Change “delete” to “kill” in sequence diagram
</commit_message>
<xml_diff>
--- a/docs/diagrams/HighLevelSequenceDiagrams.pptx
+++ b/docs/diagrams/HighLevelSequenceDiagrams.pptx
@@ -4182,7 +4182,7 @@
           <a:p>
             <a:r>
               <a:rPr lang="en-US" sz="1400" dirty="0" smtClean="0"/>
-              <a:t>delete 1</a:t>
+              <a:t>kill 1</a:t>
             </a:r>
             <a:endParaRPr lang="en-US" sz="1400" dirty="0"/>
           </a:p>
@@ -4334,15 +4334,7 @@
                   <a:srgbClr val="7030A0"/>
                 </a:solidFill>
               </a:rPr>
-              <a:t>(p</a:t>
-            </a:r>
-            <a:r>
-              <a:rPr lang="en-US" sz="1400" dirty="0" smtClean="0">
-                <a:solidFill>
-                  <a:srgbClr val="7030A0"/>
-                </a:solidFill>
-              </a:rPr>
-              <a:t>)</a:t>
+              <a:t>(p)</a:t>
             </a:r>
             <a:endParaRPr lang="en-US" sz="1400" dirty="0">
               <a:solidFill>

</xml_diff>

<commit_message>
Change “delete” to “kill” in another sequence diagram
</commit_message>
<xml_diff>
--- a/docs/diagrams/HighLevelSequenceDiagrams.pptx
+++ b/docs/diagrams/HighLevelSequenceDiagrams.pptx
@@ -4252,7 +4252,23 @@
                   <a:srgbClr val="0070C0"/>
                 </a:solidFill>
               </a:rPr>
-              <a:t>execute(“delete 1”)</a:t>
+              <a:t>execute</a:t>
+            </a:r>
+            <a:r>
+              <a:rPr lang="en-US" sz="1400" dirty="0" smtClean="0">
+                <a:solidFill>
+                  <a:srgbClr val="0070C0"/>
+                </a:solidFill>
+              </a:rPr>
+              <a:t>(“kill 1</a:t>
+            </a:r>
+            <a:r>
+              <a:rPr lang="en-US" sz="1400" dirty="0" smtClean="0">
+                <a:solidFill>
+                  <a:srgbClr val="0070C0"/>
+                </a:solidFill>
+              </a:rPr>
+              <a:t>”)</a:t>
             </a:r>
             <a:endParaRPr lang="en-US" sz="1400" dirty="0">
               <a:solidFill>

</xml_diff>

<commit_message>
Updated Diagrams and replaced images in Dev Guide
</commit_message>
<xml_diff>
--- a/docs/diagrams/HighLevelSequenceDiagrams.pptx
+++ b/docs/diagrams/HighLevelSequenceDiagrams.pptx
@@ -5,10 +5,11 @@
     <p:sldMasterId id="2147483648" r:id="rId1"/>
   </p:sldMasterIdLst>
   <p:notesMasterIdLst>
-    <p:notesMasterId r:id="rId3"/>
+    <p:notesMasterId r:id="rId4"/>
   </p:notesMasterIdLst>
   <p:sldIdLst>
     <p:sldId id="266" r:id="rId2"/>
+    <p:sldId id="267" r:id="rId3"/>
   </p:sldIdLst>
   <p:sldSz cx="9144000" cy="6858000" type="screen4x3"/>
   <p:notesSz cx="6858000" cy="9144000"/>
@@ -208,7 +209,7 @@
           <a:p>
             <a:fld id="{F5CC4B3F-88C1-4FFA-B1B6-F41C21DC6924}" type="datetimeFigureOut">
               <a:rPr lang="en-US" smtClean="0"/>
-              <a:t>3/24/17</a:t>
+              <a:t>3/26/17</a:t>
             </a:fld>
             <a:endParaRPr lang="en-US"/>
           </a:p>
@@ -657,7 +658,7 @@
           <a:p>
             <a:fld id="{78C97017-6FC3-485B-9764-EAC9E56C1D49}" type="datetimeFigureOut">
               <a:rPr lang="en-US" smtClean="0"/>
-              <a:t>3/24/17</a:t>
+              <a:t>3/26/17</a:t>
             </a:fld>
             <a:endParaRPr lang="en-US"/>
           </a:p>
@@ -827,7 +828,7 @@
           <a:p>
             <a:fld id="{78C97017-6FC3-485B-9764-EAC9E56C1D49}" type="datetimeFigureOut">
               <a:rPr lang="en-US" smtClean="0"/>
-              <a:t>3/24/17</a:t>
+              <a:t>3/26/17</a:t>
             </a:fld>
             <a:endParaRPr lang="en-US"/>
           </a:p>
@@ -1007,7 +1008,7 @@
           <a:p>
             <a:fld id="{78C97017-6FC3-485B-9764-EAC9E56C1D49}" type="datetimeFigureOut">
               <a:rPr lang="en-US" smtClean="0"/>
-              <a:t>3/24/17</a:t>
+              <a:t>3/26/17</a:t>
             </a:fld>
             <a:endParaRPr lang="en-US"/>
           </a:p>
@@ -1177,7 +1178,7 @@
           <a:p>
             <a:fld id="{78C97017-6FC3-485B-9764-EAC9E56C1D49}" type="datetimeFigureOut">
               <a:rPr lang="en-US" smtClean="0"/>
-              <a:t>3/24/17</a:t>
+              <a:t>3/26/17</a:t>
             </a:fld>
             <a:endParaRPr lang="en-US"/>
           </a:p>
@@ -1423,7 +1424,7 @@
           <a:p>
             <a:fld id="{78C97017-6FC3-485B-9764-EAC9E56C1D49}" type="datetimeFigureOut">
               <a:rPr lang="en-US" smtClean="0"/>
-              <a:t>3/24/17</a:t>
+              <a:t>3/26/17</a:t>
             </a:fld>
             <a:endParaRPr lang="en-US"/>
           </a:p>
@@ -1711,7 +1712,7 @@
           <a:p>
             <a:fld id="{78C97017-6FC3-485B-9764-EAC9E56C1D49}" type="datetimeFigureOut">
               <a:rPr lang="en-US" smtClean="0"/>
-              <a:t>3/24/17</a:t>
+              <a:t>3/26/17</a:t>
             </a:fld>
             <a:endParaRPr lang="en-US"/>
           </a:p>
@@ -2133,7 +2134,7 @@
           <a:p>
             <a:fld id="{78C97017-6FC3-485B-9764-EAC9E56C1D49}" type="datetimeFigureOut">
               <a:rPr lang="en-US" smtClean="0"/>
-              <a:t>3/24/17</a:t>
+              <a:t>3/26/17</a:t>
             </a:fld>
             <a:endParaRPr lang="en-US"/>
           </a:p>
@@ -2251,7 +2252,7 @@
           <a:p>
             <a:fld id="{78C97017-6FC3-485B-9764-EAC9E56C1D49}" type="datetimeFigureOut">
               <a:rPr lang="en-US" smtClean="0"/>
-              <a:t>3/24/17</a:t>
+              <a:t>3/26/17</a:t>
             </a:fld>
             <a:endParaRPr lang="en-US"/>
           </a:p>
@@ -2346,7 +2347,7 @@
           <a:p>
             <a:fld id="{78C97017-6FC3-485B-9764-EAC9E56C1D49}" type="datetimeFigureOut">
               <a:rPr lang="en-US" smtClean="0"/>
-              <a:t>3/24/17</a:t>
+              <a:t>3/26/17</a:t>
             </a:fld>
             <a:endParaRPr lang="en-US"/>
           </a:p>
@@ -2623,7 +2624,7 @@
           <a:p>
             <a:fld id="{78C97017-6FC3-485B-9764-EAC9E56C1D49}" type="datetimeFigureOut">
               <a:rPr lang="en-US" smtClean="0"/>
-              <a:t>3/24/17</a:t>
+              <a:t>3/26/17</a:t>
             </a:fld>
             <a:endParaRPr lang="en-US"/>
           </a:p>
@@ -2876,7 +2877,7 @@
           <a:p>
             <a:fld id="{78C97017-6FC3-485B-9764-EAC9E56C1D49}" type="datetimeFigureOut">
               <a:rPr lang="en-US" smtClean="0"/>
-              <a:t>3/24/17</a:t>
+              <a:t>3/26/17</a:t>
             </a:fld>
             <a:endParaRPr lang="en-US"/>
           </a:p>
@@ -3089,7 +3090,7 @@
           <a:p>
             <a:fld id="{78C97017-6FC3-485B-9764-EAC9E56C1D49}" type="datetimeFigureOut">
               <a:rPr lang="en-US" smtClean="0"/>
-              <a:t>3/24/17</a:t>
+              <a:t>3/26/17</a:t>
             </a:fld>
             <a:endParaRPr lang="en-US"/>
           </a:p>
@@ -3472,7 +3473,7 @@
         </p:nvSpPr>
         <p:spPr>
           <a:xfrm>
-            <a:off x="1111860" y="607926"/>
+            <a:off x="1035660" y="2303445"/>
             <a:ext cx="1093635" cy="346760"/>
           </a:xfrm>
           <a:prstGeom prst="rect">
@@ -3531,7 +3532,7 @@
         </p:nvCxnSpPr>
         <p:spPr>
           <a:xfrm>
-            <a:off x="1658677" y="971597"/>
+            <a:off x="1582477" y="2667116"/>
             <a:ext cx="0" cy="1723059"/>
           </a:xfrm>
           <a:prstGeom prst="line">
@@ -3568,7 +3569,7 @@
         </p:nvSpPr>
         <p:spPr>
           <a:xfrm>
-            <a:off x="1586669" y="1322292"/>
+            <a:off x="1510469" y="3017811"/>
             <a:ext cx="152400" cy="1019910"/>
           </a:xfrm>
           <a:prstGeom prst="rect">
@@ -3619,7 +3620,7 @@
         </p:nvGrpSpPr>
         <p:grpSpPr>
           <a:xfrm>
-            <a:off x="152400" y="533400"/>
+            <a:off x="76200" y="2228919"/>
             <a:ext cx="324036" cy="573410"/>
             <a:chOff x="3239901" y="4149080"/>
             <a:chExt cx="648072" cy="1146820"/>
@@ -3836,7 +3837,7 @@
         </p:nvSpPr>
         <p:spPr>
           <a:xfrm>
-            <a:off x="3335583" y="611613"/>
+            <a:off x="3259383" y="2307132"/>
             <a:ext cx="1093635" cy="346760"/>
           </a:xfrm>
           <a:prstGeom prst="rect">
@@ -3895,7 +3896,7 @@
         </p:nvCxnSpPr>
         <p:spPr>
           <a:xfrm>
-            <a:off x="3882400" y="975284"/>
+            <a:off x="3806200" y="2670803"/>
             <a:ext cx="0" cy="1723059"/>
           </a:xfrm>
           <a:prstGeom prst="line">
@@ -3932,7 +3933,7 @@
         </p:nvSpPr>
         <p:spPr>
           <a:xfrm>
-            <a:off x="3810392" y="1433477"/>
+            <a:off x="3734192" y="3128996"/>
             <a:ext cx="144016" cy="832525"/>
           </a:xfrm>
           <a:prstGeom prst="rect">
@@ -3983,7 +3984,7 @@
         </p:nvSpPr>
         <p:spPr>
           <a:xfrm>
-            <a:off x="5316783" y="607926"/>
+            <a:off x="5240583" y="2303445"/>
             <a:ext cx="1093635" cy="346760"/>
           </a:xfrm>
           <a:prstGeom prst="rect">
@@ -4042,7 +4043,7 @@
         </p:nvCxnSpPr>
         <p:spPr>
           <a:xfrm>
-            <a:off x="5863600" y="971597"/>
+            <a:off x="5787400" y="2667116"/>
             <a:ext cx="0" cy="1723059"/>
           </a:xfrm>
           <a:prstGeom prst="line">
@@ -4079,7 +4080,7 @@
         </p:nvSpPr>
         <p:spPr>
           <a:xfrm>
-            <a:off x="5791592" y="1538408"/>
+            <a:off x="5715392" y="3233927"/>
             <a:ext cx="142006" cy="651394"/>
           </a:xfrm>
           <a:prstGeom prst="rect">
@@ -4130,7 +4131,7 @@
         </p:nvCxnSpPr>
         <p:spPr>
           <a:xfrm>
-            <a:off x="466818" y="1325979"/>
+            <a:off x="390618" y="3021498"/>
             <a:ext cx="1119851" cy="0"/>
           </a:xfrm>
           <a:prstGeom prst="straightConnector1">
@@ -4166,7 +4167,7 @@
         </p:nvSpPr>
         <p:spPr>
           <a:xfrm>
-            <a:off x="466818" y="1345880"/>
+            <a:off x="390618" y="3041399"/>
             <a:ext cx="860170" cy="215444"/>
           </a:xfrm>
           <a:prstGeom prst="rect">
@@ -4196,7 +4197,7 @@
         </p:nvCxnSpPr>
         <p:spPr>
           <a:xfrm>
-            <a:off x="1739069" y="1433478"/>
+            <a:off x="1662869" y="3128997"/>
             <a:ext cx="2071323" cy="0"/>
           </a:xfrm>
           <a:prstGeom prst="straightConnector1">
@@ -4232,7 +4233,7 @@
         </p:nvSpPr>
         <p:spPr>
           <a:xfrm>
-            <a:off x="2166172" y="1453379"/>
+            <a:off x="2089972" y="3148898"/>
             <a:ext cx="1424846" cy="215444"/>
           </a:xfrm>
           <a:prstGeom prst="rect">
@@ -4270,7 +4271,7 @@
         </p:nvCxnSpPr>
         <p:spPr>
           <a:xfrm>
-            <a:off x="3954408" y="1538409"/>
+            <a:off x="3878208" y="3233928"/>
             <a:ext cx="1837184" cy="0"/>
           </a:xfrm>
           <a:prstGeom prst="straightConnector1">
@@ -4306,7 +4307,7 @@
         </p:nvSpPr>
         <p:spPr>
           <a:xfrm>
-            <a:off x="4299772" y="1542583"/>
+            <a:off x="4223572" y="3238102"/>
             <a:ext cx="1424846" cy="215444"/>
           </a:xfrm>
           <a:prstGeom prst="rect">
@@ -4352,7 +4353,7 @@
         </p:nvSpPr>
         <p:spPr>
           <a:xfrm>
-            <a:off x="6074030" y="1687656"/>
+            <a:off x="5997830" y="3383175"/>
             <a:ext cx="2438400" cy="215444"/>
           </a:xfrm>
           <a:prstGeom prst="rect">
@@ -4414,7 +4415,7 @@
         </p:nvCxnSpPr>
         <p:spPr>
           <a:xfrm>
-            <a:off x="3954408" y="2190681"/>
+            <a:off x="3878208" y="3886200"/>
             <a:ext cx="1837184" cy="0"/>
           </a:xfrm>
           <a:prstGeom prst="straightConnector1">
@@ -4452,7 +4453,7 @@
         </p:nvCxnSpPr>
         <p:spPr>
           <a:xfrm>
-            <a:off x="1739069" y="2266002"/>
+            <a:off x="1662869" y="3961521"/>
             <a:ext cx="2058118" cy="0"/>
           </a:xfrm>
           <a:prstGeom prst="straightConnector1">
@@ -4490,7 +4491,7 @@
         </p:nvCxnSpPr>
         <p:spPr>
           <a:xfrm>
-            <a:off x="390618" y="2342202"/>
+            <a:off x="314418" y="4037721"/>
             <a:ext cx="1196051" cy="0"/>
           </a:xfrm>
           <a:prstGeom prst="straightConnector1">
@@ -4528,7 +4529,7 @@
         </p:nvSpPr>
         <p:spPr>
           <a:xfrm>
-            <a:off x="7696200" y="591251"/>
+            <a:off x="7620000" y="2286770"/>
             <a:ext cx="1371600" cy="346760"/>
           </a:xfrm>
           <a:prstGeom prst="rect">
@@ -4599,7 +4600,7 @@
         </p:nvCxnSpPr>
         <p:spPr>
           <a:xfrm>
-            <a:off x="8616802" y="944305"/>
+            <a:off x="8540602" y="2639824"/>
             <a:ext cx="0" cy="1723059"/>
           </a:xfrm>
           <a:prstGeom prst="line">
@@ -4638,7 +4639,7 @@
         </p:nvSpPr>
         <p:spPr>
           <a:xfrm>
-            <a:off x="8544794" y="1961202"/>
+            <a:off x="8468594" y="3656721"/>
             <a:ext cx="142006" cy="176787"/>
           </a:xfrm>
           <a:prstGeom prst="rect">
@@ -4693,7 +4694,7 @@
         </p:nvCxnSpPr>
         <p:spPr>
           <a:xfrm>
-            <a:off x="5943992" y="1961202"/>
+            <a:off x="5867792" y="3656721"/>
             <a:ext cx="2568438" cy="0"/>
           </a:xfrm>
           <a:prstGeom prst="straightConnector1">
@@ -4729,7 +4730,7 @@
         </p:nvCxnSpPr>
         <p:spPr>
           <a:xfrm>
-            <a:off x="5943992" y="2137989"/>
+            <a:off x="5867792" y="3833508"/>
             <a:ext cx="2549946" cy="0"/>
           </a:xfrm>
           <a:prstGeom prst="straightConnector1">
@@ -4761,6 +4762,73 @@
           </a:fontRef>
         </p:style>
       </p:cxnSp>
+      <p:cxnSp>
+        <p:nvCxnSpPr>
+          <p:cNvPr id="85" name="Straight Connector 84"/>
+          <p:cNvCxnSpPr/>
+          <p:nvPr/>
+        </p:nvCxnSpPr>
+        <p:spPr>
+          <a:xfrm flipH="1">
+            <a:off x="238194" y="2795191"/>
+            <a:ext cx="24" cy="1598671"/>
+          </a:xfrm>
+          <a:prstGeom prst="line">
+            <a:avLst/>
+          </a:prstGeom>
+          <a:ln w="19050">
+            <a:solidFill>
+              <a:schemeClr val="tx1"/>
+            </a:solidFill>
+            <a:prstDash val="sysDash"/>
+          </a:ln>
+          <a:effectLst/>
+        </p:spPr>
+        <p:style>
+          <a:lnRef idx="1">
+            <a:schemeClr val="accent1"/>
+          </a:lnRef>
+          <a:fillRef idx="2">
+            <a:schemeClr val="accent1"/>
+          </a:fillRef>
+          <a:effectRef idx="1">
+            <a:schemeClr val="accent1"/>
+          </a:effectRef>
+          <a:fontRef idx="minor">
+            <a:schemeClr val="dk1"/>
+          </a:fontRef>
+        </p:style>
+      </p:cxnSp>
+    </p:spTree>
+    <p:extLst>
+      <p:ext uri="{BB962C8B-B14F-4D97-AF65-F5344CB8AC3E}">
+        <p14:creationId xmlns:p14="http://schemas.microsoft.com/office/powerpoint/2010/main" val="4023378879"/>
+      </p:ext>
+    </p:extLst>
+  </p:cSld>
+  <p:clrMapOvr>
+    <a:masterClrMapping/>
+  </p:clrMapOvr>
+</p:sld>
+</file>
+
+<file path=ppt/slides/slide2.xml><?xml version="1.0" encoding="utf-8"?>
+<p:sld xmlns:a="http://schemas.openxmlformats.org/drawingml/2006/main" xmlns:r="http://schemas.openxmlformats.org/officeDocument/2006/relationships" xmlns:p="http://schemas.openxmlformats.org/presentationml/2006/main">
+  <p:cSld>
+    <p:spTree>
+      <p:nvGrpSpPr>
+        <p:cNvPr id="1" name=""/>
+        <p:cNvGrpSpPr/>
+        <p:nvPr/>
+      </p:nvGrpSpPr>
+      <p:grpSpPr>
+        <a:xfrm>
+          <a:off x="0" y="0"/>
+          <a:ext cx="0" cy="0"/>
+          <a:chOff x="0" y="0"/>
+          <a:chExt cx="0" cy="0"/>
+        </a:xfrm>
+      </p:grpSpPr>
       <p:sp>
         <p:nvSpPr>
           <p:cNvPr id="53" name="Rectangle 62"/>
@@ -4769,7 +4837,7 @@
         </p:nvSpPr>
         <p:spPr>
           <a:xfrm>
-            <a:off x="7370178" y="4278322"/>
+            <a:off x="7454183" y="2379529"/>
             <a:ext cx="1093635" cy="346760"/>
           </a:xfrm>
           <a:prstGeom prst="rect">
@@ -4832,7 +4900,7 @@
         </p:nvCxnSpPr>
         <p:spPr>
           <a:xfrm>
-            <a:off x="7916995" y="4641993"/>
+            <a:off x="8001000" y="2743200"/>
             <a:ext cx="0" cy="1723059"/>
           </a:xfrm>
           <a:prstGeom prst="line">
@@ -4871,7 +4939,7 @@
         </p:nvSpPr>
         <p:spPr>
           <a:xfrm>
-            <a:off x="7844987" y="5335662"/>
+            <a:off x="7928992" y="3436869"/>
             <a:ext cx="124478" cy="287409"/>
           </a:xfrm>
           <a:prstGeom prst="rect">
@@ -4926,7 +4994,7 @@
         </p:nvSpPr>
         <p:spPr>
           <a:xfrm>
-            <a:off x="1810094" y="4797674"/>
+            <a:off x="1894099" y="2898881"/>
             <a:ext cx="2716635" cy="215444"/>
           </a:xfrm>
           <a:prstGeom prst="rect">
@@ -4988,7 +5056,7 @@
         </p:nvCxnSpPr>
         <p:spPr>
           <a:xfrm flipH="1">
-            <a:off x="4526729" y="5623071"/>
+            <a:off x="4610734" y="3724278"/>
             <a:ext cx="3383941" cy="0"/>
           </a:xfrm>
           <a:prstGeom prst="straightConnector1">
@@ -5028,7 +5096,7 @@
         </p:nvSpPr>
         <p:spPr>
           <a:xfrm>
-            <a:off x="3791146" y="4295233"/>
+            <a:off x="3875151" y="2396440"/>
             <a:ext cx="1371600" cy="346760"/>
           </a:xfrm>
           <a:prstGeom prst="rect">
@@ -5099,7 +5167,7 @@
         </p:nvCxnSpPr>
         <p:spPr>
           <a:xfrm>
-            <a:off x="4456731" y="4648287"/>
+            <a:off x="4540736" y="2749494"/>
             <a:ext cx="0" cy="1723059"/>
           </a:xfrm>
           <a:prstGeom prst="line">
@@ -5138,7 +5206,7 @@
         </p:nvSpPr>
         <p:spPr>
           <a:xfrm>
-            <a:off x="4384723" y="5071220"/>
+            <a:off x="4468728" y="3172427"/>
             <a:ext cx="142006" cy="1036757"/>
           </a:xfrm>
           <a:prstGeom prst="rect">
@@ -5193,7 +5261,7 @@
         </p:nvCxnSpPr>
         <p:spPr>
           <a:xfrm>
-            <a:off x="3078929" y="5071220"/>
+            <a:off x="3162934" y="3172427"/>
             <a:ext cx="1295400" cy="0"/>
           </a:xfrm>
           <a:prstGeom prst="straightConnector1">
@@ -5229,7 +5297,7 @@
         </p:nvCxnSpPr>
         <p:spPr>
           <a:xfrm>
-            <a:off x="2975642" y="6107977"/>
+            <a:off x="3059647" y="4209184"/>
             <a:ext cx="1448755" cy="0"/>
           </a:xfrm>
           <a:prstGeom prst="straightConnector1">
@@ -5269,7 +5337,7 @@
         </p:nvCxnSpPr>
         <p:spPr>
           <a:xfrm>
-            <a:off x="4526729" y="5341014"/>
+            <a:off x="4610734" y="3442221"/>
             <a:ext cx="3318258" cy="0"/>
           </a:xfrm>
           <a:prstGeom prst="straightConnector1">
@@ -5308,7 +5376,7 @@
         </p:nvSpPr>
         <p:spPr>
           <a:xfrm>
-            <a:off x="5036330" y="5065911"/>
+            <a:off x="5120335" y="3167118"/>
             <a:ext cx="2659870" cy="215444"/>
           </a:xfrm>
           <a:prstGeom prst="rect">
@@ -5352,23 +5420,82 @@
           </a:p>
         </p:txBody>
       </p:sp>
+      <p:sp>
+        <p:nvSpPr>
+          <p:cNvPr id="45" name="Rectangle 62"/>
+          <p:cNvSpPr/>
+          <p:nvPr/>
+        </p:nvSpPr>
+        <p:spPr>
+          <a:xfrm>
+            <a:off x="805639" y="2379529"/>
+            <a:ext cx="1093635" cy="346760"/>
+          </a:xfrm>
+          <a:prstGeom prst="rect">
+            <a:avLst/>
+          </a:prstGeom>
+          <a:solidFill>
+            <a:srgbClr val="00B050"/>
+          </a:solidFill>
+          <a:ln w="19050">
+            <a:solidFill>
+              <a:srgbClr val="00B050"/>
+            </a:solidFill>
+          </a:ln>
+          <a:effectLst/>
+        </p:spPr>
+        <p:style>
+          <a:lnRef idx="1">
+            <a:schemeClr val="accent2"/>
+          </a:lnRef>
+          <a:fillRef idx="2">
+            <a:schemeClr val="accent2"/>
+          </a:fillRef>
+          <a:effectRef idx="1">
+            <a:schemeClr val="accent2"/>
+          </a:effectRef>
+          <a:fontRef idx="minor">
+            <a:schemeClr val="dk1"/>
+          </a:fontRef>
+        </p:style>
+        <p:txBody>
+          <a:bodyPr rtlCol="0" anchor="ctr"/>
+          <a:lstStyle/>
+          <a:p>
+            <a:pPr algn="ctr"/>
+            <a:r>
+              <a:rPr lang="en-US" sz="1600" dirty="0" smtClean="0">
+                <a:solidFill>
+                  <a:schemeClr val="bg1"/>
+                </a:solidFill>
+              </a:rPr>
+              <a:t>:UI</a:t>
+            </a:r>
+            <a:endParaRPr lang="en-SG" sz="1600" dirty="0">
+              <a:solidFill>
+                <a:schemeClr val="bg1"/>
+              </a:solidFill>
+            </a:endParaRPr>
+          </a:p>
+        </p:txBody>
+      </p:sp>
       <p:cxnSp>
         <p:nvCxnSpPr>
-          <p:cNvPr id="85" name="Straight Connector 84"/>
+          <p:cNvPr id="46" name="Straight Connector 45"/>
           <p:cNvCxnSpPr/>
           <p:nvPr/>
         </p:nvCxnSpPr>
         <p:spPr>
-          <a:xfrm flipH="1">
-            <a:off x="314394" y="1099672"/>
-            <a:ext cx="24" cy="1598671"/>
+          <a:xfrm>
+            <a:off x="1352456" y="2743200"/>
+            <a:ext cx="0" cy="1723059"/>
           </a:xfrm>
           <a:prstGeom prst="line">
             <a:avLst/>
           </a:prstGeom>
           <a:ln w="19050">
             <a:solidFill>
-              <a:schemeClr val="tx1"/>
+              <a:srgbClr val="00B050"/>
             </a:solidFill>
             <a:prstDash val="sysDash"/>
           </a:ln>
@@ -5391,109 +5518,13 @@
       </p:cxnSp>
       <p:sp>
         <p:nvSpPr>
-          <p:cNvPr id="45" name="Rectangle 62"/>
-          <p:cNvSpPr/>
-          <p:nvPr/>
-        </p:nvSpPr>
-        <p:spPr>
-          <a:xfrm>
-            <a:off x="721634" y="4278322"/>
-            <a:ext cx="1093635" cy="346760"/>
-          </a:xfrm>
-          <a:prstGeom prst="rect">
-            <a:avLst/>
-          </a:prstGeom>
-          <a:solidFill>
-            <a:srgbClr val="00B050"/>
-          </a:solidFill>
-          <a:ln w="19050">
-            <a:solidFill>
-              <a:srgbClr val="00B050"/>
-            </a:solidFill>
-          </a:ln>
-          <a:effectLst/>
-        </p:spPr>
-        <p:style>
-          <a:lnRef idx="1">
-            <a:schemeClr val="accent2"/>
-          </a:lnRef>
-          <a:fillRef idx="2">
-            <a:schemeClr val="accent2"/>
-          </a:fillRef>
-          <a:effectRef idx="1">
-            <a:schemeClr val="accent2"/>
-          </a:effectRef>
-          <a:fontRef idx="minor">
-            <a:schemeClr val="dk1"/>
-          </a:fontRef>
-        </p:style>
-        <p:txBody>
-          <a:bodyPr rtlCol="0" anchor="ctr"/>
-          <a:lstStyle/>
-          <a:p>
-            <a:pPr algn="ctr"/>
-            <a:r>
-              <a:rPr lang="en-US" sz="1600" dirty="0" smtClean="0">
-                <a:solidFill>
-                  <a:schemeClr val="bg1"/>
-                </a:solidFill>
-              </a:rPr>
-              <a:t>:UI</a:t>
-            </a:r>
-            <a:endParaRPr lang="en-SG" sz="1600" dirty="0">
-              <a:solidFill>
-                <a:schemeClr val="bg1"/>
-              </a:solidFill>
-            </a:endParaRPr>
-          </a:p>
-        </p:txBody>
-      </p:sp>
-      <p:cxnSp>
-        <p:nvCxnSpPr>
-          <p:cNvPr id="46" name="Straight Connector 45"/>
-          <p:cNvCxnSpPr/>
-          <p:nvPr/>
-        </p:nvCxnSpPr>
-        <p:spPr>
-          <a:xfrm>
-            <a:off x="1268451" y="4641993"/>
-            <a:ext cx="0" cy="1723059"/>
-          </a:xfrm>
-          <a:prstGeom prst="line">
-            <a:avLst/>
-          </a:prstGeom>
-          <a:ln w="19050">
-            <a:solidFill>
-              <a:srgbClr val="00B050"/>
-            </a:solidFill>
-            <a:prstDash val="sysDash"/>
-          </a:ln>
-          <a:effectLst/>
-        </p:spPr>
-        <p:style>
-          <a:lnRef idx="1">
-            <a:schemeClr val="accent1"/>
-          </a:lnRef>
-          <a:fillRef idx="2">
-            <a:schemeClr val="accent1"/>
-          </a:fillRef>
-          <a:effectRef idx="1">
-            <a:schemeClr val="accent1"/>
-          </a:effectRef>
-          <a:fontRef idx="minor">
-            <a:schemeClr val="dk1"/>
-          </a:fontRef>
-        </p:style>
-      </p:cxnSp>
-      <p:sp>
-        <p:nvSpPr>
           <p:cNvPr id="47" name="Rectangle 46"/>
           <p:cNvSpPr/>
           <p:nvPr/>
         </p:nvSpPr>
         <p:spPr>
           <a:xfrm>
-            <a:off x="1196443" y="5670472"/>
+            <a:off x="1280448" y="3771679"/>
             <a:ext cx="130545" cy="273128"/>
           </a:xfrm>
           <a:prstGeom prst="rect">
@@ -5544,7 +5575,7 @@
         </p:nvCxnSpPr>
         <p:spPr>
           <a:xfrm flipH="1">
-            <a:off x="1348843" y="5943600"/>
+            <a:off x="1432848" y="4044807"/>
             <a:ext cx="3061842" cy="0"/>
           </a:xfrm>
           <a:prstGeom prst="straightConnector1">
@@ -5582,7 +5613,7 @@
         </p:nvCxnSpPr>
         <p:spPr>
           <a:xfrm>
-            <a:off x="1348843" y="5670472"/>
+            <a:off x="1432848" y="3771679"/>
             <a:ext cx="3061841" cy="0"/>
           </a:xfrm>
           <a:prstGeom prst="straightConnector1">
@@ -5621,7 +5652,7 @@
         </p:nvSpPr>
         <p:spPr>
           <a:xfrm>
-            <a:off x="1416276" y="5395369"/>
+            <a:off x="1500281" y="3496576"/>
             <a:ext cx="2659870" cy="215444"/>
           </a:xfrm>
           <a:prstGeom prst="rect">
@@ -5667,7 +5698,7 @@
         </p:nvGrpSpPr>
         <p:grpSpPr>
           <a:xfrm>
-            <a:off x="1028134" y="5612032"/>
+            <a:off x="1112139" y="3713239"/>
             <a:ext cx="217349" cy="270072"/>
             <a:chOff x="1028134" y="5612032"/>
             <a:chExt cx="217349" cy="270072"/>
@@ -5826,7 +5857,7 @@
         </p:nvSpPr>
         <p:spPr>
           <a:xfrm>
-            <a:off x="194562" y="5444571"/>
+            <a:off x="278567" y="3545778"/>
             <a:ext cx="794081" cy="430887"/>
           </a:xfrm>
           <a:prstGeom prst="rect">
@@ -5865,7 +5896,7 @@
         </p:nvGrpSpPr>
         <p:grpSpPr>
           <a:xfrm flipH="1">
-            <a:off x="7936842" y="5335662"/>
+            <a:off x="8020847" y="3436869"/>
             <a:ext cx="217349" cy="270072"/>
             <a:chOff x="1028134" y="5612032"/>
             <a:chExt cx="217349" cy="270072"/>
@@ -6028,7 +6059,7 @@
         </p:nvSpPr>
         <p:spPr>
           <a:xfrm>
-            <a:off x="8223953" y="5180992"/>
+            <a:off x="8307958" y="3282199"/>
             <a:ext cx="539047" cy="430887"/>
           </a:xfrm>
           <a:prstGeom prst="rect">
@@ -6084,7 +6115,7 @@
     </p:spTree>
     <p:extLst>
       <p:ext uri="{BB962C8B-B14F-4D97-AF65-F5344CB8AC3E}">
-        <p14:creationId xmlns:p14="http://schemas.microsoft.com/office/powerpoint/2010/main" val="4023378879"/>
+        <p14:creationId xmlns:p14="http://schemas.microsoft.com/office/powerpoint/2010/main" val="236030090"/>
       </p:ext>
     </p:extLst>
   </p:cSld>

</xml_diff>

<commit_message>
Update sequence diagram to lengthen arrow
</commit_message>
<xml_diff>
--- a/docs/diagrams/HighLevelSequenceDiagrams.pptx
+++ b/docs/diagrams/HighLevelSequenceDiagrams.pptx
@@ -208,7 +208,7 @@
           <a:p>
             <a:fld id="{F5CC4B3F-88C1-4FFA-B1B6-F41C21DC6924}" type="datetimeFigureOut">
               <a:rPr lang="en-US" smtClean="0"/>
-              <a:t>3/13/17</a:t>
+              <a:t>3/29/17</a:t>
             </a:fld>
             <a:endParaRPr lang="en-US" dirty="0"/>
           </a:p>
@@ -657,7 +657,7 @@
           <a:p>
             <a:fld id="{78C97017-6FC3-485B-9764-EAC9E56C1D49}" type="datetimeFigureOut">
               <a:rPr lang="en-US" smtClean="0"/>
-              <a:t>3/13/17</a:t>
+              <a:t>3/29/17</a:t>
             </a:fld>
             <a:endParaRPr lang="en-US" dirty="0"/>
           </a:p>
@@ -827,7 +827,7 @@
           <a:p>
             <a:fld id="{78C97017-6FC3-485B-9764-EAC9E56C1D49}" type="datetimeFigureOut">
               <a:rPr lang="en-US" smtClean="0"/>
-              <a:t>3/13/17</a:t>
+              <a:t>3/29/17</a:t>
             </a:fld>
             <a:endParaRPr lang="en-US" dirty="0"/>
           </a:p>
@@ -1007,7 +1007,7 @@
           <a:p>
             <a:fld id="{78C97017-6FC3-485B-9764-EAC9E56C1D49}" type="datetimeFigureOut">
               <a:rPr lang="en-US" smtClean="0"/>
-              <a:t>3/13/17</a:t>
+              <a:t>3/29/17</a:t>
             </a:fld>
             <a:endParaRPr lang="en-US" dirty="0"/>
           </a:p>
@@ -1177,7 +1177,7 @@
           <a:p>
             <a:fld id="{78C97017-6FC3-485B-9764-EAC9E56C1D49}" type="datetimeFigureOut">
               <a:rPr lang="en-US" smtClean="0"/>
-              <a:t>3/13/17</a:t>
+              <a:t>3/29/17</a:t>
             </a:fld>
             <a:endParaRPr lang="en-US" dirty="0"/>
           </a:p>
@@ -1423,7 +1423,7 @@
           <a:p>
             <a:fld id="{78C97017-6FC3-485B-9764-EAC9E56C1D49}" type="datetimeFigureOut">
               <a:rPr lang="en-US" smtClean="0"/>
-              <a:t>3/13/17</a:t>
+              <a:t>3/29/17</a:t>
             </a:fld>
             <a:endParaRPr lang="en-US" dirty="0"/>
           </a:p>
@@ -1711,7 +1711,7 @@
           <a:p>
             <a:fld id="{78C97017-6FC3-485B-9764-EAC9E56C1D49}" type="datetimeFigureOut">
               <a:rPr lang="en-US" smtClean="0"/>
-              <a:t>3/13/17</a:t>
+              <a:t>3/29/17</a:t>
             </a:fld>
             <a:endParaRPr lang="en-US" dirty="0"/>
           </a:p>
@@ -2133,7 +2133,7 @@
           <a:p>
             <a:fld id="{78C97017-6FC3-485B-9764-EAC9E56C1D49}" type="datetimeFigureOut">
               <a:rPr lang="en-US" smtClean="0"/>
-              <a:t>3/13/17</a:t>
+              <a:t>3/29/17</a:t>
             </a:fld>
             <a:endParaRPr lang="en-US" dirty="0"/>
           </a:p>
@@ -2251,7 +2251,7 @@
           <a:p>
             <a:fld id="{78C97017-6FC3-485B-9764-EAC9E56C1D49}" type="datetimeFigureOut">
               <a:rPr lang="en-US" smtClean="0"/>
-              <a:t>3/13/17</a:t>
+              <a:t>3/29/17</a:t>
             </a:fld>
             <a:endParaRPr lang="en-US" dirty="0"/>
           </a:p>
@@ -2346,7 +2346,7 @@
           <a:p>
             <a:fld id="{78C97017-6FC3-485B-9764-EAC9E56C1D49}" type="datetimeFigureOut">
               <a:rPr lang="en-US" smtClean="0"/>
-              <a:t>3/13/17</a:t>
+              <a:t>3/29/17</a:t>
             </a:fld>
             <a:endParaRPr lang="en-US" dirty="0"/>
           </a:p>
@@ -2623,7 +2623,7 @@
           <a:p>
             <a:fld id="{78C97017-6FC3-485B-9764-EAC9E56C1D49}" type="datetimeFigureOut">
               <a:rPr lang="en-US" smtClean="0"/>
-              <a:t>3/13/17</a:t>
+              <a:t>3/29/17</a:t>
             </a:fld>
             <a:endParaRPr lang="en-US" dirty="0"/>
           </a:p>
@@ -2876,7 +2876,7 @@
           <a:p>
             <a:fld id="{78C97017-6FC3-485B-9764-EAC9E56C1D49}" type="datetimeFigureOut">
               <a:rPr lang="en-US" smtClean="0"/>
-              <a:t>3/13/17</a:t>
+              <a:t>3/29/17</a:t>
             </a:fld>
             <a:endParaRPr lang="en-US" dirty="0"/>
           </a:p>
@@ -3089,7 +3089,7 @@
           <a:p>
             <a:fld id="{78C97017-6FC3-485B-9764-EAC9E56C1D49}" type="datetimeFigureOut">
               <a:rPr lang="en-US" smtClean="0"/>
-              <a:t>3/13/17</a:t>
+              <a:t>3/29/17</a:t>
             </a:fld>
             <a:endParaRPr lang="en-US" dirty="0"/>
           </a:p>
@@ -4109,23 +4109,7 @@
                   <a:srgbClr val="7030A0"/>
                 </a:solidFill>
               </a:rPr>
-              <a:t>deleteTask</a:t>
-            </a:r>
-            <a:r>
-              <a:rPr lang="en-US" sz="1400" dirty="0" smtClean="0">
-                <a:solidFill>
-                  <a:srgbClr val="7030A0"/>
-                </a:solidFill>
-              </a:rPr>
-              <a:t>(p</a:t>
-            </a:r>
-            <a:r>
-              <a:rPr lang="en-US" sz="1400" dirty="0" smtClean="0">
-                <a:solidFill>
-                  <a:srgbClr val="7030A0"/>
-                </a:solidFill>
-              </a:rPr>
-              <a:t>)</a:t>
+              <a:t>deleteTask(p)</a:t>
             </a:r>
             <a:endParaRPr lang="en-US" sz="1400" dirty="0">
               <a:solidFill>
@@ -4165,27 +4149,7 @@
                   </a:schemeClr>
                 </a:solidFill>
               </a:rPr>
-              <a:t>post(</a:t>
-            </a:r>
-            <a:r>
-              <a:rPr lang="en-US" sz="1400" dirty="0" smtClean="0">
-                <a:solidFill>
-                  <a:schemeClr val="accent5">
-                    <a:lumMod val="75000"/>
-                  </a:schemeClr>
-                </a:solidFill>
-              </a:rPr>
-              <a:t>TaskBossChangedEvent</a:t>
-            </a:r>
-            <a:r>
-              <a:rPr lang="en-US" sz="1400" dirty="0" smtClean="0">
-                <a:solidFill>
-                  <a:schemeClr val="accent5">
-                    <a:lumMod val="75000"/>
-                  </a:schemeClr>
-                </a:solidFill>
-              </a:rPr>
-              <a:t>)</a:t>
+              <a:t>post(TaskBossChangedEvent)</a:t>
             </a:r>
             <a:endParaRPr lang="en-US" sz="1400" dirty="0">
               <a:solidFill>
@@ -4364,15 +4328,7 @@
                   <a:schemeClr val="bg1"/>
                 </a:solidFill>
               </a:rPr>
-              <a:t>:</a:t>
-            </a:r>
-            <a:r>
-              <a:rPr lang="en-US" sz="1600" dirty="0" smtClean="0">
-                <a:solidFill>
-                  <a:schemeClr val="bg1"/>
-                </a:solidFill>
-              </a:rPr>
-              <a:t>EventsCenter</a:t>
+              <a:t>:EventsCenter</a:t>
             </a:r>
             <a:endParaRPr lang="en-SG" sz="1600" dirty="0">
               <a:solidFill>
@@ -4717,7 +4673,7 @@
         </p:nvSpPr>
         <p:spPr>
           <a:xfrm>
-            <a:off x="1810094" y="4797674"/>
+            <a:off x="1810094" y="4876800"/>
             <a:ext cx="2716635" cy="215444"/>
           </a:xfrm>
           <a:prstGeom prst="rect">
@@ -4739,27 +4695,7 @@
                   </a:schemeClr>
                 </a:solidFill>
               </a:rPr>
-              <a:t>post(</a:t>
-            </a:r>
-            <a:r>
-              <a:rPr lang="en-US" sz="1400" dirty="0" smtClean="0">
-                <a:solidFill>
-                  <a:schemeClr val="accent5">
-                    <a:lumMod val="75000"/>
-                  </a:schemeClr>
-                </a:solidFill>
-              </a:rPr>
-              <a:t>TaskBossChangedEvent</a:t>
-            </a:r>
-            <a:r>
-              <a:rPr lang="en-US" sz="1400" dirty="0" smtClean="0">
-                <a:solidFill>
-                  <a:schemeClr val="accent5">
-                    <a:lumMod val="75000"/>
-                  </a:schemeClr>
-                </a:solidFill>
-              </a:rPr>
-              <a:t>)</a:t>
+              <a:t>post(TaskBossChangedEvent)</a:t>
             </a:r>
             <a:endParaRPr lang="en-US" sz="1400" dirty="0">
               <a:solidFill>
@@ -4864,15 +4800,7 @@
                   <a:schemeClr val="bg1"/>
                 </a:solidFill>
               </a:rPr>
-              <a:t>:</a:t>
-            </a:r>
-            <a:r>
-              <a:rPr lang="en-US" sz="1600" dirty="0" smtClean="0">
-                <a:solidFill>
-                  <a:schemeClr val="bg1"/>
-                </a:solidFill>
-              </a:rPr>
-              <a:t>EventsCenter</a:t>
+              <a:t>:EventsCenter</a:t>
             </a:r>
             <a:endParaRPr lang="en-SG" sz="1600" dirty="0">
               <a:solidFill>
@@ -4984,8 +4912,8 @@
         </p:nvCxnSpPr>
         <p:spPr>
           <a:xfrm>
-            <a:off x="3078929" y="5071220"/>
-            <a:ext cx="1295400" cy="0"/>
+            <a:off x="1258131" y="5176291"/>
+            <a:ext cx="3126592" cy="4701"/>
           </a:xfrm>
           <a:prstGeom prst="straightConnector1">
             <a:avLst/>
@@ -5121,17 +5049,7 @@
                   </a:schemeClr>
                 </a:solidFill>
               </a:rPr>
-              <a:t>handleTaskBossChangedEvent</a:t>
-            </a:r>
-            <a:r>
-              <a:rPr lang="en-US" sz="1400" dirty="0" smtClean="0">
-                <a:solidFill>
-                  <a:schemeClr val="accent6">
-                    <a:lumMod val="75000"/>
-                  </a:schemeClr>
-                </a:solidFill>
-              </a:rPr>
-              <a:t>()</a:t>
+              <a:t>handleTaskBossChangedEvent()</a:t>
             </a:r>
             <a:endParaRPr lang="en-US" sz="1400" dirty="0">
               <a:solidFill>
@@ -5432,15 +5350,7 @@
                   <a:srgbClr val="00B050"/>
                 </a:solidFill>
               </a:rPr>
-              <a:t>handleTaskBossChangedEvent</a:t>
-            </a:r>
-            <a:r>
-              <a:rPr lang="en-US" sz="1400" dirty="0" smtClean="0">
-                <a:solidFill>
-                  <a:srgbClr val="00B050"/>
-                </a:solidFill>
-              </a:rPr>
-              <a:t>()</a:t>
+              <a:t>handleTaskBossChangedEvent()</a:t>
             </a:r>
             <a:endParaRPr lang="en-US" sz="1400" dirty="0">
               <a:solidFill>

</xml_diff>

<commit_message>
Fix Sequence Diagram for Developer Guide
</commit_message>
<xml_diff>
--- a/docs/diagrams/HighLevelSequenceDiagrams.pptx
+++ b/docs/diagrams/HighLevelSequenceDiagrams.pptx
@@ -208,7 +208,7 @@
           <a:p>
             <a:fld id="{F5CC4B3F-88C1-4FFA-B1B6-F41C21DC6924}" type="datetimeFigureOut">
               <a:rPr lang="en-US" smtClean="0"/>
-              <a:t>3/3/17</a:t>
+              <a:t>3/30/17</a:t>
             </a:fld>
             <a:endParaRPr lang="en-US"/>
           </a:p>
@@ -657,7 +657,7 @@
           <a:p>
             <a:fld id="{78C97017-6FC3-485B-9764-EAC9E56C1D49}" type="datetimeFigureOut">
               <a:rPr lang="en-US" smtClean="0"/>
-              <a:t>3/3/17</a:t>
+              <a:t>3/30/17</a:t>
             </a:fld>
             <a:endParaRPr lang="en-US"/>
           </a:p>
@@ -827,7 +827,7 @@
           <a:p>
             <a:fld id="{78C97017-6FC3-485B-9764-EAC9E56C1D49}" type="datetimeFigureOut">
               <a:rPr lang="en-US" smtClean="0"/>
-              <a:t>3/3/17</a:t>
+              <a:t>3/30/17</a:t>
             </a:fld>
             <a:endParaRPr lang="en-US"/>
           </a:p>
@@ -1007,7 +1007,7 @@
           <a:p>
             <a:fld id="{78C97017-6FC3-485B-9764-EAC9E56C1D49}" type="datetimeFigureOut">
               <a:rPr lang="en-US" smtClean="0"/>
-              <a:t>3/3/17</a:t>
+              <a:t>3/30/17</a:t>
             </a:fld>
             <a:endParaRPr lang="en-US"/>
           </a:p>
@@ -1177,7 +1177,7 @@
           <a:p>
             <a:fld id="{78C97017-6FC3-485B-9764-EAC9E56C1D49}" type="datetimeFigureOut">
               <a:rPr lang="en-US" smtClean="0"/>
-              <a:t>3/3/17</a:t>
+              <a:t>3/30/17</a:t>
             </a:fld>
             <a:endParaRPr lang="en-US"/>
           </a:p>
@@ -1423,7 +1423,7 @@
           <a:p>
             <a:fld id="{78C97017-6FC3-485B-9764-EAC9E56C1D49}" type="datetimeFigureOut">
               <a:rPr lang="en-US" smtClean="0"/>
-              <a:t>3/3/17</a:t>
+              <a:t>3/30/17</a:t>
             </a:fld>
             <a:endParaRPr lang="en-US"/>
           </a:p>
@@ -1711,7 +1711,7 @@
           <a:p>
             <a:fld id="{78C97017-6FC3-485B-9764-EAC9E56C1D49}" type="datetimeFigureOut">
               <a:rPr lang="en-US" smtClean="0"/>
-              <a:t>3/3/17</a:t>
+              <a:t>3/30/17</a:t>
             </a:fld>
             <a:endParaRPr lang="en-US"/>
           </a:p>
@@ -2133,7 +2133,7 @@
           <a:p>
             <a:fld id="{78C97017-6FC3-485B-9764-EAC9E56C1D49}" type="datetimeFigureOut">
               <a:rPr lang="en-US" smtClean="0"/>
-              <a:t>3/3/17</a:t>
+              <a:t>3/30/17</a:t>
             </a:fld>
             <a:endParaRPr lang="en-US"/>
           </a:p>
@@ -2251,7 +2251,7 @@
           <a:p>
             <a:fld id="{78C97017-6FC3-485B-9764-EAC9E56C1D49}" type="datetimeFigureOut">
               <a:rPr lang="en-US" smtClean="0"/>
-              <a:t>3/3/17</a:t>
+              <a:t>3/30/17</a:t>
             </a:fld>
             <a:endParaRPr lang="en-US"/>
           </a:p>
@@ -2346,7 +2346,7 @@
           <a:p>
             <a:fld id="{78C97017-6FC3-485B-9764-EAC9E56C1D49}" type="datetimeFigureOut">
               <a:rPr lang="en-US" smtClean="0"/>
-              <a:t>3/3/17</a:t>
+              <a:t>3/30/17</a:t>
             </a:fld>
             <a:endParaRPr lang="en-US"/>
           </a:p>
@@ -2623,7 +2623,7 @@
           <a:p>
             <a:fld id="{78C97017-6FC3-485B-9764-EAC9E56C1D49}" type="datetimeFigureOut">
               <a:rPr lang="en-US" smtClean="0"/>
-              <a:t>3/3/17</a:t>
+              <a:t>3/30/17</a:t>
             </a:fld>
             <a:endParaRPr lang="en-US"/>
           </a:p>
@@ -2876,7 +2876,7 @@
           <a:p>
             <a:fld id="{78C97017-6FC3-485B-9764-EAC9E56C1D49}" type="datetimeFigureOut">
               <a:rPr lang="en-US" smtClean="0"/>
-              <a:t>3/3/17</a:t>
+              <a:t>3/30/17</a:t>
             </a:fld>
             <a:endParaRPr lang="en-US"/>
           </a:p>
@@ -3089,7 +3089,7 @@
           <a:p>
             <a:fld id="{78C97017-6FC3-485B-9764-EAC9E56C1D49}" type="datetimeFigureOut">
               <a:rPr lang="en-US" smtClean="0"/>
-              <a:t>3/3/17</a:t>
+              <a:t>3/30/17</a:t>
             </a:fld>
             <a:endParaRPr lang="en-US"/>
           </a:p>
@@ -3464,2088 +3464,60 @@
           <a:chExt cx="0" cy="0"/>
         </a:xfrm>
       </p:grpSpPr>
-      <p:sp>
-        <p:nvSpPr>
-          <p:cNvPr id="2" name="Rectangle 62"/>
-          <p:cNvSpPr/>
+      <p:grpSp>
+        <p:nvGrpSpPr>
+          <p:cNvPr id="7" name="Group 6"/>
+          <p:cNvGrpSpPr/>
           <p:nvPr/>
-        </p:nvSpPr>
-        <p:spPr>
+        </p:nvGrpSpPr>
+        <p:grpSpPr>
           <a:xfrm>
-            <a:off x="1111860" y="607926"/>
-            <a:ext cx="1093635" cy="346760"/>
+            <a:off x="194562" y="4278322"/>
+            <a:ext cx="8568438" cy="2093024"/>
+            <a:chOff x="194562" y="4278322"/>
+            <a:chExt cx="8568438" cy="2093024"/>
           </a:xfrm>
-          <a:prstGeom prst="rect">
-            <a:avLst/>
-          </a:prstGeom>
-          <a:solidFill>
-            <a:srgbClr val="00B050"/>
-          </a:solidFill>
-          <a:ln w="19050">
-            <a:solidFill>
-              <a:srgbClr val="00B050"/>
-            </a:solidFill>
-          </a:ln>
-          <a:effectLst/>
-        </p:spPr>
-        <p:style>
-          <a:lnRef idx="1">
-            <a:schemeClr val="accent2"/>
-          </a:lnRef>
-          <a:fillRef idx="2">
-            <a:schemeClr val="accent2"/>
-          </a:fillRef>
-          <a:effectRef idx="1">
-            <a:schemeClr val="accent2"/>
-          </a:effectRef>
-          <a:fontRef idx="minor">
-            <a:schemeClr val="dk1"/>
-          </a:fontRef>
-        </p:style>
-        <p:txBody>
-          <a:bodyPr rtlCol="0" anchor="ctr"/>
-          <a:lstStyle/>
-          <a:p>
-            <a:pPr algn="ctr"/>
-            <a:r>
-              <a:rPr lang="en-US" sz="1600" dirty="0" smtClean="0">
-                <a:solidFill>
-                  <a:schemeClr val="bg1"/>
-                </a:solidFill>
-              </a:rPr>
-              <a:t>:UI</a:t>
-            </a:r>
-            <a:endParaRPr lang="en-SG" sz="1600" dirty="0">
-              <a:solidFill>
-                <a:schemeClr val="bg1"/>
-              </a:solidFill>
-            </a:endParaRPr>
-          </a:p>
-        </p:txBody>
-      </p:sp>
-      <p:cxnSp>
-        <p:nvCxnSpPr>
-          <p:cNvPr id="5" name="Straight Connector 4"/>
-          <p:cNvCxnSpPr/>
-          <p:nvPr/>
-        </p:nvCxnSpPr>
-        <p:spPr>
-          <a:xfrm>
-            <a:off x="1658677" y="971597"/>
-            <a:ext cx="0" cy="1723059"/>
-          </a:xfrm>
-          <a:prstGeom prst="line">
-            <a:avLst/>
-          </a:prstGeom>
-          <a:ln w="19050">
-            <a:solidFill>
-              <a:srgbClr val="00B050"/>
-            </a:solidFill>
-            <a:prstDash val="sysDash"/>
-          </a:ln>
-          <a:effectLst/>
-        </p:spPr>
-        <p:style>
-          <a:lnRef idx="1">
-            <a:schemeClr val="accent1"/>
-          </a:lnRef>
-          <a:fillRef idx="2">
-            <a:schemeClr val="accent1"/>
-          </a:fillRef>
-          <a:effectRef idx="1">
-            <a:schemeClr val="accent1"/>
-          </a:effectRef>
-          <a:fontRef idx="minor">
-            <a:schemeClr val="dk1"/>
-          </a:fontRef>
-        </p:style>
-      </p:cxnSp>
-      <p:sp>
-        <p:nvSpPr>
-          <p:cNvPr id="6" name="Rectangle 5"/>
-          <p:cNvSpPr/>
-          <p:nvPr/>
-        </p:nvSpPr>
-        <p:spPr>
-          <a:xfrm>
-            <a:off x="1586669" y="1322292"/>
-            <a:ext cx="152400" cy="1019910"/>
-          </a:xfrm>
-          <a:prstGeom prst="rect">
-            <a:avLst/>
-          </a:prstGeom>
-          <a:solidFill>
-            <a:srgbClr val="00B050"/>
-          </a:solidFill>
-          <a:ln>
-            <a:solidFill>
-              <a:srgbClr val="00B050"/>
-            </a:solidFill>
-          </a:ln>
-          <a:effectLst/>
-        </p:spPr>
-        <p:style>
-          <a:lnRef idx="1">
-            <a:schemeClr val="accent3"/>
-          </a:lnRef>
-          <a:fillRef idx="2">
-            <a:schemeClr val="accent3"/>
-          </a:fillRef>
-          <a:effectRef idx="1">
-            <a:schemeClr val="accent3"/>
-          </a:effectRef>
-          <a:fontRef idx="minor">
-            <a:schemeClr val="dk1"/>
-          </a:fontRef>
-        </p:style>
-        <p:txBody>
-          <a:bodyPr rtlCol="0" anchor="ctr"/>
-          <a:lstStyle/>
-          <a:p>
-            <a:pPr algn="ctr"/>
-            <a:endParaRPr lang="en-SG" sz="1400">
-              <a:solidFill>
-                <a:schemeClr val="dk1"/>
-              </a:solidFill>
-            </a:endParaRPr>
-          </a:p>
-        </p:txBody>
-      </p:sp>
-      <p:sp>
-        <p:nvSpPr>
-          <p:cNvPr id="16" name="Rectangle 62"/>
-          <p:cNvSpPr/>
-          <p:nvPr/>
-        </p:nvSpPr>
-        <p:spPr>
-          <a:xfrm>
-            <a:off x="3335583" y="611613"/>
-            <a:ext cx="1093635" cy="346760"/>
-          </a:xfrm>
-          <a:prstGeom prst="rect">
-            <a:avLst/>
-          </a:prstGeom>
-          <a:solidFill>
-            <a:srgbClr val="0070C0"/>
-          </a:solidFill>
-          <a:ln w="19050">
-            <a:solidFill>
-              <a:srgbClr val="0070C0"/>
-            </a:solidFill>
-          </a:ln>
-          <a:effectLst/>
-        </p:spPr>
-        <p:style>
-          <a:lnRef idx="1">
-            <a:schemeClr val="accent2"/>
-          </a:lnRef>
-          <a:fillRef idx="2">
-            <a:schemeClr val="accent2"/>
-          </a:fillRef>
-          <a:effectRef idx="1">
-            <a:schemeClr val="accent2"/>
-          </a:effectRef>
-          <a:fontRef idx="minor">
-            <a:schemeClr val="dk1"/>
-          </a:fontRef>
-        </p:style>
-        <p:txBody>
-          <a:bodyPr rtlCol="0" anchor="ctr"/>
-          <a:lstStyle/>
-          <a:p>
-            <a:pPr algn="ctr"/>
-            <a:r>
-              <a:rPr lang="en-US" sz="1600" dirty="0" smtClean="0">
-                <a:solidFill>
-                  <a:schemeClr val="bg1"/>
-                </a:solidFill>
-              </a:rPr>
-              <a:t>:Logic</a:t>
-            </a:r>
-            <a:endParaRPr lang="en-SG" sz="1600" dirty="0">
-              <a:solidFill>
-                <a:schemeClr val="bg1"/>
-              </a:solidFill>
-            </a:endParaRPr>
-          </a:p>
-        </p:txBody>
-      </p:sp>
-      <p:cxnSp>
-        <p:nvCxnSpPr>
-          <p:cNvPr id="17" name="Straight Connector 16"/>
-          <p:cNvCxnSpPr/>
-          <p:nvPr/>
-        </p:nvCxnSpPr>
-        <p:spPr>
-          <a:xfrm>
-            <a:off x="3882400" y="975284"/>
-            <a:ext cx="0" cy="1723059"/>
-          </a:xfrm>
-          <a:prstGeom prst="line">
-            <a:avLst/>
-          </a:prstGeom>
-          <a:ln w="19050">
-            <a:solidFill>
-              <a:srgbClr val="0070C0"/>
-            </a:solidFill>
-            <a:prstDash val="sysDash"/>
-          </a:ln>
-          <a:effectLst/>
-        </p:spPr>
-        <p:style>
-          <a:lnRef idx="1">
-            <a:schemeClr val="accent1"/>
-          </a:lnRef>
-          <a:fillRef idx="2">
-            <a:schemeClr val="accent1"/>
-          </a:fillRef>
-          <a:effectRef idx="1">
-            <a:schemeClr val="accent1"/>
-          </a:effectRef>
-          <a:fontRef idx="minor">
-            <a:schemeClr val="dk1"/>
-          </a:fontRef>
-        </p:style>
-      </p:cxnSp>
-      <p:sp>
-        <p:nvSpPr>
-          <p:cNvPr id="18" name="Rectangle 17"/>
-          <p:cNvSpPr/>
-          <p:nvPr/>
-        </p:nvSpPr>
-        <p:spPr>
-          <a:xfrm>
-            <a:off x="3810392" y="1433477"/>
-            <a:ext cx="144016" cy="832525"/>
-          </a:xfrm>
-          <a:prstGeom prst="rect">
-            <a:avLst/>
-          </a:prstGeom>
-          <a:solidFill>
-            <a:srgbClr val="0070C0"/>
-          </a:solidFill>
-          <a:ln>
-            <a:solidFill>
-              <a:srgbClr val="0070C0"/>
-            </a:solidFill>
-          </a:ln>
-          <a:effectLst/>
-        </p:spPr>
-        <p:style>
-          <a:lnRef idx="1">
-            <a:schemeClr val="accent3"/>
-          </a:lnRef>
-          <a:fillRef idx="2">
-            <a:schemeClr val="accent3"/>
-          </a:fillRef>
-          <a:effectRef idx="1">
-            <a:schemeClr val="accent3"/>
-          </a:effectRef>
-          <a:fontRef idx="minor">
-            <a:schemeClr val="dk1"/>
-          </a:fontRef>
-        </p:style>
-        <p:txBody>
-          <a:bodyPr rtlCol="0" anchor="ctr"/>
-          <a:lstStyle/>
-          <a:p>
-            <a:pPr algn="ctr"/>
-            <a:endParaRPr lang="en-SG" sz="1400">
-              <a:solidFill>
-                <a:schemeClr val="dk1"/>
-              </a:solidFill>
-            </a:endParaRPr>
-          </a:p>
-        </p:txBody>
-      </p:sp>
-      <p:sp>
-        <p:nvSpPr>
-          <p:cNvPr id="19" name="Rectangle 62"/>
-          <p:cNvSpPr/>
-          <p:nvPr/>
-        </p:nvSpPr>
-        <p:spPr>
-          <a:xfrm>
-            <a:off x="5316783" y="607926"/>
-            <a:ext cx="1093635" cy="346760"/>
-          </a:xfrm>
-          <a:prstGeom prst="rect">
-            <a:avLst/>
-          </a:prstGeom>
-          <a:solidFill>
-            <a:srgbClr val="7030A0"/>
-          </a:solidFill>
-          <a:ln w="19050">
-            <a:solidFill>
-              <a:srgbClr val="7030A0"/>
-            </a:solidFill>
-          </a:ln>
-          <a:effectLst/>
-        </p:spPr>
-        <p:style>
-          <a:lnRef idx="1">
-            <a:schemeClr val="accent2"/>
-          </a:lnRef>
-          <a:fillRef idx="2">
-            <a:schemeClr val="accent2"/>
-          </a:fillRef>
-          <a:effectRef idx="1">
-            <a:schemeClr val="accent2"/>
-          </a:effectRef>
-          <a:fontRef idx="minor">
-            <a:schemeClr val="dk1"/>
-          </a:fontRef>
-        </p:style>
-        <p:txBody>
-          <a:bodyPr rtlCol="0" anchor="ctr"/>
-          <a:lstStyle/>
-          <a:p>
-            <a:pPr algn="ctr"/>
-            <a:r>
-              <a:rPr lang="en-US" sz="1600" dirty="0" smtClean="0">
-                <a:solidFill>
-                  <a:schemeClr val="bg1"/>
-                </a:solidFill>
-              </a:rPr>
-              <a:t>:Model</a:t>
-            </a:r>
-            <a:endParaRPr lang="en-SG" sz="1600" dirty="0">
-              <a:solidFill>
-                <a:schemeClr val="bg1"/>
-              </a:solidFill>
-            </a:endParaRPr>
-          </a:p>
-        </p:txBody>
-      </p:sp>
-      <p:cxnSp>
-        <p:nvCxnSpPr>
-          <p:cNvPr id="20" name="Straight Connector 19"/>
-          <p:cNvCxnSpPr/>
-          <p:nvPr/>
-        </p:nvCxnSpPr>
-        <p:spPr>
-          <a:xfrm>
-            <a:off x="5863600" y="971597"/>
-            <a:ext cx="0" cy="1723059"/>
-          </a:xfrm>
-          <a:prstGeom prst="line">
-            <a:avLst/>
-          </a:prstGeom>
-          <a:ln w="19050">
-            <a:solidFill>
-              <a:srgbClr val="7030A0"/>
-            </a:solidFill>
-            <a:prstDash val="sysDash"/>
-          </a:ln>
-          <a:effectLst/>
-        </p:spPr>
-        <p:style>
-          <a:lnRef idx="1">
-            <a:schemeClr val="accent1"/>
-          </a:lnRef>
-          <a:fillRef idx="2">
-            <a:schemeClr val="accent1"/>
-          </a:fillRef>
-          <a:effectRef idx="1">
-            <a:schemeClr val="accent1"/>
-          </a:effectRef>
-          <a:fontRef idx="minor">
-            <a:schemeClr val="dk1"/>
-          </a:fontRef>
-        </p:style>
-      </p:cxnSp>
-      <p:sp>
-        <p:nvSpPr>
-          <p:cNvPr id="21" name="Rectangle 20"/>
-          <p:cNvSpPr/>
-          <p:nvPr/>
-        </p:nvSpPr>
-        <p:spPr>
-          <a:xfrm>
-            <a:off x="5791592" y="1538408"/>
-            <a:ext cx="142006" cy="651394"/>
-          </a:xfrm>
-          <a:prstGeom prst="rect">
-            <a:avLst/>
-          </a:prstGeom>
-          <a:solidFill>
-            <a:srgbClr val="7030A0"/>
-          </a:solidFill>
-          <a:ln>
-            <a:solidFill>
-              <a:srgbClr val="7030A0"/>
-            </a:solidFill>
-          </a:ln>
-          <a:effectLst/>
-        </p:spPr>
-        <p:style>
-          <a:lnRef idx="1">
-            <a:schemeClr val="accent3"/>
-          </a:lnRef>
-          <a:fillRef idx="2">
-            <a:schemeClr val="accent3"/>
-          </a:fillRef>
-          <a:effectRef idx="1">
-            <a:schemeClr val="accent3"/>
-          </a:effectRef>
-          <a:fontRef idx="minor">
-            <a:schemeClr val="dk1"/>
-          </a:fontRef>
-        </p:style>
-        <p:txBody>
-          <a:bodyPr rtlCol="0" anchor="ctr"/>
-          <a:lstStyle/>
-          <a:p>
-            <a:pPr algn="ctr"/>
-            <a:endParaRPr lang="en-SG" sz="1400">
-              <a:solidFill>
-                <a:schemeClr val="dk1"/>
-              </a:solidFill>
-            </a:endParaRPr>
-          </a:p>
-        </p:txBody>
-      </p:sp>
-      <p:cxnSp>
-        <p:nvCxnSpPr>
-          <p:cNvPr id="23" name="Straight Arrow Connector 22"/>
-          <p:cNvCxnSpPr/>
-          <p:nvPr/>
-        </p:nvCxnSpPr>
-        <p:spPr>
-          <a:xfrm>
-            <a:off x="466818" y="1325979"/>
-            <a:ext cx="1119851" cy="0"/>
-          </a:xfrm>
-          <a:prstGeom prst="straightConnector1">
-            <a:avLst/>
-          </a:prstGeom>
-          <a:ln w="19050">
-            <a:solidFill>
-              <a:schemeClr val="tx1"/>
-            </a:solidFill>
-            <a:tailEnd type="arrow"/>
-          </a:ln>
-        </p:spPr>
-        <p:style>
-          <a:lnRef idx="1">
-            <a:schemeClr val="accent1"/>
-          </a:lnRef>
-          <a:fillRef idx="0">
-            <a:schemeClr val="accent1"/>
-          </a:fillRef>
-          <a:effectRef idx="0">
-            <a:schemeClr val="accent1"/>
-          </a:effectRef>
-          <a:fontRef idx="minor">
-            <a:schemeClr val="tx1"/>
-          </a:fontRef>
-        </p:style>
-      </p:cxnSp>
-      <p:sp>
-        <p:nvSpPr>
-          <p:cNvPr id="24" name="TextBox 23"/>
-          <p:cNvSpPr txBox="1"/>
-          <p:nvPr/>
-        </p:nvSpPr>
-        <p:spPr>
-          <a:xfrm>
-            <a:off x="466818" y="1345880"/>
-            <a:ext cx="860170" cy="215444"/>
-          </a:xfrm>
-          <a:prstGeom prst="rect">
-            <a:avLst/>
-          </a:prstGeom>
-          <a:noFill/>
-        </p:spPr>
-        <p:txBody>
-          <a:bodyPr wrap="square" lIns="0" tIns="0" rIns="0" bIns="0" rtlCol="0">
-            <a:spAutoFit/>
-          </a:bodyPr>
-          <a:lstStyle/>
-          <a:p>
-            <a:r>
-              <a:rPr lang="en-US" sz="1400" dirty="0" smtClean="0"/>
-              <a:t>delete 1</a:t>
-            </a:r>
-            <a:endParaRPr lang="en-US" sz="1400" dirty="0"/>
-          </a:p>
-        </p:txBody>
-      </p:sp>
-      <p:cxnSp>
-        <p:nvCxnSpPr>
-          <p:cNvPr id="25" name="Straight Arrow Connector 24"/>
-          <p:cNvCxnSpPr/>
-          <p:nvPr/>
-        </p:nvCxnSpPr>
-        <p:spPr>
-          <a:xfrm>
-            <a:off x="1739069" y="1433478"/>
-            <a:ext cx="2071323" cy="0"/>
-          </a:xfrm>
-          <a:prstGeom prst="straightConnector1">
-            <a:avLst/>
-          </a:prstGeom>
-          <a:ln w="19050">
-            <a:solidFill>
-              <a:srgbClr val="00B050"/>
-            </a:solidFill>
-            <a:tailEnd type="arrow"/>
-          </a:ln>
-        </p:spPr>
-        <p:style>
-          <a:lnRef idx="1">
-            <a:schemeClr val="accent1"/>
-          </a:lnRef>
-          <a:fillRef idx="0">
-            <a:schemeClr val="accent1"/>
-          </a:fillRef>
-          <a:effectRef idx="0">
-            <a:schemeClr val="accent1"/>
-          </a:effectRef>
-          <a:fontRef idx="minor">
-            <a:schemeClr val="tx1"/>
-          </a:fontRef>
-        </p:style>
-      </p:cxnSp>
-      <p:sp>
-        <p:nvSpPr>
-          <p:cNvPr id="26" name="TextBox 25"/>
-          <p:cNvSpPr txBox="1"/>
-          <p:nvPr/>
-        </p:nvSpPr>
-        <p:spPr>
-          <a:xfrm>
-            <a:off x="2166172" y="1453379"/>
-            <a:ext cx="1424846" cy="215444"/>
-          </a:xfrm>
-          <a:prstGeom prst="rect">
-            <a:avLst/>
-          </a:prstGeom>
-          <a:noFill/>
-        </p:spPr>
-        <p:txBody>
-          <a:bodyPr wrap="square" lIns="0" tIns="0" rIns="0" bIns="0" rtlCol="0">
-            <a:spAutoFit/>
-          </a:bodyPr>
-          <a:lstStyle/>
-          <a:p>
-            <a:r>
-              <a:rPr lang="en-US" sz="1400" dirty="0" smtClean="0">
-                <a:solidFill>
-                  <a:srgbClr val="0070C0"/>
-                </a:solidFill>
-              </a:rPr>
-              <a:t>execute(“delete 1”)</a:t>
-            </a:r>
-            <a:endParaRPr lang="en-US" sz="1400" dirty="0">
-              <a:solidFill>
-                <a:srgbClr val="0070C0"/>
-              </a:solidFill>
-            </a:endParaRPr>
-          </a:p>
-        </p:txBody>
-      </p:sp>
-      <p:cxnSp>
-        <p:nvCxnSpPr>
-          <p:cNvPr id="28" name="Straight Arrow Connector 27"/>
-          <p:cNvCxnSpPr/>
-          <p:nvPr/>
-        </p:nvCxnSpPr>
-        <p:spPr>
-          <a:xfrm>
-            <a:off x="3954408" y="1538409"/>
-            <a:ext cx="1837184" cy="0"/>
-          </a:xfrm>
-          <a:prstGeom prst="straightConnector1">
-            <a:avLst/>
-          </a:prstGeom>
-          <a:ln w="19050">
-            <a:solidFill>
-              <a:srgbClr val="0070C0"/>
-            </a:solidFill>
-            <a:tailEnd type="arrow"/>
-          </a:ln>
-        </p:spPr>
-        <p:style>
-          <a:lnRef idx="1">
-            <a:schemeClr val="accent1"/>
-          </a:lnRef>
-          <a:fillRef idx="0">
-            <a:schemeClr val="accent1"/>
-          </a:fillRef>
-          <a:effectRef idx="0">
-            <a:schemeClr val="accent1"/>
-          </a:effectRef>
-          <a:fontRef idx="minor">
-            <a:schemeClr val="tx1"/>
-          </a:fontRef>
-        </p:style>
-      </p:cxnSp>
-      <p:sp>
-        <p:nvSpPr>
-          <p:cNvPr id="29" name="TextBox 28"/>
-          <p:cNvSpPr txBox="1"/>
-          <p:nvPr/>
-        </p:nvSpPr>
-        <p:spPr>
-          <a:xfrm>
-            <a:off x="4299772" y="1542583"/>
-            <a:ext cx="1424846" cy="215444"/>
-          </a:xfrm>
-          <a:prstGeom prst="rect">
-            <a:avLst/>
-          </a:prstGeom>
-          <a:noFill/>
-        </p:spPr>
-        <p:txBody>
-          <a:bodyPr wrap="square" lIns="0" tIns="0" rIns="0" bIns="0" rtlCol="0">
-            <a:spAutoFit/>
-          </a:bodyPr>
-          <a:lstStyle/>
-          <a:p>
-            <a:r>
-              <a:rPr lang="en-US" sz="1400" dirty="0" err="1" smtClean="0">
-                <a:solidFill>
-                  <a:srgbClr val="7030A0"/>
-                </a:solidFill>
-              </a:rPr>
-              <a:t>deleteTask</a:t>
-            </a:r>
-            <a:r>
-              <a:rPr lang="en-US" sz="1400" dirty="0" smtClean="0">
-                <a:solidFill>
-                  <a:srgbClr val="7030A0"/>
-                </a:solidFill>
-              </a:rPr>
-              <a:t>(p</a:t>
-            </a:r>
-            <a:r>
-              <a:rPr lang="en-US" sz="1400" dirty="0" smtClean="0">
-                <a:solidFill>
-                  <a:srgbClr val="7030A0"/>
-                </a:solidFill>
-              </a:rPr>
-              <a:t>)</a:t>
-            </a:r>
-            <a:endParaRPr lang="en-US" sz="1400" dirty="0">
-              <a:solidFill>
-                <a:srgbClr val="7030A0"/>
-              </a:solidFill>
-            </a:endParaRPr>
-          </a:p>
-        </p:txBody>
-      </p:sp>
-      <p:sp>
-        <p:nvSpPr>
-          <p:cNvPr id="33" name="TextBox 32"/>
-          <p:cNvSpPr txBox="1"/>
-          <p:nvPr/>
-        </p:nvSpPr>
-        <p:spPr>
-          <a:xfrm>
-            <a:off x="6074030" y="1687656"/>
-            <a:ext cx="2438400" cy="215444"/>
-          </a:xfrm>
-          <a:prstGeom prst="rect">
-            <a:avLst/>
-          </a:prstGeom>
-          <a:noFill/>
-        </p:spPr>
-        <p:txBody>
-          <a:bodyPr wrap="square" lIns="0" tIns="0" rIns="0" bIns="0" rtlCol="0">
-            <a:spAutoFit/>
-          </a:bodyPr>
-          <a:lstStyle/>
-          <a:p>
-            <a:r>
-              <a:rPr lang="en-US" sz="1400" dirty="0" smtClean="0">
-                <a:solidFill>
-                  <a:schemeClr val="accent5">
-                    <a:lumMod val="75000"/>
-                  </a:schemeClr>
-                </a:solidFill>
-              </a:rPr>
-              <a:t>post(</a:t>
-            </a:r>
-            <a:r>
-              <a:rPr lang="en-US" sz="1400" dirty="0" err="1" smtClean="0">
-                <a:solidFill>
-                  <a:schemeClr val="accent5">
-                    <a:lumMod val="75000"/>
-                  </a:schemeClr>
-                </a:solidFill>
-              </a:rPr>
-              <a:t>TaskManagerChangedEvent</a:t>
-            </a:r>
-            <a:r>
-              <a:rPr lang="en-US" sz="1400" dirty="0" smtClean="0">
-                <a:solidFill>
-                  <a:schemeClr val="accent5">
-                    <a:lumMod val="75000"/>
-                  </a:schemeClr>
-                </a:solidFill>
-              </a:rPr>
-              <a:t>)</a:t>
-            </a:r>
-            <a:endParaRPr lang="en-US" sz="1400" dirty="0">
-              <a:solidFill>
-                <a:schemeClr val="accent5">
-                  <a:lumMod val="75000"/>
-                </a:schemeClr>
-              </a:solidFill>
-            </a:endParaRPr>
-          </a:p>
-        </p:txBody>
-      </p:sp>
-      <p:cxnSp>
-        <p:nvCxnSpPr>
-          <p:cNvPr id="34" name="Straight Arrow Connector 33"/>
-          <p:cNvCxnSpPr/>
-          <p:nvPr/>
-        </p:nvCxnSpPr>
-        <p:spPr>
-          <a:xfrm>
-            <a:off x="3954408" y="2190681"/>
-            <a:ext cx="1837184" cy="0"/>
-          </a:xfrm>
-          <a:prstGeom prst="straightConnector1">
-            <a:avLst/>
-          </a:prstGeom>
-          <a:ln w="19050">
-            <a:solidFill>
-              <a:srgbClr val="7030A0"/>
-            </a:solidFill>
-            <a:prstDash val="sysDash"/>
-            <a:headEnd type="arrow" w="med" len="med"/>
-            <a:tailEnd type="none" w="med" len="med"/>
-          </a:ln>
-        </p:spPr>
-        <p:style>
-          <a:lnRef idx="1">
-            <a:schemeClr val="accent1"/>
-          </a:lnRef>
-          <a:fillRef idx="0">
-            <a:schemeClr val="accent1"/>
-          </a:fillRef>
-          <a:effectRef idx="0">
-            <a:schemeClr val="accent1"/>
-          </a:effectRef>
-          <a:fontRef idx="minor">
-            <a:schemeClr val="tx1"/>
-          </a:fontRef>
-        </p:style>
-      </p:cxnSp>
-      <p:cxnSp>
-        <p:nvCxnSpPr>
-          <p:cNvPr id="35" name="Straight Arrow Connector 34"/>
-          <p:cNvCxnSpPr/>
-          <p:nvPr/>
-        </p:nvCxnSpPr>
-        <p:spPr>
-          <a:xfrm>
-            <a:off x="1739069" y="2266002"/>
-            <a:ext cx="2058118" cy="0"/>
-          </a:xfrm>
-          <a:prstGeom prst="straightConnector1">
-            <a:avLst/>
-          </a:prstGeom>
-          <a:ln w="19050">
-            <a:solidFill>
-              <a:srgbClr val="0070C0"/>
-            </a:solidFill>
-            <a:prstDash val="sysDash"/>
-            <a:headEnd type="arrow" w="med" len="med"/>
-            <a:tailEnd type="none" w="med" len="med"/>
-          </a:ln>
-        </p:spPr>
-        <p:style>
-          <a:lnRef idx="1">
-            <a:schemeClr val="accent1"/>
-          </a:lnRef>
-          <a:fillRef idx="0">
-            <a:schemeClr val="accent1"/>
-          </a:fillRef>
-          <a:effectRef idx="0">
-            <a:schemeClr val="accent1"/>
-          </a:effectRef>
-          <a:fontRef idx="minor">
-            <a:schemeClr val="tx1"/>
-          </a:fontRef>
-        </p:style>
-      </p:cxnSp>
-      <p:cxnSp>
-        <p:nvCxnSpPr>
-          <p:cNvPr id="37" name="Straight Arrow Connector 36"/>
-          <p:cNvCxnSpPr/>
-          <p:nvPr/>
-        </p:nvCxnSpPr>
-        <p:spPr>
-          <a:xfrm>
-            <a:off x="390618" y="2342202"/>
-            <a:ext cx="1196051" cy="0"/>
-          </a:xfrm>
-          <a:prstGeom prst="straightConnector1">
-            <a:avLst/>
-          </a:prstGeom>
-          <a:ln w="19050">
-            <a:solidFill>
-              <a:srgbClr val="00B050"/>
-            </a:solidFill>
-            <a:prstDash val="sysDash"/>
-            <a:headEnd type="arrow" w="med" len="med"/>
-            <a:tailEnd type="none" w="med" len="med"/>
-          </a:ln>
-        </p:spPr>
-        <p:style>
-          <a:lnRef idx="1">
-            <a:schemeClr val="accent1"/>
-          </a:lnRef>
-          <a:fillRef idx="0">
-            <a:schemeClr val="accent1"/>
-          </a:fillRef>
-          <a:effectRef idx="0">
-            <a:schemeClr val="accent1"/>
-          </a:effectRef>
-          <a:fontRef idx="minor">
-            <a:schemeClr val="tx1"/>
-          </a:fontRef>
-        </p:style>
-      </p:cxnSp>
-      <p:sp>
-        <p:nvSpPr>
-          <p:cNvPr id="39" name="Rectangle 62"/>
-          <p:cNvSpPr/>
-          <p:nvPr/>
-        </p:nvSpPr>
-        <p:spPr>
-          <a:xfrm>
-            <a:off x="7696200" y="591251"/>
-            <a:ext cx="1371600" cy="346760"/>
-          </a:xfrm>
-          <a:prstGeom prst="rect">
-            <a:avLst/>
-          </a:prstGeom>
-          <a:solidFill>
-            <a:schemeClr val="accent5">
-              <a:lumMod val="75000"/>
-            </a:schemeClr>
-          </a:solidFill>
-          <a:ln w="19050">
-            <a:solidFill>
-              <a:schemeClr val="accent5">
-                <a:lumMod val="75000"/>
-              </a:schemeClr>
-            </a:solidFill>
-          </a:ln>
-          <a:effectLst/>
-        </p:spPr>
-        <p:style>
-          <a:lnRef idx="1">
-            <a:schemeClr val="accent2"/>
-          </a:lnRef>
-          <a:fillRef idx="2">
-            <a:schemeClr val="accent2"/>
-          </a:fillRef>
-          <a:effectRef idx="1">
-            <a:schemeClr val="accent2"/>
-          </a:effectRef>
-          <a:fontRef idx="minor">
-            <a:schemeClr val="dk1"/>
-          </a:fontRef>
-        </p:style>
-        <p:txBody>
-          <a:bodyPr rtlCol="0" anchor="ctr"/>
-          <a:lstStyle/>
-          <a:p>
-            <a:pPr algn="ctr"/>
-            <a:r>
-              <a:rPr lang="en-US" sz="1600" dirty="0" smtClean="0">
-                <a:solidFill>
-                  <a:schemeClr val="bg1"/>
-                </a:solidFill>
-              </a:rPr>
-              <a:t>:</a:t>
-            </a:r>
-            <a:r>
-              <a:rPr lang="en-US" sz="1600" dirty="0" err="1" smtClean="0">
-                <a:solidFill>
-                  <a:schemeClr val="bg1"/>
-                </a:solidFill>
-              </a:rPr>
-              <a:t>EventsCenter</a:t>
-            </a:r>
-            <a:endParaRPr lang="en-SG" sz="1600" dirty="0">
-              <a:solidFill>
-                <a:schemeClr val="bg1"/>
-              </a:solidFill>
-            </a:endParaRPr>
-          </a:p>
-        </p:txBody>
-      </p:sp>
-      <p:cxnSp>
-        <p:nvCxnSpPr>
-          <p:cNvPr id="40" name="Straight Connector 39"/>
-          <p:cNvCxnSpPr/>
-          <p:nvPr/>
-        </p:nvCxnSpPr>
-        <p:spPr>
-          <a:xfrm>
-            <a:off x="8616802" y="944305"/>
-            <a:ext cx="0" cy="1723059"/>
-          </a:xfrm>
-          <a:prstGeom prst="line">
-            <a:avLst/>
-          </a:prstGeom>
-          <a:ln w="19050">
-            <a:solidFill>
-              <a:schemeClr val="accent5">
-                <a:lumMod val="75000"/>
-              </a:schemeClr>
-            </a:solidFill>
-            <a:prstDash val="sysDash"/>
-          </a:ln>
-          <a:effectLst/>
-        </p:spPr>
-        <p:style>
-          <a:lnRef idx="1">
-            <a:schemeClr val="accent1"/>
-          </a:lnRef>
-          <a:fillRef idx="2">
-            <a:schemeClr val="accent1"/>
-          </a:fillRef>
-          <a:effectRef idx="1">
-            <a:schemeClr val="accent1"/>
-          </a:effectRef>
-          <a:fontRef idx="minor">
-            <a:schemeClr val="dk1"/>
-          </a:fontRef>
-        </p:style>
-      </p:cxnSp>
-      <p:sp>
-        <p:nvSpPr>
-          <p:cNvPr id="41" name="Rectangle 40"/>
-          <p:cNvSpPr/>
-          <p:nvPr/>
-        </p:nvSpPr>
-        <p:spPr>
-          <a:xfrm>
-            <a:off x="8544794" y="1961202"/>
-            <a:ext cx="142006" cy="176787"/>
-          </a:xfrm>
-          <a:prstGeom prst="rect">
-            <a:avLst/>
-          </a:prstGeom>
-          <a:solidFill>
-            <a:schemeClr val="accent5">
-              <a:lumMod val="75000"/>
-            </a:schemeClr>
-          </a:solidFill>
-          <a:ln>
-            <a:solidFill>
-              <a:schemeClr val="accent5">
-                <a:lumMod val="75000"/>
-              </a:schemeClr>
-            </a:solidFill>
-          </a:ln>
-          <a:effectLst/>
-        </p:spPr>
-        <p:style>
-          <a:lnRef idx="1">
-            <a:schemeClr val="accent3"/>
-          </a:lnRef>
-          <a:fillRef idx="2">
-            <a:schemeClr val="accent3"/>
-          </a:fillRef>
-          <a:effectRef idx="1">
-            <a:schemeClr val="accent3"/>
-          </a:effectRef>
-          <a:fontRef idx="minor">
-            <a:schemeClr val="dk1"/>
-          </a:fontRef>
-        </p:style>
-        <p:txBody>
-          <a:bodyPr rtlCol="0" anchor="ctr"/>
-          <a:lstStyle/>
-          <a:p>
-            <a:pPr algn="ctr"/>
-            <a:endParaRPr lang="en-SG" sz="1400">
-              <a:solidFill>
-                <a:schemeClr val="dk1"/>
-              </a:solidFill>
-            </a:endParaRPr>
-          </a:p>
-        </p:txBody>
-      </p:sp>
-      <p:cxnSp>
-        <p:nvCxnSpPr>
-          <p:cNvPr id="42" name="Straight Arrow Connector 41"/>
-          <p:cNvCxnSpPr/>
-          <p:nvPr/>
-        </p:nvCxnSpPr>
-        <p:spPr>
-          <a:xfrm>
-            <a:off x="5943992" y="1961202"/>
-            <a:ext cx="2568438" cy="0"/>
-          </a:xfrm>
-          <a:prstGeom prst="straightConnector1">
-            <a:avLst/>
-          </a:prstGeom>
-          <a:ln w="19050">
-            <a:solidFill>
-              <a:srgbClr val="7030A0"/>
-            </a:solidFill>
-            <a:tailEnd type="arrow"/>
-          </a:ln>
-        </p:spPr>
-        <p:style>
-          <a:lnRef idx="1">
-            <a:schemeClr val="accent1"/>
-          </a:lnRef>
-          <a:fillRef idx="0">
-            <a:schemeClr val="accent1"/>
-          </a:fillRef>
-          <a:effectRef idx="0">
-            <a:schemeClr val="accent1"/>
-          </a:effectRef>
-          <a:fontRef idx="minor">
-            <a:schemeClr val="tx1"/>
-          </a:fontRef>
-        </p:style>
-      </p:cxnSp>
-      <p:cxnSp>
-        <p:nvCxnSpPr>
-          <p:cNvPr id="44" name="Straight Arrow Connector 43"/>
-          <p:cNvCxnSpPr/>
-          <p:nvPr/>
-        </p:nvCxnSpPr>
-        <p:spPr>
-          <a:xfrm>
-            <a:off x="5943992" y="2137989"/>
-            <a:ext cx="2549946" cy="0"/>
-          </a:xfrm>
-          <a:prstGeom prst="straightConnector1">
-            <a:avLst/>
-          </a:prstGeom>
-          <a:ln w="19050">
-            <a:solidFill>
-              <a:schemeClr val="accent5">
-                <a:lumMod val="75000"/>
-              </a:schemeClr>
-            </a:solidFill>
-            <a:prstDash val="sysDash"/>
-            <a:headEnd type="arrow" w="med" len="med"/>
-            <a:tailEnd type="none" w="med" len="med"/>
-          </a:ln>
-        </p:spPr>
-        <p:style>
-          <a:lnRef idx="1">
-            <a:schemeClr val="accent1"/>
-          </a:lnRef>
-          <a:fillRef idx="0">
-            <a:schemeClr val="accent1"/>
-          </a:fillRef>
-          <a:effectRef idx="0">
-            <a:schemeClr val="accent1"/>
-          </a:effectRef>
-          <a:fontRef idx="minor">
-            <a:schemeClr val="tx1"/>
-          </a:fontRef>
-        </p:style>
-      </p:cxnSp>
-      <p:sp>
-        <p:nvSpPr>
-          <p:cNvPr id="53" name="Rectangle 62"/>
-          <p:cNvSpPr/>
-          <p:nvPr/>
-        </p:nvSpPr>
-        <p:spPr>
-          <a:xfrm>
-            <a:off x="7370178" y="4278322"/>
-            <a:ext cx="1093635" cy="346760"/>
-          </a:xfrm>
-          <a:prstGeom prst="rect">
-            <a:avLst/>
-          </a:prstGeom>
-          <a:solidFill>
-            <a:schemeClr val="accent6">
-              <a:lumMod val="75000"/>
-            </a:schemeClr>
-          </a:solidFill>
-          <a:ln w="19050">
+        </p:grpSpPr>
+        <p:sp>
+          <p:nvSpPr>
+            <p:cNvPr id="53" name="Rectangle 62"/>
+            <p:cNvSpPr/>
+            <p:nvPr/>
+          </p:nvSpPr>
+          <p:spPr>
+            <a:xfrm>
+              <a:off x="7370178" y="4278322"/>
+              <a:ext cx="1093635" cy="346760"/>
+            </a:xfrm>
+            <a:prstGeom prst="rect">
+              <a:avLst/>
+            </a:prstGeom>
             <a:solidFill>
               <a:schemeClr val="accent6">
                 <a:lumMod val="75000"/>
               </a:schemeClr>
             </a:solidFill>
-          </a:ln>
-          <a:effectLst/>
-        </p:spPr>
-        <p:style>
-          <a:lnRef idx="1">
-            <a:schemeClr val="accent2"/>
-          </a:lnRef>
-          <a:fillRef idx="2">
-            <a:schemeClr val="accent2"/>
-          </a:fillRef>
-          <a:effectRef idx="1">
-            <a:schemeClr val="accent2"/>
-          </a:effectRef>
-          <a:fontRef idx="minor">
-            <a:schemeClr val="dk1"/>
-          </a:fontRef>
-        </p:style>
-        <p:txBody>
-          <a:bodyPr rtlCol="0" anchor="ctr"/>
-          <a:lstStyle/>
-          <a:p>
-            <a:pPr algn="ctr"/>
-            <a:r>
-              <a:rPr lang="en-US" sz="1600" dirty="0" smtClean="0">
-                <a:solidFill>
-                  <a:schemeClr val="bg1"/>
-                </a:solidFill>
-              </a:rPr>
-              <a:t>:Storage</a:t>
-            </a:r>
-            <a:endParaRPr lang="en-SG" sz="1600" dirty="0">
-              <a:solidFill>
-                <a:schemeClr val="bg1"/>
-              </a:solidFill>
-            </a:endParaRPr>
-          </a:p>
-        </p:txBody>
-      </p:sp>
-      <p:cxnSp>
-        <p:nvCxnSpPr>
-          <p:cNvPr id="54" name="Straight Connector 53"/>
-          <p:cNvCxnSpPr/>
-          <p:nvPr/>
-        </p:nvCxnSpPr>
-        <p:spPr>
-          <a:xfrm>
-            <a:off x="7916995" y="4641993"/>
-            <a:ext cx="0" cy="1723059"/>
-          </a:xfrm>
-          <a:prstGeom prst="line">
-            <a:avLst/>
-          </a:prstGeom>
-          <a:ln w="19050">
-            <a:solidFill>
-              <a:schemeClr val="accent6">
-                <a:lumMod val="75000"/>
-              </a:schemeClr>
-            </a:solidFill>
-            <a:prstDash val="sysDash"/>
-          </a:ln>
-          <a:effectLst/>
-        </p:spPr>
-        <p:style>
-          <a:lnRef idx="1">
-            <a:schemeClr val="accent1"/>
-          </a:lnRef>
-          <a:fillRef idx="2">
-            <a:schemeClr val="accent1"/>
-          </a:fillRef>
-          <a:effectRef idx="1">
-            <a:schemeClr val="accent1"/>
-          </a:effectRef>
-          <a:fontRef idx="minor">
-            <a:schemeClr val="dk1"/>
-          </a:fontRef>
-        </p:style>
-      </p:cxnSp>
-      <p:sp>
-        <p:nvSpPr>
-          <p:cNvPr id="55" name="Rectangle 54"/>
-          <p:cNvSpPr/>
-          <p:nvPr/>
-        </p:nvSpPr>
-        <p:spPr>
-          <a:xfrm>
-            <a:off x="7844987" y="5335662"/>
-            <a:ext cx="124478" cy="287409"/>
-          </a:xfrm>
-          <a:prstGeom prst="rect">
-            <a:avLst/>
-          </a:prstGeom>
-          <a:solidFill>
-            <a:schemeClr val="accent6">
-              <a:lumMod val="75000"/>
-            </a:schemeClr>
-          </a:solidFill>
-          <a:ln>
-            <a:solidFill>
-              <a:schemeClr val="accent6">
-                <a:lumMod val="75000"/>
-              </a:schemeClr>
-            </a:solidFill>
-          </a:ln>
-          <a:effectLst/>
-        </p:spPr>
-        <p:style>
-          <a:lnRef idx="1">
-            <a:schemeClr val="accent3"/>
-          </a:lnRef>
-          <a:fillRef idx="2">
-            <a:schemeClr val="accent3"/>
-          </a:fillRef>
-          <a:effectRef idx="1">
-            <a:schemeClr val="accent3"/>
-          </a:effectRef>
-          <a:fontRef idx="minor">
-            <a:schemeClr val="dk1"/>
-          </a:fontRef>
-        </p:style>
-        <p:txBody>
-          <a:bodyPr rtlCol="0" anchor="ctr"/>
-          <a:lstStyle/>
-          <a:p>
-            <a:pPr algn="ctr"/>
-            <a:endParaRPr lang="en-SG" sz="1400">
-              <a:solidFill>
-                <a:schemeClr val="dk1"/>
-              </a:solidFill>
-            </a:endParaRPr>
-          </a:p>
-        </p:txBody>
-      </p:sp>
-      <p:sp>
-        <p:nvSpPr>
-          <p:cNvPr id="62" name="TextBox 61"/>
-          <p:cNvSpPr txBox="1"/>
-          <p:nvPr/>
-        </p:nvSpPr>
-        <p:spPr>
-          <a:xfrm>
-            <a:off x="1810094" y="4797674"/>
-            <a:ext cx="2716635" cy="215444"/>
-          </a:xfrm>
-          <a:prstGeom prst="rect">
-            <a:avLst/>
-          </a:prstGeom>
-          <a:noFill/>
-        </p:spPr>
-        <p:txBody>
-          <a:bodyPr wrap="square" lIns="0" tIns="0" rIns="0" bIns="0" rtlCol="0">
-            <a:spAutoFit/>
-          </a:bodyPr>
-          <a:lstStyle/>
-          <a:p>
-            <a:r>
-              <a:rPr lang="en-US" sz="1400" dirty="0" smtClean="0">
-                <a:solidFill>
-                  <a:schemeClr val="accent5">
-                    <a:lumMod val="75000"/>
-                  </a:schemeClr>
-                </a:solidFill>
-              </a:rPr>
-              <a:t>post(</a:t>
-            </a:r>
-            <a:r>
-              <a:rPr lang="en-US" sz="1400" dirty="0" err="1" smtClean="0">
-                <a:solidFill>
-                  <a:schemeClr val="accent5">
-                    <a:lumMod val="75000"/>
-                  </a:schemeClr>
-                </a:solidFill>
-              </a:rPr>
-              <a:t>TaskManagerChangedEvent</a:t>
-            </a:r>
-            <a:r>
-              <a:rPr lang="en-US" sz="1400" dirty="0" smtClean="0">
-                <a:solidFill>
-                  <a:schemeClr val="accent5">
-                    <a:lumMod val="75000"/>
-                  </a:schemeClr>
-                </a:solidFill>
-              </a:rPr>
-              <a:t>)</a:t>
-            </a:r>
-            <a:endParaRPr lang="en-US" sz="1400" dirty="0">
-              <a:solidFill>
-                <a:schemeClr val="accent5">
-                  <a:lumMod val="75000"/>
-                </a:schemeClr>
-              </a:solidFill>
-            </a:endParaRPr>
-          </a:p>
-        </p:txBody>
-      </p:sp>
-      <p:cxnSp>
-        <p:nvCxnSpPr>
-          <p:cNvPr id="63" name="Straight Arrow Connector 62"/>
-          <p:cNvCxnSpPr/>
-          <p:nvPr/>
-        </p:nvCxnSpPr>
-        <p:spPr>
-          <a:xfrm flipH="1">
-            <a:off x="4526729" y="5623071"/>
-            <a:ext cx="3383941" cy="0"/>
-          </a:xfrm>
-          <a:prstGeom prst="straightConnector1">
-            <a:avLst/>
-          </a:prstGeom>
-          <a:ln w="19050">
-            <a:solidFill>
-              <a:schemeClr val="accent6">
-                <a:lumMod val="75000"/>
-              </a:schemeClr>
-            </a:solidFill>
-            <a:prstDash val="sysDash"/>
-            <a:headEnd type="none" w="med" len="med"/>
-            <a:tailEnd type="arrow" w="med" len="med"/>
-          </a:ln>
-        </p:spPr>
-        <p:style>
-          <a:lnRef idx="1">
-            <a:schemeClr val="accent1"/>
-          </a:lnRef>
-          <a:fillRef idx="0">
-            <a:schemeClr val="accent1"/>
-          </a:fillRef>
-          <a:effectRef idx="0">
-            <a:schemeClr val="accent1"/>
-          </a:effectRef>
-          <a:fontRef idx="minor">
-            <a:schemeClr val="tx1"/>
-          </a:fontRef>
-        </p:style>
-      </p:cxnSp>
-      <p:sp>
-        <p:nvSpPr>
-          <p:cNvPr id="66" name="Rectangle 62"/>
-          <p:cNvSpPr/>
-          <p:nvPr/>
-        </p:nvSpPr>
-        <p:spPr>
-          <a:xfrm>
-            <a:off x="3791146" y="4295233"/>
-            <a:ext cx="1371600" cy="346760"/>
-          </a:xfrm>
-          <a:prstGeom prst="rect">
-            <a:avLst/>
-          </a:prstGeom>
-          <a:solidFill>
-            <a:schemeClr val="accent5">
-              <a:lumMod val="75000"/>
-            </a:schemeClr>
-          </a:solidFill>
-          <a:ln w="19050">
-            <a:solidFill>
-              <a:schemeClr val="accent5">
-                <a:lumMod val="75000"/>
-              </a:schemeClr>
-            </a:solidFill>
-          </a:ln>
-          <a:effectLst/>
-        </p:spPr>
-        <p:style>
-          <a:lnRef idx="1">
-            <a:schemeClr val="accent2"/>
-          </a:lnRef>
-          <a:fillRef idx="2">
-            <a:schemeClr val="accent2"/>
-          </a:fillRef>
-          <a:effectRef idx="1">
-            <a:schemeClr val="accent2"/>
-          </a:effectRef>
-          <a:fontRef idx="minor">
-            <a:schemeClr val="dk1"/>
-          </a:fontRef>
-        </p:style>
-        <p:txBody>
-          <a:bodyPr rtlCol="0" anchor="ctr"/>
-          <a:lstStyle/>
-          <a:p>
-            <a:pPr algn="ctr"/>
-            <a:r>
-              <a:rPr lang="en-US" sz="1600" dirty="0" smtClean="0">
-                <a:solidFill>
-                  <a:schemeClr val="bg1"/>
-                </a:solidFill>
-              </a:rPr>
-              <a:t>:</a:t>
-            </a:r>
-            <a:r>
-              <a:rPr lang="en-US" sz="1600" dirty="0" err="1" smtClean="0">
-                <a:solidFill>
-                  <a:schemeClr val="bg1"/>
-                </a:solidFill>
-              </a:rPr>
-              <a:t>EventsCenter</a:t>
-            </a:r>
-            <a:endParaRPr lang="en-SG" sz="1600" dirty="0">
-              <a:solidFill>
-                <a:schemeClr val="bg1"/>
-              </a:solidFill>
-            </a:endParaRPr>
-          </a:p>
-        </p:txBody>
-      </p:sp>
-      <p:cxnSp>
-        <p:nvCxnSpPr>
-          <p:cNvPr id="67" name="Straight Connector 66"/>
-          <p:cNvCxnSpPr/>
-          <p:nvPr/>
-        </p:nvCxnSpPr>
-        <p:spPr>
-          <a:xfrm>
-            <a:off x="4456731" y="4648287"/>
-            <a:ext cx="0" cy="1723059"/>
-          </a:xfrm>
-          <a:prstGeom prst="line">
-            <a:avLst/>
-          </a:prstGeom>
-          <a:ln w="19050">
-            <a:solidFill>
-              <a:schemeClr val="accent5">
-                <a:lumMod val="75000"/>
-              </a:schemeClr>
-            </a:solidFill>
-            <a:prstDash val="sysDash"/>
-          </a:ln>
-          <a:effectLst/>
-        </p:spPr>
-        <p:style>
-          <a:lnRef idx="1">
-            <a:schemeClr val="accent1"/>
-          </a:lnRef>
-          <a:fillRef idx="2">
-            <a:schemeClr val="accent1"/>
-          </a:fillRef>
-          <a:effectRef idx="1">
-            <a:schemeClr val="accent1"/>
-          </a:effectRef>
-          <a:fontRef idx="minor">
-            <a:schemeClr val="dk1"/>
-          </a:fontRef>
-        </p:style>
-      </p:cxnSp>
-      <p:sp>
-        <p:nvSpPr>
-          <p:cNvPr id="68" name="Rectangle 67"/>
-          <p:cNvSpPr/>
-          <p:nvPr/>
-        </p:nvSpPr>
-        <p:spPr>
-          <a:xfrm>
-            <a:off x="4384723" y="5071220"/>
-            <a:ext cx="142006" cy="1036757"/>
-          </a:xfrm>
-          <a:prstGeom prst="rect">
-            <a:avLst/>
-          </a:prstGeom>
-          <a:solidFill>
-            <a:schemeClr val="accent5">
-              <a:lumMod val="75000"/>
-            </a:schemeClr>
-          </a:solidFill>
-          <a:ln>
-            <a:solidFill>
-              <a:schemeClr val="accent5">
-                <a:lumMod val="75000"/>
-              </a:schemeClr>
-            </a:solidFill>
-          </a:ln>
-          <a:effectLst/>
-        </p:spPr>
-        <p:style>
-          <a:lnRef idx="1">
-            <a:schemeClr val="accent3"/>
-          </a:lnRef>
-          <a:fillRef idx="2">
-            <a:schemeClr val="accent3"/>
-          </a:fillRef>
-          <a:effectRef idx="1">
-            <a:schemeClr val="accent3"/>
-          </a:effectRef>
-          <a:fontRef idx="minor">
-            <a:schemeClr val="dk1"/>
-          </a:fontRef>
-        </p:style>
-        <p:txBody>
-          <a:bodyPr rtlCol="0" anchor="ctr"/>
-          <a:lstStyle/>
-          <a:p>
-            <a:pPr algn="ctr"/>
-            <a:endParaRPr lang="en-SG" sz="1400">
-              <a:solidFill>
-                <a:schemeClr val="dk1"/>
-              </a:solidFill>
-            </a:endParaRPr>
-          </a:p>
-        </p:txBody>
-      </p:sp>
-      <p:cxnSp>
-        <p:nvCxnSpPr>
-          <p:cNvPr id="69" name="Straight Arrow Connector 68"/>
-          <p:cNvCxnSpPr/>
-          <p:nvPr/>
-        </p:nvCxnSpPr>
-        <p:spPr>
-          <a:xfrm>
-            <a:off x="3078929" y="5071220"/>
-            <a:ext cx="1295400" cy="0"/>
-          </a:xfrm>
-          <a:prstGeom prst="straightConnector1">
-            <a:avLst/>
-          </a:prstGeom>
-          <a:ln w="19050">
-            <a:solidFill>
-              <a:srgbClr val="7030A0"/>
-            </a:solidFill>
-            <a:tailEnd type="arrow"/>
-          </a:ln>
-        </p:spPr>
-        <p:style>
-          <a:lnRef idx="1">
-            <a:schemeClr val="accent1"/>
-          </a:lnRef>
-          <a:fillRef idx="0">
-            <a:schemeClr val="accent1"/>
-          </a:fillRef>
-          <a:effectRef idx="0">
-            <a:schemeClr val="accent1"/>
-          </a:effectRef>
-          <a:fontRef idx="minor">
-            <a:schemeClr val="tx1"/>
-          </a:fontRef>
-        </p:style>
-      </p:cxnSp>
-      <p:cxnSp>
-        <p:nvCxnSpPr>
-          <p:cNvPr id="70" name="Straight Arrow Connector 69"/>
-          <p:cNvCxnSpPr/>
-          <p:nvPr/>
-        </p:nvCxnSpPr>
-        <p:spPr>
-          <a:xfrm>
-            <a:off x="2975642" y="6107977"/>
-            <a:ext cx="1448755" cy="0"/>
-          </a:xfrm>
-          <a:prstGeom prst="straightConnector1">
-            <a:avLst/>
-          </a:prstGeom>
-          <a:ln w="19050">
-            <a:solidFill>
-              <a:schemeClr val="accent5">
-                <a:lumMod val="75000"/>
-              </a:schemeClr>
-            </a:solidFill>
-            <a:prstDash val="sysDash"/>
-            <a:headEnd type="arrow" w="med" len="med"/>
-            <a:tailEnd type="none" w="med" len="med"/>
-          </a:ln>
-        </p:spPr>
-        <p:style>
-          <a:lnRef idx="1">
-            <a:schemeClr val="accent1"/>
-          </a:lnRef>
-          <a:fillRef idx="0">
-            <a:schemeClr val="accent1"/>
-          </a:fillRef>
-          <a:effectRef idx="0">
-            <a:schemeClr val="accent1"/>
-          </a:effectRef>
-          <a:fontRef idx="minor">
-            <a:schemeClr val="tx1"/>
-          </a:fontRef>
-        </p:style>
-      </p:cxnSp>
-      <p:cxnSp>
-        <p:nvCxnSpPr>
-          <p:cNvPr id="72" name="Straight Arrow Connector 71"/>
-          <p:cNvCxnSpPr/>
-          <p:nvPr/>
-        </p:nvCxnSpPr>
-        <p:spPr>
-          <a:xfrm>
-            <a:off x="4526729" y="5341014"/>
-            <a:ext cx="3318258" cy="0"/>
-          </a:xfrm>
-          <a:prstGeom prst="straightConnector1">
-            <a:avLst/>
-          </a:prstGeom>
-          <a:ln w="19050">
-            <a:solidFill>
-              <a:schemeClr val="accent5">
-                <a:lumMod val="75000"/>
-              </a:schemeClr>
-            </a:solidFill>
-            <a:headEnd type="none" w="med" len="med"/>
-            <a:tailEnd type="arrow" w="med" len="med"/>
-          </a:ln>
-        </p:spPr>
-        <p:style>
-          <a:lnRef idx="1">
-            <a:schemeClr val="accent1"/>
-          </a:lnRef>
-          <a:fillRef idx="0">
-            <a:schemeClr val="accent1"/>
-          </a:fillRef>
-          <a:effectRef idx="0">
-            <a:schemeClr val="accent1"/>
-          </a:effectRef>
-          <a:fontRef idx="minor">
-            <a:schemeClr val="tx1"/>
-          </a:fontRef>
-        </p:style>
-      </p:cxnSp>
-      <p:sp>
-        <p:nvSpPr>
-          <p:cNvPr id="74" name="TextBox 73"/>
-          <p:cNvSpPr txBox="1"/>
-          <p:nvPr/>
-        </p:nvSpPr>
-        <p:spPr>
-          <a:xfrm>
-            <a:off x="5036330" y="5065911"/>
-            <a:ext cx="2659870" cy="215444"/>
-          </a:xfrm>
-          <a:prstGeom prst="rect">
-            <a:avLst/>
-          </a:prstGeom>
-          <a:noFill/>
-        </p:spPr>
-        <p:txBody>
-          <a:bodyPr wrap="square" lIns="0" tIns="0" rIns="0" bIns="0" rtlCol="0">
-            <a:spAutoFit/>
-          </a:bodyPr>
-          <a:lstStyle/>
-          <a:p>
-            <a:r>
-              <a:rPr lang="en-US" sz="1400" dirty="0" err="1" smtClean="0">
-                <a:solidFill>
-                  <a:schemeClr val="accent6">
-                    <a:lumMod val="75000"/>
-                  </a:schemeClr>
-                </a:solidFill>
-              </a:rPr>
-              <a:t>handleTaskManagerChangedEvent</a:t>
-            </a:r>
-            <a:r>
-              <a:rPr lang="en-US" sz="1400" dirty="0" smtClean="0">
-                <a:solidFill>
-                  <a:schemeClr val="accent6">
-                    <a:lumMod val="75000"/>
-                  </a:schemeClr>
-                </a:solidFill>
-              </a:rPr>
-              <a:t>()</a:t>
-            </a:r>
-            <a:endParaRPr lang="en-US" sz="1400" dirty="0">
+            <a:ln w="19050">
               <a:solidFill>
                 <a:schemeClr val="accent6">
                   <a:lumMod val="75000"/>
                 </a:schemeClr>
               </a:solidFill>
-            </a:endParaRPr>
-          </a:p>
-        </p:txBody>
-      </p:sp>
-      <p:cxnSp>
-        <p:nvCxnSpPr>
-          <p:cNvPr id="85" name="Straight Connector 84"/>
-          <p:cNvCxnSpPr/>
-          <p:nvPr/>
-        </p:nvCxnSpPr>
-        <p:spPr>
-          <a:xfrm flipH="1">
-            <a:off x="314394" y="1099672"/>
-            <a:ext cx="24" cy="1598671"/>
-          </a:xfrm>
-          <a:prstGeom prst="line">
-            <a:avLst/>
-          </a:prstGeom>
-          <a:ln w="19050">
-            <a:solidFill>
-              <a:schemeClr val="tx1"/>
-            </a:solidFill>
-            <a:prstDash val="sysDash"/>
-          </a:ln>
-          <a:effectLst/>
-        </p:spPr>
-        <p:style>
-          <a:lnRef idx="1">
-            <a:schemeClr val="accent1"/>
-          </a:lnRef>
-          <a:fillRef idx="2">
-            <a:schemeClr val="accent1"/>
-          </a:fillRef>
-          <a:effectRef idx="1">
-            <a:schemeClr val="accent1"/>
-          </a:effectRef>
-          <a:fontRef idx="minor">
-            <a:schemeClr val="dk1"/>
-          </a:fontRef>
-        </p:style>
-      </p:cxnSp>
-      <p:sp>
-        <p:nvSpPr>
-          <p:cNvPr id="45" name="Rectangle 62"/>
-          <p:cNvSpPr/>
-          <p:nvPr/>
-        </p:nvSpPr>
-        <p:spPr>
-          <a:xfrm>
-            <a:off x="721634" y="4278322"/>
-            <a:ext cx="1093635" cy="346760"/>
-          </a:xfrm>
-          <a:prstGeom prst="rect">
-            <a:avLst/>
-          </a:prstGeom>
-          <a:solidFill>
-            <a:srgbClr val="00B050"/>
-          </a:solidFill>
-          <a:ln w="19050">
-            <a:solidFill>
-              <a:srgbClr val="00B050"/>
-            </a:solidFill>
-          </a:ln>
-          <a:effectLst/>
-        </p:spPr>
-        <p:style>
-          <a:lnRef idx="1">
-            <a:schemeClr val="accent2"/>
-          </a:lnRef>
-          <a:fillRef idx="2">
-            <a:schemeClr val="accent2"/>
-          </a:fillRef>
-          <a:effectRef idx="1">
-            <a:schemeClr val="accent2"/>
-          </a:effectRef>
-          <a:fontRef idx="minor">
-            <a:schemeClr val="dk1"/>
-          </a:fontRef>
-        </p:style>
-        <p:txBody>
-          <a:bodyPr rtlCol="0" anchor="ctr"/>
-          <a:lstStyle/>
-          <a:p>
-            <a:pPr algn="ctr"/>
-            <a:r>
-              <a:rPr lang="en-US" sz="1600" dirty="0" smtClean="0">
-                <a:solidFill>
-                  <a:schemeClr val="bg1"/>
-                </a:solidFill>
-              </a:rPr>
-              <a:t>:UI</a:t>
-            </a:r>
-            <a:endParaRPr lang="en-SG" sz="1600" dirty="0">
-              <a:solidFill>
-                <a:schemeClr val="bg1"/>
-              </a:solidFill>
-            </a:endParaRPr>
-          </a:p>
-        </p:txBody>
-      </p:sp>
-      <p:cxnSp>
-        <p:nvCxnSpPr>
-          <p:cNvPr id="46" name="Straight Connector 45"/>
-          <p:cNvCxnSpPr/>
-          <p:nvPr/>
-        </p:nvCxnSpPr>
-        <p:spPr>
-          <a:xfrm>
-            <a:off x="1268451" y="4641993"/>
-            <a:ext cx="0" cy="1723059"/>
-          </a:xfrm>
-          <a:prstGeom prst="line">
-            <a:avLst/>
-          </a:prstGeom>
-          <a:ln w="19050">
-            <a:solidFill>
-              <a:srgbClr val="00B050"/>
-            </a:solidFill>
-            <a:prstDash val="sysDash"/>
-          </a:ln>
-          <a:effectLst/>
-        </p:spPr>
-        <p:style>
-          <a:lnRef idx="1">
-            <a:schemeClr val="accent1"/>
-          </a:lnRef>
-          <a:fillRef idx="2">
-            <a:schemeClr val="accent1"/>
-          </a:fillRef>
-          <a:effectRef idx="1">
-            <a:schemeClr val="accent1"/>
-          </a:effectRef>
-          <a:fontRef idx="minor">
-            <a:schemeClr val="dk1"/>
-          </a:fontRef>
-        </p:style>
-      </p:cxnSp>
-      <p:sp>
-        <p:nvSpPr>
-          <p:cNvPr id="47" name="Rectangle 46"/>
-          <p:cNvSpPr/>
-          <p:nvPr/>
-        </p:nvSpPr>
-        <p:spPr>
-          <a:xfrm>
-            <a:off x="1196443" y="5670472"/>
-            <a:ext cx="130545" cy="273128"/>
-          </a:xfrm>
-          <a:prstGeom prst="rect">
-            <a:avLst/>
-          </a:prstGeom>
-          <a:solidFill>
-            <a:srgbClr val="00B050"/>
-          </a:solidFill>
-          <a:ln>
-            <a:solidFill>
-              <a:srgbClr val="00B050"/>
-            </a:solidFill>
-          </a:ln>
-          <a:effectLst/>
-        </p:spPr>
-        <p:style>
-          <a:lnRef idx="1">
-            <a:schemeClr val="accent3"/>
-          </a:lnRef>
-          <a:fillRef idx="2">
-            <a:schemeClr val="accent3"/>
-          </a:fillRef>
-          <a:effectRef idx="1">
-            <a:schemeClr val="accent3"/>
-          </a:effectRef>
-          <a:fontRef idx="minor">
-            <a:schemeClr val="dk1"/>
-          </a:fontRef>
-        </p:style>
-        <p:txBody>
-          <a:bodyPr rtlCol="0" anchor="ctr"/>
-          <a:lstStyle/>
-          <a:p>
-            <a:pPr algn="ctr"/>
-            <a:endParaRPr lang="en-SG" sz="1400">
-              <a:solidFill>
-                <a:schemeClr val="dk1"/>
-              </a:solidFill>
-            </a:endParaRPr>
-          </a:p>
-        </p:txBody>
-      </p:sp>
-      <p:cxnSp>
-        <p:nvCxnSpPr>
-          <p:cNvPr id="48" name="Straight Arrow Connector 47"/>
-          <p:cNvCxnSpPr/>
-          <p:nvPr/>
-        </p:nvCxnSpPr>
-        <p:spPr>
-          <a:xfrm flipH="1">
-            <a:off x="1348843" y="5943600"/>
-            <a:ext cx="3061842" cy="0"/>
-          </a:xfrm>
-          <a:prstGeom prst="straightConnector1">
-            <a:avLst/>
-          </a:prstGeom>
-          <a:ln w="19050">
-            <a:solidFill>
-              <a:srgbClr val="00B050"/>
-            </a:solidFill>
-            <a:prstDash val="sysDash"/>
-            <a:headEnd type="arrow" w="med" len="med"/>
-            <a:tailEnd type="none" w="med" len="med"/>
-          </a:ln>
-        </p:spPr>
-        <p:style>
-          <a:lnRef idx="1">
-            <a:schemeClr val="accent1"/>
-          </a:lnRef>
-          <a:fillRef idx="0">
-            <a:schemeClr val="accent1"/>
-          </a:fillRef>
-          <a:effectRef idx="0">
-            <a:schemeClr val="accent1"/>
-          </a:effectRef>
-          <a:fontRef idx="minor">
-            <a:schemeClr val="tx1"/>
-          </a:fontRef>
-        </p:style>
-      </p:cxnSp>
-      <p:cxnSp>
-        <p:nvCxnSpPr>
-          <p:cNvPr id="49" name="Straight Arrow Connector 48"/>
-          <p:cNvCxnSpPr/>
-          <p:nvPr/>
-        </p:nvCxnSpPr>
-        <p:spPr>
-          <a:xfrm>
-            <a:off x="1348843" y="5670472"/>
-            <a:ext cx="3061841" cy="0"/>
-          </a:xfrm>
-          <a:prstGeom prst="straightConnector1">
-            <a:avLst/>
-          </a:prstGeom>
-          <a:ln w="19050">
-            <a:solidFill>
-              <a:schemeClr val="accent5">
-                <a:lumMod val="75000"/>
-              </a:schemeClr>
-            </a:solidFill>
-            <a:headEnd type="arrow" w="med" len="med"/>
-            <a:tailEnd type="none" w="med" len="med"/>
-          </a:ln>
-        </p:spPr>
-        <p:style>
-          <a:lnRef idx="1">
-            <a:schemeClr val="accent1"/>
-          </a:lnRef>
-          <a:fillRef idx="0">
-            <a:schemeClr val="accent1"/>
-          </a:fillRef>
-          <a:effectRef idx="0">
-            <a:schemeClr val="accent1"/>
-          </a:effectRef>
-          <a:fontRef idx="minor">
-            <a:schemeClr val="tx1"/>
-          </a:fontRef>
-        </p:style>
-      </p:cxnSp>
-      <p:sp>
-        <p:nvSpPr>
-          <p:cNvPr id="50" name="TextBox 49"/>
-          <p:cNvSpPr txBox="1"/>
-          <p:nvPr/>
-        </p:nvSpPr>
-        <p:spPr>
-          <a:xfrm>
-            <a:off x="1416276" y="5395369"/>
-            <a:ext cx="2659870" cy="215444"/>
-          </a:xfrm>
-          <a:prstGeom prst="rect">
-            <a:avLst/>
-          </a:prstGeom>
-          <a:noFill/>
-        </p:spPr>
-        <p:txBody>
-          <a:bodyPr wrap="square" lIns="0" tIns="0" rIns="0" bIns="0" rtlCol="0">
-            <a:spAutoFit/>
-          </a:bodyPr>
-          <a:lstStyle/>
-          <a:p>
-            <a:r>
-              <a:rPr lang="en-US" sz="1400" dirty="0" err="1" smtClean="0">
-                <a:solidFill>
-                  <a:srgbClr val="00B050"/>
-                </a:solidFill>
-              </a:rPr>
-              <a:t>handleTaskManagerChangedEvent</a:t>
-            </a:r>
-            <a:r>
-              <a:rPr lang="en-US" sz="1400" dirty="0" smtClean="0">
-                <a:solidFill>
-                  <a:srgbClr val="00B050"/>
-                </a:solidFill>
-              </a:rPr>
-              <a:t>()</a:t>
-            </a:r>
-            <a:endParaRPr lang="en-US" sz="1400" dirty="0">
-              <a:solidFill>
-                <a:srgbClr val="00B050"/>
-              </a:solidFill>
-            </a:endParaRPr>
-          </a:p>
-        </p:txBody>
-      </p:sp>
-      <p:grpSp>
-        <p:nvGrpSpPr>
-          <p:cNvPr id="13" name="Group 12"/>
-          <p:cNvGrpSpPr/>
-          <p:nvPr/>
-        </p:nvGrpSpPr>
-        <p:grpSpPr>
-          <a:xfrm>
-            <a:off x="1028134" y="5612032"/>
-            <a:ext cx="217349" cy="270072"/>
-            <a:chOff x="1028134" y="5612032"/>
-            <a:chExt cx="217349" cy="270072"/>
-          </a:xfrm>
-        </p:grpSpPr>
-        <p:sp>
-          <p:nvSpPr>
-            <p:cNvPr id="12" name="Freeform 11"/>
-            <p:cNvSpPr/>
-            <p:nvPr/>
-          </p:nvSpPr>
-          <p:spPr>
-            <a:xfrm rot="2600998" flipH="1" flipV="1">
-              <a:off x="1028134" y="5612032"/>
-              <a:ext cx="167452" cy="116880"/>
-            </a:xfrm>
-            <a:custGeom>
-              <a:avLst/>
-              <a:gdLst>
-                <a:gd name="connsiteX0" fmla="*/ 0 w 226400"/>
-                <a:gd name="connsiteY0" fmla="*/ 32920 h 171466"/>
-                <a:gd name="connsiteX1" fmla="*/ 157018 w 226400"/>
-                <a:gd name="connsiteY1" fmla="*/ 5211 h 171466"/>
-                <a:gd name="connsiteX2" fmla="*/ 221673 w 226400"/>
-                <a:gd name="connsiteY2" fmla="*/ 125284 h 171466"/>
-                <a:gd name="connsiteX3" fmla="*/ 36945 w 226400"/>
-                <a:gd name="connsiteY3" fmla="*/ 171466 h 171466"/>
-              </a:gdLst>
-              <a:ahLst/>
-              <a:cxnLst>
-                <a:cxn ang="0">
-                  <a:pos x="connsiteX0" y="connsiteY0"/>
-                </a:cxn>
-                <a:cxn ang="0">
-                  <a:pos x="connsiteX1" y="connsiteY1"/>
-                </a:cxn>
-                <a:cxn ang="0">
-                  <a:pos x="connsiteX2" y="connsiteY2"/>
-                </a:cxn>
-                <a:cxn ang="0">
-                  <a:pos x="connsiteX3" y="connsiteY3"/>
-                </a:cxn>
-              </a:cxnLst>
-              <a:rect l="l" t="t" r="r" b="b"/>
-              <a:pathLst>
-                <a:path w="226400" h="171466">
-                  <a:moveTo>
-                    <a:pt x="0" y="32920"/>
-                  </a:moveTo>
-                  <a:cubicBezTo>
-                    <a:pt x="60036" y="11368"/>
-                    <a:pt x="120073" y="-10183"/>
-                    <a:pt x="157018" y="5211"/>
-                  </a:cubicBezTo>
-                  <a:cubicBezTo>
-                    <a:pt x="193963" y="20605"/>
-                    <a:pt x="241685" y="97575"/>
-                    <a:pt x="221673" y="125284"/>
-                  </a:cubicBezTo>
-                  <a:cubicBezTo>
-                    <a:pt x="201661" y="152993"/>
-                    <a:pt x="119303" y="162229"/>
-                    <a:pt x="36945" y="171466"/>
-                  </a:cubicBezTo>
-                </a:path>
-              </a:pathLst>
-            </a:custGeom>
-            <a:ln w="19050">
-              <a:solidFill>
-                <a:srgbClr val="00B050"/>
-              </a:solidFill>
-              <a:headEnd type="arrow" w="med" len="med"/>
-              <a:tailEnd type="none" w="med" len="med"/>
             </a:ln>
+            <a:effectLst/>
           </p:spPr>
           <p:style>
             <a:lnRef idx="1">
-              <a:schemeClr val="accent1"/>
+              <a:schemeClr val="accent2"/>
             </a:lnRef>
-            <a:fillRef idx="0">
-              <a:schemeClr val="accent1"/>
+            <a:fillRef idx="2">
+              <a:schemeClr val="accent2"/>
             </a:fillRef>
-            <a:effectRef idx="0">
-              <a:schemeClr val="accent1"/>
+            <a:effectRef idx="1">
+              <a:schemeClr val="accent2"/>
             </a:effectRef>
             <a:fontRef idx="minor">
-              <a:schemeClr val="tx1"/>
+              <a:schemeClr val="dk1"/>
             </a:fontRef>
           </p:style>
           <p:txBody>
@@ -5553,30 +3525,85 @@
             <a:lstStyle/>
             <a:p>
               <a:pPr algn="ctr"/>
-              <a:endParaRPr lang="en-SG"/>
+              <a:r>
+                <a:rPr lang="en-US" sz="1600" dirty="0" smtClean="0">
+                  <a:solidFill>
+                    <a:schemeClr val="bg1"/>
+                  </a:solidFill>
+                </a:rPr>
+                <a:t>:Storage</a:t>
+              </a:r>
+              <a:endParaRPr lang="en-SG" sz="1600" dirty="0">
+                <a:solidFill>
+                  <a:schemeClr val="bg1"/>
+                </a:solidFill>
+              </a:endParaRPr>
             </a:p>
           </p:txBody>
         </p:sp>
+        <p:cxnSp>
+          <p:nvCxnSpPr>
+            <p:cNvPr id="54" name="Straight Connector 53"/>
+            <p:cNvCxnSpPr/>
+            <p:nvPr/>
+          </p:nvCxnSpPr>
+          <p:spPr>
+            <a:xfrm>
+              <a:off x="7916995" y="4641993"/>
+              <a:ext cx="0" cy="1723059"/>
+            </a:xfrm>
+            <a:prstGeom prst="line">
+              <a:avLst/>
+            </a:prstGeom>
+            <a:ln w="19050">
+              <a:solidFill>
+                <a:schemeClr val="accent6">
+                  <a:lumMod val="75000"/>
+                </a:schemeClr>
+              </a:solidFill>
+              <a:prstDash val="sysDash"/>
+            </a:ln>
+            <a:effectLst/>
+          </p:spPr>
+          <p:style>
+            <a:lnRef idx="1">
+              <a:schemeClr val="accent1"/>
+            </a:lnRef>
+            <a:fillRef idx="2">
+              <a:schemeClr val="accent1"/>
+            </a:fillRef>
+            <a:effectRef idx="1">
+              <a:schemeClr val="accent1"/>
+            </a:effectRef>
+            <a:fontRef idx="minor">
+              <a:schemeClr val="dk1"/>
+            </a:fontRef>
+          </p:style>
+        </p:cxnSp>
         <p:sp>
           <p:nvSpPr>
-            <p:cNvPr id="56" name="Rectangle 55"/>
+            <p:cNvPr id="55" name="Rectangle 54"/>
             <p:cNvSpPr/>
             <p:nvPr/>
           </p:nvSpPr>
           <p:spPr>
             <a:xfrm>
-              <a:off x="1147403" y="5712513"/>
-              <a:ext cx="98080" cy="169591"/>
+              <a:off x="7844987" y="5335662"/>
+              <a:ext cx="124478" cy="287409"/>
             </a:xfrm>
             <a:prstGeom prst="rect">
               <a:avLst/>
             </a:prstGeom>
             <a:solidFill>
-              <a:srgbClr val="00B050"/>
+              <a:schemeClr val="accent6">
+                <a:lumMod val="75000"/>
+              </a:schemeClr>
             </a:solidFill>
             <a:ln>
               <a:solidFill>
-                <a:schemeClr val="bg1"/>
+                <a:schemeClr val="accent6">
+                  <a:lumMod val="75000"/>
+                </a:schemeClr>
               </a:solidFill>
             </a:ln>
             <a:effectLst/>
@@ -5608,130 +3635,91 @@
             </a:p>
           </p:txBody>
         </p:sp>
-      </p:grpSp>
-      <p:sp>
-        <p:nvSpPr>
-          <p:cNvPr id="57" name="TextBox 56"/>
-          <p:cNvSpPr txBox="1"/>
-          <p:nvPr/>
-        </p:nvSpPr>
-        <p:spPr>
-          <a:xfrm>
-            <a:off x="194562" y="5444571"/>
-            <a:ext cx="794081" cy="430887"/>
-          </a:xfrm>
-          <a:prstGeom prst="rect">
-            <a:avLst/>
-          </a:prstGeom>
-          <a:noFill/>
-        </p:spPr>
-        <p:txBody>
-          <a:bodyPr wrap="square" lIns="0" tIns="0" rIns="0" bIns="0" rtlCol="0">
-            <a:spAutoFit/>
-          </a:bodyPr>
-          <a:lstStyle/>
-          <a:p>
-            <a:pPr algn="r"/>
-            <a:r>
-              <a:rPr lang="en-US" sz="1400" dirty="0" smtClean="0">
-                <a:solidFill>
-                  <a:srgbClr val="00B050"/>
-                </a:solidFill>
-              </a:rPr>
-              <a:t>Update status bar</a:t>
-            </a:r>
-            <a:endParaRPr lang="en-US" sz="1400" dirty="0">
-              <a:solidFill>
-                <a:srgbClr val="00B050"/>
-              </a:solidFill>
-            </a:endParaRPr>
-          </a:p>
-        </p:txBody>
-      </p:sp>
-      <p:grpSp>
-        <p:nvGrpSpPr>
-          <p:cNvPr id="58" name="Group 57"/>
-          <p:cNvGrpSpPr/>
-          <p:nvPr/>
-        </p:nvGrpSpPr>
-        <p:grpSpPr>
-          <a:xfrm flipH="1">
-            <a:off x="7936842" y="5335662"/>
-            <a:ext cx="217349" cy="270072"/>
-            <a:chOff x="1028134" y="5612032"/>
-            <a:chExt cx="217349" cy="270072"/>
-          </a:xfrm>
-        </p:grpSpPr>
         <p:sp>
           <p:nvSpPr>
-            <p:cNvPr id="59" name="Freeform 58"/>
-            <p:cNvSpPr/>
+            <p:cNvPr id="62" name="TextBox 61"/>
+            <p:cNvSpPr txBox="1"/>
             <p:nvPr/>
           </p:nvSpPr>
           <p:spPr>
-            <a:xfrm rot="2600998" flipH="1" flipV="1">
-              <a:off x="1028134" y="5612032"/>
-              <a:ext cx="167452" cy="116880"/>
+            <a:xfrm>
+              <a:off x="1947399" y="4809706"/>
+              <a:ext cx="2716635" cy="184666"/>
             </a:xfrm>
-            <a:custGeom>
+            <a:prstGeom prst="rect">
               <a:avLst/>
-              <a:gdLst>
-                <a:gd name="connsiteX0" fmla="*/ 0 w 226400"/>
-                <a:gd name="connsiteY0" fmla="*/ 32920 h 171466"/>
-                <a:gd name="connsiteX1" fmla="*/ 157018 w 226400"/>
-                <a:gd name="connsiteY1" fmla="*/ 5211 h 171466"/>
-                <a:gd name="connsiteX2" fmla="*/ 221673 w 226400"/>
-                <a:gd name="connsiteY2" fmla="*/ 125284 h 171466"/>
-                <a:gd name="connsiteX3" fmla="*/ 36945 w 226400"/>
-                <a:gd name="connsiteY3" fmla="*/ 171466 h 171466"/>
-              </a:gdLst>
-              <a:ahLst/>
-              <a:cxnLst>
-                <a:cxn ang="0">
-                  <a:pos x="connsiteX0" y="connsiteY0"/>
-                </a:cxn>
-                <a:cxn ang="0">
-                  <a:pos x="connsiteX1" y="connsiteY1"/>
-                </a:cxn>
-                <a:cxn ang="0">
-                  <a:pos x="connsiteX2" y="connsiteY2"/>
-                </a:cxn>
-                <a:cxn ang="0">
-                  <a:pos x="connsiteX3" y="connsiteY3"/>
-                </a:cxn>
-              </a:cxnLst>
-              <a:rect l="l" t="t" r="r" b="b"/>
-              <a:pathLst>
-                <a:path w="226400" h="171466">
-                  <a:moveTo>
-                    <a:pt x="0" y="32920"/>
-                  </a:moveTo>
-                  <a:cubicBezTo>
-                    <a:pt x="60036" y="11368"/>
-                    <a:pt x="120073" y="-10183"/>
-                    <a:pt x="157018" y="5211"/>
-                  </a:cubicBezTo>
-                  <a:cubicBezTo>
-                    <a:pt x="193963" y="20605"/>
-                    <a:pt x="241685" y="97575"/>
-                    <a:pt x="221673" y="125284"/>
-                  </a:cubicBezTo>
-                  <a:cubicBezTo>
-                    <a:pt x="201661" y="152993"/>
-                    <a:pt x="119303" y="162229"/>
-                    <a:pt x="36945" y="171466"/>
-                  </a:cubicBezTo>
-                </a:path>
-              </a:pathLst>
-            </a:custGeom>
+            </a:prstGeom>
+            <a:noFill/>
+          </p:spPr>
+          <p:txBody>
+            <a:bodyPr wrap="square" lIns="0" tIns="0" rIns="0" bIns="0" rtlCol="0">
+              <a:spAutoFit/>
+            </a:bodyPr>
+            <a:lstStyle/>
+            <a:p>
+              <a:r>
+                <a:rPr lang="en-US" sz="1200" dirty="0" smtClean="0">
+                  <a:solidFill>
+                    <a:schemeClr val="accent5">
+                      <a:lumMod val="75000"/>
+                    </a:schemeClr>
+                  </a:solidFill>
+                </a:rPr>
+                <a:t>post(</a:t>
+              </a:r>
+              <a:r>
+                <a:rPr lang="en-US" sz="1200" dirty="0" err="1" smtClean="0">
+                  <a:solidFill>
+                    <a:schemeClr val="accent5">
+                      <a:lumMod val="75000"/>
+                    </a:schemeClr>
+                  </a:solidFill>
+                </a:rPr>
+                <a:t>TaskManagerChangedEvent</a:t>
+              </a:r>
+              <a:r>
+                <a:rPr lang="en-US" sz="1200" dirty="0" smtClean="0">
+                  <a:solidFill>
+                    <a:schemeClr val="accent5">
+                      <a:lumMod val="75000"/>
+                    </a:schemeClr>
+                  </a:solidFill>
+                </a:rPr>
+                <a:t>)</a:t>
+              </a:r>
+              <a:endParaRPr lang="en-US" sz="1200" dirty="0">
+                <a:solidFill>
+                  <a:schemeClr val="accent5">
+                    <a:lumMod val="75000"/>
+                  </a:schemeClr>
+                </a:solidFill>
+              </a:endParaRPr>
+            </a:p>
+          </p:txBody>
+        </p:sp>
+        <p:cxnSp>
+          <p:nvCxnSpPr>
+            <p:cNvPr id="63" name="Straight Arrow Connector 62"/>
+            <p:cNvCxnSpPr/>
+            <p:nvPr/>
+          </p:nvCxnSpPr>
+          <p:spPr>
+            <a:xfrm flipH="1">
+              <a:off x="4526729" y="5623071"/>
+              <a:ext cx="3383941" cy="0"/>
+            </a:xfrm>
+            <a:prstGeom prst="straightConnector1">
+              <a:avLst/>
+            </a:prstGeom>
             <a:ln w="19050">
               <a:solidFill>
                 <a:schemeClr val="accent6">
                   <a:lumMod val="75000"/>
                 </a:schemeClr>
               </a:solidFill>
-              <a:headEnd type="arrow" w="med" len="med"/>
-              <a:tailEnd type="none" w="med" len="med"/>
+              <a:prstDash val="sysDash"/>
+              <a:headEnd type="none" w="med" len="med"/>
+              <a:tailEnd type="arrow" w="med" len="med"/>
             </a:ln>
           </p:spPr>
           <p:style>
@@ -5748,37 +3736,141 @@
               <a:schemeClr val="tx1"/>
             </a:fontRef>
           </p:style>
+        </p:cxnSp>
+        <p:sp>
+          <p:nvSpPr>
+            <p:cNvPr id="66" name="Rectangle 62"/>
+            <p:cNvSpPr/>
+            <p:nvPr/>
+          </p:nvSpPr>
+          <p:spPr>
+            <a:xfrm>
+              <a:off x="3791146" y="4295233"/>
+              <a:ext cx="1371600" cy="346760"/>
+            </a:xfrm>
+            <a:prstGeom prst="rect">
+              <a:avLst/>
+            </a:prstGeom>
+            <a:solidFill>
+              <a:schemeClr val="accent5">
+                <a:lumMod val="75000"/>
+              </a:schemeClr>
+            </a:solidFill>
+            <a:ln w="19050">
+              <a:solidFill>
+                <a:schemeClr val="accent5">
+                  <a:lumMod val="75000"/>
+                </a:schemeClr>
+              </a:solidFill>
+            </a:ln>
+            <a:effectLst/>
+          </p:spPr>
+          <p:style>
+            <a:lnRef idx="1">
+              <a:schemeClr val="accent2"/>
+            </a:lnRef>
+            <a:fillRef idx="2">
+              <a:schemeClr val="accent2"/>
+            </a:fillRef>
+            <a:effectRef idx="1">
+              <a:schemeClr val="accent2"/>
+            </a:effectRef>
+            <a:fontRef idx="minor">
+              <a:schemeClr val="dk1"/>
+            </a:fontRef>
+          </p:style>
           <p:txBody>
             <a:bodyPr rtlCol="0" anchor="ctr"/>
             <a:lstStyle/>
             <a:p>
               <a:pPr algn="ctr"/>
-              <a:endParaRPr lang="en-SG"/>
+              <a:r>
+                <a:rPr lang="en-US" sz="1600" dirty="0" smtClean="0">
+                  <a:solidFill>
+                    <a:schemeClr val="bg1"/>
+                  </a:solidFill>
+                </a:rPr>
+                <a:t>:</a:t>
+              </a:r>
+              <a:r>
+                <a:rPr lang="en-US" sz="1600" dirty="0" err="1" smtClean="0">
+                  <a:solidFill>
+                    <a:schemeClr val="bg1"/>
+                  </a:solidFill>
+                </a:rPr>
+                <a:t>EventsCenter</a:t>
+              </a:r>
+              <a:endParaRPr lang="en-SG" sz="1600" dirty="0">
+                <a:solidFill>
+                  <a:schemeClr val="bg1"/>
+                </a:solidFill>
+              </a:endParaRPr>
             </a:p>
           </p:txBody>
         </p:sp>
+        <p:cxnSp>
+          <p:nvCxnSpPr>
+            <p:cNvPr id="67" name="Straight Connector 66"/>
+            <p:cNvCxnSpPr/>
+            <p:nvPr/>
+          </p:nvCxnSpPr>
+          <p:spPr>
+            <a:xfrm>
+              <a:off x="4456731" y="4648287"/>
+              <a:ext cx="0" cy="1723059"/>
+            </a:xfrm>
+            <a:prstGeom prst="line">
+              <a:avLst/>
+            </a:prstGeom>
+            <a:ln w="19050">
+              <a:solidFill>
+                <a:schemeClr val="accent5">
+                  <a:lumMod val="75000"/>
+                </a:schemeClr>
+              </a:solidFill>
+              <a:prstDash val="sysDash"/>
+            </a:ln>
+            <a:effectLst/>
+          </p:spPr>
+          <p:style>
+            <a:lnRef idx="1">
+              <a:schemeClr val="accent1"/>
+            </a:lnRef>
+            <a:fillRef idx="2">
+              <a:schemeClr val="accent1"/>
+            </a:fillRef>
+            <a:effectRef idx="1">
+              <a:schemeClr val="accent1"/>
+            </a:effectRef>
+            <a:fontRef idx="minor">
+              <a:schemeClr val="dk1"/>
+            </a:fontRef>
+          </p:style>
+        </p:cxnSp>
         <p:sp>
           <p:nvSpPr>
-            <p:cNvPr id="60" name="Rectangle 59"/>
+            <p:cNvPr id="68" name="Rectangle 67"/>
             <p:cNvSpPr/>
             <p:nvPr/>
           </p:nvSpPr>
           <p:spPr>
             <a:xfrm>
-              <a:off x="1147403" y="5712513"/>
-              <a:ext cx="98080" cy="169591"/>
+              <a:off x="4384723" y="5071220"/>
+              <a:ext cx="142006" cy="1036757"/>
             </a:xfrm>
             <a:prstGeom prst="rect">
               <a:avLst/>
             </a:prstGeom>
             <a:solidFill>
-              <a:schemeClr val="accent6">
+              <a:schemeClr val="accent5">
                 <a:lumMod val="75000"/>
               </a:schemeClr>
             </a:solidFill>
             <a:ln>
               <a:solidFill>
-                <a:schemeClr val="bg1"/>
+                <a:schemeClr val="accent5">
+                  <a:lumMod val="75000"/>
+                </a:schemeClr>
               </a:solidFill>
             </a:ln>
             <a:effectLst/>
@@ -5810,92 +3902,2022 @@
             </a:p>
           </p:txBody>
         </p:sp>
-      </p:grpSp>
-      <p:sp>
-        <p:nvSpPr>
-          <p:cNvPr id="61" name="TextBox 60"/>
-          <p:cNvSpPr txBox="1"/>
-          <p:nvPr/>
-        </p:nvSpPr>
-        <p:spPr>
-          <a:xfrm>
-            <a:off x="8223953" y="5180992"/>
-            <a:ext cx="539047" cy="430887"/>
-          </a:xfrm>
-          <a:prstGeom prst="rect">
-            <a:avLst/>
-          </a:prstGeom>
-          <a:noFill/>
-        </p:spPr>
-        <p:txBody>
-          <a:bodyPr wrap="square" lIns="0" tIns="0" rIns="0" bIns="0" rtlCol="0">
-            <a:spAutoFit/>
-          </a:bodyPr>
-          <a:lstStyle/>
-          <a:p>
-            <a:r>
-              <a:rPr lang="en-US" sz="1400" dirty="0" smtClean="0">
+        <p:cxnSp>
+          <p:nvCxnSpPr>
+            <p:cNvPr id="69" name="Straight Arrow Connector 68"/>
+            <p:cNvCxnSpPr/>
+            <p:nvPr/>
+          </p:nvCxnSpPr>
+          <p:spPr>
+            <a:xfrm>
+              <a:off x="3078929" y="5071220"/>
+              <a:ext cx="1295400" cy="0"/>
+            </a:xfrm>
+            <a:prstGeom prst="straightConnector1">
+              <a:avLst/>
+            </a:prstGeom>
+            <a:ln w="19050">
+              <a:solidFill>
+                <a:srgbClr val="7030A0"/>
+              </a:solidFill>
+              <a:tailEnd type="arrow"/>
+            </a:ln>
+          </p:spPr>
+          <p:style>
+            <a:lnRef idx="1">
+              <a:schemeClr val="accent1"/>
+            </a:lnRef>
+            <a:fillRef idx="0">
+              <a:schemeClr val="accent1"/>
+            </a:fillRef>
+            <a:effectRef idx="0">
+              <a:schemeClr val="accent1"/>
+            </a:effectRef>
+            <a:fontRef idx="minor">
+              <a:schemeClr val="tx1"/>
+            </a:fontRef>
+          </p:style>
+        </p:cxnSp>
+        <p:cxnSp>
+          <p:nvCxnSpPr>
+            <p:cNvPr id="70" name="Straight Arrow Connector 69"/>
+            <p:cNvCxnSpPr/>
+            <p:nvPr/>
+          </p:nvCxnSpPr>
+          <p:spPr>
+            <a:xfrm>
+              <a:off x="2975642" y="6107977"/>
+              <a:ext cx="1448755" cy="0"/>
+            </a:xfrm>
+            <a:prstGeom prst="straightConnector1">
+              <a:avLst/>
+            </a:prstGeom>
+            <a:ln w="19050">
+              <a:solidFill>
+                <a:schemeClr val="accent5">
+                  <a:lumMod val="75000"/>
+                </a:schemeClr>
+              </a:solidFill>
+              <a:prstDash val="sysDash"/>
+              <a:headEnd type="arrow" w="med" len="med"/>
+              <a:tailEnd type="none" w="med" len="med"/>
+            </a:ln>
+          </p:spPr>
+          <p:style>
+            <a:lnRef idx="1">
+              <a:schemeClr val="accent1"/>
+            </a:lnRef>
+            <a:fillRef idx="0">
+              <a:schemeClr val="accent1"/>
+            </a:fillRef>
+            <a:effectRef idx="0">
+              <a:schemeClr val="accent1"/>
+            </a:effectRef>
+            <a:fontRef idx="minor">
+              <a:schemeClr val="tx1"/>
+            </a:fontRef>
+          </p:style>
+        </p:cxnSp>
+        <p:cxnSp>
+          <p:nvCxnSpPr>
+            <p:cNvPr id="72" name="Straight Arrow Connector 71"/>
+            <p:cNvCxnSpPr/>
+            <p:nvPr/>
+          </p:nvCxnSpPr>
+          <p:spPr>
+            <a:xfrm>
+              <a:off x="4526729" y="5341014"/>
+              <a:ext cx="3318258" cy="0"/>
+            </a:xfrm>
+            <a:prstGeom prst="straightConnector1">
+              <a:avLst/>
+            </a:prstGeom>
+            <a:ln w="19050">
+              <a:solidFill>
+                <a:schemeClr val="accent5">
+                  <a:lumMod val="75000"/>
+                </a:schemeClr>
+              </a:solidFill>
+              <a:headEnd type="none" w="med" len="med"/>
+              <a:tailEnd type="arrow" w="med" len="med"/>
+            </a:ln>
+          </p:spPr>
+          <p:style>
+            <a:lnRef idx="1">
+              <a:schemeClr val="accent1"/>
+            </a:lnRef>
+            <a:fillRef idx="0">
+              <a:schemeClr val="accent1"/>
+            </a:fillRef>
+            <a:effectRef idx="0">
+              <a:schemeClr val="accent1"/>
+            </a:effectRef>
+            <a:fontRef idx="minor">
+              <a:schemeClr val="tx1"/>
+            </a:fontRef>
+          </p:style>
+        </p:cxnSp>
+        <p:sp>
+          <p:nvSpPr>
+            <p:cNvPr id="74" name="TextBox 73"/>
+            <p:cNvSpPr txBox="1"/>
+            <p:nvPr/>
+          </p:nvSpPr>
+          <p:spPr>
+            <a:xfrm>
+              <a:off x="5080483" y="5088659"/>
+              <a:ext cx="2659870" cy="184666"/>
+            </a:xfrm>
+            <a:prstGeom prst="rect">
+              <a:avLst/>
+            </a:prstGeom>
+            <a:noFill/>
+          </p:spPr>
+          <p:txBody>
+            <a:bodyPr wrap="square" lIns="0" tIns="0" rIns="0" bIns="0" rtlCol="0">
+              <a:spAutoFit/>
+            </a:bodyPr>
+            <a:lstStyle/>
+            <a:p>
+              <a:r>
+                <a:rPr lang="en-US" sz="1200" dirty="0" err="1" smtClean="0">
+                  <a:solidFill>
+                    <a:schemeClr val="accent6">
+                      <a:lumMod val="75000"/>
+                    </a:schemeClr>
+                  </a:solidFill>
+                </a:rPr>
+                <a:t>handleTaskManagerChangedEvent</a:t>
+              </a:r>
+              <a:r>
+                <a:rPr lang="en-US" sz="1200" dirty="0" smtClean="0">
+                  <a:solidFill>
+                    <a:schemeClr val="accent6">
+                      <a:lumMod val="75000"/>
+                    </a:schemeClr>
+                  </a:solidFill>
+                </a:rPr>
+                <a:t>()</a:t>
+              </a:r>
+              <a:endParaRPr lang="en-US" sz="1200" dirty="0">
                 <a:solidFill>
                   <a:schemeClr val="accent6">
                     <a:lumMod val="75000"/>
                   </a:schemeClr>
                 </a:solidFill>
-              </a:rPr>
-              <a:t>Save </a:t>
-            </a:r>
-            <a:br>
-              <a:rPr lang="en-US" sz="1400" dirty="0" smtClean="0">
+              </a:endParaRPr>
+            </a:p>
+          </p:txBody>
+        </p:sp>
+        <p:sp>
+          <p:nvSpPr>
+            <p:cNvPr id="45" name="Rectangle 62"/>
+            <p:cNvSpPr/>
+            <p:nvPr/>
+          </p:nvSpPr>
+          <p:spPr>
+            <a:xfrm>
+              <a:off x="721634" y="4278322"/>
+              <a:ext cx="1093635" cy="346760"/>
+            </a:xfrm>
+            <a:prstGeom prst="rect">
+              <a:avLst/>
+            </a:prstGeom>
+            <a:solidFill>
+              <a:srgbClr val="00B050"/>
+            </a:solidFill>
+            <a:ln w="19050">
+              <a:solidFill>
+                <a:srgbClr val="00B050"/>
+              </a:solidFill>
+            </a:ln>
+            <a:effectLst/>
+          </p:spPr>
+          <p:style>
+            <a:lnRef idx="1">
+              <a:schemeClr val="accent2"/>
+            </a:lnRef>
+            <a:fillRef idx="2">
+              <a:schemeClr val="accent2"/>
+            </a:fillRef>
+            <a:effectRef idx="1">
+              <a:schemeClr val="accent2"/>
+            </a:effectRef>
+            <a:fontRef idx="minor">
+              <a:schemeClr val="dk1"/>
+            </a:fontRef>
+          </p:style>
+          <p:txBody>
+            <a:bodyPr rtlCol="0" anchor="ctr"/>
+            <a:lstStyle/>
+            <a:p>
+              <a:pPr algn="ctr"/>
+              <a:r>
+                <a:rPr lang="en-US" sz="1600" dirty="0" smtClean="0">
+                  <a:solidFill>
+                    <a:schemeClr val="bg1"/>
+                  </a:solidFill>
+                </a:rPr>
+                <a:t>:UI</a:t>
+              </a:r>
+              <a:endParaRPr lang="en-SG" sz="1600" dirty="0">
+                <a:solidFill>
+                  <a:schemeClr val="bg1"/>
+                </a:solidFill>
+              </a:endParaRPr>
+            </a:p>
+          </p:txBody>
+        </p:sp>
+        <p:cxnSp>
+          <p:nvCxnSpPr>
+            <p:cNvPr id="46" name="Straight Connector 45"/>
+            <p:cNvCxnSpPr/>
+            <p:nvPr/>
+          </p:nvCxnSpPr>
+          <p:spPr>
+            <a:xfrm>
+              <a:off x="1268451" y="4641993"/>
+              <a:ext cx="0" cy="1723059"/>
+            </a:xfrm>
+            <a:prstGeom prst="line">
+              <a:avLst/>
+            </a:prstGeom>
+            <a:ln w="19050">
+              <a:solidFill>
+                <a:srgbClr val="00B050"/>
+              </a:solidFill>
+              <a:prstDash val="sysDash"/>
+            </a:ln>
+            <a:effectLst/>
+          </p:spPr>
+          <p:style>
+            <a:lnRef idx="1">
+              <a:schemeClr val="accent1"/>
+            </a:lnRef>
+            <a:fillRef idx="2">
+              <a:schemeClr val="accent1"/>
+            </a:fillRef>
+            <a:effectRef idx="1">
+              <a:schemeClr val="accent1"/>
+            </a:effectRef>
+            <a:fontRef idx="minor">
+              <a:schemeClr val="dk1"/>
+            </a:fontRef>
+          </p:style>
+        </p:cxnSp>
+        <p:sp>
+          <p:nvSpPr>
+            <p:cNvPr id="47" name="Rectangle 46"/>
+            <p:cNvSpPr/>
+            <p:nvPr/>
+          </p:nvSpPr>
+          <p:spPr>
+            <a:xfrm>
+              <a:off x="1196443" y="5670472"/>
+              <a:ext cx="130545" cy="273128"/>
+            </a:xfrm>
+            <a:prstGeom prst="rect">
+              <a:avLst/>
+            </a:prstGeom>
+            <a:solidFill>
+              <a:srgbClr val="00B050"/>
+            </a:solidFill>
+            <a:ln>
+              <a:solidFill>
+                <a:srgbClr val="00B050"/>
+              </a:solidFill>
+            </a:ln>
+            <a:effectLst/>
+          </p:spPr>
+          <p:style>
+            <a:lnRef idx="1">
+              <a:schemeClr val="accent3"/>
+            </a:lnRef>
+            <a:fillRef idx="2">
+              <a:schemeClr val="accent3"/>
+            </a:fillRef>
+            <a:effectRef idx="1">
+              <a:schemeClr val="accent3"/>
+            </a:effectRef>
+            <a:fontRef idx="minor">
+              <a:schemeClr val="dk1"/>
+            </a:fontRef>
+          </p:style>
+          <p:txBody>
+            <a:bodyPr rtlCol="0" anchor="ctr"/>
+            <a:lstStyle/>
+            <a:p>
+              <a:pPr algn="ctr"/>
+              <a:endParaRPr lang="en-SG" sz="1400">
+                <a:solidFill>
+                  <a:schemeClr val="dk1"/>
+                </a:solidFill>
+              </a:endParaRPr>
+            </a:p>
+          </p:txBody>
+        </p:sp>
+        <p:cxnSp>
+          <p:nvCxnSpPr>
+            <p:cNvPr id="48" name="Straight Arrow Connector 47"/>
+            <p:cNvCxnSpPr/>
+            <p:nvPr/>
+          </p:nvCxnSpPr>
+          <p:spPr>
+            <a:xfrm flipH="1">
+              <a:off x="1348843" y="5943600"/>
+              <a:ext cx="3061842" cy="0"/>
+            </a:xfrm>
+            <a:prstGeom prst="straightConnector1">
+              <a:avLst/>
+            </a:prstGeom>
+            <a:ln w="19050">
+              <a:solidFill>
+                <a:srgbClr val="00B050"/>
+              </a:solidFill>
+              <a:prstDash val="sysDash"/>
+              <a:headEnd type="arrow" w="med" len="med"/>
+              <a:tailEnd type="none" w="med" len="med"/>
+            </a:ln>
+          </p:spPr>
+          <p:style>
+            <a:lnRef idx="1">
+              <a:schemeClr val="accent1"/>
+            </a:lnRef>
+            <a:fillRef idx="0">
+              <a:schemeClr val="accent1"/>
+            </a:fillRef>
+            <a:effectRef idx="0">
+              <a:schemeClr val="accent1"/>
+            </a:effectRef>
+            <a:fontRef idx="minor">
+              <a:schemeClr val="tx1"/>
+            </a:fontRef>
+          </p:style>
+        </p:cxnSp>
+        <p:cxnSp>
+          <p:nvCxnSpPr>
+            <p:cNvPr id="49" name="Straight Arrow Connector 48"/>
+            <p:cNvCxnSpPr/>
+            <p:nvPr/>
+          </p:nvCxnSpPr>
+          <p:spPr>
+            <a:xfrm>
+              <a:off x="1348843" y="5670472"/>
+              <a:ext cx="3061841" cy="0"/>
+            </a:xfrm>
+            <a:prstGeom prst="straightConnector1">
+              <a:avLst/>
+            </a:prstGeom>
+            <a:ln w="19050">
+              <a:solidFill>
+                <a:schemeClr val="accent5">
+                  <a:lumMod val="75000"/>
+                </a:schemeClr>
+              </a:solidFill>
+              <a:headEnd type="arrow" w="med" len="med"/>
+              <a:tailEnd type="none" w="med" len="med"/>
+            </a:ln>
+          </p:spPr>
+          <p:style>
+            <a:lnRef idx="1">
+              <a:schemeClr val="accent1"/>
+            </a:lnRef>
+            <a:fillRef idx="0">
+              <a:schemeClr val="accent1"/>
+            </a:fillRef>
+            <a:effectRef idx="0">
+              <a:schemeClr val="accent1"/>
+            </a:effectRef>
+            <a:fontRef idx="minor">
+              <a:schemeClr val="tx1"/>
+            </a:fontRef>
+          </p:style>
+        </p:cxnSp>
+        <p:sp>
+          <p:nvSpPr>
+            <p:cNvPr id="50" name="TextBox 49"/>
+            <p:cNvSpPr txBox="1"/>
+            <p:nvPr/>
+          </p:nvSpPr>
+          <p:spPr>
+            <a:xfrm>
+              <a:off x="1683652" y="5428605"/>
+              <a:ext cx="2659870" cy="184666"/>
+            </a:xfrm>
+            <a:prstGeom prst="rect">
+              <a:avLst/>
+            </a:prstGeom>
+            <a:noFill/>
+          </p:spPr>
+          <p:txBody>
+            <a:bodyPr wrap="square" lIns="0" tIns="0" rIns="0" bIns="0" rtlCol="0">
+              <a:spAutoFit/>
+            </a:bodyPr>
+            <a:lstStyle/>
+            <a:p>
+              <a:r>
+                <a:rPr lang="en-US" sz="1200" dirty="0" err="1" smtClean="0">
+                  <a:solidFill>
+                    <a:srgbClr val="00B050"/>
+                  </a:solidFill>
+                </a:rPr>
+                <a:t>handleTaskManagerChangedEvent</a:t>
+              </a:r>
+              <a:r>
+                <a:rPr lang="en-US" sz="1200" dirty="0" smtClean="0">
+                  <a:solidFill>
+                    <a:srgbClr val="00B050"/>
+                  </a:solidFill>
+                </a:rPr>
+                <a:t>()</a:t>
+              </a:r>
+              <a:endParaRPr lang="en-US" sz="1200" dirty="0">
+                <a:solidFill>
+                  <a:srgbClr val="00B050"/>
+                </a:solidFill>
+              </a:endParaRPr>
+            </a:p>
+          </p:txBody>
+        </p:sp>
+        <p:grpSp>
+          <p:nvGrpSpPr>
+            <p:cNvPr id="13" name="Group 12"/>
+            <p:cNvGrpSpPr/>
+            <p:nvPr/>
+          </p:nvGrpSpPr>
+          <p:grpSpPr>
+            <a:xfrm>
+              <a:off x="1028134" y="5612032"/>
+              <a:ext cx="217349" cy="270072"/>
+              <a:chOff x="1028134" y="5612032"/>
+              <a:chExt cx="217349" cy="270072"/>
+            </a:xfrm>
+          </p:grpSpPr>
+          <p:sp>
+            <p:nvSpPr>
+              <p:cNvPr id="12" name="Freeform 11"/>
+              <p:cNvSpPr/>
+              <p:nvPr/>
+            </p:nvSpPr>
+            <p:spPr>
+              <a:xfrm rot="2600998" flipH="1" flipV="1">
+                <a:off x="1028134" y="5612032"/>
+                <a:ext cx="167452" cy="116880"/>
+              </a:xfrm>
+              <a:custGeom>
+                <a:avLst/>
+                <a:gdLst>
+                  <a:gd name="connsiteX0" fmla="*/ 0 w 226400"/>
+                  <a:gd name="connsiteY0" fmla="*/ 32920 h 171466"/>
+                  <a:gd name="connsiteX1" fmla="*/ 157018 w 226400"/>
+                  <a:gd name="connsiteY1" fmla="*/ 5211 h 171466"/>
+                  <a:gd name="connsiteX2" fmla="*/ 221673 w 226400"/>
+                  <a:gd name="connsiteY2" fmla="*/ 125284 h 171466"/>
+                  <a:gd name="connsiteX3" fmla="*/ 36945 w 226400"/>
+                  <a:gd name="connsiteY3" fmla="*/ 171466 h 171466"/>
+                </a:gdLst>
+                <a:ahLst/>
+                <a:cxnLst>
+                  <a:cxn ang="0">
+                    <a:pos x="connsiteX0" y="connsiteY0"/>
+                  </a:cxn>
+                  <a:cxn ang="0">
+                    <a:pos x="connsiteX1" y="connsiteY1"/>
+                  </a:cxn>
+                  <a:cxn ang="0">
+                    <a:pos x="connsiteX2" y="connsiteY2"/>
+                  </a:cxn>
+                  <a:cxn ang="0">
+                    <a:pos x="connsiteX3" y="connsiteY3"/>
+                  </a:cxn>
+                </a:cxnLst>
+                <a:rect l="l" t="t" r="r" b="b"/>
+                <a:pathLst>
+                  <a:path w="226400" h="171466">
+                    <a:moveTo>
+                      <a:pt x="0" y="32920"/>
+                    </a:moveTo>
+                    <a:cubicBezTo>
+                      <a:pt x="60036" y="11368"/>
+                      <a:pt x="120073" y="-10183"/>
+                      <a:pt x="157018" y="5211"/>
+                    </a:cubicBezTo>
+                    <a:cubicBezTo>
+                      <a:pt x="193963" y="20605"/>
+                      <a:pt x="241685" y="97575"/>
+                      <a:pt x="221673" y="125284"/>
+                    </a:cubicBezTo>
+                    <a:cubicBezTo>
+                      <a:pt x="201661" y="152993"/>
+                      <a:pt x="119303" y="162229"/>
+                      <a:pt x="36945" y="171466"/>
+                    </a:cubicBezTo>
+                  </a:path>
+                </a:pathLst>
+              </a:custGeom>
+              <a:ln w="19050">
+                <a:solidFill>
+                  <a:srgbClr val="00B050"/>
+                </a:solidFill>
+                <a:headEnd type="arrow" w="med" len="med"/>
+                <a:tailEnd type="none" w="med" len="med"/>
+              </a:ln>
+            </p:spPr>
+            <p:style>
+              <a:lnRef idx="1">
+                <a:schemeClr val="accent1"/>
+              </a:lnRef>
+              <a:fillRef idx="0">
+                <a:schemeClr val="accent1"/>
+              </a:fillRef>
+              <a:effectRef idx="0">
+                <a:schemeClr val="accent1"/>
+              </a:effectRef>
+              <a:fontRef idx="minor">
+                <a:schemeClr val="tx1"/>
+              </a:fontRef>
+            </p:style>
+            <p:txBody>
+              <a:bodyPr rtlCol="0" anchor="ctr"/>
+              <a:lstStyle/>
+              <a:p>
+                <a:pPr algn="ctr"/>
+                <a:endParaRPr lang="en-SG"/>
+              </a:p>
+            </p:txBody>
+          </p:sp>
+          <p:sp>
+            <p:nvSpPr>
+              <p:cNvPr id="56" name="Rectangle 55"/>
+              <p:cNvSpPr/>
+              <p:nvPr/>
+            </p:nvSpPr>
+            <p:spPr>
+              <a:xfrm>
+                <a:off x="1147403" y="5712513"/>
+                <a:ext cx="98080" cy="169591"/>
+              </a:xfrm>
+              <a:prstGeom prst="rect">
+                <a:avLst/>
+              </a:prstGeom>
+              <a:solidFill>
+                <a:srgbClr val="00B050"/>
+              </a:solidFill>
+              <a:ln>
+                <a:solidFill>
+                  <a:schemeClr val="bg1"/>
+                </a:solidFill>
+              </a:ln>
+              <a:effectLst/>
+            </p:spPr>
+            <p:style>
+              <a:lnRef idx="1">
+                <a:schemeClr val="accent3"/>
+              </a:lnRef>
+              <a:fillRef idx="2">
+                <a:schemeClr val="accent3"/>
+              </a:fillRef>
+              <a:effectRef idx="1">
+                <a:schemeClr val="accent3"/>
+              </a:effectRef>
+              <a:fontRef idx="minor">
+                <a:schemeClr val="dk1"/>
+              </a:fontRef>
+            </p:style>
+            <p:txBody>
+              <a:bodyPr rtlCol="0" anchor="ctr"/>
+              <a:lstStyle/>
+              <a:p>
+                <a:pPr algn="ctr"/>
+                <a:endParaRPr lang="en-SG" sz="1400">
+                  <a:solidFill>
+                    <a:schemeClr val="dk1"/>
+                  </a:solidFill>
+                </a:endParaRPr>
+              </a:p>
+            </p:txBody>
+          </p:sp>
+        </p:grpSp>
+        <p:sp>
+          <p:nvSpPr>
+            <p:cNvPr id="57" name="TextBox 56"/>
+            <p:cNvSpPr txBox="1"/>
+            <p:nvPr/>
+          </p:nvSpPr>
+          <p:spPr>
+            <a:xfrm>
+              <a:off x="194562" y="5444571"/>
+              <a:ext cx="794081" cy="430887"/>
+            </a:xfrm>
+            <a:prstGeom prst="rect">
+              <a:avLst/>
+            </a:prstGeom>
+            <a:noFill/>
+          </p:spPr>
+          <p:txBody>
+            <a:bodyPr wrap="square" lIns="0" tIns="0" rIns="0" bIns="0" rtlCol="0">
+              <a:spAutoFit/>
+            </a:bodyPr>
+            <a:lstStyle/>
+            <a:p>
+              <a:pPr algn="r"/>
+              <a:r>
+                <a:rPr lang="en-US" sz="1400" dirty="0" smtClean="0">
+                  <a:solidFill>
+                    <a:srgbClr val="00B050"/>
+                  </a:solidFill>
+                </a:rPr>
+                <a:t>Update status bar</a:t>
+              </a:r>
+              <a:endParaRPr lang="en-US" sz="1400" dirty="0">
+                <a:solidFill>
+                  <a:srgbClr val="00B050"/>
+                </a:solidFill>
+              </a:endParaRPr>
+            </a:p>
+          </p:txBody>
+        </p:sp>
+        <p:grpSp>
+          <p:nvGrpSpPr>
+            <p:cNvPr id="58" name="Group 57"/>
+            <p:cNvGrpSpPr/>
+            <p:nvPr/>
+          </p:nvGrpSpPr>
+          <p:grpSpPr>
+            <a:xfrm flipH="1">
+              <a:off x="7936842" y="5335662"/>
+              <a:ext cx="217349" cy="270072"/>
+              <a:chOff x="1028134" y="5612032"/>
+              <a:chExt cx="217349" cy="270072"/>
+            </a:xfrm>
+          </p:grpSpPr>
+          <p:sp>
+            <p:nvSpPr>
+              <p:cNvPr id="59" name="Freeform 58"/>
+              <p:cNvSpPr/>
+              <p:nvPr/>
+            </p:nvSpPr>
+            <p:spPr>
+              <a:xfrm rot="2600998" flipH="1" flipV="1">
+                <a:off x="1028134" y="5612032"/>
+                <a:ext cx="167452" cy="116880"/>
+              </a:xfrm>
+              <a:custGeom>
+                <a:avLst/>
+                <a:gdLst>
+                  <a:gd name="connsiteX0" fmla="*/ 0 w 226400"/>
+                  <a:gd name="connsiteY0" fmla="*/ 32920 h 171466"/>
+                  <a:gd name="connsiteX1" fmla="*/ 157018 w 226400"/>
+                  <a:gd name="connsiteY1" fmla="*/ 5211 h 171466"/>
+                  <a:gd name="connsiteX2" fmla="*/ 221673 w 226400"/>
+                  <a:gd name="connsiteY2" fmla="*/ 125284 h 171466"/>
+                  <a:gd name="connsiteX3" fmla="*/ 36945 w 226400"/>
+                  <a:gd name="connsiteY3" fmla="*/ 171466 h 171466"/>
+                </a:gdLst>
+                <a:ahLst/>
+                <a:cxnLst>
+                  <a:cxn ang="0">
+                    <a:pos x="connsiteX0" y="connsiteY0"/>
+                  </a:cxn>
+                  <a:cxn ang="0">
+                    <a:pos x="connsiteX1" y="connsiteY1"/>
+                  </a:cxn>
+                  <a:cxn ang="0">
+                    <a:pos x="connsiteX2" y="connsiteY2"/>
+                  </a:cxn>
+                  <a:cxn ang="0">
+                    <a:pos x="connsiteX3" y="connsiteY3"/>
+                  </a:cxn>
+                </a:cxnLst>
+                <a:rect l="l" t="t" r="r" b="b"/>
+                <a:pathLst>
+                  <a:path w="226400" h="171466">
+                    <a:moveTo>
+                      <a:pt x="0" y="32920"/>
+                    </a:moveTo>
+                    <a:cubicBezTo>
+                      <a:pt x="60036" y="11368"/>
+                      <a:pt x="120073" y="-10183"/>
+                      <a:pt x="157018" y="5211"/>
+                    </a:cubicBezTo>
+                    <a:cubicBezTo>
+                      <a:pt x="193963" y="20605"/>
+                      <a:pt x="241685" y="97575"/>
+                      <a:pt x="221673" y="125284"/>
+                    </a:cubicBezTo>
+                    <a:cubicBezTo>
+                      <a:pt x="201661" y="152993"/>
+                      <a:pt x="119303" y="162229"/>
+                      <a:pt x="36945" y="171466"/>
+                    </a:cubicBezTo>
+                  </a:path>
+                </a:pathLst>
+              </a:custGeom>
+              <a:ln w="19050">
                 <a:solidFill>
                   <a:schemeClr val="accent6">
                     <a:lumMod val="75000"/>
                   </a:schemeClr>
                 </a:solidFill>
-              </a:rPr>
-            </a:br>
-            <a:r>
-              <a:rPr lang="en-US" sz="1400" dirty="0" smtClean="0">
+                <a:headEnd type="arrow" w="med" len="med"/>
+                <a:tailEnd type="none" w="med" len="med"/>
+              </a:ln>
+            </p:spPr>
+            <p:style>
+              <a:lnRef idx="1">
+                <a:schemeClr val="accent1"/>
+              </a:lnRef>
+              <a:fillRef idx="0">
+                <a:schemeClr val="accent1"/>
+              </a:fillRef>
+              <a:effectRef idx="0">
+                <a:schemeClr val="accent1"/>
+              </a:effectRef>
+              <a:fontRef idx="minor">
+                <a:schemeClr val="tx1"/>
+              </a:fontRef>
+            </p:style>
+            <p:txBody>
+              <a:bodyPr rtlCol="0" anchor="ctr"/>
+              <a:lstStyle/>
+              <a:p>
+                <a:pPr algn="ctr"/>
+                <a:endParaRPr lang="en-SG"/>
+              </a:p>
+            </p:txBody>
+          </p:sp>
+          <p:sp>
+            <p:nvSpPr>
+              <p:cNvPr id="60" name="Rectangle 59"/>
+              <p:cNvSpPr/>
+              <p:nvPr/>
+            </p:nvSpPr>
+            <p:spPr>
+              <a:xfrm>
+                <a:off x="1147403" y="5712513"/>
+                <a:ext cx="98080" cy="169591"/>
+              </a:xfrm>
+              <a:prstGeom prst="rect">
+                <a:avLst/>
+              </a:prstGeom>
+              <a:solidFill>
+                <a:schemeClr val="accent6">
+                  <a:lumMod val="75000"/>
+                </a:schemeClr>
+              </a:solidFill>
+              <a:ln>
+                <a:solidFill>
+                  <a:schemeClr val="bg1"/>
+                </a:solidFill>
+              </a:ln>
+              <a:effectLst/>
+            </p:spPr>
+            <p:style>
+              <a:lnRef idx="1">
+                <a:schemeClr val="accent3"/>
+              </a:lnRef>
+              <a:fillRef idx="2">
+                <a:schemeClr val="accent3"/>
+              </a:fillRef>
+              <a:effectRef idx="1">
+                <a:schemeClr val="accent3"/>
+              </a:effectRef>
+              <a:fontRef idx="minor">
+                <a:schemeClr val="dk1"/>
+              </a:fontRef>
+            </p:style>
+            <p:txBody>
+              <a:bodyPr rtlCol="0" anchor="ctr"/>
+              <a:lstStyle/>
+              <a:p>
+                <a:pPr algn="ctr"/>
+                <a:endParaRPr lang="en-SG" sz="1400">
+                  <a:solidFill>
+                    <a:schemeClr val="dk1"/>
+                  </a:solidFill>
+                </a:endParaRPr>
+              </a:p>
+            </p:txBody>
+          </p:sp>
+        </p:grpSp>
+        <p:sp>
+          <p:nvSpPr>
+            <p:cNvPr id="61" name="TextBox 60"/>
+            <p:cNvSpPr txBox="1"/>
+            <p:nvPr/>
+          </p:nvSpPr>
+          <p:spPr>
+            <a:xfrm>
+              <a:off x="8223953" y="5180992"/>
+              <a:ext cx="539047" cy="430887"/>
+            </a:xfrm>
+            <a:prstGeom prst="rect">
+              <a:avLst/>
+            </a:prstGeom>
+            <a:noFill/>
+          </p:spPr>
+          <p:txBody>
+            <a:bodyPr wrap="square" lIns="0" tIns="0" rIns="0" bIns="0" rtlCol="0">
+              <a:spAutoFit/>
+            </a:bodyPr>
+            <a:lstStyle/>
+            <a:p>
+              <a:r>
+                <a:rPr lang="en-US" sz="1400" dirty="0" smtClean="0">
+                  <a:solidFill>
+                    <a:schemeClr val="accent6">
+                      <a:lumMod val="75000"/>
+                    </a:schemeClr>
+                  </a:solidFill>
+                </a:rPr>
+                <a:t>Save </a:t>
+              </a:r>
+              <a:br>
+                <a:rPr lang="en-US" sz="1400" dirty="0" smtClean="0">
+                  <a:solidFill>
+                    <a:schemeClr val="accent6">
+                      <a:lumMod val="75000"/>
+                    </a:schemeClr>
+                  </a:solidFill>
+                </a:rPr>
+              </a:br>
+              <a:r>
+                <a:rPr lang="en-US" sz="1400" dirty="0" smtClean="0">
+                  <a:solidFill>
+                    <a:schemeClr val="accent6">
+                      <a:lumMod val="75000"/>
+                    </a:schemeClr>
+                  </a:solidFill>
+                </a:rPr>
+                <a:t>to file</a:t>
+              </a:r>
+              <a:endParaRPr lang="en-US" sz="1400" dirty="0">
                 <a:solidFill>
                   <a:schemeClr val="accent6">
                     <a:lumMod val="75000"/>
                   </a:schemeClr>
                 </a:solidFill>
-              </a:rPr>
-              <a:t>to file</a:t>
-            </a:r>
-            <a:endParaRPr lang="en-US" sz="1400" dirty="0">
+              </a:endParaRPr>
+            </a:p>
+          </p:txBody>
+        </p:sp>
+      </p:grpSp>
+      <p:grpSp>
+        <p:nvGrpSpPr>
+          <p:cNvPr id="4" name="Group 3"/>
+          <p:cNvGrpSpPr/>
+          <p:nvPr/>
+        </p:nvGrpSpPr>
+        <p:grpSpPr>
+          <a:xfrm>
+            <a:off x="37791" y="417689"/>
+            <a:ext cx="9030009" cy="2280654"/>
+            <a:chOff x="37791" y="417689"/>
+            <a:chExt cx="9030009" cy="2280654"/>
+          </a:xfrm>
+        </p:grpSpPr>
+        <p:sp>
+          <p:nvSpPr>
+            <p:cNvPr id="2" name="Rectangle 62"/>
+            <p:cNvSpPr/>
+            <p:nvPr/>
+          </p:nvSpPr>
+          <p:spPr>
+            <a:xfrm>
+              <a:off x="1111860" y="607926"/>
+              <a:ext cx="1093635" cy="346760"/>
+            </a:xfrm>
+            <a:prstGeom prst="rect">
+              <a:avLst/>
+            </a:prstGeom>
+            <a:solidFill>
+              <a:srgbClr val="00B050"/>
+            </a:solidFill>
+            <a:ln w="19050">
               <a:solidFill>
-                <a:schemeClr val="accent6">
+                <a:srgbClr val="00B050"/>
+              </a:solidFill>
+            </a:ln>
+            <a:effectLst/>
+          </p:spPr>
+          <p:style>
+            <a:lnRef idx="1">
+              <a:schemeClr val="accent2"/>
+            </a:lnRef>
+            <a:fillRef idx="2">
+              <a:schemeClr val="accent2"/>
+            </a:fillRef>
+            <a:effectRef idx="1">
+              <a:schemeClr val="accent2"/>
+            </a:effectRef>
+            <a:fontRef idx="minor">
+              <a:schemeClr val="dk1"/>
+            </a:fontRef>
+          </p:style>
+          <p:txBody>
+            <a:bodyPr rtlCol="0" anchor="ctr"/>
+            <a:lstStyle/>
+            <a:p>
+              <a:pPr algn="ctr"/>
+              <a:r>
+                <a:rPr lang="en-US" sz="1600" dirty="0" smtClean="0">
+                  <a:solidFill>
+                    <a:schemeClr val="bg1"/>
+                  </a:solidFill>
+                </a:rPr>
+                <a:t>:UI</a:t>
+              </a:r>
+              <a:endParaRPr lang="en-SG" sz="1600" dirty="0">
+                <a:solidFill>
+                  <a:schemeClr val="bg1"/>
+                </a:solidFill>
+              </a:endParaRPr>
+            </a:p>
+          </p:txBody>
+        </p:sp>
+        <p:cxnSp>
+          <p:nvCxnSpPr>
+            <p:cNvPr id="5" name="Straight Connector 4"/>
+            <p:cNvCxnSpPr/>
+            <p:nvPr/>
+          </p:nvCxnSpPr>
+          <p:spPr>
+            <a:xfrm>
+              <a:off x="1658677" y="971597"/>
+              <a:ext cx="0" cy="1723059"/>
+            </a:xfrm>
+            <a:prstGeom prst="line">
+              <a:avLst/>
+            </a:prstGeom>
+            <a:ln w="19050">
+              <a:solidFill>
+                <a:srgbClr val="00B050"/>
+              </a:solidFill>
+              <a:prstDash val="sysDash"/>
+            </a:ln>
+            <a:effectLst/>
+          </p:spPr>
+          <p:style>
+            <a:lnRef idx="1">
+              <a:schemeClr val="accent1"/>
+            </a:lnRef>
+            <a:fillRef idx="2">
+              <a:schemeClr val="accent1"/>
+            </a:fillRef>
+            <a:effectRef idx="1">
+              <a:schemeClr val="accent1"/>
+            </a:effectRef>
+            <a:fontRef idx="minor">
+              <a:schemeClr val="dk1"/>
+            </a:fontRef>
+          </p:style>
+        </p:cxnSp>
+        <p:sp>
+          <p:nvSpPr>
+            <p:cNvPr id="6" name="Rectangle 5"/>
+            <p:cNvSpPr/>
+            <p:nvPr/>
+          </p:nvSpPr>
+          <p:spPr>
+            <a:xfrm>
+              <a:off x="1586669" y="1322292"/>
+              <a:ext cx="152400" cy="1019910"/>
+            </a:xfrm>
+            <a:prstGeom prst="rect">
+              <a:avLst/>
+            </a:prstGeom>
+            <a:solidFill>
+              <a:srgbClr val="00B050"/>
+            </a:solidFill>
+            <a:ln>
+              <a:solidFill>
+                <a:srgbClr val="00B050"/>
+              </a:solidFill>
+            </a:ln>
+            <a:effectLst/>
+          </p:spPr>
+          <p:style>
+            <a:lnRef idx="1">
+              <a:schemeClr val="accent3"/>
+            </a:lnRef>
+            <a:fillRef idx="2">
+              <a:schemeClr val="accent3"/>
+            </a:fillRef>
+            <a:effectRef idx="1">
+              <a:schemeClr val="accent3"/>
+            </a:effectRef>
+            <a:fontRef idx="minor">
+              <a:schemeClr val="dk1"/>
+            </a:fontRef>
+          </p:style>
+          <p:txBody>
+            <a:bodyPr rtlCol="0" anchor="ctr"/>
+            <a:lstStyle/>
+            <a:p>
+              <a:pPr algn="ctr"/>
+              <a:endParaRPr lang="en-SG" sz="1400">
+                <a:solidFill>
+                  <a:schemeClr val="dk1"/>
+                </a:solidFill>
+              </a:endParaRPr>
+            </a:p>
+          </p:txBody>
+        </p:sp>
+        <p:sp>
+          <p:nvSpPr>
+            <p:cNvPr id="16" name="Rectangle 62"/>
+            <p:cNvSpPr/>
+            <p:nvPr/>
+          </p:nvSpPr>
+          <p:spPr>
+            <a:xfrm>
+              <a:off x="3335583" y="611613"/>
+              <a:ext cx="1093635" cy="346760"/>
+            </a:xfrm>
+            <a:prstGeom prst="rect">
+              <a:avLst/>
+            </a:prstGeom>
+            <a:solidFill>
+              <a:srgbClr val="0070C0"/>
+            </a:solidFill>
+            <a:ln w="19050">
+              <a:solidFill>
+                <a:srgbClr val="0070C0"/>
+              </a:solidFill>
+            </a:ln>
+            <a:effectLst/>
+          </p:spPr>
+          <p:style>
+            <a:lnRef idx="1">
+              <a:schemeClr val="accent2"/>
+            </a:lnRef>
+            <a:fillRef idx="2">
+              <a:schemeClr val="accent2"/>
+            </a:fillRef>
+            <a:effectRef idx="1">
+              <a:schemeClr val="accent2"/>
+            </a:effectRef>
+            <a:fontRef idx="minor">
+              <a:schemeClr val="dk1"/>
+            </a:fontRef>
+          </p:style>
+          <p:txBody>
+            <a:bodyPr rtlCol="0" anchor="ctr"/>
+            <a:lstStyle/>
+            <a:p>
+              <a:pPr algn="ctr"/>
+              <a:r>
+                <a:rPr lang="en-US" sz="1600" dirty="0" smtClean="0">
+                  <a:solidFill>
+                    <a:schemeClr val="bg1"/>
+                  </a:solidFill>
+                </a:rPr>
+                <a:t>:Logic</a:t>
+              </a:r>
+              <a:endParaRPr lang="en-SG" sz="1600" dirty="0">
+                <a:solidFill>
+                  <a:schemeClr val="bg1"/>
+                </a:solidFill>
+              </a:endParaRPr>
+            </a:p>
+          </p:txBody>
+        </p:sp>
+        <p:cxnSp>
+          <p:nvCxnSpPr>
+            <p:cNvPr id="17" name="Straight Connector 16"/>
+            <p:cNvCxnSpPr/>
+            <p:nvPr/>
+          </p:nvCxnSpPr>
+          <p:spPr>
+            <a:xfrm>
+              <a:off x="3882400" y="975284"/>
+              <a:ext cx="0" cy="1723059"/>
+            </a:xfrm>
+            <a:prstGeom prst="line">
+              <a:avLst/>
+            </a:prstGeom>
+            <a:ln w="19050">
+              <a:solidFill>
+                <a:srgbClr val="0070C0"/>
+              </a:solidFill>
+              <a:prstDash val="sysDash"/>
+            </a:ln>
+            <a:effectLst/>
+          </p:spPr>
+          <p:style>
+            <a:lnRef idx="1">
+              <a:schemeClr val="accent1"/>
+            </a:lnRef>
+            <a:fillRef idx="2">
+              <a:schemeClr val="accent1"/>
+            </a:fillRef>
+            <a:effectRef idx="1">
+              <a:schemeClr val="accent1"/>
+            </a:effectRef>
+            <a:fontRef idx="minor">
+              <a:schemeClr val="dk1"/>
+            </a:fontRef>
+          </p:style>
+        </p:cxnSp>
+        <p:sp>
+          <p:nvSpPr>
+            <p:cNvPr id="18" name="Rectangle 17"/>
+            <p:cNvSpPr/>
+            <p:nvPr/>
+          </p:nvSpPr>
+          <p:spPr>
+            <a:xfrm>
+              <a:off x="3810392" y="1433477"/>
+              <a:ext cx="144016" cy="832525"/>
+            </a:xfrm>
+            <a:prstGeom prst="rect">
+              <a:avLst/>
+            </a:prstGeom>
+            <a:solidFill>
+              <a:srgbClr val="0070C0"/>
+            </a:solidFill>
+            <a:ln>
+              <a:solidFill>
+                <a:srgbClr val="0070C0"/>
+              </a:solidFill>
+            </a:ln>
+            <a:effectLst/>
+          </p:spPr>
+          <p:style>
+            <a:lnRef idx="1">
+              <a:schemeClr val="accent3"/>
+            </a:lnRef>
+            <a:fillRef idx="2">
+              <a:schemeClr val="accent3"/>
+            </a:fillRef>
+            <a:effectRef idx="1">
+              <a:schemeClr val="accent3"/>
+            </a:effectRef>
+            <a:fontRef idx="minor">
+              <a:schemeClr val="dk1"/>
+            </a:fontRef>
+          </p:style>
+          <p:txBody>
+            <a:bodyPr rtlCol="0" anchor="ctr"/>
+            <a:lstStyle/>
+            <a:p>
+              <a:pPr algn="ctr"/>
+              <a:endParaRPr lang="en-SG" sz="1400">
+                <a:solidFill>
+                  <a:schemeClr val="dk1"/>
+                </a:solidFill>
+              </a:endParaRPr>
+            </a:p>
+          </p:txBody>
+        </p:sp>
+        <p:sp>
+          <p:nvSpPr>
+            <p:cNvPr id="19" name="Rectangle 62"/>
+            <p:cNvSpPr/>
+            <p:nvPr/>
+          </p:nvSpPr>
+          <p:spPr>
+            <a:xfrm>
+              <a:off x="5316783" y="607926"/>
+              <a:ext cx="1093635" cy="346760"/>
+            </a:xfrm>
+            <a:prstGeom prst="rect">
+              <a:avLst/>
+            </a:prstGeom>
+            <a:solidFill>
+              <a:srgbClr val="7030A0"/>
+            </a:solidFill>
+            <a:ln w="19050">
+              <a:solidFill>
+                <a:srgbClr val="7030A0"/>
+              </a:solidFill>
+            </a:ln>
+            <a:effectLst/>
+          </p:spPr>
+          <p:style>
+            <a:lnRef idx="1">
+              <a:schemeClr val="accent2"/>
+            </a:lnRef>
+            <a:fillRef idx="2">
+              <a:schemeClr val="accent2"/>
+            </a:fillRef>
+            <a:effectRef idx="1">
+              <a:schemeClr val="accent2"/>
+            </a:effectRef>
+            <a:fontRef idx="minor">
+              <a:schemeClr val="dk1"/>
+            </a:fontRef>
+          </p:style>
+          <p:txBody>
+            <a:bodyPr rtlCol="0" anchor="ctr"/>
+            <a:lstStyle/>
+            <a:p>
+              <a:pPr algn="ctr"/>
+              <a:r>
+                <a:rPr lang="en-US" sz="1600" dirty="0" smtClean="0">
+                  <a:solidFill>
+                    <a:schemeClr val="bg1"/>
+                  </a:solidFill>
+                </a:rPr>
+                <a:t>:Model</a:t>
+              </a:r>
+              <a:endParaRPr lang="en-SG" sz="1600" dirty="0">
+                <a:solidFill>
+                  <a:schemeClr val="bg1"/>
+                </a:solidFill>
+              </a:endParaRPr>
+            </a:p>
+          </p:txBody>
+        </p:sp>
+        <p:cxnSp>
+          <p:nvCxnSpPr>
+            <p:cNvPr id="20" name="Straight Connector 19"/>
+            <p:cNvCxnSpPr/>
+            <p:nvPr/>
+          </p:nvCxnSpPr>
+          <p:spPr>
+            <a:xfrm>
+              <a:off x="5863600" y="971597"/>
+              <a:ext cx="0" cy="1723059"/>
+            </a:xfrm>
+            <a:prstGeom prst="line">
+              <a:avLst/>
+            </a:prstGeom>
+            <a:ln w="19050">
+              <a:solidFill>
+                <a:srgbClr val="7030A0"/>
+              </a:solidFill>
+              <a:prstDash val="sysDash"/>
+            </a:ln>
+            <a:effectLst/>
+          </p:spPr>
+          <p:style>
+            <a:lnRef idx="1">
+              <a:schemeClr val="accent1"/>
+            </a:lnRef>
+            <a:fillRef idx="2">
+              <a:schemeClr val="accent1"/>
+            </a:fillRef>
+            <a:effectRef idx="1">
+              <a:schemeClr val="accent1"/>
+            </a:effectRef>
+            <a:fontRef idx="minor">
+              <a:schemeClr val="dk1"/>
+            </a:fontRef>
+          </p:style>
+        </p:cxnSp>
+        <p:sp>
+          <p:nvSpPr>
+            <p:cNvPr id="21" name="Rectangle 20"/>
+            <p:cNvSpPr/>
+            <p:nvPr/>
+          </p:nvSpPr>
+          <p:spPr>
+            <a:xfrm>
+              <a:off x="5791592" y="1538408"/>
+              <a:ext cx="142006" cy="651394"/>
+            </a:xfrm>
+            <a:prstGeom prst="rect">
+              <a:avLst/>
+            </a:prstGeom>
+            <a:solidFill>
+              <a:srgbClr val="7030A0"/>
+            </a:solidFill>
+            <a:ln>
+              <a:solidFill>
+                <a:srgbClr val="7030A0"/>
+              </a:solidFill>
+            </a:ln>
+            <a:effectLst/>
+          </p:spPr>
+          <p:style>
+            <a:lnRef idx="1">
+              <a:schemeClr val="accent3"/>
+            </a:lnRef>
+            <a:fillRef idx="2">
+              <a:schemeClr val="accent3"/>
+            </a:fillRef>
+            <a:effectRef idx="1">
+              <a:schemeClr val="accent3"/>
+            </a:effectRef>
+            <a:fontRef idx="minor">
+              <a:schemeClr val="dk1"/>
+            </a:fontRef>
+          </p:style>
+          <p:txBody>
+            <a:bodyPr rtlCol="0" anchor="ctr"/>
+            <a:lstStyle/>
+            <a:p>
+              <a:pPr algn="ctr"/>
+              <a:endParaRPr lang="en-SG" sz="1400">
+                <a:solidFill>
+                  <a:schemeClr val="dk1"/>
+                </a:solidFill>
+              </a:endParaRPr>
+            </a:p>
+          </p:txBody>
+        </p:sp>
+        <p:cxnSp>
+          <p:nvCxnSpPr>
+            <p:cNvPr id="23" name="Straight Arrow Connector 22"/>
+            <p:cNvCxnSpPr/>
+            <p:nvPr/>
+          </p:nvCxnSpPr>
+          <p:spPr>
+            <a:xfrm>
+              <a:off x="466818" y="1325979"/>
+              <a:ext cx="1119851" cy="0"/>
+            </a:xfrm>
+            <a:prstGeom prst="straightConnector1">
+              <a:avLst/>
+            </a:prstGeom>
+            <a:ln w="19050">
+              <a:solidFill>
+                <a:schemeClr val="tx1"/>
+              </a:solidFill>
+              <a:tailEnd type="arrow"/>
+            </a:ln>
+          </p:spPr>
+          <p:style>
+            <a:lnRef idx="1">
+              <a:schemeClr val="accent1"/>
+            </a:lnRef>
+            <a:fillRef idx="0">
+              <a:schemeClr val="accent1"/>
+            </a:fillRef>
+            <a:effectRef idx="0">
+              <a:schemeClr val="accent1"/>
+            </a:effectRef>
+            <a:fontRef idx="minor">
+              <a:schemeClr val="tx1"/>
+            </a:fontRef>
+          </p:style>
+        </p:cxnSp>
+        <p:sp>
+          <p:nvSpPr>
+            <p:cNvPr id="24" name="TextBox 23"/>
+            <p:cNvSpPr txBox="1"/>
+            <p:nvPr/>
+          </p:nvSpPr>
+          <p:spPr>
+            <a:xfrm>
+              <a:off x="466818" y="1345880"/>
+              <a:ext cx="860170" cy="184666"/>
+            </a:xfrm>
+            <a:prstGeom prst="rect">
+              <a:avLst/>
+            </a:prstGeom>
+            <a:noFill/>
+          </p:spPr>
+          <p:txBody>
+            <a:bodyPr wrap="square" lIns="0" tIns="0" rIns="0" bIns="0" rtlCol="0">
+              <a:spAutoFit/>
+            </a:bodyPr>
+            <a:lstStyle/>
+            <a:p>
+              <a:r>
+                <a:rPr lang="en-US" sz="1200" dirty="0" smtClean="0"/>
+                <a:t>delete 1</a:t>
+              </a:r>
+              <a:endParaRPr lang="en-US" sz="1200" dirty="0"/>
+            </a:p>
+          </p:txBody>
+        </p:sp>
+        <p:cxnSp>
+          <p:nvCxnSpPr>
+            <p:cNvPr id="25" name="Straight Arrow Connector 24"/>
+            <p:cNvCxnSpPr/>
+            <p:nvPr/>
+          </p:nvCxnSpPr>
+          <p:spPr>
+            <a:xfrm>
+              <a:off x="1739069" y="1433478"/>
+              <a:ext cx="2071323" cy="0"/>
+            </a:xfrm>
+            <a:prstGeom prst="straightConnector1">
+              <a:avLst/>
+            </a:prstGeom>
+            <a:ln w="19050">
+              <a:solidFill>
+                <a:srgbClr val="00B050"/>
+              </a:solidFill>
+              <a:tailEnd type="arrow"/>
+            </a:ln>
+          </p:spPr>
+          <p:style>
+            <a:lnRef idx="1">
+              <a:schemeClr val="accent1"/>
+            </a:lnRef>
+            <a:fillRef idx="0">
+              <a:schemeClr val="accent1"/>
+            </a:fillRef>
+            <a:effectRef idx="0">
+              <a:schemeClr val="accent1"/>
+            </a:effectRef>
+            <a:fontRef idx="minor">
+              <a:schemeClr val="tx1"/>
+            </a:fontRef>
+          </p:style>
+        </p:cxnSp>
+        <p:sp>
+          <p:nvSpPr>
+            <p:cNvPr id="26" name="TextBox 25"/>
+            <p:cNvSpPr txBox="1"/>
+            <p:nvPr/>
+          </p:nvSpPr>
+          <p:spPr>
+            <a:xfrm>
+              <a:off x="2166172" y="1453379"/>
+              <a:ext cx="1424846" cy="184666"/>
+            </a:xfrm>
+            <a:prstGeom prst="rect">
+              <a:avLst/>
+            </a:prstGeom>
+            <a:noFill/>
+          </p:spPr>
+          <p:txBody>
+            <a:bodyPr wrap="square" lIns="0" tIns="0" rIns="0" bIns="0" rtlCol="0">
+              <a:spAutoFit/>
+            </a:bodyPr>
+            <a:lstStyle/>
+            <a:p>
+              <a:r>
+                <a:rPr lang="en-US" sz="1200" dirty="0" smtClean="0">
+                  <a:solidFill>
+                    <a:srgbClr val="0070C0"/>
+                  </a:solidFill>
+                </a:rPr>
+                <a:t>execute(“delete 1”)</a:t>
+              </a:r>
+              <a:endParaRPr lang="en-US" sz="1200" dirty="0">
+                <a:solidFill>
+                  <a:srgbClr val="0070C0"/>
+                </a:solidFill>
+              </a:endParaRPr>
+            </a:p>
+          </p:txBody>
+        </p:sp>
+        <p:cxnSp>
+          <p:nvCxnSpPr>
+            <p:cNvPr id="28" name="Straight Arrow Connector 27"/>
+            <p:cNvCxnSpPr/>
+            <p:nvPr/>
+          </p:nvCxnSpPr>
+          <p:spPr>
+            <a:xfrm>
+              <a:off x="3954408" y="1538409"/>
+              <a:ext cx="1837184" cy="0"/>
+            </a:xfrm>
+            <a:prstGeom prst="straightConnector1">
+              <a:avLst/>
+            </a:prstGeom>
+            <a:ln w="19050">
+              <a:solidFill>
+                <a:srgbClr val="0070C0"/>
+              </a:solidFill>
+              <a:tailEnd type="arrow"/>
+            </a:ln>
+          </p:spPr>
+          <p:style>
+            <a:lnRef idx="1">
+              <a:schemeClr val="accent1"/>
+            </a:lnRef>
+            <a:fillRef idx="0">
+              <a:schemeClr val="accent1"/>
+            </a:fillRef>
+            <a:effectRef idx="0">
+              <a:schemeClr val="accent1"/>
+            </a:effectRef>
+            <a:fontRef idx="minor">
+              <a:schemeClr val="tx1"/>
+            </a:fontRef>
+          </p:style>
+        </p:cxnSp>
+        <p:sp>
+          <p:nvSpPr>
+            <p:cNvPr id="29" name="TextBox 28"/>
+            <p:cNvSpPr txBox="1"/>
+            <p:nvPr/>
+          </p:nvSpPr>
+          <p:spPr>
+            <a:xfrm>
+              <a:off x="4299772" y="1542583"/>
+              <a:ext cx="1424846" cy="184666"/>
+            </a:xfrm>
+            <a:prstGeom prst="rect">
+              <a:avLst/>
+            </a:prstGeom>
+            <a:noFill/>
+          </p:spPr>
+          <p:txBody>
+            <a:bodyPr wrap="square" lIns="0" tIns="0" rIns="0" bIns="0" rtlCol="0">
+              <a:spAutoFit/>
+            </a:bodyPr>
+            <a:lstStyle/>
+            <a:p>
+              <a:r>
+                <a:rPr lang="en-US" sz="1200" dirty="0" err="1" smtClean="0">
+                  <a:solidFill>
+                    <a:srgbClr val="7030A0"/>
+                  </a:solidFill>
+                </a:rPr>
+                <a:t>deleteTask</a:t>
+              </a:r>
+              <a:r>
+                <a:rPr lang="en-US" sz="1200" dirty="0" smtClean="0">
+                  <a:solidFill>
+                    <a:srgbClr val="7030A0"/>
+                  </a:solidFill>
+                </a:rPr>
+                <a:t>(p)</a:t>
+              </a:r>
+              <a:endParaRPr lang="en-US" sz="1200" dirty="0">
+                <a:solidFill>
+                  <a:srgbClr val="7030A0"/>
+                </a:solidFill>
+              </a:endParaRPr>
+            </a:p>
+          </p:txBody>
+        </p:sp>
+        <p:sp>
+          <p:nvSpPr>
+            <p:cNvPr id="33" name="TextBox 32"/>
+            <p:cNvSpPr txBox="1"/>
+            <p:nvPr/>
+          </p:nvSpPr>
+          <p:spPr>
+            <a:xfrm>
+              <a:off x="6053342" y="1714957"/>
+              <a:ext cx="2438400" cy="184666"/>
+            </a:xfrm>
+            <a:prstGeom prst="rect">
+              <a:avLst/>
+            </a:prstGeom>
+            <a:noFill/>
+          </p:spPr>
+          <p:txBody>
+            <a:bodyPr wrap="square" lIns="0" tIns="0" rIns="0" bIns="0" rtlCol="0">
+              <a:spAutoFit/>
+            </a:bodyPr>
+            <a:lstStyle/>
+            <a:p>
+              <a:r>
+                <a:rPr lang="en-US" sz="1200" dirty="0" smtClean="0">
+                  <a:solidFill>
+                    <a:schemeClr val="accent5">
+                      <a:lumMod val="75000"/>
+                    </a:schemeClr>
+                  </a:solidFill>
+                </a:rPr>
+                <a:t>post(</a:t>
+              </a:r>
+              <a:r>
+                <a:rPr lang="en-US" sz="1200" dirty="0" err="1" smtClean="0">
+                  <a:solidFill>
+                    <a:schemeClr val="accent5">
+                      <a:lumMod val="75000"/>
+                    </a:schemeClr>
+                  </a:solidFill>
+                </a:rPr>
+                <a:t>TaskManagerChangedEvent</a:t>
+              </a:r>
+              <a:r>
+                <a:rPr lang="en-US" sz="1200" dirty="0" smtClean="0">
+                  <a:solidFill>
+                    <a:schemeClr val="accent5">
+                      <a:lumMod val="75000"/>
+                    </a:schemeClr>
+                  </a:solidFill>
+                </a:rPr>
+                <a:t>)</a:t>
+              </a:r>
+              <a:endParaRPr lang="en-US" sz="1200" dirty="0">
+                <a:solidFill>
+                  <a:schemeClr val="accent5">
+                    <a:lumMod val="75000"/>
+                  </a:schemeClr>
+                </a:solidFill>
+              </a:endParaRPr>
+            </a:p>
+          </p:txBody>
+        </p:sp>
+        <p:cxnSp>
+          <p:nvCxnSpPr>
+            <p:cNvPr id="34" name="Straight Arrow Connector 33"/>
+            <p:cNvCxnSpPr/>
+            <p:nvPr/>
+          </p:nvCxnSpPr>
+          <p:spPr>
+            <a:xfrm>
+              <a:off x="3954408" y="2190681"/>
+              <a:ext cx="1837184" cy="0"/>
+            </a:xfrm>
+            <a:prstGeom prst="straightConnector1">
+              <a:avLst/>
+            </a:prstGeom>
+            <a:ln w="19050">
+              <a:solidFill>
+                <a:srgbClr val="7030A0"/>
+              </a:solidFill>
+              <a:prstDash val="sysDash"/>
+              <a:headEnd type="arrow" w="med" len="med"/>
+              <a:tailEnd type="none" w="med" len="med"/>
+            </a:ln>
+          </p:spPr>
+          <p:style>
+            <a:lnRef idx="1">
+              <a:schemeClr val="accent1"/>
+            </a:lnRef>
+            <a:fillRef idx="0">
+              <a:schemeClr val="accent1"/>
+            </a:fillRef>
+            <a:effectRef idx="0">
+              <a:schemeClr val="accent1"/>
+            </a:effectRef>
+            <a:fontRef idx="minor">
+              <a:schemeClr val="tx1"/>
+            </a:fontRef>
+          </p:style>
+        </p:cxnSp>
+        <p:cxnSp>
+          <p:nvCxnSpPr>
+            <p:cNvPr id="35" name="Straight Arrow Connector 34"/>
+            <p:cNvCxnSpPr/>
+            <p:nvPr/>
+          </p:nvCxnSpPr>
+          <p:spPr>
+            <a:xfrm>
+              <a:off x="1739069" y="2266002"/>
+              <a:ext cx="2058118" cy="0"/>
+            </a:xfrm>
+            <a:prstGeom prst="straightConnector1">
+              <a:avLst/>
+            </a:prstGeom>
+            <a:ln w="19050">
+              <a:solidFill>
+                <a:srgbClr val="0070C0"/>
+              </a:solidFill>
+              <a:prstDash val="sysDash"/>
+              <a:headEnd type="arrow" w="med" len="med"/>
+              <a:tailEnd type="none" w="med" len="med"/>
+            </a:ln>
+          </p:spPr>
+          <p:style>
+            <a:lnRef idx="1">
+              <a:schemeClr val="accent1"/>
+            </a:lnRef>
+            <a:fillRef idx="0">
+              <a:schemeClr val="accent1"/>
+            </a:fillRef>
+            <a:effectRef idx="0">
+              <a:schemeClr val="accent1"/>
+            </a:effectRef>
+            <a:fontRef idx="minor">
+              <a:schemeClr val="tx1"/>
+            </a:fontRef>
+          </p:style>
+        </p:cxnSp>
+        <p:cxnSp>
+          <p:nvCxnSpPr>
+            <p:cNvPr id="37" name="Straight Arrow Connector 36"/>
+            <p:cNvCxnSpPr/>
+            <p:nvPr/>
+          </p:nvCxnSpPr>
+          <p:spPr>
+            <a:xfrm>
+              <a:off x="390618" y="2342202"/>
+              <a:ext cx="1196051" cy="0"/>
+            </a:xfrm>
+            <a:prstGeom prst="straightConnector1">
+              <a:avLst/>
+            </a:prstGeom>
+            <a:ln w="19050">
+              <a:solidFill>
+                <a:srgbClr val="00B050"/>
+              </a:solidFill>
+              <a:prstDash val="sysDash"/>
+              <a:headEnd type="arrow" w="med" len="med"/>
+              <a:tailEnd type="none" w="med" len="med"/>
+            </a:ln>
+          </p:spPr>
+          <p:style>
+            <a:lnRef idx="1">
+              <a:schemeClr val="accent1"/>
+            </a:lnRef>
+            <a:fillRef idx="0">
+              <a:schemeClr val="accent1"/>
+            </a:fillRef>
+            <a:effectRef idx="0">
+              <a:schemeClr val="accent1"/>
+            </a:effectRef>
+            <a:fontRef idx="minor">
+              <a:schemeClr val="tx1"/>
+            </a:fontRef>
+          </p:style>
+        </p:cxnSp>
+        <p:sp>
+          <p:nvSpPr>
+            <p:cNvPr id="39" name="Rectangle 62"/>
+            <p:cNvSpPr/>
+            <p:nvPr/>
+          </p:nvSpPr>
+          <p:spPr>
+            <a:xfrm>
+              <a:off x="7696200" y="591251"/>
+              <a:ext cx="1371600" cy="346760"/>
+            </a:xfrm>
+            <a:prstGeom prst="rect">
+              <a:avLst/>
+            </a:prstGeom>
+            <a:solidFill>
+              <a:schemeClr val="accent5">
+                <a:lumMod val="75000"/>
+              </a:schemeClr>
+            </a:solidFill>
+            <a:ln w="19050">
+              <a:solidFill>
+                <a:schemeClr val="accent5">
                   <a:lumMod val="75000"/>
                 </a:schemeClr>
               </a:solidFill>
-            </a:endParaRPr>
-          </a:p>
-        </p:txBody>
-      </p:sp>
-      <p:pic>
-        <p:nvPicPr>
-          <p:cNvPr id="3" name="Picture 2"/>
-          <p:cNvPicPr>
-            <a:picLocks noChangeAspect="1"/>
-          </p:cNvPicPr>
-          <p:nvPr/>
-        </p:nvPicPr>
-        <p:blipFill>
-          <a:blip r:embed="rId2"/>
-          <a:stretch>
-            <a:fillRect/>
-          </a:stretch>
-        </p:blipFill>
-        <p:spPr>
-          <a:xfrm>
-            <a:off x="37791" y="417689"/>
-            <a:ext cx="544477" cy="544477"/>
-          </a:xfrm>
-          <a:prstGeom prst="rect">
-            <a:avLst/>
-          </a:prstGeom>
-        </p:spPr>
-      </p:pic>
+            </a:ln>
+            <a:effectLst/>
+          </p:spPr>
+          <p:style>
+            <a:lnRef idx="1">
+              <a:schemeClr val="accent2"/>
+            </a:lnRef>
+            <a:fillRef idx="2">
+              <a:schemeClr val="accent2"/>
+            </a:fillRef>
+            <a:effectRef idx="1">
+              <a:schemeClr val="accent2"/>
+            </a:effectRef>
+            <a:fontRef idx="minor">
+              <a:schemeClr val="dk1"/>
+            </a:fontRef>
+          </p:style>
+          <p:txBody>
+            <a:bodyPr rtlCol="0" anchor="ctr"/>
+            <a:lstStyle/>
+            <a:p>
+              <a:pPr algn="ctr"/>
+              <a:r>
+                <a:rPr lang="en-US" sz="1600" dirty="0" smtClean="0">
+                  <a:solidFill>
+                    <a:schemeClr val="bg1"/>
+                  </a:solidFill>
+                </a:rPr>
+                <a:t>:</a:t>
+              </a:r>
+              <a:r>
+                <a:rPr lang="en-US" sz="1600" dirty="0" err="1" smtClean="0">
+                  <a:solidFill>
+                    <a:schemeClr val="bg1"/>
+                  </a:solidFill>
+                </a:rPr>
+                <a:t>EventsCenter</a:t>
+              </a:r>
+              <a:endParaRPr lang="en-SG" sz="1600" dirty="0">
+                <a:solidFill>
+                  <a:schemeClr val="bg1"/>
+                </a:solidFill>
+              </a:endParaRPr>
+            </a:p>
+          </p:txBody>
+        </p:sp>
+        <p:cxnSp>
+          <p:nvCxnSpPr>
+            <p:cNvPr id="40" name="Straight Connector 39"/>
+            <p:cNvCxnSpPr/>
+            <p:nvPr/>
+          </p:nvCxnSpPr>
+          <p:spPr>
+            <a:xfrm>
+              <a:off x="8616802" y="944305"/>
+              <a:ext cx="0" cy="1723059"/>
+            </a:xfrm>
+            <a:prstGeom prst="line">
+              <a:avLst/>
+            </a:prstGeom>
+            <a:ln w="19050">
+              <a:solidFill>
+                <a:schemeClr val="accent5">
+                  <a:lumMod val="75000"/>
+                </a:schemeClr>
+              </a:solidFill>
+              <a:prstDash val="sysDash"/>
+            </a:ln>
+            <a:effectLst/>
+          </p:spPr>
+          <p:style>
+            <a:lnRef idx="1">
+              <a:schemeClr val="accent1"/>
+            </a:lnRef>
+            <a:fillRef idx="2">
+              <a:schemeClr val="accent1"/>
+            </a:fillRef>
+            <a:effectRef idx="1">
+              <a:schemeClr val="accent1"/>
+            </a:effectRef>
+            <a:fontRef idx="minor">
+              <a:schemeClr val="dk1"/>
+            </a:fontRef>
+          </p:style>
+        </p:cxnSp>
+        <p:sp>
+          <p:nvSpPr>
+            <p:cNvPr id="41" name="Rectangle 40"/>
+            <p:cNvSpPr/>
+            <p:nvPr/>
+          </p:nvSpPr>
+          <p:spPr>
+            <a:xfrm>
+              <a:off x="8544794" y="1961202"/>
+              <a:ext cx="142006" cy="176787"/>
+            </a:xfrm>
+            <a:prstGeom prst="rect">
+              <a:avLst/>
+            </a:prstGeom>
+            <a:solidFill>
+              <a:schemeClr val="accent5">
+                <a:lumMod val="75000"/>
+              </a:schemeClr>
+            </a:solidFill>
+            <a:ln>
+              <a:solidFill>
+                <a:schemeClr val="accent5">
+                  <a:lumMod val="75000"/>
+                </a:schemeClr>
+              </a:solidFill>
+            </a:ln>
+            <a:effectLst/>
+          </p:spPr>
+          <p:style>
+            <a:lnRef idx="1">
+              <a:schemeClr val="accent3"/>
+            </a:lnRef>
+            <a:fillRef idx="2">
+              <a:schemeClr val="accent3"/>
+            </a:fillRef>
+            <a:effectRef idx="1">
+              <a:schemeClr val="accent3"/>
+            </a:effectRef>
+            <a:fontRef idx="minor">
+              <a:schemeClr val="dk1"/>
+            </a:fontRef>
+          </p:style>
+          <p:txBody>
+            <a:bodyPr rtlCol="0" anchor="ctr"/>
+            <a:lstStyle/>
+            <a:p>
+              <a:pPr algn="ctr"/>
+              <a:endParaRPr lang="en-SG" sz="1400">
+                <a:solidFill>
+                  <a:schemeClr val="dk1"/>
+                </a:solidFill>
+              </a:endParaRPr>
+            </a:p>
+          </p:txBody>
+        </p:sp>
+        <p:cxnSp>
+          <p:nvCxnSpPr>
+            <p:cNvPr id="42" name="Straight Arrow Connector 41"/>
+            <p:cNvCxnSpPr/>
+            <p:nvPr/>
+          </p:nvCxnSpPr>
+          <p:spPr>
+            <a:xfrm>
+              <a:off x="5943992" y="1961202"/>
+              <a:ext cx="2568438" cy="0"/>
+            </a:xfrm>
+            <a:prstGeom prst="straightConnector1">
+              <a:avLst/>
+            </a:prstGeom>
+            <a:ln w="19050">
+              <a:solidFill>
+                <a:srgbClr val="7030A0"/>
+              </a:solidFill>
+              <a:tailEnd type="arrow"/>
+            </a:ln>
+          </p:spPr>
+          <p:style>
+            <a:lnRef idx="1">
+              <a:schemeClr val="accent1"/>
+            </a:lnRef>
+            <a:fillRef idx="0">
+              <a:schemeClr val="accent1"/>
+            </a:fillRef>
+            <a:effectRef idx="0">
+              <a:schemeClr val="accent1"/>
+            </a:effectRef>
+            <a:fontRef idx="minor">
+              <a:schemeClr val="tx1"/>
+            </a:fontRef>
+          </p:style>
+        </p:cxnSp>
+        <p:cxnSp>
+          <p:nvCxnSpPr>
+            <p:cNvPr id="44" name="Straight Arrow Connector 43"/>
+            <p:cNvCxnSpPr/>
+            <p:nvPr/>
+          </p:nvCxnSpPr>
+          <p:spPr>
+            <a:xfrm>
+              <a:off x="5943992" y="2137989"/>
+              <a:ext cx="2549946" cy="0"/>
+            </a:xfrm>
+            <a:prstGeom prst="straightConnector1">
+              <a:avLst/>
+            </a:prstGeom>
+            <a:ln w="19050">
+              <a:solidFill>
+                <a:schemeClr val="accent5">
+                  <a:lumMod val="75000"/>
+                </a:schemeClr>
+              </a:solidFill>
+              <a:prstDash val="sysDash"/>
+              <a:headEnd type="arrow" w="med" len="med"/>
+              <a:tailEnd type="none" w="med" len="med"/>
+            </a:ln>
+          </p:spPr>
+          <p:style>
+            <a:lnRef idx="1">
+              <a:schemeClr val="accent1"/>
+            </a:lnRef>
+            <a:fillRef idx="0">
+              <a:schemeClr val="accent1"/>
+            </a:fillRef>
+            <a:effectRef idx="0">
+              <a:schemeClr val="accent1"/>
+            </a:effectRef>
+            <a:fontRef idx="minor">
+              <a:schemeClr val="tx1"/>
+            </a:fontRef>
+          </p:style>
+        </p:cxnSp>
+        <p:cxnSp>
+          <p:nvCxnSpPr>
+            <p:cNvPr id="85" name="Straight Connector 84"/>
+            <p:cNvCxnSpPr/>
+            <p:nvPr/>
+          </p:nvCxnSpPr>
+          <p:spPr>
+            <a:xfrm flipH="1">
+              <a:off x="314394" y="1099672"/>
+              <a:ext cx="24" cy="1598671"/>
+            </a:xfrm>
+            <a:prstGeom prst="line">
+              <a:avLst/>
+            </a:prstGeom>
+            <a:ln w="19050">
+              <a:solidFill>
+                <a:schemeClr val="tx1"/>
+              </a:solidFill>
+              <a:prstDash val="sysDash"/>
+            </a:ln>
+            <a:effectLst/>
+          </p:spPr>
+          <p:style>
+            <a:lnRef idx="1">
+              <a:schemeClr val="accent1"/>
+            </a:lnRef>
+            <a:fillRef idx="2">
+              <a:schemeClr val="accent1"/>
+            </a:fillRef>
+            <a:effectRef idx="1">
+              <a:schemeClr val="accent1"/>
+            </a:effectRef>
+            <a:fontRef idx="minor">
+              <a:schemeClr val="dk1"/>
+            </a:fontRef>
+          </p:style>
+        </p:cxnSp>
+        <p:pic>
+          <p:nvPicPr>
+            <p:cNvPr id="3" name="Picture 2"/>
+            <p:cNvPicPr>
+              <a:picLocks noChangeAspect="1"/>
+            </p:cNvPicPr>
+            <p:nvPr/>
+          </p:nvPicPr>
+          <p:blipFill>
+            <a:blip r:embed="rId2"/>
+            <a:stretch>
+              <a:fillRect/>
+            </a:stretch>
+          </p:blipFill>
+          <p:spPr>
+            <a:xfrm>
+              <a:off x="37791" y="417689"/>
+              <a:ext cx="544477" cy="544477"/>
+            </a:xfrm>
+            <a:prstGeom prst="rect">
+              <a:avLst/>
+            </a:prstGeom>
+          </p:spPr>
+        </p:pic>
+      </p:grpSp>
     </p:spTree>
     <p:extLst>
       <p:ext uri="{BB962C8B-B14F-4D97-AF65-F5344CB8AC3E}">

</xml_diff>

<commit_message>
change the diagram in pptx
</commit_message>
<xml_diff>
--- a/docs/diagrams/HighLevelSequenceDiagrams.pptx
+++ b/docs/diagrams/HighLevelSequenceDiagrams.pptx
@@ -107,6 +107,22 @@
       </a:defRPr>
     </a:lvl9pPr>
   </p:defaultTextStyle>
+  <p:extLst>
+    <p:ext uri="{EFAFB233-063F-42B5-8137-9DF3F51BA10A}">
+      <p15:sldGuideLst xmlns:p15="http://schemas.microsoft.com/office/powerpoint/2012/main">
+        <p15:guide id="1" orient="horz" pos="1488">
+          <p15:clr>
+            <a:srgbClr val="A4A3A4"/>
+          </p15:clr>
+        </p15:guide>
+        <p15:guide id="2" pos="2880">
+          <p15:clr>
+            <a:srgbClr val="A4A3A4"/>
+          </p15:clr>
+        </p15:guide>
+      </p15:sldGuideLst>
+    </p:ext>
+  </p:extLst>
 </p:presentation>
 </file>
 
@@ -192,7 +208,7 @@
           <a:p>
             <a:fld id="{F5CC4B3F-88C1-4FFA-B1B6-F41C21DC6924}" type="datetimeFigureOut">
               <a:rPr lang="en-US" smtClean="0"/>
-              <a:t>10/16/2016</a:t>
+              <a:t>4/8/2017</a:t>
             </a:fld>
             <a:endParaRPr lang="en-US"/>
           </a:p>
@@ -256,38 +272,37 @@
           <a:p>
             <a:pPr lvl="0"/>
             <a:r>
-              <a:rPr lang="en-US" smtClean="0"/>
+              <a:rPr lang="en-US"/>
               <a:t>Click to edit Master text styles</a:t>
             </a:r>
           </a:p>
           <a:p>
             <a:pPr lvl="1"/>
             <a:r>
-              <a:rPr lang="en-US" smtClean="0"/>
+              <a:rPr lang="en-US"/>
               <a:t>Second level</a:t>
             </a:r>
           </a:p>
           <a:p>
             <a:pPr lvl="2"/>
             <a:r>
-              <a:rPr lang="en-US" smtClean="0"/>
+              <a:rPr lang="en-US"/>
               <a:t>Third level</a:t>
             </a:r>
           </a:p>
           <a:p>
             <a:pPr lvl="3"/>
             <a:r>
-              <a:rPr lang="en-US" smtClean="0"/>
+              <a:rPr lang="en-US"/>
               <a:t>Fourth level</a:t>
             </a:r>
           </a:p>
           <a:p>
             <a:pPr lvl="4"/>
             <a:r>
-              <a:rPr lang="en-US" smtClean="0"/>
+              <a:rPr lang="en-US"/>
               <a:t>Fifth level</a:t>
             </a:r>
-            <a:endParaRPr lang="en-US"/>
           </a:p>
         </p:txBody>
       </p:sp>
@@ -498,10 +513,9 @@
           <a:lstStyle/>
           <a:p>
             <a:r>
-              <a:rPr lang="en-US" smtClean="0"/>
+              <a:rPr lang="en-US"/>
               <a:t>Click to edit Master title style</a:t>
             </a:r>
-            <a:endParaRPr lang="en-US"/>
           </a:p>
         </p:txBody>
       </p:sp>
@@ -617,10 +631,9 @@
           </a:lstStyle>
           <a:p>
             <a:r>
-              <a:rPr lang="en-US" smtClean="0"/>
+              <a:rPr lang="en-US"/>
               <a:t>Click to edit Master subtitle style</a:t>
             </a:r>
-            <a:endParaRPr lang="en-US"/>
           </a:p>
         </p:txBody>
       </p:sp>
@@ -641,7 +654,7 @@
           <a:p>
             <a:fld id="{78C97017-6FC3-485B-9764-EAC9E56C1D49}" type="datetimeFigureOut">
               <a:rPr lang="en-US" smtClean="0"/>
-              <a:t>10/16/2016</a:t>
+              <a:t>4/8/2017</a:t>
             </a:fld>
             <a:endParaRPr lang="en-US"/>
           </a:p>
@@ -735,10 +748,9 @@
           <a:lstStyle/>
           <a:p>
             <a:r>
-              <a:rPr lang="en-US" smtClean="0"/>
+              <a:rPr lang="en-US"/>
               <a:t>Click to edit Master title style</a:t>
             </a:r>
-            <a:endParaRPr lang="en-US"/>
           </a:p>
         </p:txBody>
       </p:sp>
@@ -759,38 +771,37 @@
           <a:p>
             <a:pPr lvl="0"/>
             <a:r>
-              <a:rPr lang="en-US" smtClean="0"/>
+              <a:rPr lang="en-US"/>
               <a:t>Click to edit Master text styles</a:t>
             </a:r>
           </a:p>
           <a:p>
             <a:pPr lvl="1"/>
             <a:r>
-              <a:rPr lang="en-US" smtClean="0"/>
+              <a:rPr lang="en-US"/>
               <a:t>Second level</a:t>
             </a:r>
           </a:p>
           <a:p>
             <a:pPr lvl="2"/>
             <a:r>
-              <a:rPr lang="en-US" smtClean="0"/>
+              <a:rPr lang="en-US"/>
               <a:t>Third level</a:t>
             </a:r>
           </a:p>
           <a:p>
             <a:pPr lvl="3"/>
             <a:r>
-              <a:rPr lang="en-US" smtClean="0"/>
+              <a:rPr lang="en-US"/>
               <a:t>Fourth level</a:t>
             </a:r>
           </a:p>
           <a:p>
             <a:pPr lvl="4"/>
             <a:r>
-              <a:rPr lang="en-US" smtClean="0"/>
+              <a:rPr lang="en-US"/>
               <a:t>Fifth level</a:t>
             </a:r>
-            <a:endParaRPr lang="en-US"/>
           </a:p>
         </p:txBody>
       </p:sp>
@@ -811,7 +822,7 @@
           <a:p>
             <a:fld id="{78C97017-6FC3-485B-9764-EAC9E56C1D49}" type="datetimeFigureOut">
               <a:rPr lang="en-US" smtClean="0"/>
-              <a:t>10/16/2016</a:t>
+              <a:t>4/8/2017</a:t>
             </a:fld>
             <a:endParaRPr lang="en-US"/>
           </a:p>
@@ -910,10 +921,9 @@
           <a:lstStyle/>
           <a:p>
             <a:r>
-              <a:rPr lang="en-US" smtClean="0"/>
+              <a:rPr lang="en-US"/>
               <a:t>Click to edit Master title style</a:t>
             </a:r>
-            <a:endParaRPr lang="en-US"/>
           </a:p>
         </p:txBody>
       </p:sp>
@@ -939,38 +949,37 @@
           <a:p>
             <a:pPr lvl="0"/>
             <a:r>
-              <a:rPr lang="en-US" smtClean="0"/>
+              <a:rPr lang="en-US"/>
               <a:t>Click to edit Master text styles</a:t>
             </a:r>
           </a:p>
           <a:p>
             <a:pPr lvl="1"/>
             <a:r>
-              <a:rPr lang="en-US" smtClean="0"/>
+              <a:rPr lang="en-US"/>
               <a:t>Second level</a:t>
             </a:r>
           </a:p>
           <a:p>
             <a:pPr lvl="2"/>
             <a:r>
-              <a:rPr lang="en-US" smtClean="0"/>
+              <a:rPr lang="en-US"/>
               <a:t>Third level</a:t>
             </a:r>
           </a:p>
           <a:p>
             <a:pPr lvl="3"/>
             <a:r>
-              <a:rPr lang="en-US" smtClean="0"/>
+              <a:rPr lang="en-US"/>
               <a:t>Fourth level</a:t>
             </a:r>
           </a:p>
           <a:p>
             <a:pPr lvl="4"/>
             <a:r>
-              <a:rPr lang="en-US" smtClean="0"/>
+              <a:rPr lang="en-US"/>
               <a:t>Fifth level</a:t>
             </a:r>
-            <a:endParaRPr lang="en-US"/>
           </a:p>
         </p:txBody>
       </p:sp>
@@ -991,7 +1000,7 @@
           <a:p>
             <a:fld id="{78C97017-6FC3-485B-9764-EAC9E56C1D49}" type="datetimeFigureOut">
               <a:rPr lang="en-US" smtClean="0"/>
-              <a:t>10/16/2016</a:t>
+              <a:t>4/8/2017</a:t>
             </a:fld>
             <a:endParaRPr lang="en-US"/>
           </a:p>
@@ -1085,10 +1094,9 @@
           <a:lstStyle/>
           <a:p>
             <a:r>
-              <a:rPr lang="en-US" smtClean="0"/>
+              <a:rPr lang="en-US"/>
               <a:t>Click to edit Master title style</a:t>
             </a:r>
-            <a:endParaRPr lang="en-US"/>
           </a:p>
         </p:txBody>
       </p:sp>
@@ -1109,38 +1117,37 @@
           <a:p>
             <a:pPr lvl="0"/>
             <a:r>
-              <a:rPr lang="en-US" smtClean="0"/>
+              <a:rPr lang="en-US"/>
               <a:t>Click to edit Master text styles</a:t>
             </a:r>
           </a:p>
           <a:p>
             <a:pPr lvl="1"/>
             <a:r>
-              <a:rPr lang="en-US" smtClean="0"/>
+              <a:rPr lang="en-US"/>
               <a:t>Second level</a:t>
             </a:r>
           </a:p>
           <a:p>
             <a:pPr lvl="2"/>
             <a:r>
-              <a:rPr lang="en-US" smtClean="0"/>
+              <a:rPr lang="en-US"/>
               <a:t>Third level</a:t>
             </a:r>
           </a:p>
           <a:p>
             <a:pPr lvl="3"/>
             <a:r>
-              <a:rPr lang="en-US" smtClean="0"/>
+              <a:rPr lang="en-US"/>
               <a:t>Fourth level</a:t>
             </a:r>
           </a:p>
           <a:p>
             <a:pPr lvl="4"/>
             <a:r>
-              <a:rPr lang="en-US" smtClean="0"/>
+              <a:rPr lang="en-US"/>
               <a:t>Fifth level</a:t>
             </a:r>
-            <a:endParaRPr lang="en-US"/>
           </a:p>
         </p:txBody>
       </p:sp>
@@ -1161,7 +1168,7 @@
           <a:p>
             <a:fld id="{78C97017-6FC3-485B-9764-EAC9E56C1D49}" type="datetimeFigureOut">
               <a:rPr lang="en-US" smtClean="0"/>
-              <a:t>10/16/2016</a:t>
+              <a:t>4/8/2017</a:t>
             </a:fld>
             <a:endParaRPr lang="en-US"/>
           </a:p>
@@ -1264,10 +1271,9 @@
           </a:lstStyle>
           <a:p>
             <a:r>
-              <a:rPr lang="en-US" smtClean="0"/>
+              <a:rPr lang="en-US"/>
               <a:t>Click to edit Master title style</a:t>
             </a:r>
-            <a:endParaRPr lang="en-US"/>
           </a:p>
         </p:txBody>
       </p:sp>
@@ -1384,7 +1390,7 @@
           <a:p>
             <a:pPr lvl="0"/>
             <a:r>
-              <a:rPr lang="en-US" smtClean="0"/>
+              <a:rPr lang="en-US"/>
               <a:t>Click to edit Master text styles</a:t>
             </a:r>
           </a:p>
@@ -1407,7 +1413,7 @@
           <a:p>
             <a:fld id="{78C97017-6FC3-485B-9764-EAC9E56C1D49}" type="datetimeFigureOut">
               <a:rPr lang="en-US" smtClean="0"/>
-              <a:t>10/16/2016</a:t>
+              <a:t>4/8/2017</a:t>
             </a:fld>
             <a:endParaRPr lang="en-US"/>
           </a:p>
@@ -1501,10 +1507,9 @@
           <a:lstStyle/>
           <a:p>
             <a:r>
-              <a:rPr lang="en-US" smtClean="0"/>
+              <a:rPr lang="en-US"/>
               <a:t>Click to edit Master title style</a:t>
             </a:r>
-            <a:endParaRPr lang="en-US"/>
           </a:p>
         </p:txBody>
       </p:sp>
@@ -1558,38 +1563,37 @@
           <a:p>
             <a:pPr lvl="0"/>
             <a:r>
-              <a:rPr lang="en-US" smtClean="0"/>
+              <a:rPr lang="en-US"/>
               <a:t>Click to edit Master text styles</a:t>
             </a:r>
           </a:p>
           <a:p>
             <a:pPr lvl="1"/>
             <a:r>
-              <a:rPr lang="en-US" smtClean="0"/>
+              <a:rPr lang="en-US"/>
               <a:t>Second level</a:t>
             </a:r>
           </a:p>
           <a:p>
             <a:pPr lvl="2"/>
             <a:r>
-              <a:rPr lang="en-US" smtClean="0"/>
+              <a:rPr lang="en-US"/>
               <a:t>Third level</a:t>
             </a:r>
           </a:p>
           <a:p>
             <a:pPr lvl="3"/>
             <a:r>
-              <a:rPr lang="en-US" smtClean="0"/>
+              <a:rPr lang="en-US"/>
               <a:t>Fourth level</a:t>
             </a:r>
           </a:p>
           <a:p>
             <a:pPr lvl="4"/>
             <a:r>
-              <a:rPr lang="en-US" smtClean="0"/>
+              <a:rPr lang="en-US"/>
               <a:t>Fifth level</a:t>
             </a:r>
-            <a:endParaRPr lang="en-US"/>
           </a:p>
         </p:txBody>
       </p:sp>
@@ -1643,38 +1647,37 @@
           <a:p>
             <a:pPr lvl="0"/>
             <a:r>
-              <a:rPr lang="en-US" smtClean="0"/>
+              <a:rPr lang="en-US"/>
               <a:t>Click to edit Master text styles</a:t>
             </a:r>
           </a:p>
           <a:p>
             <a:pPr lvl="1"/>
             <a:r>
-              <a:rPr lang="en-US" smtClean="0"/>
+              <a:rPr lang="en-US"/>
               <a:t>Second level</a:t>
             </a:r>
           </a:p>
           <a:p>
             <a:pPr lvl="2"/>
             <a:r>
-              <a:rPr lang="en-US" smtClean="0"/>
+              <a:rPr lang="en-US"/>
               <a:t>Third level</a:t>
             </a:r>
           </a:p>
           <a:p>
             <a:pPr lvl="3"/>
             <a:r>
-              <a:rPr lang="en-US" smtClean="0"/>
+              <a:rPr lang="en-US"/>
               <a:t>Fourth level</a:t>
             </a:r>
           </a:p>
           <a:p>
             <a:pPr lvl="4"/>
             <a:r>
-              <a:rPr lang="en-US" smtClean="0"/>
+              <a:rPr lang="en-US"/>
               <a:t>Fifth level</a:t>
             </a:r>
-            <a:endParaRPr lang="en-US"/>
           </a:p>
         </p:txBody>
       </p:sp>
@@ -1695,7 +1698,7 @@
           <a:p>
             <a:fld id="{78C97017-6FC3-485B-9764-EAC9E56C1D49}" type="datetimeFigureOut">
               <a:rPr lang="en-US" smtClean="0"/>
-              <a:t>10/16/2016</a:t>
+              <a:t>4/8/2017</a:t>
             </a:fld>
             <a:endParaRPr lang="en-US"/>
           </a:p>
@@ -1793,10 +1796,9 @@
           </a:lstStyle>
           <a:p>
             <a:r>
-              <a:rPr lang="en-US" smtClean="0"/>
+              <a:rPr lang="en-US"/>
               <a:t>Click to edit Master title style</a:t>
             </a:r>
-            <a:endParaRPr lang="en-US"/>
           </a:p>
         </p:txBody>
       </p:sp>
@@ -1859,7 +1861,7 @@
           <a:p>
             <a:pPr lvl="0"/>
             <a:r>
-              <a:rPr lang="en-US" smtClean="0"/>
+              <a:rPr lang="en-US"/>
               <a:t>Click to edit Master text styles</a:t>
             </a:r>
           </a:p>
@@ -1915,38 +1917,37 @@
           <a:p>
             <a:pPr lvl="0"/>
             <a:r>
-              <a:rPr lang="en-US" smtClean="0"/>
+              <a:rPr lang="en-US"/>
               <a:t>Click to edit Master text styles</a:t>
             </a:r>
           </a:p>
           <a:p>
             <a:pPr lvl="1"/>
             <a:r>
-              <a:rPr lang="en-US" smtClean="0"/>
+              <a:rPr lang="en-US"/>
               <a:t>Second level</a:t>
             </a:r>
           </a:p>
           <a:p>
             <a:pPr lvl="2"/>
             <a:r>
-              <a:rPr lang="en-US" smtClean="0"/>
+              <a:rPr lang="en-US"/>
               <a:t>Third level</a:t>
             </a:r>
           </a:p>
           <a:p>
             <a:pPr lvl="3"/>
             <a:r>
-              <a:rPr lang="en-US" smtClean="0"/>
+              <a:rPr lang="en-US"/>
               <a:t>Fourth level</a:t>
             </a:r>
           </a:p>
           <a:p>
             <a:pPr lvl="4"/>
             <a:r>
-              <a:rPr lang="en-US" smtClean="0"/>
+              <a:rPr lang="en-US"/>
               <a:t>Fifth level</a:t>
             </a:r>
-            <a:endParaRPr lang="en-US"/>
           </a:p>
         </p:txBody>
       </p:sp>
@@ -2009,7 +2010,7 @@
           <a:p>
             <a:pPr lvl="0"/>
             <a:r>
-              <a:rPr lang="en-US" smtClean="0"/>
+              <a:rPr lang="en-US"/>
               <a:t>Click to edit Master text styles</a:t>
             </a:r>
           </a:p>
@@ -2065,38 +2066,37 @@
           <a:p>
             <a:pPr lvl="0"/>
             <a:r>
-              <a:rPr lang="en-US" smtClean="0"/>
+              <a:rPr lang="en-US"/>
               <a:t>Click to edit Master text styles</a:t>
             </a:r>
           </a:p>
           <a:p>
             <a:pPr lvl="1"/>
             <a:r>
-              <a:rPr lang="en-US" smtClean="0"/>
+              <a:rPr lang="en-US"/>
               <a:t>Second level</a:t>
             </a:r>
           </a:p>
           <a:p>
             <a:pPr lvl="2"/>
             <a:r>
-              <a:rPr lang="en-US" smtClean="0"/>
+              <a:rPr lang="en-US"/>
               <a:t>Third level</a:t>
             </a:r>
           </a:p>
           <a:p>
             <a:pPr lvl="3"/>
             <a:r>
-              <a:rPr lang="en-US" smtClean="0"/>
+              <a:rPr lang="en-US"/>
               <a:t>Fourth level</a:t>
             </a:r>
           </a:p>
           <a:p>
             <a:pPr lvl="4"/>
             <a:r>
-              <a:rPr lang="en-US" smtClean="0"/>
+              <a:rPr lang="en-US"/>
               <a:t>Fifth level</a:t>
             </a:r>
-            <a:endParaRPr lang="en-US"/>
           </a:p>
         </p:txBody>
       </p:sp>
@@ -2117,7 +2117,7 @@
           <a:p>
             <a:fld id="{78C97017-6FC3-485B-9764-EAC9E56C1D49}" type="datetimeFigureOut">
               <a:rPr lang="en-US" smtClean="0"/>
-              <a:t>10/16/2016</a:t>
+              <a:t>4/8/2017</a:t>
             </a:fld>
             <a:endParaRPr lang="en-US"/>
           </a:p>
@@ -2211,10 +2211,9 @@
           <a:lstStyle/>
           <a:p>
             <a:r>
-              <a:rPr lang="en-US" smtClean="0"/>
+              <a:rPr lang="en-US"/>
               <a:t>Click to edit Master title style</a:t>
             </a:r>
-            <a:endParaRPr lang="en-US"/>
           </a:p>
         </p:txBody>
       </p:sp>
@@ -2235,7 +2234,7 @@
           <a:p>
             <a:fld id="{78C97017-6FC3-485B-9764-EAC9E56C1D49}" type="datetimeFigureOut">
               <a:rPr lang="en-US" smtClean="0"/>
-              <a:t>10/16/2016</a:t>
+              <a:t>4/8/2017</a:t>
             </a:fld>
             <a:endParaRPr lang="en-US"/>
           </a:p>
@@ -2330,7 +2329,7 @@
           <a:p>
             <a:fld id="{78C97017-6FC3-485B-9764-EAC9E56C1D49}" type="datetimeFigureOut">
               <a:rPr lang="en-US" smtClean="0"/>
-              <a:t>10/16/2016</a:t>
+              <a:t>4/8/2017</a:t>
             </a:fld>
             <a:endParaRPr lang="en-US"/>
           </a:p>
@@ -2433,10 +2432,9 @@
           </a:lstStyle>
           <a:p>
             <a:r>
-              <a:rPr lang="en-US" smtClean="0"/>
+              <a:rPr lang="en-US"/>
               <a:t>Click to edit Master title style</a:t>
             </a:r>
-            <a:endParaRPr lang="en-US"/>
           </a:p>
         </p:txBody>
       </p:sp>
@@ -2490,38 +2488,37 @@
           <a:p>
             <a:pPr lvl="0"/>
             <a:r>
-              <a:rPr lang="en-US" smtClean="0"/>
+              <a:rPr lang="en-US"/>
               <a:t>Click to edit Master text styles</a:t>
             </a:r>
           </a:p>
           <a:p>
             <a:pPr lvl="1"/>
             <a:r>
-              <a:rPr lang="en-US" smtClean="0"/>
+              <a:rPr lang="en-US"/>
               <a:t>Second level</a:t>
             </a:r>
           </a:p>
           <a:p>
             <a:pPr lvl="2"/>
             <a:r>
-              <a:rPr lang="en-US" smtClean="0"/>
+              <a:rPr lang="en-US"/>
               <a:t>Third level</a:t>
             </a:r>
           </a:p>
           <a:p>
             <a:pPr lvl="3"/>
             <a:r>
-              <a:rPr lang="en-US" smtClean="0"/>
+              <a:rPr lang="en-US"/>
               <a:t>Fourth level</a:t>
             </a:r>
           </a:p>
           <a:p>
             <a:pPr lvl="4"/>
             <a:r>
-              <a:rPr lang="en-US" smtClean="0"/>
+              <a:rPr lang="en-US"/>
               <a:t>Fifth level</a:t>
             </a:r>
-            <a:endParaRPr lang="en-US"/>
           </a:p>
         </p:txBody>
       </p:sp>
@@ -2584,7 +2581,7 @@
           <a:p>
             <a:pPr lvl="0"/>
             <a:r>
-              <a:rPr lang="en-US" smtClean="0"/>
+              <a:rPr lang="en-US"/>
               <a:t>Click to edit Master text styles</a:t>
             </a:r>
           </a:p>
@@ -2607,7 +2604,7 @@
           <a:p>
             <a:fld id="{78C97017-6FC3-485B-9764-EAC9E56C1D49}" type="datetimeFigureOut">
               <a:rPr lang="en-US" smtClean="0"/>
-              <a:t>10/16/2016</a:t>
+              <a:t>4/8/2017</a:t>
             </a:fld>
             <a:endParaRPr lang="en-US"/>
           </a:p>
@@ -2710,10 +2707,9 @@
           </a:lstStyle>
           <a:p>
             <a:r>
-              <a:rPr lang="en-US" smtClean="0"/>
+              <a:rPr lang="en-US"/>
               <a:t>Click to edit Master title style</a:t>
             </a:r>
-            <a:endParaRPr lang="en-US"/>
           </a:p>
         </p:txBody>
       </p:sp>
@@ -2837,7 +2833,7 @@
           <a:p>
             <a:pPr lvl="0"/>
             <a:r>
-              <a:rPr lang="en-US" smtClean="0"/>
+              <a:rPr lang="en-US"/>
               <a:t>Click to edit Master text styles</a:t>
             </a:r>
           </a:p>
@@ -2860,7 +2856,7 @@
           <a:p>
             <a:fld id="{78C97017-6FC3-485B-9764-EAC9E56C1D49}" type="datetimeFigureOut">
               <a:rPr lang="en-US" smtClean="0"/>
-              <a:t>10/16/2016</a:t>
+              <a:t>4/8/2017</a:t>
             </a:fld>
             <a:endParaRPr lang="en-US"/>
           </a:p>
@@ -2969,10 +2965,9 @@
           <a:lstStyle/>
           <a:p>
             <a:r>
-              <a:rPr lang="en-US" smtClean="0"/>
+              <a:rPr lang="en-US"/>
               <a:t>Click to edit Master title style</a:t>
             </a:r>
-            <a:endParaRPr lang="en-US"/>
           </a:p>
         </p:txBody>
       </p:sp>
@@ -3003,38 +2998,37 @@
           <a:p>
             <a:pPr lvl="0"/>
             <a:r>
-              <a:rPr lang="en-US" smtClean="0"/>
+              <a:rPr lang="en-US"/>
               <a:t>Click to edit Master text styles</a:t>
             </a:r>
           </a:p>
           <a:p>
             <a:pPr lvl="1"/>
             <a:r>
-              <a:rPr lang="en-US" smtClean="0"/>
+              <a:rPr lang="en-US"/>
               <a:t>Second level</a:t>
             </a:r>
           </a:p>
           <a:p>
             <a:pPr lvl="2"/>
             <a:r>
-              <a:rPr lang="en-US" smtClean="0"/>
+              <a:rPr lang="en-US"/>
               <a:t>Third level</a:t>
             </a:r>
           </a:p>
           <a:p>
             <a:pPr lvl="3"/>
             <a:r>
-              <a:rPr lang="en-US" smtClean="0"/>
+              <a:rPr lang="en-US"/>
               <a:t>Fourth level</a:t>
             </a:r>
           </a:p>
           <a:p>
             <a:pPr lvl="4"/>
             <a:r>
-              <a:rPr lang="en-US" smtClean="0"/>
+              <a:rPr lang="en-US"/>
               <a:t>Fifth level</a:t>
             </a:r>
-            <a:endParaRPr lang="en-US"/>
           </a:p>
         </p:txBody>
       </p:sp>
@@ -3073,7 +3067,7 @@
           <a:p>
             <a:fld id="{78C97017-6FC3-485B-9764-EAC9E56C1D49}" type="datetimeFigureOut">
               <a:rPr lang="en-US" smtClean="0"/>
-              <a:t>10/16/2016</a:t>
+              <a:t>4/8/2017</a:t>
             </a:fld>
             <a:endParaRPr lang="en-US"/>
           </a:p>
@@ -3492,7 +3486,7 @@
           <a:p>
             <a:pPr algn="ctr"/>
             <a:r>
-              <a:rPr lang="en-US" sz="1600" dirty="0" smtClean="0">
+              <a:rPr lang="en-US" sz="1600" dirty="0">
                 <a:solidFill>
                   <a:schemeClr val="bg1"/>
                 </a:solidFill>
@@ -3856,7 +3850,7 @@
           <a:p>
             <a:pPr algn="ctr"/>
             <a:r>
-              <a:rPr lang="en-US" sz="1600" dirty="0" smtClean="0">
+              <a:rPr lang="en-US" sz="1600" dirty="0">
                 <a:solidFill>
                   <a:schemeClr val="bg1"/>
                 </a:solidFill>
@@ -4003,7 +3997,7 @@
           <a:p>
             <a:pPr algn="ctr"/>
             <a:r>
-              <a:rPr lang="en-US" sz="1600" dirty="0" smtClean="0">
+              <a:rPr lang="en-US" sz="1600" dirty="0">
                 <a:solidFill>
                   <a:schemeClr val="bg1"/>
                 </a:solidFill>
@@ -4165,10 +4159,9 @@
           <a:lstStyle/>
           <a:p>
             <a:r>
-              <a:rPr lang="en-US" sz="1400" dirty="0" smtClean="0"/>
+              <a:rPr lang="en-US" sz="1400" dirty="0"/>
               <a:t>delete 1</a:t>
             </a:r>
-            <a:endParaRPr lang="en-US" sz="1400" dirty="0"/>
           </a:p>
         </p:txBody>
       </p:sp>
@@ -4231,18 +4224,13 @@
           <a:lstStyle/>
           <a:p>
             <a:r>
-              <a:rPr lang="en-US" sz="1400" dirty="0" smtClean="0">
+              <a:rPr lang="en-US" sz="1400" dirty="0">
                 <a:solidFill>
                   <a:srgbClr val="0070C0"/>
                 </a:solidFill>
               </a:rPr>
               <a:t>execute(“delete 1”)</a:t>
             </a:r>
-            <a:endParaRPr lang="en-US" sz="1400" dirty="0">
-              <a:solidFill>
-                <a:srgbClr val="0070C0"/>
-              </a:solidFill>
-            </a:endParaRPr>
           </a:p>
         </p:txBody>
       </p:sp>
@@ -4305,26 +4293,29 @@
           <a:lstStyle/>
           <a:p>
             <a:r>
-              <a:rPr lang="en-US" sz="1400" dirty="0" err="1" smtClean="0">
+              <a:rPr lang="en-US" sz="1400" dirty="0" err="1">
                 <a:solidFill>
                   <a:srgbClr val="7030A0"/>
                 </a:solidFill>
               </a:rPr>
-              <a:t>deletePerson</a:t>
-            </a:r>
-            <a:r>
-              <a:rPr lang="en-US" sz="1400" dirty="0" smtClean="0">
+              <a:t>deleteT</a:t>
+            </a:r>
+            <a:r>
+              <a:rPr lang="en-US" altLang="zh-CN" sz="1400" dirty="0" err="1">
+                <a:solidFill>
+                  <a:srgbClr val="7030A0"/>
+                </a:solidFill>
+              </a:rPr>
+              <a:t>ask</a:t>
+            </a:r>
+            <a:r>
+              <a:rPr lang="en-US" sz="1400" dirty="0">
                 <a:solidFill>
                   <a:srgbClr val="7030A0"/>
                 </a:solidFill>
               </a:rPr>
               <a:t>(p)</a:t>
             </a:r>
-            <a:endParaRPr lang="en-US" sz="1400" dirty="0">
-              <a:solidFill>
-                <a:srgbClr val="7030A0"/>
-              </a:solidFill>
-            </a:endParaRPr>
           </a:p>
         </p:txBody>
       </p:sp>
@@ -4351,7 +4342,7 @@
           <a:lstStyle/>
           <a:p>
             <a:r>
-              <a:rPr lang="en-US" sz="1400" dirty="0" smtClean="0">
+              <a:rPr lang="en-US" sz="1400" dirty="0">
                 <a:solidFill>
                   <a:schemeClr val="accent5">
                     <a:lumMod val="75000"/>
@@ -4361,17 +4352,37 @@
               <a:t>post(</a:t>
             </a:r>
             <a:r>
-              <a:rPr lang="en-US" sz="1400" dirty="0" err="1" smtClean="0">
+              <a:rPr lang="en-US" sz="1400" dirty="0" err="1">
                 <a:solidFill>
                   <a:schemeClr val="accent5">
                     <a:lumMod val="75000"/>
                   </a:schemeClr>
                 </a:solidFill>
               </a:rPr>
-              <a:t>AddressBookChangedEvent</a:t>
-            </a:r>
-            <a:r>
-              <a:rPr lang="en-US" sz="1400" dirty="0" smtClean="0">
+              <a:t>T</a:t>
+            </a:r>
+            <a:r>
+              <a:rPr lang="en-US" altLang="zh-CN" sz="1400" dirty="0" err="1">
+                <a:solidFill>
+                  <a:schemeClr val="accent5">
+                    <a:lumMod val="75000"/>
+                  </a:schemeClr>
+                </a:solidFill>
+              </a:rPr>
+              <a:t>askManager</a:t>
+            </a:r>
+            <a:r>
+              <a:rPr lang="en-US" sz="1400" dirty="0" err="1">
+                <a:solidFill>
+                  <a:schemeClr val="accent5">
+                    <a:lumMod val="75000"/>
+                  </a:schemeClr>
+                </a:solidFill>
+              </a:rPr>
+              <a:t>ChangedEvent</a:t>
+            </a:r>
+            <a:r>
+              <a:rPr lang="en-US" sz="1400" dirty="0">
                 <a:solidFill>
                   <a:schemeClr val="accent5">
                     <a:lumMod val="75000"/>
@@ -4380,13 +4391,6 @@
               </a:rPr>
               <a:t>)</a:t>
             </a:r>
-            <a:endParaRPr lang="en-US" sz="1400" dirty="0">
-              <a:solidFill>
-                <a:schemeClr val="accent5">
-                  <a:lumMod val="75000"/>
-                </a:schemeClr>
-              </a:solidFill>
-            </a:endParaRPr>
           </a:p>
         </p:txBody>
       </p:sp>
@@ -4552,7 +4556,7 @@
           <a:p>
             <a:pPr algn="ctr"/>
             <a:r>
-              <a:rPr lang="en-US" sz="1600" dirty="0" smtClean="0">
+              <a:rPr lang="en-US" sz="1600" dirty="0">
                 <a:solidFill>
                   <a:schemeClr val="bg1"/>
                 </a:solidFill>
@@ -4560,7 +4564,7 @@
               <a:t>:</a:t>
             </a:r>
             <a:r>
-              <a:rPr lang="en-US" sz="1600" dirty="0" err="1" smtClean="0">
+              <a:rPr lang="en-US" sz="1600" dirty="0" err="1">
                 <a:solidFill>
                   <a:schemeClr val="bg1"/>
                 </a:solidFill>
@@ -4793,7 +4797,7 @@
           <a:p>
             <a:pPr algn="ctr"/>
             <a:r>
-              <a:rPr lang="en-US" sz="1600" dirty="0" smtClean="0">
+              <a:rPr lang="en-US" sz="1600" dirty="0">
                 <a:solidFill>
                   <a:schemeClr val="bg1"/>
                 </a:solidFill>
@@ -4925,7 +4929,7 @@
           <a:lstStyle/>
           <a:p>
             <a:r>
-              <a:rPr lang="en-US" sz="1400" dirty="0" smtClean="0">
+              <a:rPr lang="en-US" sz="1400" dirty="0">
                 <a:solidFill>
                   <a:schemeClr val="accent5">
                     <a:lumMod val="75000"/>
@@ -4935,17 +4939,17 @@
               <a:t>post(</a:t>
             </a:r>
             <a:r>
-              <a:rPr lang="en-US" sz="1400" dirty="0" err="1" smtClean="0">
+              <a:rPr lang="en-US" sz="1400" dirty="0" err="1">
                 <a:solidFill>
                   <a:schemeClr val="accent5">
                     <a:lumMod val="75000"/>
                   </a:schemeClr>
                 </a:solidFill>
               </a:rPr>
-              <a:t>AddressBookChangedEvent</a:t>
-            </a:r>
-            <a:r>
-              <a:rPr lang="en-US" sz="1400" dirty="0" smtClean="0">
+              <a:t>TaskManagerChangedEvent</a:t>
+            </a:r>
+            <a:r>
+              <a:rPr lang="en-US" sz="1400" dirty="0">
                 <a:solidFill>
                   <a:schemeClr val="accent5">
                     <a:lumMod val="75000"/>
@@ -4954,13 +4958,6 @@
               </a:rPr>
               <a:t>)</a:t>
             </a:r>
-            <a:endParaRPr lang="en-US" sz="1400" dirty="0">
-              <a:solidFill>
-                <a:schemeClr val="accent5">
-                  <a:lumMod val="75000"/>
-                </a:schemeClr>
-              </a:solidFill>
-            </a:endParaRPr>
           </a:p>
         </p:txBody>
       </p:sp>
@@ -5052,7 +5049,7 @@
           <a:p>
             <a:pPr algn="ctr"/>
             <a:r>
-              <a:rPr lang="en-US" sz="1600" dirty="0" smtClean="0">
+              <a:rPr lang="en-US" sz="1600" dirty="0">
                 <a:solidFill>
                   <a:schemeClr val="bg1"/>
                 </a:solidFill>
@@ -5060,7 +5057,7 @@
               <a:t>:</a:t>
             </a:r>
             <a:r>
-              <a:rPr lang="en-US" sz="1600" dirty="0" err="1" smtClean="0">
+              <a:rPr lang="en-US" sz="1600" dirty="0" err="1">
                 <a:solidFill>
                   <a:schemeClr val="bg1"/>
                 </a:solidFill>
@@ -5307,17 +5304,17 @@
           <a:lstStyle/>
           <a:p>
             <a:r>
-              <a:rPr lang="en-US" sz="1400" dirty="0" err="1" smtClean="0">
+              <a:rPr lang="en-US" sz="1400">
                 <a:solidFill>
                   <a:schemeClr val="accent6">
                     <a:lumMod val="75000"/>
                   </a:schemeClr>
                 </a:solidFill>
               </a:rPr>
-              <a:t>handleAddresssBookChangedEvent</a:t>
-            </a:r>
-            <a:r>
-              <a:rPr lang="en-US" sz="1400" dirty="0" smtClean="0">
+              <a:t>handleTaskManagerChangedEvent</a:t>
+            </a:r>
+            <a:r>
+              <a:rPr lang="en-US" sz="1400" dirty="0">
                 <a:solidFill>
                   <a:schemeClr val="accent6">
                     <a:lumMod val="75000"/>
@@ -5326,13 +5323,6 @@
               </a:rPr>
               <a:t>()</a:t>
             </a:r>
-            <a:endParaRPr lang="en-US" sz="1400" dirty="0">
-              <a:solidFill>
-                <a:schemeClr val="accent6">
-                  <a:lumMod val="75000"/>
-                </a:schemeClr>
-              </a:solidFill>
-            </a:endParaRPr>
           </a:p>
         </p:txBody>
       </p:sp>
@@ -5417,7 +5407,7 @@
           <a:p>
             <a:pPr algn="ctr"/>
             <a:r>
-              <a:rPr lang="en-US" sz="1600" dirty="0" smtClean="0">
+              <a:rPr lang="en-US" sz="1600" dirty="0">
                 <a:solidFill>
                   <a:schemeClr val="bg1"/>
                 </a:solidFill>
@@ -5620,26 +5610,21 @@
           <a:lstStyle/>
           <a:p>
             <a:r>
-              <a:rPr lang="en-US" sz="1400" dirty="0" err="1" smtClean="0">
+              <a:rPr lang="en-US" sz="1400" dirty="0" err="1">
                 <a:solidFill>
                   <a:srgbClr val="00B050"/>
                 </a:solidFill>
               </a:rPr>
-              <a:t>handleAddresssBookChangedEvent</a:t>
-            </a:r>
-            <a:r>
-              <a:rPr lang="en-US" sz="1400" dirty="0" smtClean="0">
+              <a:t>handleTaskManagerChangedEvent</a:t>
+            </a:r>
+            <a:r>
+              <a:rPr lang="en-US" sz="1400" dirty="0">
                 <a:solidFill>
                   <a:srgbClr val="00B050"/>
                 </a:solidFill>
               </a:rPr>
               <a:t>()</a:t>
             </a:r>
-            <a:endParaRPr lang="en-US" sz="1400" dirty="0">
-              <a:solidFill>
-                <a:srgbClr val="00B050"/>
-              </a:solidFill>
-            </a:endParaRPr>
           </a:p>
         </p:txBody>
       </p:sp>
@@ -5826,18 +5811,13 @@
           <a:p>
             <a:pPr algn="r"/>
             <a:r>
-              <a:rPr lang="en-US" sz="1400" dirty="0" smtClean="0">
+              <a:rPr lang="en-US" sz="1400" dirty="0">
                 <a:solidFill>
                   <a:srgbClr val="00B050"/>
                 </a:solidFill>
               </a:rPr>
               <a:t>Update status bar</a:t>
             </a:r>
-            <a:endParaRPr lang="en-US" sz="1400" dirty="0">
-              <a:solidFill>
-                <a:srgbClr val="00B050"/>
-              </a:solidFill>
-            </a:endParaRPr>
           </a:p>
         </p:txBody>
       </p:sp>
@@ -6027,7 +6007,7 @@
           <a:lstStyle/>
           <a:p>
             <a:r>
-              <a:rPr lang="en-US" sz="1400" dirty="0" smtClean="0">
+              <a:rPr lang="en-US" sz="1400" dirty="0">
                 <a:solidFill>
                   <a:schemeClr val="accent6">
                     <a:lumMod val="75000"/>
@@ -6037,7 +6017,7 @@
               <a:t>Save </a:t>
             </a:r>
             <a:br>
-              <a:rPr lang="en-US" sz="1400" dirty="0" smtClean="0">
+              <a:rPr lang="en-US" sz="1400" dirty="0">
                 <a:solidFill>
                   <a:schemeClr val="accent6">
                     <a:lumMod val="75000"/>
@@ -6046,7 +6026,7 @@
               </a:rPr>
             </a:br>
             <a:r>
-              <a:rPr lang="en-US" sz="1400" dirty="0" smtClean="0">
+              <a:rPr lang="en-US" sz="1400" dirty="0">
                 <a:solidFill>
                   <a:schemeClr val="accent6">
                     <a:lumMod val="75000"/>
@@ -6055,13 +6035,6 @@
               </a:rPr>
               <a:t>to file</a:t>
             </a:r>
-            <a:endParaRPr lang="en-US" sz="1400" dirty="0">
-              <a:solidFill>
-                <a:schemeClr val="accent6">
-                  <a:lumMod val="75000"/>
-                </a:schemeClr>
-              </a:solidFill>
-            </a:endParaRPr>
           </a:p>
         </p:txBody>
       </p:sp>

</xml_diff>

<commit_message>
update dev guide and add activity diagrams
</commit_message>
<xml_diff>
--- a/docs/diagrams/HighLevelSequenceDiagrams.pptx
+++ b/docs/diagrams/HighLevelSequenceDiagrams.pptx
@@ -208,7 +208,7 @@
           <a:p>
             <a:fld id="{F5CC4B3F-88C1-4FFA-B1B6-F41C21DC6924}" type="datetimeFigureOut">
               <a:rPr lang="en-US" smtClean="0"/>
-              <a:t>3/21/2017</a:t>
+              <a:t>08-Apr-17</a:t>
             </a:fld>
             <a:endParaRPr lang="en-US"/>
           </a:p>
@@ -654,7 +654,7 @@
           <a:p>
             <a:fld id="{78C97017-6FC3-485B-9764-EAC9E56C1D49}" type="datetimeFigureOut">
               <a:rPr lang="en-US" smtClean="0"/>
-              <a:t>3/21/2017</a:t>
+              <a:t>08-Apr-17</a:t>
             </a:fld>
             <a:endParaRPr lang="en-US"/>
           </a:p>
@@ -822,7 +822,7 @@
           <a:p>
             <a:fld id="{78C97017-6FC3-485B-9764-EAC9E56C1D49}" type="datetimeFigureOut">
               <a:rPr lang="en-US" smtClean="0"/>
-              <a:t>3/21/2017</a:t>
+              <a:t>08-Apr-17</a:t>
             </a:fld>
             <a:endParaRPr lang="en-US"/>
           </a:p>
@@ -1000,7 +1000,7 @@
           <a:p>
             <a:fld id="{78C97017-6FC3-485B-9764-EAC9E56C1D49}" type="datetimeFigureOut">
               <a:rPr lang="en-US" smtClean="0"/>
-              <a:t>3/21/2017</a:t>
+              <a:t>08-Apr-17</a:t>
             </a:fld>
             <a:endParaRPr lang="en-US"/>
           </a:p>
@@ -1168,7 +1168,7 @@
           <a:p>
             <a:fld id="{78C97017-6FC3-485B-9764-EAC9E56C1D49}" type="datetimeFigureOut">
               <a:rPr lang="en-US" smtClean="0"/>
-              <a:t>3/21/2017</a:t>
+              <a:t>08-Apr-17</a:t>
             </a:fld>
             <a:endParaRPr lang="en-US"/>
           </a:p>
@@ -1413,7 +1413,7 @@
           <a:p>
             <a:fld id="{78C97017-6FC3-485B-9764-EAC9E56C1D49}" type="datetimeFigureOut">
               <a:rPr lang="en-US" smtClean="0"/>
-              <a:t>3/21/2017</a:t>
+              <a:t>08-Apr-17</a:t>
             </a:fld>
             <a:endParaRPr lang="en-US"/>
           </a:p>
@@ -1698,7 +1698,7 @@
           <a:p>
             <a:fld id="{78C97017-6FC3-485B-9764-EAC9E56C1D49}" type="datetimeFigureOut">
               <a:rPr lang="en-US" smtClean="0"/>
-              <a:t>3/21/2017</a:t>
+              <a:t>08-Apr-17</a:t>
             </a:fld>
             <a:endParaRPr lang="en-US"/>
           </a:p>
@@ -2117,7 +2117,7 @@
           <a:p>
             <a:fld id="{78C97017-6FC3-485B-9764-EAC9E56C1D49}" type="datetimeFigureOut">
               <a:rPr lang="en-US" smtClean="0"/>
-              <a:t>3/21/2017</a:t>
+              <a:t>08-Apr-17</a:t>
             </a:fld>
             <a:endParaRPr lang="en-US"/>
           </a:p>
@@ -2234,7 +2234,7 @@
           <a:p>
             <a:fld id="{78C97017-6FC3-485B-9764-EAC9E56C1D49}" type="datetimeFigureOut">
               <a:rPr lang="en-US" smtClean="0"/>
-              <a:t>3/21/2017</a:t>
+              <a:t>08-Apr-17</a:t>
             </a:fld>
             <a:endParaRPr lang="en-US"/>
           </a:p>
@@ -2329,7 +2329,7 @@
           <a:p>
             <a:fld id="{78C97017-6FC3-485B-9764-EAC9E56C1D49}" type="datetimeFigureOut">
               <a:rPr lang="en-US" smtClean="0"/>
-              <a:t>3/21/2017</a:t>
+              <a:t>08-Apr-17</a:t>
             </a:fld>
             <a:endParaRPr lang="en-US"/>
           </a:p>
@@ -2604,7 +2604,7 @@
           <a:p>
             <a:fld id="{78C97017-6FC3-485B-9764-EAC9E56C1D49}" type="datetimeFigureOut">
               <a:rPr lang="en-US" smtClean="0"/>
-              <a:t>3/21/2017</a:t>
+              <a:t>08-Apr-17</a:t>
             </a:fld>
             <a:endParaRPr lang="en-US"/>
           </a:p>
@@ -2856,7 +2856,7 @@
           <a:p>
             <a:fld id="{78C97017-6FC3-485B-9764-EAC9E56C1D49}" type="datetimeFigureOut">
               <a:rPr lang="en-US" smtClean="0"/>
-              <a:t>3/21/2017</a:t>
+              <a:t>08-Apr-17</a:t>
             </a:fld>
             <a:endParaRPr lang="en-US"/>
           </a:p>
@@ -3067,7 +3067,7 @@
           <a:p>
             <a:fld id="{78C97017-6FC3-485B-9764-EAC9E56C1D49}" type="datetimeFigureOut">
               <a:rPr lang="en-US" smtClean="0"/>
-              <a:t>3/21/2017</a:t>
+              <a:t>08-Apr-17</a:t>
             </a:fld>
             <a:endParaRPr lang="en-US"/>
           </a:p>
@@ -4160,8 +4160,17 @@
           <a:p>
             <a:r>
               <a:rPr lang="en-US" sz="1400" dirty="0"/>
-              <a:t>delete 1</a:t>
-            </a:r>
+              <a:t>delete </a:t>
+            </a:r>
+            <a:r>
+              <a:rPr lang="en-US" sz="1400" dirty="0" err="1" smtClean="0"/>
+              <a:t>ev</a:t>
+            </a:r>
+            <a:r>
+              <a:rPr lang="en-US" sz="1400" dirty="0" smtClean="0"/>
+              <a:t> 1</a:t>
+            </a:r>
+            <a:endParaRPr lang="en-US" sz="1400" dirty="0"/>
           </a:p>
         </p:txBody>
       </p:sp>
@@ -4210,7 +4219,7 @@
         <p:spPr>
           <a:xfrm>
             <a:off x="2166172" y="1453379"/>
-            <a:ext cx="1424846" cy="215444"/>
+            <a:ext cx="1424846" cy="430887"/>
           </a:xfrm>
           <a:prstGeom prst="rect">
             <a:avLst/>
@@ -4229,7 +4238,31 @@
                   <a:srgbClr val="0070C0"/>
                 </a:solidFill>
               </a:rPr>
-              <a:t>execute(“delete 1”)</a:t>
+              <a:t>execute(“delete </a:t>
+            </a:r>
+            <a:r>
+              <a:rPr lang="en-US" sz="1400" dirty="0" err="1" smtClean="0">
+                <a:solidFill>
+                  <a:srgbClr val="0070C0"/>
+                </a:solidFill>
+              </a:rPr>
+              <a:t>ev</a:t>
+            </a:r>
+            <a:r>
+              <a:rPr lang="en-US" sz="1400" dirty="0" smtClean="0">
+                <a:solidFill>
+                  <a:srgbClr val="0070C0"/>
+                </a:solidFill>
+              </a:rPr>
+              <a:t> 1</a:t>
+            </a:r>
+            <a:r>
+              <a:rPr lang="en-US" sz="1400" dirty="0">
+                <a:solidFill>
+                  <a:srgbClr val="0070C0"/>
+                </a:solidFill>
+              </a:rPr>
+              <a:t>”)</a:t>
             </a:r>
           </a:p>
         </p:txBody>
@@ -4293,12 +4326,20 @@
           <a:lstStyle/>
           <a:p>
             <a:r>
-              <a:rPr lang="en-US" sz="1400" dirty="0" err="1">
+              <a:rPr lang="en-US" sz="1400" dirty="0" err="1" smtClean="0">
                 <a:solidFill>
                   <a:srgbClr val="7030A0"/>
                 </a:solidFill>
               </a:rPr>
-              <a:t>deleteActivity</a:t>
+              <a:t>deleteEvent</a:t>
+            </a:r>
+            <a:r>
+              <a:rPr lang="en-US" sz="1400" dirty="0" smtClean="0">
+                <a:solidFill>
+                  <a:srgbClr val="7030A0"/>
+                </a:solidFill>
+              </a:rPr>
+              <a:t>(p</a:t>
             </a:r>
             <a:r>
               <a:rPr lang="en-US" sz="1400" dirty="0">
@@ -4306,7 +4347,7 @@
                   <a:srgbClr val="7030A0"/>
                 </a:solidFill>
               </a:rPr>
-              <a:t>(p)</a:t>
+              <a:t>)</a:t>
             </a:r>
           </a:p>
         </p:txBody>

</xml_diff>

<commit_message>
Update DeveloperGuide to use Task/TaskList
Removes all mention of address book and person from the developer guide.
Also refactors `handleAddressBookChangedEvent` to `handleTaskListChangedEvent`.
</commit_message>
<xml_diff>
--- a/docs/diagrams/HighLevelSequenceDiagrams.pptx
+++ b/docs/diagrams/HighLevelSequenceDiagrams.pptx
@@ -192,7 +192,7 @@
           <a:p>
             <a:fld id="{F5CC4B3F-88C1-4FFA-B1B6-F41C21DC6924}" type="datetimeFigureOut">
               <a:rPr lang="en-US" smtClean="0"/>
-              <a:t>10/16/2016</a:t>
+              <a:t>17-04-09</a:t>
             </a:fld>
             <a:endParaRPr lang="en-US"/>
           </a:p>
@@ -641,7 +641,7 @@
           <a:p>
             <a:fld id="{78C97017-6FC3-485B-9764-EAC9E56C1D49}" type="datetimeFigureOut">
               <a:rPr lang="en-US" smtClean="0"/>
-              <a:t>10/16/2016</a:t>
+              <a:t>17-04-09</a:t>
             </a:fld>
             <a:endParaRPr lang="en-US"/>
           </a:p>
@@ -811,7 +811,7 @@
           <a:p>
             <a:fld id="{78C97017-6FC3-485B-9764-EAC9E56C1D49}" type="datetimeFigureOut">
               <a:rPr lang="en-US" smtClean="0"/>
-              <a:t>10/16/2016</a:t>
+              <a:t>17-04-09</a:t>
             </a:fld>
             <a:endParaRPr lang="en-US"/>
           </a:p>
@@ -991,7 +991,7 @@
           <a:p>
             <a:fld id="{78C97017-6FC3-485B-9764-EAC9E56C1D49}" type="datetimeFigureOut">
               <a:rPr lang="en-US" smtClean="0"/>
-              <a:t>10/16/2016</a:t>
+              <a:t>17-04-09</a:t>
             </a:fld>
             <a:endParaRPr lang="en-US"/>
           </a:p>
@@ -1161,7 +1161,7 @@
           <a:p>
             <a:fld id="{78C97017-6FC3-485B-9764-EAC9E56C1D49}" type="datetimeFigureOut">
               <a:rPr lang="en-US" smtClean="0"/>
-              <a:t>10/16/2016</a:t>
+              <a:t>17-04-09</a:t>
             </a:fld>
             <a:endParaRPr lang="en-US"/>
           </a:p>
@@ -1407,7 +1407,7 @@
           <a:p>
             <a:fld id="{78C97017-6FC3-485B-9764-EAC9E56C1D49}" type="datetimeFigureOut">
               <a:rPr lang="en-US" smtClean="0"/>
-              <a:t>10/16/2016</a:t>
+              <a:t>17-04-09</a:t>
             </a:fld>
             <a:endParaRPr lang="en-US"/>
           </a:p>
@@ -1695,7 +1695,7 @@
           <a:p>
             <a:fld id="{78C97017-6FC3-485B-9764-EAC9E56C1D49}" type="datetimeFigureOut">
               <a:rPr lang="en-US" smtClean="0"/>
-              <a:t>10/16/2016</a:t>
+              <a:t>17-04-09</a:t>
             </a:fld>
             <a:endParaRPr lang="en-US"/>
           </a:p>
@@ -2117,7 +2117,7 @@
           <a:p>
             <a:fld id="{78C97017-6FC3-485B-9764-EAC9E56C1D49}" type="datetimeFigureOut">
               <a:rPr lang="en-US" smtClean="0"/>
-              <a:t>10/16/2016</a:t>
+              <a:t>17-04-09</a:t>
             </a:fld>
             <a:endParaRPr lang="en-US"/>
           </a:p>
@@ -2235,7 +2235,7 @@
           <a:p>
             <a:fld id="{78C97017-6FC3-485B-9764-EAC9E56C1D49}" type="datetimeFigureOut">
               <a:rPr lang="en-US" smtClean="0"/>
-              <a:t>10/16/2016</a:t>
+              <a:t>17-04-09</a:t>
             </a:fld>
             <a:endParaRPr lang="en-US"/>
           </a:p>
@@ -2330,7 +2330,7 @@
           <a:p>
             <a:fld id="{78C97017-6FC3-485B-9764-EAC9E56C1D49}" type="datetimeFigureOut">
               <a:rPr lang="en-US" smtClean="0"/>
-              <a:t>10/16/2016</a:t>
+              <a:t>17-04-09</a:t>
             </a:fld>
             <a:endParaRPr lang="en-US"/>
           </a:p>
@@ -2607,7 +2607,7 @@
           <a:p>
             <a:fld id="{78C97017-6FC3-485B-9764-EAC9E56C1D49}" type="datetimeFigureOut">
               <a:rPr lang="en-US" smtClean="0"/>
-              <a:t>10/16/2016</a:t>
+              <a:t>17-04-09</a:t>
             </a:fld>
             <a:endParaRPr lang="en-US"/>
           </a:p>
@@ -2860,7 +2860,7 @@
           <a:p>
             <a:fld id="{78C97017-6FC3-485B-9764-EAC9E56C1D49}" type="datetimeFigureOut">
               <a:rPr lang="en-US" smtClean="0"/>
-              <a:t>10/16/2016</a:t>
+              <a:t>17-04-09</a:t>
             </a:fld>
             <a:endParaRPr lang="en-US"/>
           </a:p>
@@ -3073,7 +3073,7 @@
           <a:p>
             <a:fld id="{78C97017-6FC3-485B-9764-EAC9E56C1D49}" type="datetimeFigureOut">
               <a:rPr lang="en-US" smtClean="0"/>
-              <a:t>10/16/2016</a:t>
+              <a:t>17-04-09</a:t>
             </a:fld>
             <a:endParaRPr lang="en-US"/>
           </a:p>
@@ -4310,7 +4310,7 @@
                   <a:srgbClr val="7030A0"/>
                 </a:solidFill>
               </a:rPr>
-              <a:t>deletePerson</a:t>
+              <a:t>deleteTask</a:t>
             </a:r>
             <a:r>
               <a:rPr lang="en-US" sz="1400" dirty="0" smtClean="0">
@@ -4318,7 +4318,15 @@
                   <a:srgbClr val="7030A0"/>
                 </a:solidFill>
               </a:rPr>
-              <a:t>(p)</a:t>
+              <a:t>(</a:t>
+            </a:r>
+            <a:r>
+              <a:rPr lang="en-US" sz="1400" dirty="0" smtClean="0">
+                <a:solidFill>
+                  <a:srgbClr val="7030A0"/>
+                </a:solidFill>
+              </a:rPr>
+              <a:t>p)</a:t>
             </a:r>
             <a:endParaRPr lang="en-US" sz="1400" dirty="0">
               <a:solidFill>
@@ -4358,7 +4366,7 @@
                   </a:schemeClr>
                 </a:solidFill>
               </a:rPr>
-              <a:t>post(</a:t>
+              <a:t>Post(</a:t>
             </a:r>
             <a:r>
               <a:rPr lang="en-US" sz="1400" dirty="0" err="1" smtClean="0">
@@ -4368,7 +4376,17 @@
                   </a:schemeClr>
                 </a:solidFill>
               </a:rPr>
-              <a:t>AddressBookChangedEvent</a:t>
+              <a:t>TaskList</a:t>
+            </a:r>
+            <a:r>
+              <a:rPr lang="en-US" sz="1400" dirty="0" err="1" smtClean="0">
+                <a:solidFill>
+                  <a:schemeClr val="accent5">
+                    <a:lumMod val="75000"/>
+                  </a:schemeClr>
+                </a:solidFill>
+              </a:rPr>
+              <a:t>ChangedEvent</a:t>
             </a:r>
             <a:r>
               <a:rPr lang="en-US" sz="1400" dirty="0" smtClean="0">
@@ -4932,7 +4950,7 @@
                   </a:schemeClr>
                 </a:solidFill>
               </a:rPr>
-              <a:t>post(</a:t>
+              <a:t>Post(</a:t>
             </a:r>
             <a:r>
               <a:rPr lang="en-US" sz="1400" dirty="0" err="1" smtClean="0">
@@ -4942,7 +4960,17 @@
                   </a:schemeClr>
                 </a:solidFill>
               </a:rPr>
-              <a:t>AddressBookChangedEvent</a:t>
+              <a:t>TaskList</a:t>
+            </a:r>
+            <a:r>
+              <a:rPr lang="en-US" sz="1400" dirty="0" err="1" smtClean="0">
+                <a:solidFill>
+                  <a:schemeClr val="accent5">
+                    <a:lumMod val="75000"/>
+                  </a:schemeClr>
+                </a:solidFill>
+              </a:rPr>
+              <a:t>ChangedEvent</a:t>
             </a:r>
             <a:r>
               <a:rPr lang="en-US" sz="1400" dirty="0" smtClean="0">
@@ -5314,7 +5342,7 @@
                   </a:schemeClr>
                 </a:solidFill>
               </a:rPr>
-              <a:t>handleAddresssBookChangedEvent</a:t>
+              <a:t>handleTaskListChangedEvent</a:t>
             </a:r>
             <a:r>
               <a:rPr lang="en-US" sz="1400" dirty="0" smtClean="0">
@@ -5625,7 +5653,7 @@
                   <a:srgbClr val="00B050"/>
                 </a:solidFill>
               </a:rPr>
-              <a:t>handleAddresssBookChangedEvent</a:t>
+              <a:t>handleTaskListChangedEvent</a:t>
             </a:r>
             <a:r>
               <a:rPr lang="en-US" sz="1400" dirty="0" smtClean="0">

</xml_diff>